<commit_message>
Last minute change Genesis
</commit_message>
<xml_diff>
--- a/PPT/Easy != Simple.pptx
+++ b/PPT/Easy != Simple.pptx
@@ -224,7 +224,7 @@
           <a:p>
             <a:fld id="{29301A56-A927-403C-8918-21E784444591}" type="datetimeFigureOut">
               <a:rPr lang="fr-FR" smtClean="0"/>
-              <a:t>04/05/2019</a:t>
+              <a:t>09/05/2019</a:t>
             </a:fld>
             <a:endParaRPr lang="fr-FR"/>
           </a:p>
@@ -535,48 +535,9 @@
           <a:bodyPr/>
           <a:lstStyle/>
           <a:p>
-            <a:pPr marL="228600" indent="-228600">
-              <a:buAutoNum type="arabicParenR"/>
+            <a:pPr marL="0" indent="0">
+              <a:buNone/>
             </a:pPr>
-            <a:r>
-              <a:rPr lang="fr-BE" dirty="0"/>
-              <a:t>First </a:t>
-            </a:r>
-            <a:r>
-              <a:rPr lang="fr-BE" dirty="0" err="1"/>
-              <a:t>Kirill</a:t>
-            </a:r>
-            <a:r>
-              <a:rPr lang="fr-BE" dirty="0"/>
-              <a:t> et injection d’indépendance impossible</a:t>
-            </a:r>
-          </a:p>
-          <a:p>
-            <a:pPr marL="228600" indent="-228600">
-              <a:buAutoNum type="arabicParenR"/>
-            </a:pPr>
-            <a:r>
-              <a:rPr lang="fr-BE" dirty="0"/>
-              <a:t>Sébastien &amp; </a:t>
-            </a:r>
-            <a:r>
-              <a:rPr lang="fr-BE" dirty="0" err="1"/>
-              <a:t>HttpContext</a:t>
-            </a:r>
-            <a:endParaRPr lang="fr-BE" dirty="0"/>
-          </a:p>
-          <a:p>
-            <a:pPr marL="228600" indent="-228600">
-              <a:buAutoNum type="arabicParenR"/>
-            </a:pPr>
-            <a:r>
-              <a:rPr lang="fr-BE" dirty="0"/>
-              <a:t>Proxy pattern avec Benoit </a:t>
-            </a:r>
-            <a:r>
-              <a:rPr lang="fr-BE" dirty="0" err="1"/>
-              <a:t>Bizzdev</a:t>
-            </a:r>
             <a:endParaRPr lang="fr-FR" dirty="0"/>
           </a:p>
         </p:txBody>
@@ -1139,7 +1100,19 @@
           <a:p>
             <a:r>
               <a:rPr lang="fr-BE" dirty="0"/>
-              <a:t>Exemple du carré qui n’est pas représentant du rectangle</a:t>
+              <a:t>Exemple du carré qui n’est pas représentant du rectangle.</a:t>
+            </a:r>
+          </a:p>
+          <a:p>
+            <a:r>
+              <a:rPr lang="fr-BE" dirty="0"/>
+              <a:t>Programmation par contrat</a:t>
+            </a:r>
+          </a:p>
+          <a:p>
+            <a:r>
+              <a:rPr lang="fr-BE" dirty="0"/>
+              <a:t>Post and Pré condition</a:t>
             </a:r>
           </a:p>
         </p:txBody>
@@ -2400,7 +2373,7 @@
             <a:fld id="{B61BEF0D-F0BB-DE4B-95CE-6DB70DBA9567}" type="datetimeFigureOut">
               <a:rPr lang="en-US" dirty="0"/>
               <a:pPr/>
-              <a:t>5/4/2019</a:t>
+              <a:t>5/9/2019</a:t>
             </a:fld>
             <a:endParaRPr lang="en-US" dirty="0"/>
           </a:p>
@@ -2648,7 +2621,7 @@
             <a:fld id="{B61BEF0D-F0BB-DE4B-95CE-6DB70DBA9567}" type="datetimeFigureOut">
               <a:rPr lang="en-US" dirty="0"/>
               <a:pPr/>
-              <a:t>5/4/2019</a:t>
+              <a:t>5/9/2019</a:t>
             </a:fld>
             <a:endParaRPr lang="en-US" dirty="0"/>
           </a:p>
@@ -2959,7 +2932,7 @@
             <a:fld id="{B61BEF0D-F0BB-DE4B-95CE-6DB70DBA9567}" type="datetimeFigureOut">
               <a:rPr lang="en-US" dirty="0"/>
               <a:pPr/>
-              <a:t>5/4/2019</a:t>
+              <a:t>5/9/2019</a:t>
             </a:fld>
             <a:endParaRPr lang="en-US" dirty="0"/>
           </a:p>
@@ -3297,7 +3270,7 @@
             <a:fld id="{B61BEF0D-F0BB-DE4B-95CE-6DB70DBA9567}" type="datetimeFigureOut">
               <a:rPr lang="en-US" dirty="0"/>
               <a:pPr/>
-              <a:t>5/4/2019</a:t>
+              <a:t>5/9/2019</a:t>
             </a:fld>
             <a:endParaRPr lang="en-US" dirty="0"/>
           </a:p>
@@ -3608,7 +3581,7 @@
             <a:fld id="{B61BEF0D-F0BB-DE4B-95CE-6DB70DBA9567}" type="datetimeFigureOut">
               <a:rPr lang="en-US" dirty="0"/>
               <a:pPr/>
-              <a:t>5/4/2019</a:t>
+              <a:t>5/9/2019</a:t>
             </a:fld>
             <a:endParaRPr lang="en-US" dirty="0"/>
           </a:p>
@@ -3998,7 +3971,7 @@
             <a:fld id="{B61BEF0D-F0BB-DE4B-95CE-6DB70DBA9567}" type="datetimeFigureOut">
               <a:rPr lang="en-US" dirty="0"/>
               <a:pPr/>
-              <a:t>5/4/2019</a:t>
+              <a:t>5/9/2019</a:t>
             </a:fld>
             <a:endParaRPr lang="en-US" dirty="0"/>
           </a:p>
@@ -4164,7 +4137,7 @@
           <a:p>
             <a:fld id="{55C6B4A9-1611-4792-9094-5F34BCA07E0B}" type="datetimeFigureOut">
               <a:rPr lang="en-US" dirty="0"/>
-              <a:t>5/4/2019</a:t>
+              <a:t>5/9/2019</a:t>
             </a:fld>
             <a:endParaRPr lang="en-US" dirty="0"/>
           </a:p>
@@ -4340,7 +4313,7 @@
             <a:fld id="{B61BEF0D-F0BB-DE4B-95CE-6DB70DBA9567}" type="datetimeFigureOut">
               <a:rPr lang="en-US" dirty="0"/>
               <a:pPr/>
-              <a:t>5/4/2019</a:t>
+              <a:t>5/9/2019</a:t>
             </a:fld>
             <a:endParaRPr lang="en-US" dirty="0"/>
           </a:p>
@@ -4513,7 +4486,7 @@
             <a:fld id="{B61BEF0D-F0BB-DE4B-95CE-6DB70DBA9567}" type="datetimeFigureOut">
               <a:rPr lang="en-US" dirty="0"/>
               <a:pPr/>
-              <a:t>5/4/2019</a:t>
+              <a:t>5/9/2019</a:t>
             </a:fld>
             <a:endParaRPr lang="en-US" dirty="0"/>
           </a:p>
@@ -4757,7 +4730,7 @@
             <a:fld id="{B61BEF0D-F0BB-DE4B-95CE-6DB70DBA9567}" type="datetimeFigureOut">
               <a:rPr lang="en-US" dirty="0"/>
               <a:pPr/>
-              <a:t>5/4/2019</a:t>
+              <a:t>5/9/2019</a:t>
             </a:fld>
             <a:endParaRPr lang="en-US" dirty="0"/>
           </a:p>
@@ -4985,7 +4958,7 @@
           <a:p>
             <a:fld id="{EB712588-04B1-427B-82EE-E8DB90309F08}" type="datetimeFigureOut">
               <a:rPr lang="en-US" dirty="0"/>
-              <a:t>5/4/2019</a:t>
+              <a:t>5/9/2019</a:t>
             </a:fld>
             <a:endParaRPr lang="en-US" dirty="0"/>
           </a:p>
@@ -5355,7 +5328,7 @@
             <a:fld id="{B61BEF0D-F0BB-DE4B-95CE-6DB70DBA9567}" type="datetimeFigureOut">
               <a:rPr lang="en-US" dirty="0"/>
               <a:pPr/>
-              <a:t>5/4/2019</a:t>
+              <a:t>5/9/2019</a:t>
             </a:fld>
             <a:endParaRPr lang="en-US" dirty="0"/>
           </a:p>
@@ -5475,7 +5448,7 @@
             <a:fld id="{B61BEF0D-F0BB-DE4B-95CE-6DB70DBA9567}" type="datetimeFigureOut">
               <a:rPr lang="en-US" dirty="0"/>
               <a:pPr/>
-              <a:t>5/4/2019</a:t>
+              <a:t>5/9/2019</a:t>
             </a:fld>
             <a:endParaRPr lang="en-US" dirty="0"/>
           </a:p>
@@ -5567,7 +5540,7 @@
             <a:fld id="{B61BEF0D-F0BB-DE4B-95CE-6DB70DBA9567}" type="datetimeFigureOut">
               <a:rPr lang="en-US" dirty="0"/>
               <a:pPr/>
-              <a:t>5/4/2019</a:t>
+              <a:t>5/9/2019</a:t>
             </a:fld>
             <a:endParaRPr lang="en-US" dirty="0"/>
           </a:p>
@@ -5818,7 +5791,7 @@
           <a:p>
             <a:fld id="{42A54C80-263E-416B-A8E0-580EDEADCBDC}" type="datetimeFigureOut">
               <a:rPr lang="en-US" dirty="0"/>
-              <a:t>5/4/2019</a:t>
+              <a:t>5/9/2019</a:t>
             </a:fld>
             <a:endParaRPr lang="en-US" dirty="0"/>
           </a:p>
@@ -6077,7 +6050,7 @@
             <a:fld id="{B61BEF0D-F0BB-DE4B-95CE-6DB70DBA9567}" type="datetimeFigureOut">
               <a:rPr lang="en-US" dirty="0"/>
               <a:pPr/>
-              <a:t>5/4/2019</a:t>
+              <a:t>5/9/2019</a:t>
             </a:fld>
             <a:endParaRPr lang="en-US" dirty="0"/>
           </a:p>
@@ -6817,7 +6790,7 @@
             <a:fld id="{B61BEF0D-F0BB-DE4B-95CE-6DB70DBA9567}" type="datetimeFigureOut">
               <a:rPr lang="en-US" dirty="0"/>
               <a:pPr/>
-              <a:t>5/4/2019</a:t>
+              <a:t>5/9/2019</a:t>
             </a:fld>
             <a:endParaRPr lang="en-US" dirty="0"/>
           </a:p>
@@ -8985,6 +8958,11 @@
               <a:rPr lang="fr-FR" dirty="0"/>
               <a:t> depuis 2018</a:t>
             </a:r>
+          </a:p>
+          <a:p>
+            <a:endParaRPr lang="fr-FR" dirty="0"/>
+          </a:p>
+          <a:p>
             <a:endParaRPr lang="fr-BE" dirty="0"/>
           </a:p>
         </p:txBody>
@@ -10644,6 +10622,12 @@
               <a:rPr lang="fr-BE" dirty="0"/>
               <a:t>Présente divers principes pour le monde de l’orienté objet.</a:t>
             </a:r>
+          </a:p>
+          <a:p>
+            <a:r>
+              <a:rPr lang="fr-BE" dirty="0"/>
+              <a:t>Est conviviale. Les réactions sont la bienvenus</a:t>
+            </a:r>
             <a:endParaRPr lang="fr-FR" dirty="0"/>
           </a:p>
         </p:txBody>
@@ -11291,7 +11275,6 @@
               <a:rPr lang="fr-BE" dirty="0"/>
               <a:t>A l’inverse modifier du code/une class existante augmente les risques de régression</a:t>
             </a:r>
-            <a:endParaRPr lang="fr-FR" dirty="0"/>
           </a:p>
         </p:txBody>
       </p:sp>

</xml_diff>

<commit_message>
Correction de quelques fautes d'orthographe
</commit_message>
<xml_diff>
--- a/PPT/Easy != Simple.pptx
+++ b/PPT/Easy != Simple.pptx
@@ -224,7 +224,7 @@
           <a:p>
             <a:fld id="{29301A56-A927-403C-8918-21E784444591}" type="datetimeFigureOut">
               <a:rPr lang="fr-FR" smtClean="0"/>
-              <a:t>09/05/2019</a:t>
+              <a:t>13/05/2019</a:t>
             </a:fld>
             <a:endParaRPr lang="fr-FR"/>
           </a:p>
@@ -382,7 +382,7 @@
           <a:p>
             <a:fld id="{6F10D748-FFE4-4788-B13E-F644A7CDC41E}" type="slidenum">
               <a:rPr lang="fr-FR" smtClean="0"/>
-              <a:t>‹N°›</a:t>
+              <a:t>‹#›</a:t>
             </a:fld>
             <a:endParaRPr lang="fr-FR"/>
           </a:p>
@@ -2373,7 +2373,7 @@
             <a:fld id="{B61BEF0D-F0BB-DE4B-95CE-6DB70DBA9567}" type="datetimeFigureOut">
               <a:rPr lang="en-US" dirty="0"/>
               <a:pPr/>
-              <a:t>5/9/2019</a:t>
+              <a:t>5/13/2019</a:t>
             </a:fld>
             <a:endParaRPr lang="en-US" dirty="0"/>
           </a:p>
@@ -2416,7 +2416,7 @@
             <a:fld id="{D57F1E4F-1CFF-5643-939E-217C01CDF565}" type="slidenum">
               <a:rPr lang="en-US" dirty="0"/>
               <a:pPr/>
-              <a:t>‹N°›</a:t>
+              <a:t>‹#›</a:t>
             </a:fld>
             <a:endParaRPr lang="en-US" dirty="0"/>
           </a:p>
@@ -2621,7 +2621,7 @@
             <a:fld id="{B61BEF0D-F0BB-DE4B-95CE-6DB70DBA9567}" type="datetimeFigureOut">
               <a:rPr lang="en-US" dirty="0"/>
               <a:pPr/>
-              <a:t>5/9/2019</a:t>
+              <a:t>5/13/2019</a:t>
             </a:fld>
             <a:endParaRPr lang="en-US" dirty="0"/>
           </a:p>
@@ -2664,7 +2664,7 @@
             <a:fld id="{D57F1E4F-1CFF-5643-939E-217C01CDF565}" type="slidenum">
               <a:rPr lang="en-US" dirty="0"/>
               <a:pPr/>
-              <a:t>‹N°›</a:t>
+              <a:t>‹#›</a:t>
             </a:fld>
             <a:endParaRPr lang="en-US" dirty="0"/>
           </a:p>
@@ -2932,7 +2932,7 @@
             <a:fld id="{B61BEF0D-F0BB-DE4B-95CE-6DB70DBA9567}" type="datetimeFigureOut">
               <a:rPr lang="en-US" dirty="0"/>
               <a:pPr/>
-              <a:t>5/9/2019</a:t>
+              <a:t>5/13/2019</a:t>
             </a:fld>
             <a:endParaRPr lang="en-US" dirty="0"/>
           </a:p>
@@ -2975,7 +2975,7 @@
             <a:fld id="{D57F1E4F-1CFF-5643-939E-217C01CDF565}" type="slidenum">
               <a:rPr lang="en-US" dirty="0"/>
               <a:pPr/>
-              <a:t>‹N°›</a:t>
+              <a:t>‹#›</a:t>
             </a:fld>
             <a:endParaRPr lang="en-US" dirty="0"/>
           </a:p>
@@ -3270,7 +3270,7 @@
             <a:fld id="{B61BEF0D-F0BB-DE4B-95CE-6DB70DBA9567}" type="datetimeFigureOut">
               <a:rPr lang="en-US" dirty="0"/>
               <a:pPr/>
-              <a:t>5/9/2019</a:t>
+              <a:t>5/13/2019</a:t>
             </a:fld>
             <a:endParaRPr lang="en-US" dirty="0"/>
           </a:p>
@@ -3313,7 +3313,7 @@
             <a:fld id="{D57F1E4F-1CFF-5643-939E-217C01CDF565}" type="slidenum">
               <a:rPr lang="en-US" dirty="0"/>
               <a:pPr/>
-              <a:t>‹N°›</a:t>
+              <a:t>‹#›</a:t>
             </a:fld>
             <a:endParaRPr lang="en-US" dirty="0"/>
           </a:p>
@@ -3581,7 +3581,7 @@
             <a:fld id="{B61BEF0D-F0BB-DE4B-95CE-6DB70DBA9567}" type="datetimeFigureOut">
               <a:rPr lang="en-US" dirty="0"/>
               <a:pPr/>
-              <a:t>5/9/2019</a:t>
+              <a:t>5/13/2019</a:t>
             </a:fld>
             <a:endParaRPr lang="en-US" dirty="0"/>
           </a:p>
@@ -3624,7 +3624,7 @@
             <a:fld id="{D57F1E4F-1CFF-5643-939E-217C01CDF565}" type="slidenum">
               <a:rPr lang="en-US" dirty="0"/>
               <a:pPr/>
-              <a:t>‹N°›</a:t>
+              <a:t>‹#›</a:t>
             </a:fld>
             <a:endParaRPr lang="en-US" dirty="0"/>
           </a:p>
@@ -3971,7 +3971,7 @@
             <a:fld id="{B61BEF0D-F0BB-DE4B-95CE-6DB70DBA9567}" type="datetimeFigureOut">
               <a:rPr lang="en-US" dirty="0"/>
               <a:pPr/>
-              <a:t>5/9/2019</a:t>
+              <a:t>5/13/2019</a:t>
             </a:fld>
             <a:endParaRPr lang="en-US" dirty="0"/>
           </a:p>
@@ -4014,7 +4014,7 @@
             <a:fld id="{D57F1E4F-1CFF-5643-939E-217C01CDF565}" type="slidenum">
               <a:rPr lang="en-US" dirty="0"/>
               <a:pPr/>
-              <a:t>‹N°›</a:t>
+              <a:t>‹#›</a:t>
             </a:fld>
             <a:endParaRPr lang="en-US" dirty="0"/>
           </a:p>
@@ -4137,7 +4137,7 @@
           <a:p>
             <a:fld id="{55C6B4A9-1611-4792-9094-5F34BCA07E0B}" type="datetimeFigureOut">
               <a:rPr lang="en-US" dirty="0"/>
-              <a:t>5/9/2019</a:t>
+              <a:t>5/13/2019</a:t>
             </a:fld>
             <a:endParaRPr lang="en-US" dirty="0"/>
           </a:p>
@@ -4179,7 +4179,7 @@
           <a:p>
             <a:fld id="{89333C77-0158-454C-844F-B7AB9BD7DAD4}" type="slidenum">
               <a:rPr lang="en-US" dirty="0"/>
-              <a:t>‹N°›</a:t>
+              <a:t>‹#›</a:t>
             </a:fld>
             <a:endParaRPr lang="en-US" dirty="0"/>
           </a:p>
@@ -4313,7 +4313,7 @@
             <a:fld id="{B61BEF0D-F0BB-DE4B-95CE-6DB70DBA9567}" type="datetimeFigureOut">
               <a:rPr lang="en-US" dirty="0"/>
               <a:pPr/>
-              <a:t>5/9/2019</a:t>
+              <a:t>5/13/2019</a:t>
             </a:fld>
             <a:endParaRPr lang="en-US" dirty="0"/>
           </a:p>
@@ -4356,7 +4356,7 @@
             <a:fld id="{D57F1E4F-1CFF-5643-939E-217C01CDF565}" type="slidenum">
               <a:rPr lang="en-US" dirty="0"/>
               <a:pPr/>
-              <a:t>‹N°›</a:t>
+              <a:t>‹#›</a:t>
             </a:fld>
             <a:endParaRPr lang="en-US" dirty="0"/>
           </a:p>
@@ -4486,7 +4486,7 @@
             <a:fld id="{B61BEF0D-F0BB-DE4B-95CE-6DB70DBA9567}" type="datetimeFigureOut">
               <a:rPr lang="en-US" dirty="0"/>
               <a:pPr/>
-              <a:t>5/9/2019</a:t>
+              <a:t>5/13/2019</a:t>
             </a:fld>
             <a:endParaRPr lang="en-US" dirty="0"/>
           </a:p>
@@ -4529,7 +4529,7 @@
             <a:fld id="{D57F1E4F-1CFF-5643-939E-217C01CDF565}" type="slidenum">
               <a:rPr lang="en-US" dirty="0"/>
               <a:pPr/>
-              <a:t>‹N°›</a:t>
+              <a:t>‹#›</a:t>
             </a:fld>
             <a:endParaRPr lang="en-US" dirty="0"/>
           </a:p>
@@ -4730,7 +4730,7 @@
             <a:fld id="{B61BEF0D-F0BB-DE4B-95CE-6DB70DBA9567}" type="datetimeFigureOut">
               <a:rPr lang="en-US" dirty="0"/>
               <a:pPr/>
-              <a:t>5/9/2019</a:t>
+              <a:t>5/13/2019</a:t>
             </a:fld>
             <a:endParaRPr lang="en-US" dirty="0"/>
           </a:p>
@@ -4773,7 +4773,7 @@
             <a:fld id="{D57F1E4F-1CFF-5643-939E-217C01CDF565}" type="slidenum">
               <a:rPr lang="en-US" dirty="0"/>
               <a:pPr/>
-              <a:t>‹N°›</a:t>
+              <a:t>‹#›</a:t>
             </a:fld>
             <a:endParaRPr lang="en-US" dirty="0"/>
           </a:p>
@@ -4958,7 +4958,7 @@
           <a:p>
             <a:fld id="{EB712588-04B1-427B-82EE-E8DB90309F08}" type="datetimeFigureOut">
               <a:rPr lang="en-US" dirty="0"/>
-              <a:t>5/9/2019</a:t>
+              <a:t>5/13/2019</a:t>
             </a:fld>
             <a:endParaRPr lang="en-US" dirty="0"/>
           </a:p>
@@ -5000,7 +5000,7 @@
           <a:p>
             <a:fld id="{6FF9F0C5-380F-41C2-899A-BAC0F0927E16}" type="slidenum">
               <a:rPr lang="en-US" dirty="0"/>
-              <a:t>‹N°›</a:t>
+              <a:t>‹#›</a:t>
             </a:fld>
             <a:endParaRPr lang="en-US" dirty="0"/>
           </a:p>
@@ -5328,7 +5328,7 @@
             <a:fld id="{B61BEF0D-F0BB-DE4B-95CE-6DB70DBA9567}" type="datetimeFigureOut">
               <a:rPr lang="en-US" dirty="0"/>
               <a:pPr/>
-              <a:t>5/9/2019</a:t>
+              <a:t>5/13/2019</a:t>
             </a:fld>
             <a:endParaRPr lang="en-US" dirty="0"/>
           </a:p>
@@ -5371,7 +5371,7 @@
             <a:fld id="{D57F1E4F-1CFF-5643-939E-217C01CDF565}" type="slidenum">
               <a:rPr lang="en-US" dirty="0"/>
               <a:pPr/>
-              <a:t>‹N°›</a:t>
+              <a:t>‹#›</a:t>
             </a:fld>
             <a:endParaRPr lang="en-US" dirty="0"/>
           </a:p>
@@ -5448,7 +5448,7 @@
             <a:fld id="{B61BEF0D-F0BB-DE4B-95CE-6DB70DBA9567}" type="datetimeFigureOut">
               <a:rPr lang="en-US" dirty="0"/>
               <a:pPr/>
-              <a:t>5/9/2019</a:t>
+              <a:t>5/13/2019</a:t>
             </a:fld>
             <a:endParaRPr lang="en-US" dirty="0"/>
           </a:p>
@@ -5491,7 +5491,7 @@
             <a:fld id="{D57F1E4F-1CFF-5643-939E-217C01CDF565}" type="slidenum">
               <a:rPr lang="en-US" dirty="0"/>
               <a:pPr/>
-              <a:t>‹N°›</a:t>
+              <a:t>‹#›</a:t>
             </a:fld>
             <a:endParaRPr lang="en-US" dirty="0"/>
           </a:p>
@@ -5540,7 +5540,7 @@
             <a:fld id="{B61BEF0D-F0BB-DE4B-95CE-6DB70DBA9567}" type="datetimeFigureOut">
               <a:rPr lang="en-US" dirty="0"/>
               <a:pPr/>
-              <a:t>5/9/2019</a:t>
+              <a:t>5/13/2019</a:t>
             </a:fld>
             <a:endParaRPr lang="en-US" dirty="0"/>
           </a:p>
@@ -5583,7 +5583,7 @@
             <a:fld id="{D57F1E4F-1CFF-5643-939E-217C01CDF565}" type="slidenum">
               <a:rPr lang="en-US" dirty="0"/>
               <a:pPr/>
-              <a:t>‹N°›</a:t>
+              <a:t>‹#›</a:t>
             </a:fld>
             <a:endParaRPr lang="en-US" dirty="0"/>
           </a:p>
@@ -5791,7 +5791,7 @@
           <a:p>
             <a:fld id="{42A54C80-263E-416B-A8E0-580EDEADCBDC}" type="datetimeFigureOut">
               <a:rPr lang="en-US" dirty="0"/>
-              <a:t>5/9/2019</a:t>
+              <a:t>5/13/2019</a:t>
             </a:fld>
             <a:endParaRPr lang="en-US" dirty="0"/>
           </a:p>
@@ -5833,7 +5833,7 @@
           <a:p>
             <a:fld id="{519954A3-9DFD-4C44-94BA-B95130A3BA1C}" type="slidenum">
               <a:rPr lang="en-US" dirty="0"/>
-              <a:t>‹N°›</a:t>
+              <a:t>‹#›</a:t>
             </a:fld>
             <a:endParaRPr lang="en-US" dirty="0"/>
           </a:p>
@@ -6050,7 +6050,7 @@
             <a:fld id="{B61BEF0D-F0BB-DE4B-95CE-6DB70DBA9567}" type="datetimeFigureOut">
               <a:rPr lang="en-US" dirty="0"/>
               <a:pPr/>
-              <a:t>5/9/2019</a:t>
+              <a:t>5/13/2019</a:t>
             </a:fld>
             <a:endParaRPr lang="en-US" dirty="0"/>
           </a:p>
@@ -6093,7 +6093,7 @@
             <a:fld id="{D57F1E4F-1CFF-5643-939E-217C01CDF565}" type="slidenum">
               <a:rPr lang="en-US" dirty="0"/>
               <a:pPr/>
-              <a:t>‹N°›</a:t>
+              <a:t>‹#›</a:t>
             </a:fld>
             <a:endParaRPr lang="en-US" dirty="0"/>
           </a:p>
@@ -6790,7 +6790,7 @@
             <a:fld id="{B61BEF0D-F0BB-DE4B-95CE-6DB70DBA9567}" type="datetimeFigureOut">
               <a:rPr lang="en-US" dirty="0"/>
               <a:pPr/>
-              <a:t>5/9/2019</a:t>
+              <a:t>5/13/2019</a:t>
             </a:fld>
             <a:endParaRPr lang="en-US" dirty="0"/>
           </a:p>
@@ -6867,7 +6867,7 @@
             <a:fld id="{D57F1E4F-1CFF-5643-939E-217C01CDF565}" type="slidenum">
               <a:rPr lang="en-US" dirty="0"/>
               <a:pPr/>
-              <a:t>‹N°›</a:t>
+              <a:t>‹#›</a:t>
             </a:fld>
             <a:endParaRPr lang="en-US" dirty="0"/>
           </a:p>
@@ -7523,7 +7523,7 @@
           <a:p>
             <a:r>
               <a:rPr lang="fr-BE" dirty="0"/>
-              <a:t>Cette permanence de comportement est appelé contrat</a:t>
+              <a:t>Cette permanence de comportement est appelée contrat</a:t>
             </a:r>
             <a:endParaRPr lang="fr-FR" dirty="0"/>
           </a:p>
@@ -7645,7 +7645,7 @@
           <a:p>
             <a:r>
               <a:rPr lang="fr-BE" i="1" dirty="0"/>
-              <a:t>Aucun client devrait avoir accès à des méthodes qu’il n’utilise pas</a:t>
+              <a:t>Aucun client ne devrait avoir accès à des méthodes qu’il n’utilise pas</a:t>
             </a:r>
           </a:p>
           <a:p>
@@ -7654,7 +7654,7 @@
           <a:p>
             <a:r>
               <a:rPr lang="fr-BE" dirty="0"/>
-              <a:t>Sous manière de question rhétorique: Ais-je besoin d’une méthode </a:t>
+              <a:t>Sous manière de question rhétorique: Ai-je besoin d’une méthode </a:t>
             </a:r>
             <a:r>
               <a:rPr lang="fr-BE" i="1" dirty="0"/>
@@ -7662,7 +7662,7 @@
             </a:r>
             <a:r>
               <a:rPr lang="fr-BE" dirty="0"/>
-              <a:t>dans une procédure où je n’ai besoin de que </a:t>
+              <a:t>dans une procédure où je n’ai besoin que de </a:t>
             </a:r>
             <a:r>
               <a:rPr lang="fr-BE" i="1" dirty="0"/>
@@ -8628,7 +8628,7 @@
           <a:p>
             <a:r>
               <a:rPr lang="fr-BE" dirty="0"/>
-              <a:t>Si des méthodes sont toujours exécutés dans un ordre définit, un qu’un ordre est implicitement logique, mettez les dans cet ordre. Comme un livre, le code se lit naturellement.</a:t>
+              <a:t>Si des méthodes sont toujours exécutées dans un ordre défini, qu’un ordre est implicitement logique, mettez les dans cet ordre. Comme un livre, le code se lit naturellement.</a:t>
             </a:r>
             <a:endParaRPr lang="en-US" dirty="0"/>
           </a:p>
@@ -8746,7 +8746,7 @@
           <a:p>
             <a:r>
               <a:rPr lang="fr-BE" dirty="0"/>
-              <a:t>Historiquement, les lignes de codes ne devaient pas excéder 80 char pour les cartes imprimés. C’est encore le cas aujourd’hui afin d’afficher correctement deux pages dans un comparateur de fichier</a:t>
+              <a:t>Historiquement, les lignes de codes ne devaient pas excéder 80 char pour les cartes imprimées. C’est encore le cas aujourd’hui afin d’afficher correctement deux pages dans un comparateur de fichier</a:t>
             </a:r>
           </a:p>
           <a:p>
@@ -8760,7 +8760,7 @@
             </a:r>
             <a:r>
               <a:rPr lang="fr-BE" dirty="0"/>
-              <a:t> sont plus lisibles à en vertical qu’en horizontal</a:t>
+              <a:t> sont plus lisibles à la verticale qu’à l’horizontal</a:t>
             </a:r>
           </a:p>
           <a:p>
@@ -8927,7 +8927,7 @@
           <a:p>
             <a:r>
               <a:rPr lang="fr-BE" dirty="0"/>
-              <a:t>Développeurs chez </a:t>
+              <a:t>Développeur chez </a:t>
             </a:r>
             <a:r>
               <a:rPr lang="fr-BE" dirty="0" err="1"/>
@@ -9456,7 +9456,7 @@
             <a:pPr lvl="1"/>
             <a:r>
               <a:rPr lang="fr-FR" dirty="0"/>
-              <a:t>Une fonction doit faire une et une unique chose. Tout ce qui est superflus est malvenu</a:t>
+              <a:t>Une fonction doit faire une et une unique chose. Tout ce qui est superflu est malvenu</a:t>
             </a:r>
           </a:p>
           <a:p>
@@ -9472,19 +9472,11 @@
             </a:r>
             <a:r>
               <a:rPr lang="fr-FR" dirty="0" err="1"/>
-              <a:t>ègles</a:t>
+              <a:t>ègle</a:t>
             </a:r>
             <a:r>
               <a:rPr lang="fr-FR" dirty="0"/>
-              <a:t> des 10 secondes: Si on ne peut pas comprendre en 10 secondes ce que fait une </a:t>
-            </a:r>
-            <a:r>
-              <a:rPr lang="fr-FR" dirty="0" err="1"/>
-              <a:t>functions</a:t>
-            </a:r>
-            <a:r>
-              <a:rPr lang="fr-FR" dirty="0"/>
-              <a:t>, elle est trop compliquée</a:t>
+              <a:t> des 10 secondes: Si on ne peut pas comprendre en 10 secondes ce que fait une fonction, elle est trop compliquée</a:t>
             </a:r>
           </a:p>
         </p:txBody>
@@ -9581,7 +9573,7 @@
           <a:p>
             <a:r>
               <a:rPr lang="fr-FR" dirty="0"/>
-              <a:t>Qui as déjà vu un </a:t>
+              <a:t>Qui a déjà vu un </a:t>
             </a:r>
             <a:r>
               <a:rPr lang="fr-FR" dirty="0" err="1"/>
@@ -9596,7 +9588,7 @@
             <a:pPr lvl="1"/>
             <a:r>
               <a:rPr lang="fr-FR" dirty="0"/>
-              <a:t>L’occasion d’interpréter facilement une réponse est raté. Un </a:t>
+              <a:t>L’occasion d’interpréter facilement une réponse est ratée. Un </a:t>
             </a:r>
             <a:r>
               <a:rPr lang="fr-FR" dirty="0" err="1"/>
@@ -10257,8 +10249,8 @@
           <a:lstStyle/>
           <a:p>
             <a:r>
-              <a:rPr lang="fr-BE" dirty="0" err="1"/>
-              <a:t>Resources</a:t>
+              <a:rPr lang="fr-BE" dirty="0"/>
+              <a:t>Ressources</a:t>
             </a:r>
             <a:endParaRPr lang="fr-FR" dirty="0"/>
           </a:p>
@@ -10469,14 +10461,14 @@
             </a:r>
             <a:r>
               <a:rPr lang="fr-BE" dirty="0"/>
-              <a:t> estimé à 4 heures impossible à ajouter</a:t>
+              <a:t> estimée à 4 heures impossible à ajouter</a:t>
             </a:r>
           </a:p>
           <a:p>
             <a:pPr lvl="1"/>
             <a:r>
               <a:rPr lang="fr-BE" dirty="0"/>
-              <a:t>Injection de dépendance absent (SQL </a:t>
+              <a:t>Injection de dépendance absente (SQL </a:t>
             </a:r>
             <a:r>
               <a:rPr lang="fr-BE" dirty="0" err="1"/>
@@ -10494,7 +10486,7 @@
             </a:r>
             <a:r>
               <a:rPr lang="fr-BE" dirty="0"/>
-              <a:t> estimé à 15 minutes a pris 1 semaine</a:t>
+              <a:t> estimée à 15 minutes a pris 1 semaine</a:t>
             </a:r>
           </a:p>
           <a:p>
@@ -10509,7 +10501,7 @@
             </a:r>
             <a:r>
               <a:rPr lang="fr-BE" dirty="0"/>
-              <a:t>, ce service était sensé être appelé dans un autre thread/contexte)</a:t>
+              <a:t>, ce service était censé être appelé dans un autre thread/contexte)</a:t>
             </a:r>
           </a:p>
           <a:p>
@@ -10519,7 +10511,7 @@
             </a:r>
             <a:r>
               <a:rPr lang="fr-BE" dirty="0"/>
-              <a:t> estimé à 2 jours a pris 3 heure</a:t>
+              <a:t> estimée à 2 jours a pris 3 heure</a:t>
             </a:r>
           </a:p>
           <a:p>
@@ -10626,7 +10618,7 @@
           <a:p>
             <a:r>
               <a:rPr lang="fr-BE" dirty="0"/>
-              <a:t>Est conviviale. Les réactions sont la bienvenus</a:t>
+              <a:t>Est conviviale. Les réactions sont les bienvenues</a:t>
             </a:r>
             <a:endParaRPr lang="fr-FR" dirty="0"/>
           </a:p>
@@ -10816,15 +10808,7 @@
           <a:p>
             <a:r>
               <a:rPr lang="fr-BE" dirty="0"/>
-              <a:t>Auteur des </a:t>
-            </a:r>
-            <a:r>
-              <a:rPr lang="fr-BE" dirty="0" err="1"/>
-              <a:t>principles</a:t>
-            </a:r>
-            <a:r>
-              <a:rPr lang="fr-BE" dirty="0"/>
-              <a:t> SOLID</a:t>
+              <a:t>Auteur des principes SOLID</a:t>
             </a:r>
           </a:p>
           <a:p>
@@ -10969,7 +10953,7 @@
           <a:p>
             <a:r>
               <a:rPr lang="fr-BE" dirty="0"/>
-              <a:t>Principles SOLID</a:t>
+              <a:t>Principes SOLID</a:t>
             </a:r>
             <a:br>
               <a:rPr lang="fr-BE" dirty="0"/>
@@ -11166,7 +11150,7 @@
           <a:p>
             <a:r>
               <a:rPr lang="fr-BE" dirty="0"/>
-              <a:t>Une classe qui a trop de responsabilité est dure à tenir</a:t>
+              <a:t>Une classe qui a trop de responsabilités est dure à maintenir</a:t>
             </a:r>
             <a:endParaRPr lang="fr-FR" dirty="0"/>
           </a:p>
@@ -11258,7 +11242,7 @@
           <a:p>
             <a:r>
               <a:rPr lang="fr-BE" i="1" dirty="0"/>
-              <a:t>Une classe doit être ouvert à l’extension, et fermée à la modification</a:t>
+              <a:t>Une classe doit être ouverte à l’extension, et fermée à la modification</a:t>
             </a:r>
           </a:p>
           <a:p>
@@ -11273,7 +11257,7 @@
           <a:p>
             <a:r>
               <a:rPr lang="fr-BE" dirty="0"/>
-              <a:t>A l’inverse modifier du code/une class existante augmente les risques de régression</a:t>
+              <a:t>A l’inverse modifier du code/une classe existant augmente les risques de régression</a:t>
             </a:r>
           </a:p>
         </p:txBody>

</xml_diff>

<commit_message>
rm bin + change language of variable to ts + verticality in go
</commit_message>
<xml_diff>
--- a/PPT/Easy != Simple.pptx
+++ b/PPT/Easy != Simple.pptx
@@ -5,37 +5,30 @@
     <p:sldMasterId id="2147483648" r:id="rId1"/>
   </p:sldMasterIdLst>
   <p:notesMasterIdLst>
-    <p:notesMasterId r:id="rId30"/>
+    <p:notesMasterId r:id="rId23"/>
   </p:notesMasterIdLst>
   <p:sldIdLst>
     <p:sldId id="256" r:id="rId2"/>
     <p:sldId id="258" r:id="rId3"/>
-    <p:sldId id="257" r:id="rId4"/>
-    <p:sldId id="277" r:id="rId5"/>
-    <p:sldId id="278" r:id="rId6"/>
-    <p:sldId id="261" r:id="rId7"/>
-    <p:sldId id="262" r:id="rId8"/>
-    <p:sldId id="263" r:id="rId9"/>
-    <p:sldId id="264" r:id="rId10"/>
-    <p:sldId id="265" r:id="rId11"/>
-    <p:sldId id="266" r:id="rId12"/>
-    <p:sldId id="267" r:id="rId13"/>
-    <p:sldId id="268" r:id="rId14"/>
-    <p:sldId id="269" r:id="rId15"/>
-    <p:sldId id="270" r:id="rId16"/>
-    <p:sldId id="275" r:id="rId17"/>
-    <p:sldId id="271" r:id="rId18"/>
-    <p:sldId id="284" r:id="rId19"/>
-    <p:sldId id="285" r:id="rId20"/>
-    <p:sldId id="272" r:id="rId21"/>
-    <p:sldId id="282" r:id="rId22"/>
-    <p:sldId id="273" r:id="rId23"/>
-    <p:sldId id="274" r:id="rId24"/>
-    <p:sldId id="279" r:id="rId25"/>
-    <p:sldId id="281" r:id="rId26"/>
-    <p:sldId id="280" r:id="rId27"/>
-    <p:sldId id="283" r:id="rId28"/>
-    <p:sldId id="260" r:id="rId29"/>
+    <p:sldId id="277" r:id="rId4"/>
+    <p:sldId id="278" r:id="rId5"/>
+    <p:sldId id="261" r:id="rId6"/>
+    <p:sldId id="286" r:id="rId7"/>
+    <p:sldId id="269" r:id="rId8"/>
+    <p:sldId id="270" r:id="rId9"/>
+    <p:sldId id="275" r:id="rId10"/>
+    <p:sldId id="271" r:id="rId11"/>
+    <p:sldId id="284" r:id="rId12"/>
+    <p:sldId id="285" r:id="rId13"/>
+    <p:sldId id="272" r:id="rId14"/>
+    <p:sldId id="282" r:id="rId15"/>
+    <p:sldId id="273" r:id="rId16"/>
+    <p:sldId id="274" r:id="rId17"/>
+    <p:sldId id="279" r:id="rId18"/>
+    <p:sldId id="281" r:id="rId19"/>
+    <p:sldId id="280" r:id="rId20"/>
+    <p:sldId id="283" r:id="rId21"/>
+    <p:sldId id="260" r:id="rId22"/>
   </p:sldIdLst>
   <p:sldSz cx="12192000" cy="6858000"/>
   <p:notesSz cx="6858000" cy="9144000"/>
@@ -224,7 +217,7 @@
           <a:p>
             <a:fld id="{29301A56-A927-403C-8918-21E784444591}" type="datetimeFigureOut">
               <a:rPr lang="fr-FR" smtClean="0"/>
-              <a:t>13/05/2019</a:t>
+              <a:t>29/07/2019</a:t>
             </a:fld>
             <a:endParaRPr lang="fr-FR"/>
           </a:p>
@@ -382,7 +375,7 @@
           <a:p>
             <a:fld id="{6F10D748-FFE4-4788-B13E-F644A7CDC41E}" type="slidenum">
               <a:rPr lang="fr-FR" smtClean="0"/>
-              <a:t>‹#›</a:t>
+              <a:t>‹N°›</a:t>
             </a:fld>
             <a:endParaRPr lang="fr-FR"/>
           </a:p>
@@ -535,9 +528,20 @@
           <a:bodyPr/>
           <a:lstStyle/>
           <a:p>
-            <a:pPr marL="0" indent="0">
-              <a:buNone/>
-            </a:pPr>
+            <a:r>
+              <a:rPr lang="fr-BE" dirty="0"/>
+              <a:t>Rappeler que le clean code est une bonne pratique pour un travail professionnel</a:t>
+            </a:r>
+          </a:p>
+          <a:p>
+            <a:r>
+              <a:rPr lang="fr-BE" dirty="0"/>
+              <a:t>Sans </a:t>
+            </a:r>
+            <a:r>
+              <a:rPr lang="fr-BE" dirty="0" err="1"/>
+              <a:t>ambiguité</a:t>
+            </a:r>
             <a:endParaRPr lang="fr-FR" dirty="0"/>
           </a:p>
         </p:txBody>
@@ -559,7 +563,7 @@
           <a:p>
             <a:fld id="{6F10D748-FFE4-4788-B13E-F644A7CDC41E}" type="slidenum">
               <a:rPr lang="fr-FR" smtClean="0"/>
-              <a:t>3</a:t>
+              <a:t>7</a:t>
             </a:fld>
             <a:endParaRPr lang="fr-FR"/>
           </a:p>
@@ -568,294 +572,7 @@
     </p:spTree>
     <p:extLst>
       <p:ext uri="{BB962C8B-B14F-4D97-AF65-F5344CB8AC3E}">
-        <p14:creationId xmlns:p14="http://schemas.microsoft.com/office/powerpoint/2010/main" val="4047308299"/>
-      </p:ext>
-    </p:extLst>
-  </p:cSld>
-  <p:clrMapOvr>
-    <a:masterClrMapping/>
-  </p:clrMapOvr>
-</p:notes>
-</file>
-
-<file path=ppt/notesSlides/notesSlide10.xml><?xml version="1.0" encoding="utf-8"?>
-<p:notes xmlns:a="http://schemas.openxmlformats.org/drawingml/2006/main" xmlns:r="http://schemas.openxmlformats.org/officeDocument/2006/relationships" xmlns:p="http://schemas.openxmlformats.org/presentationml/2006/main">
-  <p:cSld>
-    <p:spTree>
-      <p:nvGrpSpPr>
-        <p:cNvPr id="1" name=""/>
-        <p:cNvGrpSpPr/>
-        <p:nvPr/>
-      </p:nvGrpSpPr>
-      <p:grpSpPr>
-        <a:xfrm>
-          <a:off x="0" y="0"/>
-          <a:ext cx="0" cy="0"/>
-          <a:chOff x="0" y="0"/>
-          <a:chExt cx="0" cy="0"/>
-        </a:xfrm>
-      </p:grpSpPr>
-      <p:sp>
-        <p:nvSpPr>
-          <p:cNvPr id="2" name="Espace réservé de l'image des diapositives 1"/>
-          <p:cNvSpPr>
-            <a:spLocks noGrp="1" noRot="1" noChangeAspect="1"/>
-          </p:cNvSpPr>
-          <p:nvPr>
-            <p:ph type="sldImg"/>
-          </p:nvPr>
-        </p:nvSpPr>
-        <p:spPr/>
-      </p:sp>
-      <p:sp>
-        <p:nvSpPr>
-          <p:cNvPr id="3" name="Espace réservé des notes 2"/>
-          <p:cNvSpPr>
-            <a:spLocks noGrp="1"/>
-          </p:cNvSpPr>
-          <p:nvPr>
-            <p:ph type="body" idx="1"/>
-          </p:nvPr>
-        </p:nvSpPr>
-        <p:spPr/>
-        <p:txBody>
-          <a:bodyPr/>
-          <a:lstStyle/>
-          <a:p>
-            <a:r>
-              <a:rPr lang="fr-FR" dirty="0"/>
-              <a:t>Ruben l’a fait avec des variables </a:t>
-            </a:r>
-            <a:r>
-              <a:rPr lang="fr-FR" dirty="0" err="1"/>
-              <a:t>PolicyA</a:t>
-            </a:r>
-            <a:r>
-              <a:rPr lang="fr-FR" dirty="0"/>
-              <a:t> et </a:t>
-            </a:r>
-            <a:r>
-              <a:rPr lang="fr-FR" dirty="0" err="1"/>
-              <a:t>PolicyB</a:t>
-            </a:r>
-            <a:endParaRPr lang="fr-FR" dirty="0"/>
-          </a:p>
-        </p:txBody>
-      </p:sp>
-      <p:sp>
-        <p:nvSpPr>
-          <p:cNvPr id="4" name="Espace réservé du numéro de diapositive 3"/>
-          <p:cNvSpPr>
-            <a:spLocks noGrp="1"/>
-          </p:cNvSpPr>
-          <p:nvPr>
-            <p:ph type="sldNum" sz="quarter" idx="5"/>
-          </p:nvPr>
-        </p:nvSpPr>
-        <p:spPr/>
-        <p:txBody>
-          <a:bodyPr/>
-          <a:lstStyle/>
-          <a:p>
-            <a:fld id="{6F10D748-FFE4-4788-B13E-F644A7CDC41E}" type="slidenum">
-              <a:rPr lang="fr-FR" smtClean="0"/>
-              <a:t>17</a:t>
-            </a:fld>
-            <a:endParaRPr lang="fr-FR"/>
-          </a:p>
-        </p:txBody>
-      </p:sp>
-    </p:spTree>
-    <p:extLst>
-      <p:ext uri="{BB962C8B-B14F-4D97-AF65-F5344CB8AC3E}">
-        <p14:creationId xmlns:p14="http://schemas.microsoft.com/office/powerpoint/2010/main" val="4227056444"/>
-      </p:ext>
-    </p:extLst>
-  </p:cSld>
-  <p:clrMapOvr>
-    <a:masterClrMapping/>
-  </p:clrMapOvr>
-</p:notes>
-</file>
-
-<file path=ppt/notesSlides/notesSlide11.xml><?xml version="1.0" encoding="utf-8"?>
-<p:notes xmlns:a="http://schemas.openxmlformats.org/drawingml/2006/main" xmlns:r="http://schemas.openxmlformats.org/officeDocument/2006/relationships" xmlns:p="http://schemas.openxmlformats.org/presentationml/2006/main">
-  <p:cSld>
-    <p:spTree>
-      <p:nvGrpSpPr>
-        <p:cNvPr id="1" name=""/>
-        <p:cNvGrpSpPr/>
-        <p:nvPr/>
-      </p:nvGrpSpPr>
-      <p:grpSpPr>
-        <a:xfrm>
-          <a:off x="0" y="0"/>
-          <a:ext cx="0" cy="0"/>
-          <a:chOff x="0" y="0"/>
-          <a:chExt cx="0" cy="0"/>
-        </a:xfrm>
-      </p:grpSpPr>
-      <p:sp>
-        <p:nvSpPr>
-          <p:cNvPr id="2" name="Espace réservé de l'image des diapositives 1"/>
-          <p:cNvSpPr>
-            <a:spLocks noGrp="1" noRot="1" noChangeAspect="1"/>
-          </p:cNvSpPr>
-          <p:nvPr>
-            <p:ph type="sldImg"/>
-          </p:nvPr>
-        </p:nvSpPr>
-        <p:spPr/>
-      </p:sp>
-      <p:sp>
-        <p:nvSpPr>
-          <p:cNvPr id="3" name="Espace réservé des notes 2"/>
-          <p:cNvSpPr>
-            <a:spLocks noGrp="1"/>
-          </p:cNvSpPr>
-          <p:nvPr>
-            <p:ph type="body" idx="1"/>
-          </p:nvPr>
-        </p:nvSpPr>
-        <p:spPr/>
-        <p:txBody>
-          <a:bodyPr/>
-          <a:lstStyle/>
-          <a:p>
-            <a:r>
-              <a:rPr lang="fr-FR" dirty="0"/>
-              <a:t>Lié au prochain slide sur le </a:t>
-            </a:r>
-            <a:r>
-              <a:rPr lang="fr-FR" dirty="0" err="1"/>
-              <a:t>functions</a:t>
-            </a:r>
-            <a:endParaRPr lang="fr-FR" dirty="0"/>
-          </a:p>
-        </p:txBody>
-      </p:sp>
-      <p:sp>
-        <p:nvSpPr>
-          <p:cNvPr id="4" name="Espace réservé du numéro de diapositive 3"/>
-          <p:cNvSpPr>
-            <a:spLocks noGrp="1"/>
-          </p:cNvSpPr>
-          <p:nvPr>
-            <p:ph type="sldNum" sz="quarter" idx="5"/>
-          </p:nvPr>
-        </p:nvSpPr>
-        <p:spPr/>
-        <p:txBody>
-          <a:bodyPr/>
-          <a:lstStyle/>
-          <a:p>
-            <a:fld id="{6F10D748-FFE4-4788-B13E-F644A7CDC41E}" type="slidenum">
-              <a:rPr lang="fr-FR" smtClean="0"/>
-              <a:t>20</a:t>
-            </a:fld>
-            <a:endParaRPr lang="fr-FR"/>
-          </a:p>
-        </p:txBody>
-      </p:sp>
-    </p:spTree>
-    <p:extLst>
-      <p:ext uri="{BB962C8B-B14F-4D97-AF65-F5344CB8AC3E}">
-        <p14:creationId xmlns:p14="http://schemas.microsoft.com/office/powerpoint/2010/main" val="2197073789"/>
-      </p:ext>
-    </p:extLst>
-  </p:cSld>
-  <p:clrMapOvr>
-    <a:masterClrMapping/>
-  </p:clrMapOvr>
-</p:notes>
-</file>
-
-<file path=ppt/notesSlides/notesSlide12.xml><?xml version="1.0" encoding="utf-8"?>
-<p:notes xmlns:a="http://schemas.openxmlformats.org/drawingml/2006/main" xmlns:r="http://schemas.openxmlformats.org/officeDocument/2006/relationships" xmlns:p="http://schemas.openxmlformats.org/presentationml/2006/main">
-  <p:cSld>
-    <p:spTree>
-      <p:nvGrpSpPr>
-        <p:cNvPr id="1" name=""/>
-        <p:cNvGrpSpPr/>
-        <p:nvPr/>
-      </p:nvGrpSpPr>
-      <p:grpSpPr>
-        <a:xfrm>
-          <a:off x="0" y="0"/>
-          <a:ext cx="0" cy="0"/>
-          <a:chOff x="0" y="0"/>
-          <a:chExt cx="0" cy="0"/>
-        </a:xfrm>
-      </p:grpSpPr>
-      <p:sp>
-        <p:nvSpPr>
-          <p:cNvPr id="2" name="Espace réservé de l'image des diapositives 1"/>
-          <p:cNvSpPr>
-            <a:spLocks noGrp="1" noRot="1" noChangeAspect="1"/>
-          </p:cNvSpPr>
-          <p:nvPr>
-            <p:ph type="sldImg"/>
-          </p:nvPr>
-        </p:nvSpPr>
-        <p:spPr/>
-      </p:sp>
-      <p:sp>
-        <p:nvSpPr>
-          <p:cNvPr id="3" name="Espace réservé des notes 2"/>
-          <p:cNvSpPr>
-            <a:spLocks noGrp="1"/>
-          </p:cNvSpPr>
-          <p:nvPr>
-            <p:ph type="body" idx="1"/>
-          </p:nvPr>
-        </p:nvSpPr>
-        <p:spPr/>
-        <p:txBody>
-          <a:bodyPr/>
-          <a:lstStyle/>
-          <a:p>
-            <a:r>
-              <a:rPr lang="fr-FR" dirty="0"/>
-              <a:t>First : </a:t>
-            </a:r>
-            <a:r>
-              <a:rPr lang="fr-FR" dirty="0" err="1"/>
-              <a:t>functions</a:t>
-            </a:r>
-            <a:r>
-              <a:rPr lang="fr-FR" dirty="0"/>
-              <a:t> de 3000 lignes</a:t>
-            </a:r>
-          </a:p>
-        </p:txBody>
-      </p:sp>
-      <p:sp>
-        <p:nvSpPr>
-          <p:cNvPr id="4" name="Espace réservé du numéro de diapositive 3"/>
-          <p:cNvSpPr>
-            <a:spLocks noGrp="1"/>
-          </p:cNvSpPr>
-          <p:nvPr>
-            <p:ph type="sldNum" sz="quarter" idx="5"/>
-          </p:nvPr>
-        </p:nvSpPr>
-        <p:spPr/>
-        <p:txBody>
-          <a:bodyPr/>
-          <a:lstStyle/>
-          <a:p>
-            <a:fld id="{6F10D748-FFE4-4788-B13E-F644A7CDC41E}" type="slidenum">
-              <a:rPr lang="fr-FR" smtClean="0"/>
-              <a:t>22</a:t>
-            </a:fld>
-            <a:endParaRPr lang="fr-FR"/>
-          </a:p>
-        </p:txBody>
-      </p:sp>
-    </p:spTree>
-    <p:extLst>
-      <p:ext uri="{BB962C8B-B14F-4D97-AF65-F5344CB8AC3E}">
-        <p14:creationId xmlns:p14="http://schemas.microsoft.com/office/powerpoint/2010/main" val="2930363722"/>
+        <p14:creationId xmlns:p14="http://schemas.microsoft.com/office/powerpoint/2010/main" val="257858300"/>
       </p:ext>
     </p:extLst>
   </p:cSld>
@@ -909,13 +626,7 @@
           <a:bodyPr/>
           <a:lstStyle/>
           <a:p>
-            <a:r>
-              <a:rPr lang="fr-FR" dirty="0"/>
-              <a:t>Example in code</a:t>
-            </a:r>
-          </a:p>
-          <a:p>
-            <a:endParaRPr lang="fr-FR" dirty="0"/>
+            <a:endParaRPr lang="fr-BE" dirty="0"/>
           </a:p>
         </p:txBody>
       </p:sp>
@@ -945,7 +656,7 @@
     </p:spTree>
     <p:extLst>
       <p:ext uri="{BB962C8B-B14F-4D97-AF65-F5344CB8AC3E}">
-        <p14:creationId xmlns:p14="http://schemas.microsoft.com/office/powerpoint/2010/main" val="2492195388"/>
+        <p14:creationId xmlns:p14="http://schemas.microsoft.com/office/powerpoint/2010/main" val="890077749"/>
       </p:ext>
     </p:extLst>
   </p:cSld>
@@ -999,21 +710,46 @@
           <a:bodyPr/>
           <a:lstStyle/>
           <a:p>
+            <a:pPr marL="0" marR="0" lvl="0" indent="0" algn="l" defTabSz="914400" rtl="0" eaLnBrk="1" fontAlgn="auto" latinLnBrk="0" hangingPunct="1">
+              <a:lnSpc>
+                <a:spcPct val="100000"/>
+              </a:lnSpc>
+              <a:spcBef>
+                <a:spcPts val="0"/>
+              </a:spcBef>
+              <a:spcAft>
+                <a:spcPts val="0"/>
+              </a:spcAft>
+              <a:buClrTx/>
+              <a:buSzTx/>
+              <a:buFontTx/>
+              <a:buNone/>
+              <a:tabLst/>
+              <a:defRPr/>
+            </a:pPr>
             <a:r>
               <a:rPr lang="fr-BE" dirty="0" err="1"/>
-              <a:t>Unity</a:t>
-            </a:r>
-            <a:r>
-              <a:rPr lang="fr-BE" dirty="0"/>
-              <a:t> s’utilise cette manière</a:t>
-            </a:r>
-            <a:br>
-              <a:rPr lang="fr-BE" dirty="0"/>
-            </a:br>
-            <a:r>
-              <a:rPr lang="fr-BE" dirty="0"/>
-              <a:t>List&lt;T&gt;</a:t>
-            </a:r>
+              <a:t>Demo</a:t>
+            </a:r>
+            <a:r>
+              <a:rPr lang="fr-BE" dirty="0"/>
+              <a:t> on </a:t>
+            </a:r>
+            <a:r>
+              <a:rPr lang="fr-BE" dirty="0" err="1"/>
+              <a:t>NestedIf</a:t>
+            </a:r>
+            <a:r>
+              <a:rPr lang="fr-BE" dirty="0"/>
+              <a:t> </a:t>
+            </a:r>
+            <a:r>
+              <a:rPr lang="fr-BE" dirty="0" err="1"/>
+              <a:t>project</a:t>
+            </a:r>
+            <a:endParaRPr lang="fr-BE" dirty="0"/>
+          </a:p>
+          <a:p>
             <a:endParaRPr lang="fr-FR" dirty="0"/>
           </a:p>
         </p:txBody>
@@ -1044,7 +780,7 @@
     </p:spTree>
     <p:extLst>
       <p:ext uri="{BB962C8B-B14F-4D97-AF65-F5344CB8AC3E}">
-        <p14:creationId xmlns:p14="http://schemas.microsoft.com/office/powerpoint/2010/main" val="493383058"/>
+        <p14:creationId xmlns:p14="http://schemas.microsoft.com/office/powerpoint/2010/main" val="2558427262"/>
       </p:ext>
     </p:extLst>
   </p:cSld>
@@ -1099,20 +835,8 @@
           <a:lstStyle/>
           <a:p>
             <a:r>
-              <a:rPr lang="fr-BE" dirty="0"/>
-              <a:t>Exemple du carré qui n’est pas représentant du rectangle.</a:t>
-            </a:r>
-          </a:p>
-          <a:p>
-            <a:r>
-              <a:rPr lang="fr-BE" dirty="0"/>
-              <a:t>Programmation par contrat</a:t>
-            </a:r>
-          </a:p>
-          <a:p>
-            <a:r>
-              <a:rPr lang="fr-BE" dirty="0"/>
-              <a:t>Post and Pré condition</a:t>
+              <a:rPr lang="fr-FR" dirty="0"/>
+              <a:t>Method de copie. Source et destination</a:t>
             </a:r>
           </a:p>
         </p:txBody>
@@ -1143,7 +867,7 @@
     </p:spTree>
     <p:extLst>
       <p:ext uri="{BB962C8B-B14F-4D97-AF65-F5344CB8AC3E}">
-        <p14:creationId xmlns:p14="http://schemas.microsoft.com/office/powerpoint/2010/main" val="3065292994"/>
+        <p14:creationId xmlns:p14="http://schemas.microsoft.com/office/powerpoint/2010/main" val="4227056444"/>
       </p:ext>
     </p:extLst>
   </p:cSld>
@@ -1198,19 +922,12 @@
           <a:lstStyle/>
           <a:p>
             <a:r>
-              <a:rPr lang="fr-BE" dirty="0"/>
-              <a:t>Facilite le </a:t>
-            </a:r>
-            <a:r>
-              <a:rPr lang="fr-BE" dirty="0" err="1"/>
-              <a:t>refactoring</a:t>
-            </a:r>
-            <a:endParaRPr lang="fr-BE" dirty="0"/>
-          </a:p>
-          <a:p>
-            <a:r>
-              <a:rPr lang="fr-BE" dirty="0"/>
-              <a:t>Exemple de l’imprimante</a:t>
+              <a:rPr lang="fr-FR" dirty="0"/>
+              <a:t>Lié au prochain slide sur le </a:t>
+            </a:r>
+            <a:r>
+              <a:rPr lang="fr-FR" dirty="0" err="1"/>
+              <a:t>functions</a:t>
             </a:r>
             <a:endParaRPr lang="fr-FR" dirty="0"/>
           </a:p>
@@ -1233,7 +950,7 @@
           <a:p>
             <a:fld id="{6F10D748-FFE4-4788-B13E-F644A7CDC41E}" type="slidenum">
               <a:rPr lang="fr-FR" smtClean="0"/>
-              <a:t>11</a:t>
+              <a:t>13</a:t>
             </a:fld>
             <a:endParaRPr lang="fr-FR"/>
           </a:p>
@@ -1242,7 +959,7 @@
     </p:spTree>
     <p:extLst>
       <p:ext uri="{BB962C8B-B14F-4D97-AF65-F5344CB8AC3E}">
-        <p14:creationId xmlns:p14="http://schemas.microsoft.com/office/powerpoint/2010/main" val="1493187766"/>
+        <p14:creationId xmlns:p14="http://schemas.microsoft.com/office/powerpoint/2010/main" val="2197073789"/>
       </p:ext>
     </p:extLst>
   </p:cSld>
@@ -1297,196 +1014,17 @@
           <a:lstStyle/>
           <a:p>
             <a:r>
-              <a:rPr lang="fr-BE" dirty="0"/>
-              <a:t>A gauche, la classe n’est pas capable de changer sa dépendance.</a:t>
-            </a:r>
-          </a:p>
-          <a:p>
-            <a:r>
-              <a:rPr lang="fr-BE" dirty="0"/>
-              <a:t>Principe le mieux respecté aujourd’hui car nécessaire pour les </a:t>
-            </a:r>
-            <a:r>
-              <a:rPr lang="fr-BE" dirty="0" err="1"/>
-              <a:t>units</a:t>
-            </a:r>
-            <a:r>
-              <a:rPr lang="fr-BE" dirty="0"/>
-              <a:t> tests</a:t>
-            </a:r>
-            <a:endParaRPr lang="fr-FR" dirty="0"/>
-          </a:p>
-        </p:txBody>
-      </p:sp>
-      <p:sp>
-        <p:nvSpPr>
-          <p:cNvPr id="4" name="Espace réservé du numéro de diapositive 3"/>
-          <p:cNvSpPr>
-            <a:spLocks noGrp="1"/>
-          </p:cNvSpPr>
-          <p:nvPr>
-            <p:ph type="sldNum" sz="quarter" idx="5"/>
-          </p:nvPr>
-        </p:nvSpPr>
-        <p:spPr/>
-        <p:txBody>
-          <a:bodyPr/>
-          <a:lstStyle/>
-          <a:p>
-            <a:fld id="{6F10D748-FFE4-4788-B13E-F644A7CDC41E}" type="slidenum">
-              <a:rPr lang="fr-FR" smtClean="0"/>
-              <a:t>12</a:t>
-            </a:fld>
-            <a:endParaRPr lang="fr-FR"/>
-          </a:p>
-        </p:txBody>
-      </p:sp>
-    </p:spTree>
-    <p:extLst>
-      <p:ext uri="{BB962C8B-B14F-4D97-AF65-F5344CB8AC3E}">
-        <p14:creationId xmlns:p14="http://schemas.microsoft.com/office/powerpoint/2010/main" val="2998138998"/>
-      </p:ext>
-    </p:extLst>
-  </p:cSld>
-  <p:clrMapOvr>
-    <a:masterClrMapping/>
-  </p:clrMapOvr>
-</p:notes>
-</file>
-
-<file path=ppt/notesSlides/notesSlide7.xml><?xml version="1.0" encoding="utf-8"?>
-<p:notes xmlns:a="http://schemas.openxmlformats.org/drawingml/2006/main" xmlns:r="http://schemas.openxmlformats.org/officeDocument/2006/relationships" xmlns:p="http://schemas.openxmlformats.org/presentationml/2006/main">
-  <p:cSld>
-    <p:spTree>
-      <p:nvGrpSpPr>
-        <p:cNvPr id="1" name=""/>
-        <p:cNvGrpSpPr/>
-        <p:nvPr/>
-      </p:nvGrpSpPr>
-      <p:grpSpPr>
-        <a:xfrm>
-          <a:off x="0" y="0"/>
-          <a:ext cx="0" cy="0"/>
-          <a:chOff x="0" y="0"/>
-          <a:chExt cx="0" cy="0"/>
-        </a:xfrm>
-      </p:grpSpPr>
-      <p:sp>
-        <p:nvSpPr>
-          <p:cNvPr id="2" name="Espace réservé de l'image des diapositives 1"/>
-          <p:cNvSpPr>
-            <a:spLocks noGrp="1" noRot="1" noChangeAspect="1"/>
-          </p:cNvSpPr>
-          <p:nvPr>
-            <p:ph type="sldImg"/>
-          </p:nvPr>
-        </p:nvSpPr>
-        <p:spPr/>
-      </p:sp>
-      <p:sp>
-        <p:nvSpPr>
-          <p:cNvPr id="3" name="Espace réservé des notes 2"/>
-          <p:cNvSpPr>
-            <a:spLocks noGrp="1"/>
-          </p:cNvSpPr>
-          <p:nvPr>
-            <p:ph type="body" idx="1"/>
-          </p:nvPr>
-        </p:nvSpPr>
-        <p:spPr/>
-        <p:txBody>
-          <a:bodyPr/>
-          <a:lstStyle/>
-          <a:p>
-            <a:r>
-              <a:rPr lang="fr-BE" dirty="0"/>
-              <a:t>Rappeler que le clean code est une bonne pratique pour un travail professionnel</a:t>
-            </a:r>
-            <a:endParaRPr lang="fr-FR" dirty="0"/>
-          </a:p>
-        </p:txBody>
-      </p:sp>
-      <p:sp>
-        <p:nvSpPr>
-          <p:cNvPr id="4" name="Espace réservé du numéro de diapositive 3"/>
-          <p:cNvSpPr>
-            <a:spLocks noGrp="1"/>
-          </p:cNvSpPr>
-          <p:nvPr>
-            <p:ph type="sldNum" sz="quarter" idx="5"/>
-          </p:nvPr>
-        </p:nvSpPr>
-        <p:spPr/>
-        <p:txBody>
-          <a:bodyPr/>
-          <a:lstStyle/>
-          <a:p>
-            <a:fld id="{6F10D748-FFE4-4788-B13E-F644A7CDC41E}" type="slidenum">
-              <a:rPr lang="fr-FR" smtClean="0"/>
-              <a:t>14</a:t>
-            </a:fld>
-            <a:endParaRPr lang="fr-FR"/>
-          </a:p>
-        </p:txBody>
-      </p:sp>
-    </p:spTree>
-    <p:extLst>
-      <p:ext uri="{BB962C8B-B14F-4D97-AF65-F5344CB8AC3E}">
-        <p14:creationId xmlns:p14="http://schemas.microsoft.com/office/powerpoint/2010/main" val="257858300"/>
-      </p:ext>
-    </p:extLst>
-  </p:cSld>
-  <p:clrMapOvr>
-    <a:masterClrMapping/>
-  </p:clrMapOvr>
-</p:notes>
-</file>
-
-<file path=ppt/notesSlides/notesSlide8.xml><?xml version="1.0" encoding="utf-8"?>
-<p:notes xmlns:a="http://schemas.openxmlformats.org/drawingml/2006/main" xmlns:r="http://schemas.openxmlformats.org/officeDocument/2006/relationships" xmlns:p="http://schemas.openxmlformats.org/presentationml/2006/main">
-  <p:cSld>
-    <p:spTree>
-      <p:nvGrpSpPr>
-        <p:cNvPr id="1" name=""/>
-        <p:cNvGrpSpPr/>
-        <p:nvPr/>
-      </p:nvGrpSpPr>
-      <p:grpSpPr>
-        <a:xfrm>
-          <a:off x="0" y="0"/>
-          <a:ext cx="0" cy="0"/>
-          <a:chOff x="0" y="0"/>
-          <a:chExt cx="0" cy="0"/>
-        </a:xfrm>
-      </p:grpSpPr>
-      <p:sp>
-        <p:nvSpPr>
-          <p:cNvPr id="2" name="Espace réservé de l'image des diapositives 1"/>
-          <p:cNvSpPr>
-            <a:spLocks noGrp="1" noRot="1" noChangeAspect="1"/>
-          </p:cNvSpPr>
-          <p:nvPr>
-            <p:ph type="sldImg"/>
-          </p:nvPr>
-        </p:nvSpPr>
-        <p:spPr/>
-      </p:sp>
-      <p:sp>
-        <p:nvSpPr>
-          <p:cNvPr id="3" name="Espace réservé des notes 2"/>
-          <p:cNvSpPr>
-            <a:spLocks noGrp="1"/>
-          </p:cNvSpPr>
-          <p:nvPr>
-            <p:ph type="body" idx="1"/>
-          </p:nvPr>
-        </p:nvSpPr>
-        <p:spPr/>
-        <p:txBody>
-          <a:bodyPr/>
-          <a:lstStyle/>
-          <a:p>
-            <a:endParaRPr lang="fr-BE" dirty="0"/>
+              <a:rPr lang="fr-FR" dirty="0"/>
+              <a:t>First : </a:t>
+            </a:r>
+            <a:r>
+              <a:rPr lang="fr-FR" dirty="0" err="1"/>
+              <a:t>functions</a:t>
+            </a:r>
+            <a:r>
+              <a:rPr lang="fr-FR" dirty="0"/>
+              <a:t> de 3000 lignes</a:t>
+            </a:r>
           </a:p>
         </p:txBody>
       </p:sp>
@@ -1516,131 +1054,7 @@
     </p:spTree>
     <p:extLst>
       <p:ext uri="{BB962C8B-B14F-4D97-AF65-F5344CB8AC3E}">
-        <p14:creationId xmlns:p14="http://schemas.microsoft.com/office/powerpoint/2010/main" val="890077749"/>
-      </p:ext>
-    </p:extLst>
-  </p:cSld>
-  <p:clrMapOvr>
-    <a:masterClrMapping/>
-  </p:clrMapOvr>
-</p:notes>
-</file>
-
-<file path=ppt/notesSlides/notesSlide9.xml><?xml version="1.0" encoding="utf-8"?>
-<p:notes xmlns:a="http://schemas.openxmlformats.org/drawingml/2006/main" xmlns:r="http://schemas.openxmlformats.org/officeDocument/2006/relationships" xmlns:p="http://schemas.openxmlformats.org/presentationml/2006/main">
-  <p:cSld>
-    <p:spTree>
-      <p:nvGrpSpPr>
-        <p:cNvPr id="1" name=""/>
-        <p:cNvGrpSpPr/>
-        <p:nvPr/>
-      </p:nvGrpSpPr>
-      <p:grpSpPr>
-        <a:xfrm>
-          <a:off x="0" y="0"/>
-          <a:ext cx="0" cy="0"/>
-          <a:chOff x="0" y="0"/>
-          <a:chExt cx="0" cy="0"/>
-        </a:xfrm>
-      </p:grpSpPr>
-      <p:sp>
-        <p:nvSpPr>
-          <p:cNvPr id="2" name="Espace réservé de l'image des diapositives 1"/>
-          <p:cNvSpPr>
-            <a:spLocks noGrp="1" noRot="1" noChangeAspect="1"/>
-          </p:cNvSpPr>
-          <p:nvPr>
-            <p:ph type="sldImg"/>
-          </p:nvPr>
-        </p:nvSpPr>
-        <p:spPr/>
-      </p:sp>
-      <p:sp>
-        <p:nvSpPr>
-          <p:cNvPr id="3" name="Espace réservé des notes 2"/>
-          <p:cNvSpPr>
-            <a:spLocks noGrp="1"/>
-          </p:cNvSpPr>
-          <p:nvPr>
-            <p:ph type="body" idx="1"/>
-          </p:nvPr>
-        </p:nvSpPr>
-        <p:spPr/>
-        <p:txBody>
-          <a:bodyPr/>
-          <a:lstStyle/>
-          <a:p>
-            <a:pPr marL="0" marR="0" lvl="0" indent="0" algn="l" defTabSz="914400" rtl="0" eaLnBrk="1" fontAlgn="auto" latinLnBrk="0" hangingPunct="1">
-              <a:lnSpc>
-                <a:spcPct val="100000"/>
-              </a:lnSpc>
-              <a:spcBef>
-                <a:spcPts val="0"/>
-              </a:spcBef>
-              <a:spcAft>
-                <a:spcPts val="0"/>
-              </a:spcAft>
-              <a:buClrTx/>
-              <a:buSzTx/>
-              <a:buFontTx/>
-              <a:buNone/>
-              <a:tabLst/>
-              <a:defRPr/>
-            </a:pPr>
-            <a:r>
-              <a:rPr lang="fr-BE" dirty="0" err="1"/>
-              <a:t>Demo</a:t>
-            </a:r>
-            <a:r>
-              <a:rPr lang="fr-BE" dirty="0"/>
-              <a:t> on </a:t>
-            </a:r>
-            <a:r>
-              <a:rPr lang="fr-BE" dirty="0" err="1"/>
-              <a:t>NestedIf</a:t>
-            </a:r>
-            <a:r>
-              <a:rPr lang="fr-BE" dirty="0"/>
-              <a:t> </a:t>
-            </a:r>
-            <a:r>
-              <a:rPr lang="fr-BE" dirty="0" err="1"/>
-              <a:t>project</a:t>
-            </a:r>
-            <a:endParaRPr lang="fr-BE" dirty="0"/>
-          </a:p>
-          <a:p>
-            <a:endParaRPr lang="fr-FR" dirty="0"/>
-          </a:p>
-        </p:txBody>
-      </p:sp>
-      <p:sp>
-        <p:nvSpPr>
-          <p:cNvPr id="4" name="Espace réservé du numéro de diapositive 3"/>
-          <p:cNvSpPr>
-            <a:spLocks noGrp="1"/>
-          </p:cNvSpPr>
-          <p:nvPr>
-            <p:ph type="sldNum" sz="quarter" idx="5"/>
-          </p:nvPr>
-        </p:nvSpPr>
-        <p:spPr/>
-        <p:txBody>
-          <a:bodyPr/>
-          <a:lstStyle/>
-          <a:p>
-            <a:fld id="{6F10D748-FFE4-4788-B13E-F644A7CDC41E}" type="slidenum">
-              <a:rPr lang="fr-FR" smtClean="0"/>
-              <a:t>16</a:t>
-            </a:fld>
-            <a:endParaRPr lang="fr-FR"/>
-          </a:p>
-        </p:txBody>
-      </p:sp>
-    </p:spTree>
-    <p:extLst>
-      <p:ext uri="{BB962C8B-B14F-4D97-AF65-F5344CB8AC3E}">
-        <p14:creationId xmlns:p14="http://schemas.microsoft.com/office/powerpoint/2010/main" val="2558427262"/>
+        <p14:creationId xmlns:p14="http://schemas.microsoft.com/office/powerpoint/2010/main" val="2930363722"/>
       </p:ext>
     </p:extLst>
   </p:cSld>
@@ -2373,7 +1787,7 @@
             <a:fld id="{B61BEF0D-F0BB-DE4B-95CE-6DB70DBA9567}" type="datetimeFigureOut">
               <a:rPr lang="en-US" dirty="0"/>
               <a:pPr/>
-              <a:t>5/13/2019</a:t>
+              <a:t>7/29/2019</a:t>
             </a:fld>
             <a:endParaRPr lang="en-US" dirty="0"/>
           </a:p>
@@ -2416,7 +1830,7 @@
             <a:fld id="{D57F1E4F-1CFF-5643-939E-217C01CDF565}" type="slidenum">
               <a:rPr lang="en-US" dirty="0"/>
               <a:pPr/>
-              <a:t>‹#›</a:t>
+              <a:t>‹N°›</a:t>
             </a:fld>
             <a:endParaRPr lang="en-US" dirty="0"/>
           </a:p>
@@ -2621,7 +2035,7 @@
             <a:fld id="{B61BEF0D-F0BB-DE4B-95CE-6DB70DBA9567}" type="datetimeFigureOut">
               <a:rPr lang="en-US" dirty="0"/>
               <a:pPr/>
-              <a:t>5/13/2019</a:t>
+              <a:t>7/29/2019</a:t>
             </a:fld>
             <a:endParaRPr lang="en-US" dirty="0"/>
           </a:p>
@@ -2664,7 +2078,7 @@
             <a:fld id="{D57F1E4F-1CFF-5643-939E-217C01CDF565}" type="slidenum">
               <a:rPr lang="en-US" dirty="0"/>
               <a:pPr/>
-              <a:t>‹#›</a:t>
+              <a:t>‹N°›</a:t>
             </a:fld>
             <a:endParaRPr lang="en-US" dirty="0"/>
           </a:p>
@@ -2932,7 +2346,7 @@
             <a:fld id="{B61BEF0D-F0BB-DE4B-95CE-6DB70DBA9567}" type="datetimeFigureOut">
               <a:rPr lang="en-US" dirty="0"/>
               <a:pPr/>
-              <a:t>5/13/2019</a:t>
+              <a:t>7/29/2019</a:t>
             </a:fld>
             <a:endParaRPr lang="en-US" dirty="0"/>
           </a:p>
@@ -2975,7 +2389,7 @@
             <a:fld id="{D57F1E4F-1CFF-5643-939E-217C01CDF565}" type="slidenum">
               <a:rPr lang="en-US" dirty="0"/>
               <a:pPr/>
-              <a:t>‹#›</a:t>
+              <a:t>‹N°›</a:t>
             </a:fld>
             <a:endParaRPr lang="en-US" dirty="0"/>
           </a:p>
@@ -3270,7 +2684,7 @@
             <a:fld id="{B61BEF0D-F0BB-DE4B-95CE-6DB70DBA9567}" type="datetimeFigureOut">
               <a:rPr lang="en-US" dirty="0"/>
               <a:pPr/>
-              <a:t>5/13/2019</a:t>
+              <a:t>7/29/2019</a:t>
             </a:fld>
             <a:endParaRPr lang="en-US" dirty="0"/>
           </a:p>
@@ -3313,7 +2727,7 @@
             <a:fld id="{D57F1E4F-1CFF-5643-939E-217C01CDF565}" type="slidenum">
               <a:rPr lang="en-US" dirty="0"/>
               <a:pPr/>
-              <a:t>‹#›</a:t>
+              <a:t>‹N°›</a:t>
             </a:fld>
             <a:endParaRPr lang="en-US" dirty="0"/>
           </a:p>
@@ -3581,7 +2995,7 @@
             <a:fld id="{B61BEF0D-F0BB-DE4B-95CE-6DB70DBA9567}" type="datetimeFigureOut">
               <a:rPr lang="en-US" dirty="0"/>
               <a:pPr/>
-              <a:t>5/13/2019</a:t>
+              <a:t>7/29/2019</a:t>
             </a:fld>
             <a:endParaRPr lang="en-US" dirty="0"/>
           </a:p>
@@ -3624,7 +3038,7 @@
             <a:fld id="{D57F1E4F-1CFF-5643-939E-217C01CDF565}" type="slidenum">
               <a:rPr lang="en-US" dirty="0"/>
               <a:pPr/>
-              <a:t>‹#›</a:t>
+              <a:t>‹N°›</a:t>
             </a:fld>
             <a:endParaRPr lang="en-US" dirty="0"/>
           </a:p>
@@ -3971,7 +3385,7 @@
             <a:fld id="{B61BEF0D-F0BB-DE4B-95CE-6DB70DBA9567}" type="datetimeFigureOut">
               <a:rPr lang="en-US" dirty="0"/>
               <a:pPr/>
-              <a:t>5/13/2019</a:t>
+              <a:t>7/29/2019</a:t>
             </a:fld>
             <a:endParaRPr lang="en-US" dirty="0"/>
           </a:p>
@@ -4014,7 +3428,7 @@
             <a:fld id="{D57F1E4F-1CFF-5643-939E-217C01CDF565}" type="slidenum">
               <a:rPr lang="en-US" dirty="0"/>
               <a:pPr/>
-              <a:t>‹#›</a:t>
+              <a:t>‹N°›</a:t>
             </a:fld>
             <a:endParaRPr lang="en-US" dirty="0"/>
           </a:p>
@@ -4137,7 +3551,7 @@
           <a:p>
             <a:fld id="{55C6B4A9-1611-4792-9094-5F34BCA07E0B}" type="datetimeFigureOut">
               <a:rPr lang="en-US" dirty="0"/>
-              <a:t>5/13/2019</a:t>
+              <a:t>7/29/2019</a:t>
             </a:fld>
             <a:endParaRPr lang="en-US" dirty="0"/>
           </a:p>
@@ -4179,7 +3593,7 @@
           <a:p>
             <a:fld id="{89333C77-0158-454C-844F-B7AB9BD7DAD4}" type="slidenum">
               <a:rPr lang="en-US" dirty="0"/>
-              <a:t>‹#›</a:t>
+              <a:t>‹N°›</a:t>
             </a:fld>
             <a:endParaRPr lang="en-US" dirty="0"/>
           </a:p>
@@ -4313,7 +3727,7 @@
             <a:fld id="{B61BEF0D-F0BB-DE4B-95CE-6DB70DBA9567}" type="datetimeFigureOut">
               <a:rPr lang="en-US" dirty="0"/>
               <a:pPr/>
-              <a:t>5/13/2019</a:t>
+              <a:t>7/29/2019</a:t>
             </a:fld>
             <a:endParaRPr lang="en-US" dirty="0"/>
           </a:p>
@@ -4356,7 +3770,7 @@
             <a:fld id="{D57F1E4F-1CFF-5643-939E-217C01CDF565}" type="slidenum">
               <a:rPr lang="en-US" dirty="0"/>
               <a:pPr/>
-              <a:t>‹#›</a:t>
+              <a:t>‹N°›</a:t>
             </a:fld>
             <a:endParaRPr lang="en-US" dirty="0"/>
           </a:p>
@@ -4486,7 +3900,7 @@
             <a:fld id="{B61BEF0D-F0BB-DE4B-95CE-6DB70DBA9567}" type="datetimeFigureOut">
               <a:rPr lang="en-US" dirty="0"/>
               <a:pPr/>
-              <a:t>5/13/2019</a:t>
+              <a:t>7/29/2019</a:t>
             </a:fld>
             <a:endParaRPr lang="en-US" dirty="0"/>
           </a:p>
@@ -4529,7 +3943,7 @@
             <a:fld id="{D57F1E4F-1CFF-5643-939E-217C01CDF565}" type="slidenum">
               <a:rPr lang="en-US" dirty="0"/>
               <a:pPr/>
-              <a:t>‹#›</a:t>
+              <a:t>‹N°›</a:t>
             </a:fld>
             <a:endParaRPr lang="en-US" dirty="0"/>
           </a:p>
@@ -4730,7 +4144,7 @@
             <a:fld id="{B61BEF0D-F0BB-DE4B-95CE-6DB70DBA9567}" type="datetimeFigureOut">
               <a:rPr lang="en-US" dirty="0"/>
               <a:pPr/>
-              <a:t>5/13/2019</a:t>
+              <a:t>7/29/2019</a:t>
             </a:fld>
             <a:endParaRPr lang="en-US" dirty="0"/>
           </a:p>
@@ -4773,7 +4187,7 @@
             <a:fld id="{D57F1E4F-1CFF-5643-939E-217C01CDF565}" type="slidenum">
               <a:rPr lang="en-US" dirty="0"/>
               <a:pPr/>
-              <a:t>‹#›</a:t>
+              <a:t>‹N°›</a:t>
             </a:fld>
             <a:endParaRPr lang="en-US" dirty="0"/>
           </a:p>
@@ -4958,7 +4372,7 @@
           <a:p>
             <a:fld id="{EB712588-04B1-427B-82EE-E8DB90309F08}" type="datetimeFigureOut">
               <a:rPr lang="en-US" dirty="0"/>
-              <a:t>5/13/2019</a:t>
+              <a:t>7/29/2019</a:t>
             </a:fld>
             <a:endParaRPr lang="en-US" dirty="0"/>
           </a:p>
@@ -5000,7 +4414,7 @@
           <a:p>
             <a:fld id="{6FF9F0C5-380F-41C2-899A-BAC0F0927E16}" type="slidenum">
               <a:rPr lang="en-US" dirty="0"/>
-              <a:t>‹#›</a:t>
+              <a:t>‹N°›</a:t>
             </a:fld>
             <a:endParaRPr lang="en-US" dirty="0"/>
           </a:p>
@@ -5328,7 +4742,7 @@
             <a:fld id="{B61BEF0D-F0BB-DE4B-95CE-6DB70DBA9567}" type="datetimeFigureOut">
               <a:rPr lang="en-US" dirty="0"/>
               <a:pPr/>
-              <a:t>5/13/2019</a:t>
+              <a:t>7/29/2019</a:t>
             </a:fld>
             <a:endParaRPr lang="en-US" dirty="0"/>
           </a:p>
@@ -5371,7 +4785,7 @@
             <a:fld id="{D57F1E4F-1CFF-5643-939E-217C01CDF565}" type="slidenum">
               <a:rPr lang="en-US" dirty="0"/>
               <a:pPr/>
-              <a:t>‹#›</a:t>
+              <a:t>‹N°›</a:t>
             </a:fld>
             <a:endParaRPr lang="en-US" dirty="0"/>
           </a:p>
@@ -5448,7 +4862,7 @@
             <a:fld id="{B61BEF0D-F0BB-DE4B-95CE-6DB70DBA9567}" type="datetimeFigureOut">
               <a:rPr lang="en-US" dirty="0"/>
               <a:pPr/>
-              <a:t>5/13/2019</a:t>
+              <a:t>7/29/2019</a:t>
             </a:fld>
             <a:endParaRPr lang="en-US" dirty="0"/>
           </a:p>
@@ -5491,7 +4905,7 @@
             <a:fld id="{D57F1E4F-1CFF-5643-939E-217C01CDF565}" type="slidenum">
               <a:rPr lang="en-US" dirty="0"/>
               <a:pPr/>
-              <a:t>‹#›</a:t>
+              <a:t>‹N°›</a:t>
             </a:fld>
             <a:endParaRPr lang="en-US" dirty="0"/>
           </a:p>
@@ -5540,7 +4954,7 @@
             <a:fld id="{B61BEF0D-F0BB-DE4B-95CE-6DB70DBA9567}" type="datetimeFigureOut">
               <a:rPr lang="en-US" dirty="0"/>
               <a:pPr/>
-              <a:t>5/13/2019</a:t>
+              <a:t>7/29/2019</a:t>
             </a:fld>
             <a:endParaRPr lang="en-US" dirty="0"/>
           </a:p>
@@ -5583,7 +4997,7 @@
             <a:fld id="{D57F1E4F-1CFF-5643-939E-217C01CDF565}" type="slidenum">
               <a:rPr lang="en-US" dirty="0"/>
               <a:pPr/>
-              <a:t>‹#›</a:t>
+              <a:t>‹N°›</a:t>
             </a:fld>
             <a:endParaRPr lang="en-US" dirty="0"/>
           </a:p>
@@ -5791,7 +5205,7 @@
           <a:p>
             <a:fld id="{42A54C80-263E-416B-A8E0-580EDEADCBDC}" type="datetimeFigureOut">
               <a:rPr lang="en-US" dirty="0"/>
-              <a:t>5/13/2019</a:t>
+              <a:t>7/29/2019</a:t>
             </a:fld>
             <a:endParaRPr lang="en-US" dirty="0"/>
           </a:p>
@@ -5833,7 +5247,7 @@
           <a:p>
             <a:fld id="{519954A3-9DFD-4C44-94BA-B95130A3BA1C}" type="slidenum">
               <a:rPr lang="en-US" dirty="0"/>
-              <a:t>‹#›</a:t>
+              <a:t>‹N°›</a:t>
             </a:fld>
             <a:endParaRPr lang="en-US" dirty="0"/>
           </a:p>
@@ -6050,7 +5464,7 @@
             <a:fld id="{B61BEF0D-F0BB-DE4B-95CE-6DB70DBA9567}" type="datetimeFigureOut">
               <a:rPr lang="en-US" dirty="0"/>
               <a:pPr/>
-              <a:t>5/13/2019</a:t>
+              <a:t>7/29/2019</a:t>
             </a:fld>
             <a:endParaRPr lang="en-US" dirty="0"/>
           </a:p>
@@ -6093,7 +5507,7 @@
             <a:fld id="{D57F1E4F-1CFF-5643-939E-217C01CDF565}" type="slidenum">
               <a:rPr lang="en-US" dirty="0"/>
               <a:pPr/>
-              <a:t>‹#›</a:t>
+              <a:t>‹N°›</a:t>
             </a:fld>
             <a:endParaRPr lang="en-US" dirty="0"/>
           </a:p>
@@ -6790,7 +6204,7 @@
             <a:fld id="{B61BEF0D-F0BB-DE4B-95CE-6DB70DBA9567}" type="datetimeFigureOut">
               <a:rPr lang="en-US" dirty="0"/>
               <a:pPr/>
-              <a:t>5/13/2019</a:t>
+              <a:t>7/29/2019</a:t>
             </a:fld>
             <a:endParaRPr lang="en-US" dirty="0"/>
           </a:p>
@@ -6867,7 +6281,7 @@
             <a:fld id="{D57F1E4F-1CFF-5643-939E-217C01CDF565}" type="slidenum">
               <a:rPr lang="en-US" dirty="0"/>
               <a:pPr/>
-              <a:t>‹#›</a:t>
+              <a:t>‹N°›</a:t>
             </a:fld>
             <a:endParaRPr lang="en-US" dirty="0"/>
           </a:p>
@@ -7449,7 +6863,7 @@
           <p:cNvPr id="2" name="Titre 1">
             <a:extLst>
               <a:ext uri="{FF2B5EF4-FFF2-40B4-BE49-F238E27FC236}">
-                <a16:creationId xmlns:a16="http://schemas.microsoft.com/office/drawing/2014/main" id="{7E1F046A-2C41-46EB-B546-B02F894965DA}"/>
+                <a16:creationId xmlns:a16="http://schemas.microsoft.com/office/drawing/2014/main" id="{6D4F9E05-D37A-4E88-923B-572C5F07ECF9}"/>
               </a:ext>
             </a:extLst>
           </p:cNvPr>
@@ -7467,21 +6881,9 @@
           <a:p>
             <a:r>
               <a:rPr lang="fr-BE" dirty="0"/>
-              <a:t>Principe de </a:t>
-            </a:r>
-            <a:r>
-              <a:rPr lang="fr-BE" dirty="0" err="1"/>
-              <a:t>Liskov</a:t>
-            </a:r>
-            <a:r>
-              <a:rPr lang="fr-BE" dirty="0"/>
-              <a:t> (ou principe de Substitution) </a:t>
-            </a:r>
-            <a:r>
-              <a:rPr lang="fr-BE" i="1" dirty="0"/>
-              <a:t>LSP</a:t>
-            </a:r>
-            <a:endParaRPr lang="fr-FR" i="1" dirty="0"/>
+              <a:t>Des variables avec des noms</a:t>
+            </a:r>
+            <a:endParaRPr lang="fr-FR" dirty="0"/>
           </a:p>
         </p:txBody>
       </p:sp>
@@ -7490,7 +6892,7 @@
           <p:cNvPr id="3" name="Espace réservé du contenu 2">
             <a:extLst>
               <a:ext uri="{FF2B5EF4-FFF2-40B4-BE49-F238E27FC236}">
-                <a16:creationId xmlns:a16="http://schemas.microsoft.com/office/drawing/2014/main" id="{37C8FAA2-828F-4EFA-A89E-5F50B9BAD587}"/>
+                <a16:creationId xmlns:a16="http://schemas.microsoft.com/office/drawing/2014/main" id="{43040CE2-76B9-4AE6-BF7A-B92D71CC0798}"/>
               </a:ext>
             </a:extLst>
           </p:cNvPr>
@@ -7507,34 +6909,38 @@
           <a:lstStyle/>
           <a:p>
             <a:r>
-              <a:rPr lang="fr-BE" i="1" dirty="0"/>
-              <a:t>Remplacer une classe par une classe enfant ne doit pas casser l’application</a:t>
-            </a:r>
-          </a:p>
-          <a:p>
-            <a:endParaRPr lang="fr-BE" i="1" dirty="0"/>
-          </a:p>
-          <a:p>
-            <a:r>
-              <a:rPr lang="fr-BE" dirty="0"/>
-              <a:t>Lorsqu’une classe est remplacée par une autre, l’application ne doit pas avoir un comportement inattendu (crash, ou une modification de design).</a:t>
-            </a:r>
-          </a:p>
-          <a:p>
-            <a:r>
-              <a:rPr lang="fr-BE" dirty="0"/>
-              <a:t>Cette permanence de comportement est appelée contrat</a:t>
-            </a:r>
+              <a:rPr lang="fr-BE" dirty="0"/>
+              <a:t>Pas de fautes d’orthographe. </a:t>
+            </a:r>
+            <a:r>
+              <a:rPr lang="fr-BE" dirty="0" err="1"/>
+              <a:t>ctrl+f</a:t>
+            </a:r>
+            <a:r>
+              <a:rPr lang="fr-BE" dirty="0"/>
+              <a:t> doit rester ton ami</a:t>
+            </a:r>
+          </a:p>
+          <a:p>
+            <a:r>
+              <a:rPr lang="fr-BE" dirty="0"/>
+              <a:t>Nommez des variables explicitement</a:t>
+            </a:r>
+          </a:p>
+          <a:p>
+            <a:endParaRPr lang="fr-BE" dirty="0"/>
+          </a:p>
+          <a:p>
             <a:endParaRPr lang="fr-FR" dirty="0"/>
           </a:p>
         </p:txBody>
       </p:sp>
       <p:pic>
         <p:nvPicPr>
-          <p:cNvPr id="5" name="Image 4">
+          <p:cNvPr id="4" name="Image 3">
             <a:extLst>
               <a:ext uri="{FF2B5EF4-FFF2-40B4-BE49-F238E27FC236}">
-                <a16:creationId xmlns:a16="http://schemas.microsoft.com/office/drawing/2014/main" id="{F53EFD40-EB94-4247-9D06-B6325E10BCEF}"/>
+                <a16:creationId xmlns:a16="http://schemas.microsoft.com/office/drawing/2014/main" id="{CFB6896E-7095-4767-BB62-41A138B23547}"/>
               </a:ext>
             </a:extLst>
           </p:cNvPr>
@@ -7551,8 +6957,38 @@
         </p:blipFill>
         <p:spPr>
           <a:xfrm>
-            <a:off x="7200274" y="3911728"/>
-            <a:ext cx="2438095" cy="2031746"/>
+            <a:off x="624003" y="3179666"/>
+            <a:ext cx="4258726" cy="2455030"/>
+          </a:xfrm>
+          <a:prstGeom prst="rect">
+            <a:avLst/>
+          </a:prstGeom>
+        </p:spPr>
+      </p:pic>
+      <p:pic>
+        <p:nvPicPr>
+          <p:cNvPr id="6" name="Image 5">
+            <a:extLst>
+              <a:ext uri="{FF2B5EF4-FFF2-40B4-BE49-F238E27FC236}">
+                <a16:creationId xmlns:a16="http://schemas.microsoft.com/office/drawing/2014/main" id="{2777272A-1561-48C4-8CD0-F16F89A793F5}"/>
+              </a:ext>
+            </a:extLst>
+          </p:cNvPr>
+          <p:cNvPicPr>
+            <a:picLocks noChangeAspect="1"/>
+          </p:cNvPicPr>
+          <p:nvPr/>
+        </p:nvPicPr>
+        <p:blipFill>
+          <a:blip r:embed="rId4"/>
+          <a:stretch>
+            <a:fillRect/>
+          </a:stretch>
+        </p:blipFill>
+        <p:spPr>
+          <a:xfrm>
+            <a:off x="5103159" y="3179666"/>
+            <a:ext cx="4811307" cy="2462091"/>
           </a:xfrm>
           <a:prstGeom prst="rect">
             <a:avLst/>
@@ -7562,7 +6998,7 @@
     </p:spTree>
     <p:extLst>
       <p:ext uri="{BB962C8B-B14F-4D97-AF65-F5344CB8AC3E}">
-        <p14:creationId xmlns:p14="http://schemas.microsoft.com/office/powerpoint/2010/main" val="91065219"/>
+        <p14:creationId xmlns:p14="http://schemas.microsoft.com/office/powerpoint/2010/main" val="2720295834"/>
       </p:ext>
     </p:extLst>
   </p:cSld>
@@ -7594,993 +7030,6 @@
           <p:cNvPr id="2" name="Titre 1">
             <a:extLst>
               <a:ext uri="{FF2B5EF4-FFF2-40B4-BE49-F238E27FC236}">
-                <a16:creationId xmlns:a16="http://schemas.microsoft.com/office/drawing/2014/main" id="{8B6FE783-E6A4-478C-868E-843669FC3B60}"/>
-              </a:ext>
-            </a:extLst>
-          </p:cNvPr>
-          <p:cNvSpPr>
-            <a:spLocks noGrp="1"/>
-          </p:cNvSpPr>
-          <p:nvPr>
-            <p:ph type="title"/>
-          </p:nvPr>
-        </p:nvSpPr>
-        <p:spPr/>
-        <p:txBody>
-          <a:bodyPr/>
-          <a:lstStyle/>
-          <a:p>
-            <a:r>
-              <a:rPr lang="fr-BE" dirty="0"/>
-              <a:t>Ségrégation des interfaces </a:t>
-            </a:r>
-            <a:r>
-              <a:rPr lang="fr-BE" i="1" dirty="0"/>
-              <a:t>ISP</a:t>
-            </a:r>
-            <a:endParaRPr lang="fr-FR" i="1" dirty="0"/>
-          </a:p>
-        </p:txBody>
-      </p:sp>
-      <p:sp>
-        <p:nvSpPr>
-          <p:cNvPr id="3" name="Espace réservé du contenu 2">
-            <a:extLst>
-              <a:ext uri="{FF2B5EF4-FFF2-40B4-BE49-F238E27FC236}">
-                <a16:creationId xmlns:a16="http://schemas.microsoft.com/office/drawing/2014/main" id="{DA28CEAF-5261-4C2A-940C-554DFF7834F6}"/>
-              </a:ext>
-            </a:extLst>
-          </p:cNvPr>
-          <p:cNvSpPr>
-            <a:spLocks noGrp="1"/>
-          </p:cNvSpPr>
-          <p:nvPr>
-            <p:ph idx="1"/>
-          </p:nvPr>
-        </p:nvSpPr>
-        <p:spPr/>
-        <p:txBody>
-          <a:bodyPr/>
-          <a:lstStyle/>
-          <a:p>
-            <a:r>
-              <a:rPr lang="fr-BE" i="1" dirty="0"/>
-              <a:t>Aucun client ne devrait avoir accès à des méthodes qu’il n’utilise pas</a:t>
-            </a:r>
-          </a:p>
-          <a:p>
-            <a:endParaRPr lang="fr-BE" i="1" dirty="0"/>
-          </a:p>
-          <a:p>
-            <a:r>
-              <a:rPr lang="fr-BE" dirty="0"/>
-              <a:t>Sous manière de question rhétorique: Ai-je besoin d’une méthode </a:t>
-            </a:r>
-            <a:r>
-              <a:rPr lang="fr-BE" i="1" dirty="0"/>
-              <a:t>update </a:t>
-            </a:r>
-            <a:r>
-              <a:rPr lang="fr-BE" dirty="0"/>
-              <a:t>dans une procédure où je n’ai besoin que de </a:t>
-            </a:r>
-            <a:r>
-              <a:rPr lang="fr-BE" i="1" dirty="0"/>
-              <a:t>créer </a:t>
-            </a:r>
-            <a:r>
-              <a:rPr lang="fr-BE" dirty="0"/>
-              <a:t>?</a:t>
-            </a:r>
-          </a:p>
-          <a:p>
-            <a:endParaRPr lang="fr-FR" i="1" dirty="0"/>
-          </a:p>
-        </p:txBody>
-      </p:sp>
-    </p:spTree>
-    <p:extLst>
-      <p:ext uri="{BB962C8B-B14F-4D97-AF65-F5344CB8AC3E}">
-        <p14:creationId xmlns:p14="http://schemas.microsoft.com/office/powerpoint/2010/main" val="1765209581"/>
-      </p:ext>
-    </p:extLst>
-  </p:cSld>
-  <p:clrMapOvr>
-    <a:masterClrMapping/>
-  </p:clrMapOvr>
-</p:sld>
-</file>
-
-<file path=ppt/slides/slide12.xml><?xml version="1.0" encoding="utf-8"?>
-<p:sld xmlns:a="http://schemas.openxmlformats.org/drawingml/2006/main" xmlns:r="http://schemas.openxmlformats.org/officeDocument/2006/relationships" xmlns:p="http://schemas.openxmlformats.org/presentationml/2006/main">
-  <p:cSld>
-    <p:spTree>
-      <p:nvGrpSpPr>
-        <p:cNvPr id="1" name=""/>
-        <p:cNvGrpSpPr/>
-        <p:nvPr/>
-      </p:nvGrpSpPr>
-      <p:grpSpPr>
-        <a:xfrm>
-          <a:off x="0" y="0"/>
-          <a:ext cx="0" cy="0"/>
-          <a:chOff x="0" y="0"/>
-          <a:chExt cx="0" cy="0"/>
-        </a:xfrm>
-      </p:grpSpPr>
-      <p:sp>
-        <p:nvSpPr>
-          <p:cNvPr id="2" name="Titre 1">
-            <a:extLst>
-              <a:ext uri="{FF2B5EF4-FFF2-40B4-BE49-F238E27FC236}">
-                <a16:creationId xmlns:a16="http://schemas.microsoft.com/office/drawing/2014/main" id="{B432E7C1-E730-4D48-9C76-76BF8A59AC72}"/>
-              </a:ext>
-            </a:extLst>
-          </p:cNvPr>
-          <p:cNvSpPr>
-            <a:spLocks noGrp="1"/>
-          </p:cNvSpPr>
-          <p:nvPr>
-            <p:ph type="title"/>
-          </p:nvPr>
-        </p:nvSpPr>
-        <p:spPr/>
-        <p:txBody>
-          <a:bodyPr/>
-          <a:lstStyle/>
-          <a:p>
-            <a:r>
-              <a:rPr lang="fr-BE" dirty="0"/>
-              <a:t>Inversion des dépendances </a:t>
-            </a:r>
-            <a:r>
-              <a:rPr lang="fr-BE" i="1" dirty="0"/>
-              <a:t>DIP</a:t>
-            </a:r>
-            <a:endParaRPr lang="fr-FR" i="1" dirty="0"/>
-          </a:p>
-        </p:txBody>
-      </p:sp>
-      <p:sp>
-        <p:nvSpPr>
-          <p:cNvPr id="3" name="Espace réservé du contenu 2">
-            <a:extLst>
-              <a:ext uri="{FF2B5EF4-FFF2-40B4-BE49-F238E27FC236}">
-                <a16:creationId xmlns:a16="http://schemas.microsoft.com/office/drawing/2014/main" id="{52BD506E-5E8D-452A-9B01-9C31EAC58A63}"/>
-              </a:ext>
-            </a:extLst>
-          </p:cNvPr>
-          <p:cNvSpPr>
-            <a:spLocks noGrp="1"/>
-          </p:cNvSpPr>
-          <p:nvPr>
-            <p:ph idx="1"/>
-          </p:nvPr>
-        </p:nvSpPr>
-        <p:spPr/>
-        <p:txBody>
-          <a:bodyPr/>
-          <a:lstStyle/>
-          <a:p>
-            <a:r>
-              <a:rPr lang="fr-BE" i="1" dirty="0"/>
-              <a:t>Découple les classes en extériorisant leurs constructions de la classe qui l’utilise</a:t>
-            </a:r>
-          </a:p>
-          <a:p>
-            <a:endParaRPr lang="fr-FR" dirty="0"/>
-          </a:p>
-        </p:txBody>
-      </p:sp>
-      <p:pic>
-        <p:nvPicPr>
-          <p:cNvPr id="4" name="Image 3">
-            <a:extLst>
-              <a:ext uri="{FF2B5EF4-FFF2-40B4-BE49-F238E27FC236}">
-                <a16:creationId xmlns:a16="http://schemas.microsoft.com/office/drawing/2014/main" id="{C9181F97-8E53-4D71-A9B0-273945C90701}"/>
-              </a:ext>
-            </a:extLst>
-          </p:cNvPr>
-          <p:cNvPicPr>
-            <a:picLocks noChangeAspect="1"/>
-          </p:cNvPicPr>
-          <p:nvPr/>
-        </p:nvPicPr>
-        <p:blipFill>
-          <a:blip r:embed="rId3"/>
-          <a:stretch>
-            <a:fillRect/>
-          </a:stretch>
-        </p:blipFill>
-        <p:spPr>
-          <a:xfrm>
-            <a:off x="898698" y="3317032"/>
-            <a:ext cx="4038600" cy="3143250"/>
-          </a:xfrm>
-          <a:prstGeom prst="rect">
-            <a:avLst/>
-          </a:prstGeom>
-        </p:spPr>
-      </p:pic>
-      <p:pic>
-        <p:nvPicPr>
-          <p:cNvPr id="5" name="Image 4">
-            <a:extLst>
-              <a:ext uri="{FF2B5EF4-FFF2-40B4-BE49-F238E27FC236}">
-                <a16:creationId xmlns:a16="http://schemas.microsoft.com/office/drawing/2014/main" id="{C64EA983-A8A5-4F30-82D5-5529ABE3C6A3}"/>
-              </a:ext>
-            </a:extLst>
-          </p:cNvPr>
-          <p:cNvPicPr>
-            <a:picLocks noChangeAspect="1"/>
-          </p:cNvPicPr>
-          <p:nvPr/>
-        </p:nvPicPr>
-        <p:blipFill>
-          <a:blip r:embed="rId4"/>
-          <a:stretch>
-            <a:fillRect/>
-          </a:stretch>
-        </p:blipFill>
-        <p:spPr>
-          <a:xfrm>
-            <a:off x="6007554" y="2612096"/>
-            <a:ext cx="3640299" cy="3911205"/>
-          </a:xfrm>
-          <a:prstGeom prst="rect">
-            <a:avLst/>
-          </a:prstGeom>
-        </p:spPr>
-      </p:pic>
-    </p:spTree>
-    <p:extLst>
-      <p:ext uri="{BB962C8B-B14F-4D97-AF65-F5344CB8AC3E}">
-        <p14:creationId xmlns:p14="http://schemas.microsoft.com/office/powerpoint/2010/main" val="1738328569"/>
-      </p:ext>
-    </p:extLst>
-  </p:cSld>
-  <p:clrMapOvr>
-    <a:masterClrMapping/>
-  </p:clrMapOvr>
-</p:sld>
-</file>
-
-<file path=ppt/slides/slide13.xml><?xml version="1.0" encoding="utf-8"?>
-<p:sld xmlns:a="http://schemas.openxmlformats.org/drawingml/2006/main" xmlns:r="http://schemas.openxmlformats.org/officeDocument/2006/relationships" xmlns:p="http://schemas.openxmlformats.org/presentationml/2006/main">
-  <p:cSld>
-    <p:spTree>
-      <p:nvGrpSpPr>
-        <p:cNvPr id="1" name=""/>
-        <p:cNvGrpSpPr/>
-        <p:nvPr/>
-      </p:nvGrpSpPr>
-      <p:grpSpPr>
-        <a:xfrm>
-          <a:off x="0" y="0"/>
-          <a:ext cx="0" cy="0"/>
-          <a:chOff x="0" y="0"/>
-          <a:chExt cx="0" cy="0"/>
-        </a:xfrm>
-      </p:grpSpPr>
-      <p:sp>
-        <p:nvSpPr>
-          <p:cNvPr id="2" name="Titre 1">
-            <a:extLst>
-              <a:ext uri="{FF2B5EF4-FFF2-40B4-BE49-F238E27FC236}">
-                <a16:creationId xmlns:a16="http://schemas.microsoft.com/office/drawing/2014/main" id="{2625E04E-4172-4C68-B25D-DC13449F3D41}"/>
-              </a:ext>
-            </a:extLst>
-          </p:cNvPr>
-          <p:cNvSpPr>
-            <a:spLocks noGrp="1"/>
-          </p:cNvSpPr>
-          <p:nvPr>
-            <p:ph type="title"/>
-          </p:nvPr>
-        </p:nvSpPr>
-        <p:spPr/>
-        <p:txBody>
-          <a:bodyPr/>
-          <a:lstStyle/>
-          <a:p>
-            <a:r>
-              <a:rPr lang="fr-BE" u="sng" dirty="0"/>
-              <a:t>Principes</a:t>
-            </a:r>
-            <a:r>
-              <a:rPr lang="fr-BE" dirty="0"/>
-              <a:t> SOLID</a:t>
-            </a:r>
-            <a:endParaRPr lang="fr-FR" u="sng" dirty="0"/>
-          </a:p>
-        </p:txBody>
-      </p:sp>
-      <p:sp>
-        <p:nvSpPr>
-          <p:cNvPr id="3" name="Espace réservé du contenu 2">
-            <a:extLst>
-              <a:ext uri="{FF2B5EF4-FFF2-40B4-BE49-F238E27FC236}">
-                <a16:creationId xmlns:a16="http://schemas.microsoft.com/office/drawing/2014/main" id="{62735CB6-94FA-4481-9595-57AAEC766056}"/>
-              </a:ext>
-            </a:extLst>
-          </p:cNvPr>
-          <p:cNvSpPr>
-            <a:spLocks noGrp="1"/>
-          </p:cNvSpPr>
-          <p:nvPr>
-            <p:ph idx="1"/>
-          </p:nvPr>
-        </p:nvSpPr>
-        <p:spPr/>
-        <p:txBody>
-          <a:bodyPr/>
-          <a:lstStyle/>
-          <a:p>
-            <a:r>
-              <a:rPr lang="fr-BE" dirty="0"/>
-              <a:t>Ceci sont des </a:t>
-            </a:r>
-            <a:r>
-              <a:rPr lang="fr-BE" u="sng" dirty="0"/>
-              <a:t>principes</a:t>
-            </a:r>
-            <a:r>
-              <a:rPr lang="fr-BE" dirty="0"/>
-              <a:t>, et pas des </a:t>
-            </a:r>
-            <a:r>
-              <a:rPr lang="fr-BE" u="sng" dirty="0"/>
-              <a:t>règles</a:t>
-            </a:r>
-            <a:r>
-              <a:rPr lang="fr-BE" dirty="0"/>
-              <a:t>.</a:t>
-            </a:r>
-          </a:p>
-          <a:p>
-            <a:r>
-              <a:rPr lang="fr-BE" dirty="0"/>
-              <a:t>Parfois, ignorer les principes est la meilleure solution</a:t>
-            </a:r>
-            <a:endParaRPr lang="fr-FR" dirty="0"/>
-          </a:p>
-        </p:txBody>
-      </p:sp>
-    </p:spTree>
-    <p:extLst>
-      <p:ext uri="{BB962C8B-B14F-4D97-AF65-F5344CB8AC3E}">
-        <p14:creationId xmlns:p14="http://schemas.microsoft.com/office/powerpoint/2010/main" val="563389849"/>
-      </p:ext>
-    </p:extLst>
-  </p:cSld>
-  <p:clrMapOvr>
-    <a:masterClrMapping/>
-  </p:clrMapOvr>
-</p:sld>
-</file>
-
-<file path=ppt/slides/slide14.xml><?xml version="1.0" encoding="utf-8"?>
-<p:sld xmlns:a="http://schemas.openxmlformats.org/drawingml/2006/main" xmlns:r="http://schemas.openxmlformats.org/officeDocument/2006/relationships" xmlns:p="http://schemas.openxmlformats.org/presentationml/2006/main">
-  <p:cSld>
-    <p:spTree>
-      <p:nvGrpSpPr>
-        <p:cNvPr id="1" name=""/>
-        <p:cNvGrpSpPr/>
-        <p:nvPr/>
-      </p:nvGrpSpPr>
-      <p:grpSpPr>
-        <a:xfrm>
-          <a:off x="0" y="0"/>
-          <a:ext cx="0" cy="0"/>
-          <a:chOff x="0" y="0"/>
-          <a:chExt cx="0" cy="0"/>
-        </a:xfrm>
-      </p:grpSpPr>
-      <p:sp>
-        <p:nvSpPr>
-          <p:cNvPr id="2" name="Titre 1">
-            <a:extLst>
-              <a:ext uri="{FF2B5EF4-FFF2-40B4-BE49-F238E27FC236}">
-                <a16:creationId xmlns:a16="http://schemas.microsoft.com/office/drawing/2014/main" id="{4B4F148B-D747-4463-A02A-A126E07E1A21}"/>
-              </a:ext>
-            </a:extLst>
-          </p:cNvPr>
-          <p:cNvSpPr>
-            <a:spLocks noGrp="1"/>
-          </p:cNvSpPr>
-          <p:nvPr>
-            <p:ph type="title"/>
-          </p:nvPr>
-        </p:nvSpPr>
-        <p:spPr/>
-        <p:txBody>
-          <a:bodyPr/>
-          <a:lstStyle/>
-          <a:p>
-            <a:r>
-              <a:rPr lang="fr-BE" dirty="0"/>
-              <a:t>Clean Code: </a:t>
-            </a:r>
-            <a:r>
-              <a:rPr lang="fr-BE" dirty="0" err="1"/>
-              <a:t>mékeskeC</a:t>
-            </a:r>
-            <a:r>
-              <a:rPr lang="fr-BE" dirty="0"/>
-              <a:t> ?</a:t>
-            </a:r>
-            <a:br>
-              <a:rPr lang="fr-BE" dirty="0"/>
-            </a:br>
-            <a:r>
-              <a:rPr lang="fr-BE" sz="2000" dirty="0"/>
-              <a:t>Du code qui est:</a:t>
-            </a:r>
-            <a:endParaRPr lang="fr-FR" dirty="0"/>
-          </a:p>
-        </p:txBody>
-      </p:sp>
-      <p:sp>
-        <p:nvSpPr>
-          <p:cNvPr id="3" name="Espace réservé du contenu 2">
-            <a:extLst>
-              <a:ext uri="{FF2B5EF4-FFF2-40B4-BE49-F238E27FC236}">
-                <a16:creationId xmlns:a16="http://schemas.microsoft.com/office/drawing/2014/main" id="{BBA479F0-A022-4E96-A8F4-CBD9DCBFCD4E}"/>
-              </a:ext>
-            </a:extLst>
-          </p:cNvPr>
-          <p:cNvSpPr>
-            <a:spLocks noGrp="1"/>
-          </p:cNvSpPr>
-          <p:nvPr>
-            <p:ph idx="1"/>
-          </p:nvPr>
-        </p:nvSpPr>
-        <p:spPr/>
-        <p:txBody>
-          <a:bodyPr/>
-          <a:lstStyle/>
-          <a:p>
-            <a:r>
-              <a:rPr lang="fr-BE" dirty="0"/>
-              <a:t>Expressif et explicite</a:t>
-            </a:r>
-          </a:p>
-          <a:p>
-            <a:r>
-              <a:rPr lang="fr-BE" dirty="0"/>
-              <a:t>Lisible</a:t>
-            </a:r>
-          </a:p>
-          <a:p>
-            <a:r>
-              <a:rPr lang="fr-BE" dirty="0"/>
-              <a:t>Compréhensible</a:t>
-            </a:r>
-          </a:p>
-          <a:p>
-            <a:r>
-              <a:rPr lang="fr-BE" dirty="0"/>
-              <a:t>Sans surprise</a:t>
-            </a:r>
-          </a:p>
-          <a:p>
-            <a:r>
-              <a:rPr lang="fr-BE" dirty="0"/>
-              <a:t>Transparent</a:t>
-            </a:r>
-          </a:p>
-          <a:p>
-            <a:r>
-              <a:rPr lang="fr-BE" dirty="0"/>
-              <a:t>Rassurant</a:t>
-            </a:r>
-          </a:p>
-          <a:p>
-            <a:r>
-              <a:rPr lang="fr-BE" dirty="0"/>
-              <a:t>Plaisant</a:t>
-            </a:r>
-            <a:endParaRPr lang="fr-FR" dirty="0"/>
-          </a:p>
-        </p:txBody>
-      </p:sp>
-      <p:sp>
-        <p:nvSpPr>
-          <p:cNvPr id="4" name="ZoneTexte 3">
-            <a:extLst>
-              <a:ext uri="{FF2B5EF4-FFF2-40B4-BE49-F238E27FC236}">
-                <a16:creationId xmlns:a16="http://schemas.microsoft.com/office/drawing/2014/main" id="{DFE9CAE5-8F03-4618-BCE1-DDFE0F9BF0DA}"/>
-              </a:ext>
-            </a:extLst>
-          </p:cNvPr>
-          <p:cNvSpPr txBox="1"/>
-          <p:nvPr/>
-        </p:nvSpPr>
-        <p:spPr>
-          <a:xfrm>
-            <a:off x="7532702" y="5602069"/>
-            <a:ext cx="1939771" cy="646331"/>
-          </a:xfrm>
-          <a:prstGeom prst="rect">
-            <a:avLst/>
-          </a:prstGeom>
-          <a:noFill/>
-        </p:spPr>
-        <p:txBody>
-          <a:bodyPr wrap="square" rtlCol="0">
-            <a:spAutoFit/>
-          </a:bodyPr>
-          <a:lstStyle/>
-          <a:p>
-            <a:r>
-              <a:rPr lang="en-US" i="1" dirty="0"/>
-              <a:t>Kate Gregory</a:t>
-            </a:r>
-          </a:p>
-          <a:p>
-            <a:endParaRPr lang="fr-FR" i="1" dirty="0"/>
-          </a:p>
-        </p:txBody>
-      </p:sp>
-    </p:spTree>
-    <p:extLst>
-      <p:ext uri="{BB962C8B-B14F-4D97-AF65-F5344CB8AC3E}">
-        <p14:creationId xmlns:p14="http://schemas.microsoft.com/office/powerpoint/2010/main" val="3816974945"/>
-      </p:ext>
-    </p:extLst>
-  </p:cSld>
-  <p:clrMapOvr>
-    <a:masterClrMapping/>
-  </p:clrMapOvr>
-</p:sld>
-</file>
-
-<file path=ppt/slides/slide15.xml><?xml version="1.0" encoding="utf-8"?>
-<p:sld xmlns:a="http://schemas.openxmlformats.org/drawingml/2006/main" xmlns:r="http://schemas.openxmlformats.org/officeDocument/2006/relationships" xmlns:p="http://schemas.openxmlformats.org/presentationml/2006/main">
-  <p:cSld>
-    <p:spTree>
-      <p:nvGrpSpPr>
-        <p:cNvPr id="1" name=""/>
-        <p:cNvGrpSpPr/>
-        <p:nvPr/>
-      </p:nvGrpSpPr>
-      <p:grpSpPr>
-        <a:xfrm>
-          <a:off x="0" y="0"/>
-          <a:ext cx="0" cy="0"/>
-          <a:chOff x="0" y="0"/>
-          <a:chExt cx="0" cy="0"/>
-        </a:xfrm>
-      </p:grpSpPr>
-      <p:sp>
-        <p:nvSpPr>
-          <p:cNvPr id="2" name="Titre 1">
-            <a:extLst>
-              <a:ext uri="{FF2B5EF4-FFF2-40B4-BE49-F238E27FC236}">
-                <a16:creationId xmlns:a16="http://schemas.microsoft.com/office/drawing/2014/main" id="{436C22CA-B030-44C8-A13C-5DBC76D7129F}"/>
-              </a:ext>
-            </a:extLst>
-          </p:cNvPr>
-          <p:cNvSpPr>
-            <a:spLocks noGrp="1"/>
-          </p:cNvSpPr>
-          <p:nvPr>
-            <p:ph type="title"/>
-          </p:nvPr>
-        </p:nvSpPr>
-        <p:spPr/>
-        <p:txBody>
-          <a:bodyPr/>
-          <a:lstStyle/>
-          <a:p>
-            <a:r>
-              <a:rPr lang="fr-BE" dirty="0"/>
-              <a:t>Clean Code: mais comment ?</a:t>
-            </a:r>
-            <a:endParaRPr lang="fr-FR" dirty="0"/>
-          </a:p>
-        </p:txBody>
-      </p:sp>
-      <p:sp>
-        <p:nvSpPr>
-          <p:cNvPr id="3" name="Espace réservé du contenu 2">
-            <a:extLst>
-              <a:ext uri="{FF2B5EF4-FFF2-40B4-BE49-F238E27FC236}">
-                <a16:creationId xmlns:a16="http://schemas.microsoft.com/office/drawing/2014/main" id="{43BB4507-A3E6-4C59-9787-89A0496EF5F2}"/>
-              </a:ext>
-            </a:extLst>
-          </p:cNvPr>
-          <p:cNvSpPr>
-            <a:spLocks noGrp="1"/>
-          </p:cNvSpPr>
-          <p:nvPr>
-            <p:ph idx="1"/>
-          </p:nvPr>
-        </p:nvSpPr>
-        <p:spPr/>
-        <p:txBody>
-          <a:bodyPr/>
-          <a:lstStyle/>
-          <a:p>
-            <a:r>
-              <a:rPr lang="fr-BE" dirty="0"/>
-              <a:t>Restez Simple (KISS </a:t>
-            </a:r>
-            <a:r>
-              <a:rPr lang="fr-BE" dirty="0" err="1"/>
-              <a:t>principle</a:t>
-            </a:r>
-            <a:r>
-              <a:rPr lang="fr-BE" dirty="0"/>
-              <a:t>)</a:t>
-            </a:r>
-          </a:p>
-          <a:p>
-            <a:pPr lvl="1"/>
-            <a:r>
-              <a:rPr lang="fr-BE" dirty="0"/>
-              <a:t>« Simple: Facile à comprendre, à utiliser, à exécuter » - L’internaute</a:t>
-            </a:r>
-          </a:p>
-          <a:p>
-            <a:r>
-              <a:rPr lang="fr-BE" dirty="0"/>
-              <a:t>Pensez à raconter une histoire</a:t>
-            </a:r>
-          </a:p>
-          <a:p>
-            <a:r>
-              <a:rPr lang="fr-BE" dirty="0"/>
-              <a:t>Code </a:t>
-            </a:r>
-            <a:r>
-              <a:rPr lang="fr-BE" dirty="0" err="1"/>
-              <a:t>review</a:t>
-            </a:r>
-            <a:r>
-              <a:rPr lang="fr-BE" dirty="0"/>
-              <a:t> : faites voir votre code à un collègue. S’il le comprend, ce code est bon.</a:t>
-            </a:r>
-          </a:p>
-        </p:txBody>
-      </p:sp>
-    </p:spTree>
-    <p:extLst>
-      <p:ext uri="{BB962C8B-B14F-4D97-AF65-F5344CB8AC3E}">
-        <p14:creationId xmlns:p14="http://schemas.microsoft.com/office/powerpoint/2010/main" val="4155884551"/>
-      </p:ext>
-    </p:extLst>
-  </p:cSld>
-  <p:clrMapOvr>
-    <a:masterClrMapping/>
-  </p:clrMapOvr>
-</p:sld>
-</file>
-
-<file path=ppt/slides/slide16.xml><?xml version="1.0" encoding="utf-8"?>
-<p:sld xmlns:a="http://schemas.openxmlformats.org/drawingml/2006/main" xmlns:r="http://schemas.openxmlformats.org/officeDocument/2006/relationships" xmlns:p="http://schemas.openxmlformats.org/presentationml/2006/main">
-  <p:cSld>
-    <p:spTree>
-      <p:nvGrpSpPr>
-        <p:cNvPr id="1" name=""/>
-        <p:cNvGrpSpPr/>
-        <p:nvPr/>
-      </p:nvGrpSpPr>
-      <p:grpSpPr>
-        <a:xfrm>
-          <a:off x="0" y="0"/>
-          <a:ext cx="0" cy="0"/>
-          <a:chOff x="0" y="0"/>
-          <a:chExt cx="0" cy="0"/>
-        </a:xfrm>
-      </p:grpSpPr>
-      <p:sp>
-        <p:nvSpPr>
-          <p:cNvPr id="2" name="Titre 1">
-            <a:extLst>
-              <a:ext uri="{FF2B5EF4-FFF2-40B4-BE49-F238E27FC236}">
-                <a16:creationId xmlns:a16="http://schemas.microsoft.com/office/drawing/2014/main" id="{4777C3CF-1BA8-4B86-9618-6AF002EB7E30}"/>
-              </a:ext>
-            </a:extLst>
-          </p:cNvPr>
-          <p:cNvSpPr>
-            <a:spLocks noGrp="1"/>
-          </p:cNvSpPr>
-          <p:nvPr>
-            <p:ph type="title"/>
-          </p:nvPr>
-        </p:nvSpPr>
-        <p:spPr/>
-        <p:txBody>
-          <a:bodyPr/>
-          <a:lstStyle/>
-          <a:p>
-            <a:r>
-              <a:rPr lang="fr-FR" dirty="0" err="1"/>
-              <a:t>Nested</a:t>
-            </a:r>
-            <a:r>
-              <a:rPr lang="fr-FR" dirty="0"/>
-              <a:t> if are for </a:t>
-            </a:r>
-            <a:r>
-              <a:rPr lang="fr-FR" dirty="0" err="1"/>
-              <a:t>fools</a:t>
-            </a:r>
-            <a:endParaRPr lang="fr-FR" dirty="0"/>
-          </a:p>
-        </p:txBody>
-      </p:sp>
-      <p:sp>
-        <p:nvSpPr>
-          <p:cNvPr id="3" name="Espace réservé du contenu 2">
-            <a:extLst>
-              <a:ext uri="{FF2B5EF4-FFF2-40B4-BE49-F238E27FC236}">
-                <a16:creationId xmlns:a16="http://schemas.microsoft.com/office/drawing/2014/main" id="{090334CA-EAF4-4FDD-9B0B-2F1A9C8333FB}"/>
-              </a:ext>
-            </a:extLst>
-          </p:cNvPr>
-          <p:cNvSpPr>
-            <a:spLocks noGrp="1"/>
-          </p:cNvSpPr>
-          <p:nvPr>
-            <p:ph idx="1"/>
-          </p:nvPr>
-        </p:nvSpPr>
-        <p:spPr/>
-        <p:txBody>
-          <a:bodyPr/>
-          <a:lstStyle/>
-          <a:p>
-            <a:r>
-              <a:rPr lang="fr-BE" dirty="0" err="1"/>
-              <a:t>Avoid</a:t>
-            </a:r>
-            <a:r>
-              <a:rPr lang="fr-BE" dirty="0"/>
-              <a:t> </a:t>
-            </a:r>
-            <a:r>
-              <a:rPr lang="fr-BE" dirty="0" err="1"/>
-              <a:t>nested</a:t>
-            </a:r>
-            <a:r>
-              <a:rPr lang="fr-BE" dirty="0"/>
-              <a:t> if</a:t>
-            </a:r>
-            <a:endParaRPr lang="fr-FR" dirty="0"/>
-          </a:p>
-          <a:p>
-            <a:pPr lvl="1"/>
-            <a:r>
-              <a:rPr lang="fr-BE" dirty="0"/>
-              <a:t>Les </a:t>
-            </a:r>
-            <a:r>
-              <a:rPr lang="fr-BE" i="1" dirty="0"/>
-              <a:t>if</a:t>
-            </a:r>
-            <a:r>
-              <a:rPr lang="fr-BE" dirty="0"/>
-              <a:t> imbriqués diminuent la lisibilité à cause du décalage, et du </a:t>
-            </a:r>
-            <a:r>
-              <a:rPr lang="fr-BE" dirty="0" err="1"/>
-              <a:t>else</a:t>
-            </a:r>
-            <a:r>
-              <a:rPr lang="fr-BE" dirty="0"/>
-              <a:t> trop éloigné de sa condition</a:t>
-            </a:r>
-          </a:p>
-          <a:p>
-            <a:endParaRPr lang="fr-FR" dirty="0"/>
-          </a:p>
-        </p:txBody>
-      </p:sp>
-    </p:spTree>
-    <p:extLst>
-      <p:ext uri="{BB962C8B-B14F-4D97-AF65-F5344CB8AC3E}">
-        <p14:creationId xmlns:p14="http://schemas.microsoft.com/office/powerpoint/2010/main" val="790854867"/>
-      </p:ext>
-    </p:extLst>
-  </p:cSld>
-  <p:clrMapOvr>
-    <a:masterClrMapping/>
-  </p:clrMapOvr>
-</p:sld>
-</file>
-
-<file path=ppt/slides/slide17.xml><?xml version="1.0" encoding="utf-8"?>
-<p:sld xmlns:a="http://schemas.openxmlformats.org/drawingml/2006/main" xmlns:r="http://schemas.openxmlformats.org/officeDocument/2006/relationships" xmlns:p="http://schemas.openxmlformats.org/presentationml/2006/main">
-  <p:cSld>
-    <p:spTree>
-      <p:nvGrpSpPr>
-        <p:cNvPr id="1" name=""/>
-        <p:cNvGrpSpPr/>
-        <p:nvPr/>
-      </p:nvGrpSpPr>
-      <p:grpSpPr>
-        <a:xfrm>
-          <a:off x="0" y="0"/>
-          <a:ext cx="0" cy="0"/>
-          <a:chOff x="0" y="0"/>
-          <a:chExt cx="0" cy="0"/>
-        </a:xfrm>
-      </p:grpSpPr>
-      <p:sp>
-        <p:nvSpPr>
-          <p:cNvPr id="2" name="Titre 1">
-            <a:extLst>
-              <a:ext uri="{FF2B5EF4-FFF2-40B4-BE49-F238E27FC236}">
-                <a16:creationId xmlns:a16="http://schemas.microsoft.com/office/drawing/2014/main" id="{6D4F9E05-D37A-4E88-923B-572C5F07ECF9}"/>
-              </a:ext>
-            </a:extLst>
-          </p:cNvPr>
-          <p:cNvSpPr>
-            <a:spLocks noGrp="1"/>
-          </p:cNvSpPr>
-          <p:nvPr>
-            <p:ph type="title"/>
-          </p:nvPr>
-        </p:nvSpPr>
-        <p:spPr/>
-        <p:txBody>
-          <a:bodyPr/>
-          <a:lstStyle/>
-          <a:p>
-            <a:r>
-              <a:rPr lang="fr-BE" dirty="0"/>
-              <a:t>Des variables avec des noms</a:t>
-            </a:r>
-            <a:endParaRPr lang="fr-FR" dirty="0"/>
-          </a:p>
-        </p:txBody>
-      </p:sp>
-      <p:sp>
-        <p:nvSpPr>
-          <p:cNvPr id="3" name="Espace réservé du contenu 2">
-            <a:extLst>
-              <a:ext uri="{FF2B5EF4-FFF2-40B4-BE49-F238E27FC236}">
-                <a16:creationId xmlns:a16="http://schemas.microsoft.com/office/drawing/2014/main" id="{43040CE2-76B9-4AE6-BF7A-B92D71CC0798}"/>
-              </a:ext>
-            </a:extLst>
-          </p:cNvPr>
-          <p:cNvSpPr>
-            <a:spLocks noGrp="1"/>
-          </p:cNvSpPr>
-          <p:nvPr>
-            <p:ph idx="1"/>
-          </p:nvPr>
-        </p:nvSpPr>
-        <p:spPr/>
-        <p:txBody>
-          <a:bodyPr/>
-          <a:lstStyle/>
-          <a:p>
-            <a:r>
-              <a:rPr lang="fr-BE" dirty="0"/>
-              <a:t>Pas de fautes d’orthographe. </a:t>
-            </a:r>
-            <a:r>
-              <a:rPr lang="fr-BE" dirty="0" err="1"/>
-              <a:t>ctrl+f</a:t>
-            </a:r>
-            <a:r>
-              <a:rPr lang="fr-BE" dirty="0"/>
-              <a:t> doit rester ton ami</a:t>
-            </a:r>
-          </a:p>
-          <a:p>
-            <a:r>
-              <a:rPr lang="fr-BE" dirty="0"/>
-              <a:t>Nommez des variables explicitement</a:t>
-            </a:r>
-          </a:p>
-          <a:p>
-            <a:endParaRPr lang="fr-BE" dirty="0"/>
-          </a:p>
-          <a:p>
-            <a:endParaRPr lang="fr-FR" dirty="0"/>
-          </a:p>
-        </p:txBody>
-      </p:sp>
-      <p:pic>
-        <p:nvPicPr>
-          <p:cNvPr id="5" name="Image 4">
-            <a:extLst>
-              <a:ext uri="{FF2B5EF4-FFF2-40B4-BE49-F238E27FC236}">
-                <a16:creationId xmlns:a16="http://schemas.microsoft.com/office/drawing/2014/main" id="{E4034721-67F9-4D4A-90F5-5266E7C4736B}"/>
-              </a:ext>
-            </a:extLst>
-          </p:cNvPr>
-          <p:cNvPicPr>
-            <a:picLocks noChangeAspect="1"/>
-          </p:cNvPicPr>
-          <p:nvPr/>
-        </p:nvPicPr>
-        <p:blipFill>
-          <a:blip r:embed="rId3"/>
-          <a:stretch>
-            <a:fillRect/>
-          </a:stretch>
-        </p:blipFill>
-        <p:spPr>
-          <a:xfrm>
-            <a:off x="5579139" y="3411588"/>
-            <a:ext cx="4958596" cy="2129822"/>
-          </a:xfrm>
-          <a:prstGeom prst="rect">
-            <a:avLst/>
-          </a:prstGeom>
-        </p:spPr>
-      </p:pic>
-      <p:pic>
-        <p:nvPicPr>
-          <p:cNvPr id="8" name="Image 7">
-            <a:extLst>
-              <a:ext uri="{FF2B5EF4-FFF2-40B4-BE49-F238E27FC236}">
-                <a16:creationId xmlns:a16="http://schemas.microsoft.com/office/drawing/2014/main" id="{F742B370-9835-4567-8C5A-14CF781946D4}"/>
-              </a:ext>
-            </a:extLst>
-          </p:cNvPr>
-          <p:cNvPicPr>
-            <a:picLocks noChangeAspect="1"/>
-          </p:cNvPicPr>
-          <p:nvPr/>
-        </p:nvPicPr>
-        <p:blipFill>
-          <a:blip r:embed="rId4"/>
-          <a:stretch>
-            <a:fillRect/>
-          </a:stretch>
-        </p:blipFill>
-        <p:spPr>
-          <a:xfrm>
-            <a:off x="1033270" y="3411588"/>
-            <a:ext cx="4278890" cy="2129822"/>
-          </a:xfrm>
-          <a:prstGeom prst="rect">
-            <a:avLst/>
-          </a:prstGeom>
-        </p:spPr>
-      </p:pic>
-    </p:spTree>
-    <p:extLst>
-      <p:ext uri="{BB962C8B-B14F-4D97-AF65-F5344CB8AC3E}">
-        <p14:creationId xmlns:p14="http://schemas.microsoft.com/office/powerpoint/2010/main" val="2720295834"/>
-      </p:ext>
-    </p:extLst>
-  </p:cSld>
-  <p:clrMapOvr>
-    <a:masterClrMapping/>
-  </p:clrMapOvr>
-</p:sld>
-</file>
-
-<file path=ppt/slides/slide18.xml><?xml version="1.0" encoding="utf-8"?>
-<p:sld xmlns:a="http://schemas.openxmlformats.org/drawingml/2006/main" xmlns:r="http://schemas.openxmlformats.org/officeDocument/2006/relationships" xmlns:p="http://schemas.openxmlformats.org/presentationml/2006/main">
-  <p:cSld>
-    <p:spTree>
-      <p:nvGrpSpPr>
-        <p:cNvPr id="1" name=""/>
-        <p:cNvGrpSpPr/>
-        <p:nvPr/>
-      </p:nvGrpSpPr>
-      <p:grpSpPr>
-        <a:xfrm>
-          <a:off x="0" y="0"/>
-          <a:ext cx="0" cy="0"/>
-          <a:chOff x="0" y="0"/>
-          <a:chExt cx="0" cy="0"/>
-        </a:xfrm>
-      </p:grpSpPr>
-      <p:sp>
-        <p:nvSpPr>
-          <p:cNvPr id="2" name="Titre 1">
-            <a:extLst>
-              <a:ext uri="{FF2B5EF4-FFF2-40B4-BE49-F238E27FC236}">
                 <a16:creationId xmlns:a16="http://schemas.microsoft.com/office/drawing/2014/main" id="{F4844D73-AD96-440E-8403-3352C01759F9}"/>
               </a:ext>
             </a:extLst>
@@ -8592,7 +7041,12 @@
             <p:ph type="title"/>
           </p:nvPr>
         </p:nvSpPr>
-        <p:spPr/>
+        <p:spPr>
+          <a:xfrm>
+            <a:off x="677334" y="609600"/>
+            <a:ext cx="8596668" cy="775447"/>
+          </a:xfrm>
+        </p:spPr>
         <p:txBody>
           <a:bodyPr/>
           <a:lstStyle/>
@@ -8621,7 +7075,12 @@
             <p:ph idx="1"/>
           </p:nvPr>
         </p:nvSpPr>
-        <p:spPr/>
+        <p:spPr>
+          <a:xfrm>
+            <a:off x="677334" y="1548764"/>
+            <a:ext cx="8596668" cy="3880773"/>
+          </a:xfrm>
+        </p:spPr>
         <p:txBody>
           <a:bodyPr/>
           <a:lstStyle/>
@@ -8636,10 +7095,10 @@
       </p:sp>
       <p:pic>
         <p:nvPicPr>
-          <p:cNvPr id="4" name="Image 3">
+          <p:cNvPr id="5" name="Image 4">
             <a:extLst>
               <a:ext uri="{FF2B5EF4-FFF2-40B4-BE49-F238E27FC236}">
-                <a16:creationId xmlns:a16="http://schemas.microsoft.com/office/drawing/2014/main" id="{4FA7AE3F-C58B-4DCD-A30C-9C0E860B2BB5}"/>
+                <a16:creationId xmlns:a16="http://schemas.microsoft.com/office/drawing/2014/main" id="{D109321D-48B1-40B6-96D6-414050412385}"/>
               </a:ext>
             </a:extLst>
           </p:cNvPr>
@@ -8656,8 +7115,8 @@
         </p:blipFill>
         <p:spPr>
           <a:xfrm>
-            <a:off x="974911" y="3154061"/>
-            <a:ext cx="3691218" cy="3268948"/>
+            <a:off x="995083" y="2682125"/>
+            <a:ext cx="4476469" cy="3720076"/>
           </a:xfrm>
           <a:prstGeom prst="rect">
             <a:avLst/>
@@ -8677,7 +7136,7 @@
 </p:sld>
 </file>
 
-<file path=ppt/slides/slide19.xml><?xml version="1.0" encoding="utf-8"?>
+<file path=ppt/slides/slide12.xml><?xml version="1.0" encoding="utf-8"?>
 <p:sld xmlns:a="http://schemas.openxmlformats.org/drawingml/2006/main" xmlns:r="http://schemas.openxmlformats.org/officeDocument/2006/relationships" xmlns:p="http://schemas.openxmlformats.org/presentationml/2006/main">
   <p:cSld>
     <p:spTree>
@@ -8844,7 +7303,7 @@
 </p:sld>
 </file>
 
-<file path=ppt/slides/slide2.xml><?xml version="1.0" encoding="utf-8"?>
+<file path=ppt/slides/slide13.xml><?xml version="1.0" encoding="utf-8"?>
 <p:sld xmlns:a="http://schemas.openxmlformats.org/drawingml/2006/main" xmlns:r="http://schemas.openxmlformats.org/officeDocument/2006/relationships" xmlns:p="http://schemas.openxmlformats.org/presentationml/2006/main">
   <p:cSld>
     <p:spTree>
@@ -8866,7 +7325,7 @@
           <p:cNvPr id="2" name="Titre 1">
             <a:extLst>
               <a:ext uri="{FF2B5EF4-FFF2-40B4-BE49-F238E27FC236}">
-                <a16:creationId xmlns:a16="http://schemas.microsoft.com/office/drawing/2014/main" id="{731E7863-2D70-44AD-BB81-4687E4532035}"/>
+                <a16:creationId xmlns:a16="http://schemas.microsoft.com/office/drawing/2014/main" id="{57F4B6DA-48E9-4828-850D-939B1E27311A}"/>
               </a:ext>
             </a:extLst>
           </p:cNvPr>
@@ -8883,10 +7342,13 @@
           <a:lstStyle/>
           <a:p>
             <a:r>
-              <a:rPr lang="fr-BE" dirty="0"/>
-              <a:t>About me</a:t>
-            </a:r>
-            <a:endParaRPr lang="fr-FR" dirty="0"/>
+              <a:rPr lang="fr-FR" dirty="0" err="1"/>
+              <a:t>Refactoring</a:t>
+            </a:r>
+            <a:r>
+              <a:rPr lang="fr-FR" dirty="0"/>
+              <a:t> par itération</a:t>
+            </a:r>
           </a:p>
         </p:txBody>
       </p:sp>
@@ -8895,7 +7357,7 @@
           <p:cNvPr id="3" name="Espace réservé du contenu 2">
             <a:extLst>
               <a:ext uri="{FF2B5EF4-FFF2-40B4-BE49-F238E27FC236}">
-                <a16:creationId xmlns:a16="http://schemas.microsoft.com/office/drawing/2014/main" id="{B234D7DB-80D1-420C-A598-13E2FD71FC74}"/>
+                <a16:creationId xmlns:a16="http://schemas.microsoft.com/office/drawing/2014/main" id="{254DCE19-13FE-4791-B71E-4FD5DC27B969}"/>
               </a:ext>
             </a:extLst>
           </p:cNvPr>
@@ -8912,65 +7374,104 @@
           <a:lstStyle/>
           <a:p>
             <a:r>
-              <a:rPr lang="fr-BE" dirty="0"/>
-              <a:t>A quitté la </a:t>
+              <a:rPr lang="fr-FR" dirty="0"/>
+              <a:t>Le processus de </a:t>
+            </a:r>
+            <a:r>
+              <a:rPr lang="fr-FR" dirty="0" err="1"/>
+              <a:t>refactoring</a:t>
+            </a:r>
+            <a:r>
+              <a:rPr lang="fr-FR" dirty="0"/>
+              <a:t> est de modifier du code existant afin de le rendre plus </a:t>
+            </a:r>
+            <a:r>
+              <a:rPr lang="fr-FR" dirty="0" err="1"/>
+              <a:t>friendly</a:t>
+            </a:r>
+            <a:r>
+              <a:rPr lang="fr-FR" dirty="0"/>
+              <a:t>.</a:t>
+            </a:r>
+          </a:p>
+          <a:p>
+            <a:pPr lvl="1"/>
+            <a:r>
+              <a:rPr lang="fr-FR" dirty="0"/>
+              <a:t>En le rendant plus extensible ou plus lisible</a:t>
+            </a:r>
+          </a:p>
+          <a:p>
+            <a:r>
+              <a:rPr lang="fr-BE" dirty="0"/>
+              <a:t>Seulement si on peut faire confiance aux </a:t>
             </a:r>
             <a:r>
               <a:rPr lang="fr-BE" dirty="0" err="1"/>
-              <a:t>HELHa</a:t>
-            </a:r>
-            <a:r>
-              <a:rPr lang="fr-BE" dirty="0"/>
-              <a:t> en 2014</a:t>
-            </a:r>
-          </a:p>
-          <a:p>
-            <a:r>
-              <a:rPr lang="fr-BE" dirty="0"/>
-              <a:t>Développeur chez </a:t>
+              <a:t>units</a:t>
+            </a:r>
+            <a:r>
+              <a:rPr lang="fr-BE" dirty="0"/>
+              <a:t> tests</a:t>
+            </a:r>
+          </a:p>
+          <a:p>
+            <a:r>
+              <a:rPr lang="fr-BE" dirty="0"/>
+              <a:t>Boy scout </a:t>
             </a:r>
             <a:r>
               <a:rPr lang="fr-BE" dirty="0" err="1"/>
-              <a:t>Bizzdev</a:t>
-            </a:r>
-            <a:endParaRPr lang="fr-BE" dirty="0"/>
-          </a:p>
-          <a:p>
-            <a:r>
-              <a:rPr lang="fr-BE" dirty="0"/>
-              <a:t>Travaille à Bruxelles</a:t>
-            </a:r>
-            <a:r>
-              <a:rPr lang="fr-FR" dirty="0"/>
-              <a:t> depuis 2016</a:t>
-            </a:r>
-          </a:p>
-          <a:p>
-            <a:r>
-              <a:rPr lang="fr-BE" dirty="0"/>
-              <a:t>I</a:t>
-            </a:r>
-            <a:r>
-              <a:rPr lang="fr-FR" dirty="0" err="1"/>
-              <a:t>ndépendant</a:t>
-            </a:r>
-            <a:r>
-              <a:rPr lang="fr-FR" dirty="0"/>
-              <a:t> depuis 2018</a:t>
-            </a:r>
-          </a:p>
-          <a:p>
+              <a:t>rule</a:t>
+            </a:r>
+            <a:r>
+              <a:rPr lang="fr-BE" dirty="0"/>
+              <a:t>: laissez l’endroit plus propre en sortant qu’en entrant</a:t>
+            </a:r>
+          </a:p>
+          <a:p>
+            <a:pPr lvl="1"/>
+            <a:r>
+              <a:rPr lang="fr-BE" dirty="0"/>
+              <a:t>Une méthode mal nommée ? N’ouvrez pas un ticket JIRA pour le modifier.</a:t>
+            </a:r>
+          </a:p>
+          <a:p>
+            <a:pPr lvl="1"/>
+            <a:r>
+              <a:rPr lang="fr-BE" dirty="0"/>
+              <a:t>Un ordre d’exécution de code illogique et non lisible ? Ne lancez pas un meeting pour en discuter à 5 développeurs. Changez l’ordre vous même.</a:t>
+            </a:r>
+          </a:p>
+          <a:p>
+            <a:r>
+              <a:rPr lang="fr-BE" dirty="0"/>
+              <a:t>N’ayez pas peur de </a:t>
+            </a:r>
+            <a:r>
+              <a:rPr lang="fr-BE" dirty="0" err="1"/>
+              <a:t>refactorer</a:t>
+            </a:r>
+            <a:r>
+              <a:rPr lang="fr-BE" dirty="0"/>
+              <a:t> ! Il vaut mieux </a:t>
+            </a:r>
+            <a:r>
+              <a:rPr lang="fr-BE" dirty="0" err="1"/>
+              <a:t>refactorer</a:t>
+            </a:r>
+            <a:r>
+              <a:rPr lang="fr-BE" dirty="0"/>
+              <a:t> que de rajouter de la logique dans un design qui ne convient pas aux nouveaux besoins.</a:t>
+            </a:r>
             <a:endParaRPr lang="fr-FR" dirty="0"/>
-          </a:p>
-          <a:p>
-            <a:endParaRPr lang="fr-BE" dirty="0"/>
           </a:p>
         </p:txBody>
       </p:sp>
     </p:spTree>
     <p:extLst>
       <p:ext uri="{BB962C8B-B14F-4D97-AF65-F5344CB8AC3E}">
-        <p14:creationId xmlns:p14="http://schemas.microsoft.com/office/powerpoint/2010/main" val="287629656"/>
+        <p14:creationId xmlns:p14="http://schemas.microsoft.com/office/powerpoint/2010/main" val="487566736"/>
       </p:ext>
     </p:extLst>
   </p:cSld>
@@ -8980,7 +7481,7 @@
 </p:sld>
 </file>
 
-<file path=ppt/slides/slide20.xml><?xml version="1.0" encoding="utf-8"?>
+<file path=ppt/slides/slide14.xml><?xml version="1.0" encoding="utf-8"?>
 <p:sld xmlns:a="http://schemas.openxmlformats.org/drawingml/2006/main" xmlns:r="http://schemas.openxmlformats.org/officeDocument/2006/relationships" xmlns:p="http://schemas.openxmlformats.org/presentationml/2006/main">
   <p:cSld>
     <p:spTree>
@@ -9002,7 +7503,7 @@
           <p:cNvPr id="2" name="Titre 1">
             <a:extLst>
               <a:ext uri="{FF2B5EF4-FFF2-40B4-BE49-F238E27FC236}">
-                <a16:creationId xmlns:a16="http://schemas.microsoft.com/office/drawing/2014/main" id="{57F4B6DA-48E9-4828-850D-939B1E27311A}"/>
+                <a16:creationId xmlns:a16="http://schemas.microsoft.com/office/drawing/2014/main" id="{476215F0-8B96-4F95-B32E-44073A7F5CCF}"/>
               </a:ext>
             </a:extLst>
           </p:cNvPr>
@@ -9019,13 +7520,10 @@
           <a:lstStyle/>
           <a:p>
             <a:r>
-              <a:rPr lang="fr-FR" dirty="0" err="1"/>
-              <a:t>Refactoring</a:t>
-            </a:r>
-            <a:r>
-              <a:rPr lang="fr-FR" dirty="0"/>
-              <a:t> par itération</a:t>
-            </a:r>
+              <a:rPr lang="fr-BE" dirty="0"/>
+              <a:t>Classes</a:t>
+            </a:r>
+            <a:endParaRPr lang="fr-FR" dirty="0"/>
           </a:p>
         </p:txBody>
       </p:sp>
@@ -9034,7 +7532,7 @@
           <p:cNvPr id="3" name="Espace réservé du contenu 2">
             <a:extLst>
               <a:ext uri="{FF2B5EF4-FFF2-40B4-BE49-F238E27FC236}">
-                <a16:creationId xmlns:a16="http://schemas.microsoft.com/office/drawing/2014/main" id="{254DCE19-13FE-4791-B71E-4FD5DC27B969}"/>
+                <a16:creationId xmlns:a16="http://schemas.microsoft.com/office/drawing/2014/main" id="{068C7292-1B12-4A77-AF94-4011D46ACEB6}"/>
               </a:ext>
             </a:extLst>
           </p:cNvPr>
@@ -9051,104 +7549,133 @@
           <a:lstStyle/>
           <a:p>
             <a:r>
+              <a:rPr lang="fr-BE" dirty="0"/>
+              <a:t>Doit faire qu’une seule chose (SRP)</a:t>
+            </a:r>
+          </a:p>
+          <a:p>
+            <a:r>
+              <a:rPr lang="fr-BE" dirty="0"/>
+              <a:t>Doit faire abstraction (Interfaces)</a:t>
+            </a:r>
+          </a:p>
+          <a:p>
+            <a:pPr lvl="1"/>
+            <a:r>
+              <a:rPr lang="fr-BE" dirty="0"/>
+              <a:t>Prenez exemple sur le </a:t>
+            </a:r>
+            <a:r>
+              <a:rPr lang="fr-BE" dirty="0" err="1"/>
+              <a:t>serializer</a:t>
+            </a:r>
+            <a:r>
+              <a:rPr lang="fr-BE" dirty="0"/>
+              <a:t> xml</a:t>
+            </a:r>
+            <a:br>
               <a:rPr lang="fr-FR" dirty="0"/>
-              <a:t>Le processus de </a:t>
-            </a:r>
-            <a:r>
-              <a:rPr lang="fr-FR" dirty="0" err="1"/>
-              <a:t>refactoring</a:t>
-            </a:r>
-            <a:r>
-              <a:rPr lang="fr-FR" dirty="0"/>
-              <a:t> est de modifier du code existant afin de le rendre plus </a:t>
-            </a:r>
-            <a:r>
-              <a:rPr lang="fr-FR" dirty="0" err="1"/>
-              <a:t>friendly</a:t>
-            </a:r>
-            <a:r>
-              <a:rPr lang="fr-FR" dirty="0"/>
+            </a:br>
+            <a:r>
+              <a:rPr lang="en-US" dirty="0">
+                <a:hlinkClick r:id="rId2"/>
+              </a:rPr>
+              <a:t>https://github.com/Microsoft/referencesource/blob/master/System.Xml/System/Xml/Serialization/XmlSerializer.cs</a:t>
+            </a:r>
+            <a:br>
+              <a:rPr lang="en-US" dirty="0"/>
+            </a:br>
+            <a:r>
+              <a:rPr lang="en-US" dirty="0" err="1"/>
+              <a:t>XmlSerializer</a:t>
+            </a:r>
+            <a:r>
+              <a:rPr lang="en-US" dirty="0"/>
+              <a:t> </a:t>
+            </a:r>
+            <a:r>
+              <a:rPr lang="en-US" dirty="0" err="1"/>
+              <a:t>décrit</a:t>
+            </a:r>
+            <a:r>
+              <a:rPr lang="en-US" dirty="0"/>
+              <a:t> comment interpreter un </a:t>
+            </a:r>
+            <a:r>
+              <a:rPr lang="en-US" dirty="0" err="1"/>
+              <a:t>objet</a:t>
+            </a:r>
+            <a:r>
+              <a:rPr lang="en-US" dirty="0"/>
+              <a:t> </a:t>
+            </a:r>
+            <a:r>
+              <a:rPr lang="en-US" dirty="0" err="1"/>
+              <a:t>en</a:t>
+            </a:r>
+            <a:r>
+              <a:rPr lang="en-US" dirty="0"/>
+              <a:t> entrée</a:t>
+            </a:r>
+            <a:br>
+              <a:rPr lang="en-US" dirty="0"/>
+            </a:br>
+            <a:r>
+              <a:rPr lang="en-US" dirty="0" err="1"/>
+              <a:t>XmlTextWriter</a:t>
+            </a:r>
+            <a:r>
+              <a:rPr lang="en-US" dirty="0"/>
+              <a:t> </a:t>
+            </a:r>
+            <a:r>
+              <a:rPr lang="en-US" dirty="0" err="1"/>
+              <a:t>est</a:t>
+            </a:r>
+            <a:r>
+              <a:rPr lang="en-US" dirty="0"/>
+              <a:t> responsible de </a:t>
+            </a:r>
+            <a:r>
+              <a:rPr lang="en-US" dirty="0" err="1"/>
+              <a:t>l’écriture</a:t>
+            </a:r>
+            <a:r>
+              <a:rPr lang="en-US" dirty="0"/>
+              <a:t>, et comment </a:t>
+            </a:r>
+            <a:r>
+              <a:rPr lang="en-US" dirty="0" err="1"/>
+              <a:t>il</a:t>
+            </a:r>
+            <a:r>
+              <a:rPr lang="en-US" dirty="0"/>
+              <a:t> </a:t>
+            </a:r>
+            <a:r>
+              <a:rPr lang="en-US" dirty="0" err="1"/>
+              <a:t>est</a:t>
+            </a:r>
+            <a:r>
+              <a:rPr lang="en-US" dirty="0"/>
+              <a:t> </a:t>
+            </a:r>
+            <a:r>
+              <a:rPr lang="en-US" dirty="0" err="1"/>
+              <a:t>écrit</a:t>
+            </a:r>
+            <a:r>
+              <a:rPr lang="en-US" dirty="0"/>
               <a:t>.</a:t>
             </a:r>
-          </a:p>
-          <a:p>
-            <a:pPr lvl="1"/>
-            <a:r>
-              <a:rPr lang="fr-FR" dirty="0"/>
-              <a:t>En le rendant plus extensible ou plus lisible</a:t>
-            </a:r>
-          </a:p>
-          <a:p>
-            <a:r>
-              <a:rPr lang="fr-BE" dirty="0"/>
-              <a:t>Seulement si on peut faire confiance aux </a:t>
-            </a:r>
-            <a:r>
-              <a:rPr lang="fr-BE" dirty="0" err="1"/>
-              <a:t>units</a:t>
-            </a:r>
-            <a:r>
-              <a:rPr lang="fr-BE" dirty="0"/>
-              <a:t> tests</a:t>
-            </a:r>
-          </a:p>
-          <a:p>
-            <a:r>
-              <a:rPr lang="fr-BE" dirty="0"/>
-              <a:t>Boy scout </a:t>
-            </a:r>
-            <a:r>
-              <a:rPr lang="fr-BE" dirty="0" err="1"/>
-              <a:t>rule</a:t>
-            </a:r>
-            <a:r>
-              <a:rPr lang="fr-BE" dirty="0"/>
-              <a:t>: laissez l’endroit plus propre en sortant qu’en entrant</a:t>
-            </a:r>
-          </a:p>
-          <a:p>
-            <a:pPr lvl="1"/>
-            <a:r>
-              <a:rPr lang="fr-BE" dirty="0"/>
-              <a:t>Une méthode mal nommée ? N’ouvrez pas un ticket JIRA pour le modifier.</a:t>
-            </a:r>
-          </a:p>
-          <a:p>
-            <a:pPr lvl="1"/>
-            <a:r>
-              <a:rPr lang="fr-BE" dirty="0"/>
-              <a:t>Un ordre d’exécution de code illogique et non lisible ? Ne lancez pas un meeting pour en discuter à 5 développeurs. Changez l’ordre vous même.</a:t>
-            </a:r>
-          </a:p>
-          <a:p>
-            <a:r>
-              <a:rPr lang="fr-BE" dirty="0"/>
-              <a:t>N’ayez pas peur de </a:t>
-            </a:r>
-            <a:r>
-              <a:rPr lang="fr-BE" dirty="0" err="1"/>
-              <a:t>refactorer</a:t>
-            </a:r>
-            <a:r>
-              <a:rPr lang="fr-BE" dirty="0"/>
-              <a:t> ! Il vaut mieux </a:t>
-            </a:r>
-            <a:r>
-              <a:rPr lang="fr-BE" dirty="0" err="1"/>
-              <a:t>refactorer</a:t>
-            </a:r>
-            <a:r>
-              <a:rPr lang="fr-BE" dirty="0"/>
-              <a:t> que de rajouter de la logique dans un design qui ne convient pas aux nouveaux besoins.</a:t>
-            </a:r>
-            <a:endParaRPr lang="fr-FR" dirty="0"/>
+            <a:endParaRPr lang="fr-BE" dirty="0"/>
           </a:p>
         </p:txBody>
       </p:sp>
     </p:spTree>
     <p:extLst>
       <p:ext uri="{BB962C8B-B14F-4D97-AF65-F5344CB8AC3E}">
-        <p14:creationId xmlns:p14="http://schemas.microsoft.com/office/powerpoint/2010/main" val="487566736"/>
+        <p14:creationId xmlns:p14="http://schemas.microsoft.com/office/powerpoint/2010/main" val="1061946456"/>
       </p:ext>
     </p:extLst>
   </p:cSld>
@@ -9158,7 +7685,7 @@
 </p:sld>
 </file>
 
-<file path=ppt/slides/slide21.xml><?xml version="1.0" encoding="utf-8"?>
+<file path=ppt/slides/slide15.xml><?xml version="1.0" encoding="utf-8"?>
 <p:sld xmlns:a="http://schemas.openxmlformats.org/drawingml/2006/main" xmlns:r="http://schemas.openxmlformats.org/officeDocument/2006/relationships" xmlns:p="http://schemas.openxmlformats.org/presentationml/2006/main">
   <p:cSld>
     <p:spTree>
@@ -9180,7 +7707,7 @@
           <p:cNvPr id="2" name="Titre 1">
             <a:extLst>
               <a:ext uri="{FF2B5EF4-FFF2-40B4-BE49-F238E27FC236}">
-                <a16:creationId xmlns:a16="http://schemas.microsoft.com/office/drawing/2014/main" id="{476215F0-8B96-4F95-B32E-44073A7F5CCF}"/>
+                <a16:creationId xmlns:a16="http://schemas.microsoft.com/office/drawing/2014/main" id="{48C712FB-944A-4745-A5DF-D6FB5112DD5E}"/>
               </a:ext>
             </a:extLst>
           </p:cNvPr>
@@ -9197,10 +7724,9 @@
           <a:lstStyle/>
           <a:p>
             <a:r>
-              <a:rPr lang="fr-BE" dirty="0"/>
-              <a:t>Classes</a:t>
-            </a:r>
-            <a:endParaRPr lang="fr-FR" dirty="0"/>
+              <a:rPr lang="fr-FR" dirty="0"/>
+              <a:t>Fonctions et méthodes</a:t>
+            </a:r>
           </a:p>
         </p:txBody>
       </p:sp>
@@ -9209,7 +7735,7 @@
           <p:cNvPr id="3" name="Espace réservé du contenu 2">
             <a:extLst>
               <a:ext uri="{FF2B5EF4-FFF2-40B4-BE49-F238E27FC236}">
-                <a16:creationId xmlns:a16="http://schemas.microsoft.com/office/drawing/2014/main" id="{068C7292-1B12-4A77-AF94-4011D46ACEB6}"/>
+                <a16:creationId xmlns:a16="http://schemas.microsoft.com/office/drawing/2014/main" id="{69346411-177B-4F2D-B384-2D5C9000B5AD}"/>
               </a:ext>
             </a:extLst>
           </p:cNvPr>
@@ -9226,133 +7752,62 @@
           <a:lstStyle/>
           <a:p>
             <a:r>
-              <a:rPr lang="fr-BE" dirty="0"/>
-              <a:t>Doit faire qu’une seule chose (SRP)</a:t>
-            </a:r>
-          </a:p>
-          <a:p>
-            <a:r>
-              <a:rPr lang="fr-BE" dirty="0"/>
-              <a:t>Doit faire abstraction (Interfaces)</a:t>
-            </a:r>
+              <a:rPr lang="fr-FR" dirty="0"/>
+              <a:t>Les fonctions doivent être courtes</a:t>
+            </a:r>
+          </a:p>
+          <a:p>
+            <a:r>
+              <a:rPr lang="fr-FR" dirty="0"/>
+              <a:t>Pas de </a:t>
+            </a:r>
+            <a:r>
+              <a:rPr lang="fr-FR" dirty="0" err="1"/>
+              <a:t>side</a:t>
+            </a:r>
+            <a:r>
+              <a:rPr lang="fr-FR" dirty="0"/>
+              <a:t> </a:t>
+            </a:r>
+            <a:r>
+              <a:rPr lang="fr-FR" dirty="0" err="1"/>
+              <a:t>effects</a:t>
+            </a:r>
+            <a:endParaRPr lang="fr-FR" dirty="0"/>
           </a:p>
           <a:p>
             <a:pPr lvl="1"/>
             <a:r>
-              <a:rPr lang="fr-BE" dirty="0"/>
-              <a:t>Prenez exemple sur le </a:t>
-            </a:r>
-            <a:r>
-              <a:rPr lang="fr-BE" dirty="0" err="1"/>
-              <a:t>serializer</a:t>
-            </a:r>
-            <a:r>
-              <a:rPr lang="fr-BE" dirty="0"/>
-              <a:t> xml</a:t>
-            </a:r>
-            <a:br>
               <a:rPr lang="fr-FR" dirty="0"/>
-            </a:br>
-            <a:r>
-              <a:rPr lang="en-US" dirty="0">
-                <a:hlinkClick r:id="rId2"/>
-              </a:rPr>
-              <a:t>https://github.com/Microsoft/referencesource/blob/master/System.Xml/System/Xml/Serialization/XmlSerializer.cs</a:t>
-            </a:r>
-            <a:br>
-              <a:rPr lang="en-US" dirty="0"/>
-            </a:br>
-            <a:r>
-              <a:rPr lang="en-US" dirty="0" err="1"/>
-              <a:t>XmlSerializer</a:t>
-            </a:r>
-            <a:r>
-              <a:rPr lang="en-US" dirty="0"/>
-              <a:t> </a:t>
-            </a:r>
-            <a:r>
-              <a:rPr lang="en-US" dirty="0" err="1"/>
-              <a:t>décrit</a:t>
-            </a:r>
-            <a:r>
-              <a:rPr lang="en-US" dirty="0"/>
-              <a:t> comment interpreter un </a:t>
-            </a:r>
-            <a:r>
-              <a:rPr lang="en-US" dirty="0" err="1"/>
-              <a:t>objet</a:t>
-            </a:r>
-            <a:r>
-              <a:rPr lang="en-US" dirty="0"/>
-              <a:t> </a:t>
-            </a:r>
-            <a:r>
-              <a:rPr lang="en-US" dirty="0" err="1"/>
-              <a:t>en</a:t>
-            </a:r>
-            <a:r>
-              <a:rPr lang="en-US" dirty="0"/>
-              <a:t> entrée</a:t>
-            </a:r>
-            <a:br>
-              <a:rPr lang="en-US" dirty="0"/>
-            </a:br>
-            <a:r>
-              <a:rPr lang="en-US" dirty="0" err="1"/>
-              <a:t>XmlTextWriter</a:t>
-            </a:r>
-            <a:r>
-              <a:rPr lang="en-US" dirty="0"/>
-              <a:t> </a:t>
-            </a:r>
-            <a:r>
-              <a:rPr lang="en-US" dirty="0" err="1"/>
-              <a:t>est</a:t>
-            </a:r>
-            <a:r>
-              <a:rPr lang="en-US" dirty="0"/>
-              <a:t> responsible de </a:t>
-            </a:r>
-            <a:r>
-              <a:rPr lang="en-US" dirty="0" err="1"/>
-              <a:t>l’écriture</a:t>
-            </a:r>
-            <a:r>
-              <a:rPr lang="en-US" dirty="0"/>
-              <a:t>, et comment </a:t>
-            </a:r>
-            <a:r>
-              <a:rPr lang="en-US" dirty="0" err="1"/>
-              <a:t>il</a:t>
-            </a:r>
-            <a:r>
-              <a:rPr lang="en-US" dirty="0"/>
-              <a:t> </a:t>
-            </a:r>
-            <a:r>
-              <a:rPr lang="en-US" dirty="0" err="1"/>
-              <a:t>est</a:t>
-            </a:r>
-            <a:r>
-              <a:rPr lang="en-US" dirty="0"/>
-              <a:t> </a:t>
-            </a:r>
-            <a:r>
-              <a:rPr lang="en-US" dirty="0" err="1"/>
-              <a:t>écrit</a:t>
-            </a:r>
-            <a:r>
-              <a:rPr lang="en-US" dirty="0"/>
-              <a:t>.</a:t>
-            </a:r>
-            <a:endParaRPr lang="fr-BE" dirty="0"/>
+              <a:t>Une fonction doit faire une et une unique chose. Tout ce qui est superflu est malvenu</a:t>
+            </a:r>
+          </a:p>
+          <a:p>
+            <a:r>
+              <a:rPr lang="fr-FR" dirty="0"/>
+              <a:t>Le moins d’argument possible</a:t>
+            </a:r>
+          </a:p>
+          <a:p>
+            <a:r>
+              <a:rPr lang="fr-BE" dirty="0"/>
+              <a:t>R</a:t>
+            </a:r>
+            <a:r>
+              <a:rPr lang="fr-FR" dirty="0" err="1"/>
+              <a:t>ègle</a:t>
+            </a:r>
+            <a:r>
+              <a:rPr lang="fr-FR" dirty="0"/>
+              <a:t> des 10 secondes: Si on ne peut pas comprendre en 10 secondes ce que fait une fonction, elle est trop compliquée</a:t>
+            </a:r>
           </a:p>
         </p:txBody>
       </p:sp>
     </p:spTree>
     <p:extLst>
       <p:ext uri="{BB962C8B-B14F-4D97-AF65-F5344CB8AC3E}">
-        <p14:creationId xmlns:p14="http://schemas.microsoft.com/office/powerpoint/2010/main" val="1061946456"/>
+        <p14:creationId xmlns:p14="http://schemas.microsoft.com/office/powerpoint/2010/main" val="2098087113"/>
       </p:ext>
     </p:extLst>
   </p:cSld>
@@ -9362,7 +7817,7 @@
 </p:sld>
 </file>
 
-<file path=ppt/slides/slide22.xml><?xml version="1.0" encoding="utf-8"?>
+<file path=ppt/slides/slide16.xml><?xml version="1.0" encoding="utf-8"?>
 <p:sld xmlns:a="http://schemas.openxmlformats.org/drawingml/2006/main" xmlns:r="http://schemas.openxmlformats.org/officeDocument/2006/relationships" xmlns:p="http://schemas.openxmlformats.org/presentationml/2006/main">
   <p:cSld>
     <p:spTree>
@@ -9384,7 +7839,7 @@
           <p:cNvPr id="2" name="Titre 1">
             <a:extLst>
               <a:ext uri="{FF2B5EF4-FFF2-40B4-BE49-F238E27FC236}">
-                <a16:creationId xmlns:a16="http://schemas.microsoft.com/office/drawing/2014/main" id="{48C712FB-944A-4745-A5DF-D6FB5112DD5E}"/>
+                <a16:creationId xmlns:a16="http://schemas.microsoft.com/office/drawing/2014/main" id="{CF98D8E5-F87E-45C1-9892-03634FDE4A8E}"/>
               </a:ext>
             </a:extLst>
           </p:cNvPr>
@@ -9402,8 +7857,13 @@
           <a:p>
             <a:r>
               <a:rPr lang="fr-FR" dirty="0"/>
-              <a:t>Fonctions et méthodes</a:t>
-            </a:r>
+              <a:t>Exceptions over </a:t>
+            </a:r>
+            <a:r>
+              <a:rPr lang="fr-FR" dirty="0" err="1"/>
+              <a:t>ErrorCode</a:t>
+            </a:r>
+            <a:endParaRPr lang="fr-FR" dirty="0"/>
           </a:p>
         </p:txBody>
       </p:sp>
@@ -9412,7 +7872,7 @@
           <p:cNvPr id="3" name="Espace réservé du contenu 2">
             <a:extLst>
               <a:ext uri="{FF2B5EF4-FFF2-40B4-BE49-F238E27FC236}">
-                <a16:creationId xmlns:a16="http://schemas.microsoft.com/office/drawing/2014/main" id="{69346411-177B-4F2D-B384-2D5C9000B5AD}"/>
+                <a16:creationId xmlns:a16="http://schemas.microsoft.com/office/drawing/2014/main" id="{0108E065-6979-440C-9F8A-591E638116D6}"/>
               </a:ext>
             </a:extLst>
           </p:cNvPr>
@@ -9430,61 +7890,47 @@
           <a:p>
             <a:r>
               <a:rPr lang="fr-FR" dirty="0"/>
-              <a:t>Les fonctions doivent être courtes</a:t>
+              <a:t>Si quelque chose d’inachevable arrive, préférez renvoyer une exception plutôt que de renvoyer en résultat un code d’erreur.</a:t>
             </a:r>
           </a:p>
           <a:p>
             <a:r>
               <a:rPr lang="fr-FR" dirty="0"/>
-              <a:t>Pas de </a:t>
+              <a:t>Qui a déjà vu un </a:t>
             </a:r>
             <a:r>
               <a:rPr lang="fr-FR" dirty="0" err="1"/>
-              <a:t>side</a:t>
+              <a:t>HttpStatus</a:t>
             </a:r>
             <a:r>
               <a:rPr lang="fr-FR" dirty="0"/>
-              <a:t> </a:t>
+              <a:t> 200 avec un code d’erreur en body ? </a:t>
+            </a:r>
+          </a:p>
+          <a:p>
+            <a:pPr lvl="1"/>
+            <a:r>
+              <a:rPr lang="fr-FR" dirty="0"/>
+              <a:t>L’occasion d’interpréter facilement une réponse est ratée. Un </a:t>
             </a:r>
             <a:r>
               <a:rPr lang="fr-FR" dirty="0" err="1"/>
-              <a:t>effects</a:t>
-            </a:r>
+              <a:t>parsing</a:t>
+            </a:r>
+            <a:r>
+              <a:rPr lang="fr-FR" dirty="0"/>
+              <a:t> devient obligatoire dans une couche qui n’en a aucun autre besoin.</a:t>
+            </a:r>
+          </a:p>
+          <a:p>
             <a:endParaRPr lang="fr-FR" dirty="0"/>
-          </a:p>
-          <a:p>
-            <a:pPr lvl="1"/>
-            <a:r>
-              <a:rPr lang="fr-FR" dirty="0"/>
-              <a:t>Une fonction doit faire une et une unique chose. Tout ce qui est superflu est malvenu</a:t>
-            </a:r>
-          </a:p>
-          <a:p>
-            <a:r>
-              <a:rPr lang="fr-FR" dirty="0"/>
-              <a:t>Le moins d’argument possible</a:t>
-            </a:r>
-          </a:p>
-          <a:p>
-            <a:r>
-              <a:rPr lang="fr-BE" dirty="0"/>
-              <a:t>R</a:t>
-            </a:r>
-            <a:r>
-              <a:rPr lang="fr-FR" dirty="0" err="1"/>
-              <a:t>ègle</a:t>
-            </a:r>
-            <a:r>
-              <a:rPr lang="fr-FR" dirty="0"/>
-              <a:t> des 10 secondes: Si on ne peut pas comprendre en 10 secondes ce que fait une fonction, elle est trop compliquée</a:t>
-            </a:r>
           </a:p>
         </p:txBody>
       </p:sp>
     </p:spTree>
     <p:extLst>
       <p:ext uri="{BB962C8B-B14F-4D97-AF65-F5344CB8AC3E}">
-        <p14:creationId xmlns:p14="http://schemas.microsoft.com/office/powerpoint/2010/main" val="2098087113"/>
+        <p14:creationId xmlns:p14="http://schemas.microsoft.com/office/powerpoint/2010/main" val="1306852992"/>
       </p:ext>
     </p:extLst>
   </p:cSld>
@@ -9494,7 +7940,7 @@
 </p:sld>
 </file>
 
-<file path=ppt/slides/slide23.xml><?xml version="1.0" encoding="utf-8"?>
+<file path=ppt/slides/slide17.xml><?xml version="1.0" encoding="utf-8"?>
 <p:sld xmlns:a="http://schemas.openxmlformats.org/drawingml/2006/main" xmlns:r="http://schemas.openxmlformats.org/officeDocument/2006/relationships" xmlns:p="http://schemas.openxmlformats.org/presentationml/2006/main">
   <p:cSld>
     <p:spTree>
@@ -9516,7 +7962,7 @@
           <p:cNvPr id="2" name="Titre 1">
             <a:extLst>
               <a:ext uri="{FF2B5EF4-FFF2-40B4-BE49-F238E27FC236}">
-                <a16:creationId xmlns:a16="http://schemas.microsoft.com/office/drawing/2014/main" id="{CF98D8E5-F87E-45C1-9892-03634FDE4A8E}"/>
+                <a16:creationId xmlns:a16="http://schemas.microsoft.com/office/drawing/2014/main" id="{DE1664DD-B4F7-4020-BE92-2A58A05A38B1}"/>
               </a:ext>
             </a:extLst>
           </p:cNvPr>
@@ -9533,12 +7979,8 @@
           <a:lstStyle/>
           <a:p>
             <a:r>
-              <a:rPr lang="fr-FR" dirty="0"/>
-              <a:t>Exceptions over </a:t>
-            </a:r>
-            <a:r>
-              <a:rPr lang="fr-FR" dirty="0" err="1"/>
-              <a:t>ErrorCode</a:t>
+              <a:rPr lang="fr-BE" dirty="0"/>
+              <a:t>Abstraction</a:t>
             </a:r>
             <a:endParaRPr lang="fr-FR" dirty="0"/>
           </a:p>
@@ -9549,7 +7991,7 @@
           <p:cNvPr id="3" name="Espace réservé du contenu 2">
             <a:extLst>
               <a:ext uri="{FF2B5EF4-FFF2-40B4-BE49-F238E27FC236}">
-                <a16:creationId xmlns:a16="http://schemas.microsoft.com/office/drawing/2014/main" id="{0108E065-6979-440C-9F8A-591E638116D6}"/>
+                <a16:creationId xmlns:a16="http://schemas.microsoft.com/office/drawing/2014/main" id="{6A14E086-54B0-42A3-90BA-DE32F034CF5E}"/>
               </a:ext>
             </a:extLst>
           </p:cNvPr>
@@ -9566,40 +8008,21 @@
           <a:lstStyle/>
           <a:p>
             <a:r>
-              <a:rPr lang="fr-FR" dirty="0"/>
-              <a:t>Si quelque chose d’inachevable arrive, préférez renvoyer une exception plutôt que de renvoyer en résultat un code d’erreur.</a:t>
-            </a:r>
-          </a:p>
-          <a:p>
-            <a:r>
-              <a:rPr lang="fr-FR" dirty="0"/>
-              <a:t>Qui a déjà vu un </a:t>
-            </a:r>
-            <a:r>
-              <a:rPr lang="fr-FR" dirty="0" err="1"/>
-              <a:t>HttpStatus</a:t>
-            </a:r>
-            <a:r>
-              <a:rPr lang="fr-FR" dirty="0"/>
-              <a:t> 200 avec un code d’erreur en body ? </a:t>
-            </a:r>
-          </a:p>
-          <a:p>
-            <a:pPr lvl="1"/>
-            <a:r>
-              <a:rPr lang="fr-FR" dirty="0"/>
-              <a:t>L’occasion d’interpréter facilement une réponse est ratée. Un </a:t>
-            </a:r>
-            <a:r>
-              <a:rPr lang="fr-FR" dirty="0" err="1"/>
-              <a:t>parsing</a:t>
-            </a:r>
-            <a:r>
-              <a:rPr lang="fr-FR" dirty="0"/>
-              <a:t> devient obligatoire dans une couche qui n’en a aucun autre besoin.</a:t>
-            </a:r>
-          </a:p>
-          <a:p>
+              <a:rPr lang="fr-BE" dirty="0"/>
+              <a:t>Une méthode ne doit pas savoir comment ni par qui elle est appelée</a:t>
+            </a:r>
+          </a:p>
+          <a:p>
+            <a:r>
+              <a:rPr lang="fr-BE" dirty="0"/>
+              <a:t>Une méthode ne doit pas connaitre comment fonctionne ses dépendances</a:t>
+            </a:r>
+          </a:p>
+          <a:p>
+            <a:r>
+              <a:rPr lang="fr-BE" dirty="0"/>
+              <a:t>S’applique en architecture logiciel</a:t>
+            </a:r>
             <a:endParaRPr lang="fr-FR" dirty="0"/>
           </a:p>
         </p:txBody>
@@ -9607,7 +8030,7 @@
     </p:spTree>
     <p:extLst>
       <p:ext uri="{BB962C8B-B14F-4D97-AF65-F5344CB8AC3E}">
-        <p14:creationId xmlns:p14="http://schemas.microsoft.com/office/powerpoint/2010/main" val="1306852992"/>
+        <p14:creationId xmlns:p14="http://schemas.microsoft.com/office/powerpoint/2010/main" val="3520938063"/>
       </p:ext>
     </p:extLst>
   </p:cSld>
@@ -9617,7 +8040,7 @@
 </p:sld>
 </file>
 
-<file path=ppt/slides/slide24.xml><?xml version="1.0" encoding="utf-8"?>
+<file path=ppt/slides/slide18.xml><?xml version="1.0" encoding="utf-8"?>
 <p:sld xmlns:a="http://schemas.openxmlformats.org/drawingml/2006/main" xmlns:r="http://schemas.openxmlformats.org/officeDocument/2006/relationships" xmlns:p="http://schemas.openxmlformats.org/presentationml/2006/main">
   <p:cSld>
     <p:spTree>
@@ -9639,106 +8062,6 @@
           <p:cNvPr id="2" name="Titre 1">
             <a:extLst>
               <a:ext uri="{FF2B5EF4-FFF2-40B4-BE49-F238E27FC236}">
-                <a16:creationId xmlns:a16="http://schemas.microsoft.com/office/drawing/2014/main" id="{DE1664DD-B4F7-4020-BE92-2A58A05A38B1}"/>
-              </a:ext>
-            </a:extLst>
-          </p:cNvPr>
-          <p:cNvSpPr>
-            <a:spLocks noGrp="1"/>
-          </p:cNvSpPr>
-          <p:nvPr>
-            <p:ph type="title"/>
-          </p:nvPr>
-        </p:nvSpPr>
-        <p:spPr/>
-        <p:txBody>
-          <a:bodyPr/>
-          <a:lstStyle/>
-          <a:p>
-            <a:r>
-              <a:rPr lang="fr-BE" dirty="0"/>
-              <a:t>Abstraction</a:t>
-            </a:r>
-            <a:endParaRPr lang="fr-FR" dirty="0"/>
-          </a:p>
-        </p:txBody>
-      </p:sp>
-      <p:sp>
-        <p:nvSpPr>
-          <p:cNvPr id="3" name="Espace réservé du contenu 2">
-            <a:extLst>
-              <a:ext uri="{FF2B5EF4-FFF2-40B4-BE49-F238E27FC236}">
-                <a16:creationId xmlns:a16="http://schemas.microsoft.com/office/drawing/2014/main" id="{6A14E086-54B0-42A3-90BA-DE32F034CF5E}"/>
-              </a:ext>
-            </a:extLst>
-          </p:cNvPr>
-          <p:cNvSpPr>
-            <a:spLocks noGrp="1"/>
-          </p:cNvSpPr>
-          <p:nvPr>
-            <p:ph idx="1"/>
-          </p:nvPr>
-        </p:nvSpPr>
-        <p:spPr/>
-        <p:txBody>
-          <a:bodyPr/>
-          <a:lstStyle/>
-          <a:p>
-            <a:r>
-              <a:rPr lang="fr-BE" dirty="0"/>
-              <a:t>Une méthode ne doit pas savoir comment ni par qui elle est appelée</a:t>
-            </a:r>
-          </a:p>
-          <a:p>
-            <a:r>
-              <a:rPr lang="fr-BE" dirty="0"/>
-              <a:t>Une méthode ne doit pas connaitre comment fonctionne ses dépendances</a:t>
-            </a:r>
-          </a:p>
-          <a:p>
-            <a:r>
-              <a:rPr lang="fr-BE" dirty="0"/>
-              <a:t>S’applique en architecture logiciel</a:t>
-            </a:r>
-            <a:endParaRPr lang="fr-FR" dirty="0"/>
-          </a:p>
-        </p:txBody>
-      </p:sp>
-    </p:spTree>
-    <p:extLst>
-      <p:ext uri="{BB962C8B-B14F-4D97-AF65-F5344CB8AC3E}">
-        <p14:creationId xmlns:p14="http://schemas.microsoft.com/office/powerpoint/2010/main" val="3520938063"/>
-      </p:ext>
-    </p:extLst>
-  </p:cSld>
-  <p:clrMapOvr>
-    <a:masterClrMapping/>
-  </p:clrMapOvr>
-</p:sld>
-</file>
-
-<file path=ppt/slides/slide25.xml><?xml version="1.0" encoding="utf-8"?>
-<p:sld xmlns:a="http://schemas.openxmlformats.org/drawingml/2006/main" xmlns:r="http://schemas.openxmlformats.org/officeDocument/2006/relationships" xmlns:p="http://schemas.openxmlformats.org/presentationml/2006/main">
-  <p:cSld>
-    <p:spTree>
-      <p:nvGrpSpPr>
-        <p:cNvPr id="1" name=""/>
-        <p:cNvGrpSpPr/>
-        <p:nvPr/>
-      </p:nvGrpSpPr>
-      <p:grpSpPr>
-        <a:xfrm>
-          <a:off x="0" y="0"/>
-          <a:ext cx="0" cy="0"/>
-          <a:chOff x="0" y="0"/>
-          <a:chExt cx="0" cy="0"/>
-        </a:xfrm>
-      </p:grpSpPr>
-      <p:sp>
-        <p:nvSpPr>
-          <p:cNvPr id="2" name="Titre 1">
-            <a:extLst>
-              <a:ext uri="{FF2B5EF4-FFF2-40B4-BE49-F238E27FC236}">
                 <a16:creationId xmlns:a16="http://schemas.microsoft.com/office/drawing/2014/main" id="{B2AAB231-6678-43CB-93F3-45AF0BF0E3FB}"/>
               </a:ext>
             </a:extLst>
@@ -9875,7 +8198,7 @@
 </p:sld>
 </file>
 
-<file path=ppt/slides/slide26.xml><?xml version="1.0" encoding="utf-8"?>
+<file path=ppt/slides/slide19.xml><?xml version="1.0" encoding="utf-8"?>
 <p:sld xmlns:a="http://schemas.openxmlformats.org/drawingml/2006/main" xmlns:r="http://schemas.openxmlformats.org/officeDocument/2006/relationships" xmlns:p="http://schemas.openxmlformats.org/presentationml/2006/main">
   <p:cSld>
     <p:spTree>
@@ -10019,7 +8342,7 @@
 </p:sld>
 </file>
 
-<file path=ppt/slides/slide27.xml><?xml version="1.0" encoding="utf-8"?>
+<file path=ppt/slides/slide2.xml><?xml version="1.0" encoding="utf-8"?>
 <p:sld xmlns:a="http://schemas.openxmlformats.org/drawingml/2006/main" xmlns:r="http://schemas.openxmlformats.org/officeDocument/2006/relationships" xmlns:p="http://schemas.openxmlformats.org/presentationml/2006/main">
   <p:cSld>
     <p:spTree>
@@ -10041,6 +8364,137 @@
           <p:cNvPr id="2" name="Titre 1">
             <a:extLst>
               <a:ext uri="{FF2B5EF4-FFF2-40B4-BE49-F238E27FC236}">
+                <a16:creationId xmlns:a16="http://schemas.microsoft.com/office/drawing/2014/main" id="{731E7863-2D70-44AD-BB81-4687E4532035}"/>
+              </a:ext>
+            </a:extLst>
+          </p:cNvPr>
+          <p:cNvSpPr>
+            <a:spLocks noGrp="1"/>
+          </p:cNvSpPr>
+          <p:nvPr>
+            <p:ph type="title"/>
+          </p:nvPr>
+        </p:nvSpPr>
+        <p:spPr/>
+        <p:txBody>
+          <a:bodyPr/>
+          <a:lstStyle/>
+          <a:p>
+            <a:r>
+              <a:rPr lang="fr-BE" dirty="0"/>
+              <a:t>About me</a:t>
+            </a:r>
+            <a:endParaRPr lang="fr-FR" dirty="0"/>
+          </a:p>
+        </p:txBody>
+      </p:sp>
+      <p:sp>
+        <p:nvSpPr>
+          <p:cNvPr id="3" name="Espace réservé du contenu 2">
+            <a:extLst>
+              <a:ext uri="{FF2B5EF4-FFF2-40B4-BE49-F238E27FC236}">
+                <a16:creationId xmlns:a16="http://schemas.microsoft.com/office/drawing/2014/main" id="{B234D7DB-80D1-420C-A598-13E2FD71FC74}"/>
+              </a:ext>
+            </a:extLst>
+          </p:cNvPr>
+          <p:cNvSpPr>
+            <a:spLocks noGrp="1"/>
+          </p:cNvSpPr>
+          <p:nvPr>
+            <p:ph idx="1"/>
+          </p:nvPr>
+        </p:nvSpPr>
+        <p:spPr/>
+        <p:txBody>
+          <a:bodyPr/>
+          <a:lstStyle/>
+          <a:p>
+            <a:r>
+              <a:rPr lang="fr-BE" dirty="0"/>
+              <a:t>A quitté la </a:t>
+            </a:r>
+            <a:r>
+              <a:rPr lang="fr-BE" dirty="0" err="1"/>
+              <a:t>HELHa</a:t>
+            </a:r>
+            <a:r>
+              <a:rPr lang="fr-BE" dirty="0"/>
+              <a:t> en 2014</a:t>
+            </a:r>
+          </a:p>
+          <a:p>
+            <a:r>
+              <a:rPr lang="fr-BE" dirty="0"/>
+              <a:t>Développeur dans la région de Tournai (à 15 minutes d’ici)</a:t>
+            </a:r>
+          </a:p>
+          <a:p>
+            <a:r>
+              <a:rPr lang="fr-BE" dirty="0"/>
+              <a:t>Travaille à Bruxelles</a:t>
+            </a:r>
+            <a:r>
+              <a:rPr lang="fr-FR" dirty="0"/>
+              <a:t> depuis 2016</a:t>
+            </a:r>
+          </a:p>
+          <a:p>
+            <a:r>
+              <a:rPr lang="fr-BE" dirty="0"/>
+              <a:t>I</a:t>
+            </a:r>
+            <a:r>
+              <a:rPr lang="fr-FR" dirty="0" err="1"/>
+              <a:t>ndépendant</a:t>
+            </a:r>
+            <a:r>
+              <a:rPr lang="fr-FR" dirty="0"/>
+              <a:t> depuis 2018</a:t>
+            </a:r>
+          </a:p>
+          <a:p>
+            <a:endParaRPr lang="fr-FR" dirty="0"/>
+          </a:p>
+          <a:p>
+            <a:endParaRPr lang="fr-BE" dirty="0"/>
+          </a:p>
+        </p:txBody>
+      </p:sp>
+    </p:spTree>
+    <p:extLst>
+      <p:ext uri="{BB962C8B-B14F-4D97-AF65-F5344CB8AC3E}">
+        <p14:creationId xmlns:p14="http://schemas.microsoft.com/office/powerpoint/2010/main" val="287629656"/>
+      </p:ext>
+    </p:extLst>
+  </p:cSld>
+  <p:clrMapOvr>
+    <a:masterClrMapping/>
+  </p:clrMapOvr>
+</p:sld>
+</file>
+
+<file path=ppt/slides/slide20.xml><?xml version="1.0" encoding="utf-8"?>
+<p:sld xmlns:a="http://schemas.openxmlformats.org/drawingml/2006/main" xmlns:r="http://schemas.openxmlformats.org/officeDocument/2006/relationships" xmlns:p="http://schemas.openxmlformats.org/presentationml/2006/main">
+  <p:cSld>
+    <p:spTree>
+      <p:nvGrpSpPr>
+        <p:cNvPr id="1" name=""/>
+        <p:cNvGrpSpPr/>
+        <p:nvPr/>
+      </p:nvGrpSpPr>
+      <p:grpSpPr>
+        <a:xfrm>
+          <a:off x="0" y="0"/>
+          <a:ext cx="0" cy="0"/>
+          <a:chOff x="0" y="0"/>
+          <a:chExt cx="0" cy="0"/>
+        </a:xfrm>
+      </p:grpSpPr>
+      <p:sp>
+        <p:nvSpPr>
+          <p:cNvPr id="2" name="Titre 1">
+            <a:extLst>
+              <a:ext uri="{FF2B5EF4-FFF2-40B4-BE49-F238E27FC236}">
                 <a16:creationId xmlns:a16="http://schemas.microsoft.com/office/drawing/2014/main" id="{A3A33D8A-2C84-4629-A906-96FA1E0427DE}"/>
               </a:ext>
             </a:extLst>
@@ -10210,7 +8664,7 @@
 </p:sld>
 </file>
 
-<file path=ppt/slides/slide28.xml><?xml version="1.0" encoding="utf-8"?>
+<file path=ppt/slides/slide21.xml><?xml version="1.0" encoding="utf-8"?>
 <p:sld xmlns:a="http://schemas.openxmlformats.org/drawingml/2006/main" xmlns:r="http://schemas.openxmlformats.org/officeDocument/2006/relationships" xmlns:p="http://schemas.openxmlformats.org/presentationml/2006/main">
   <p:cSld>
     <p:spTree>
@@ -10410,7 +8864,7 @@
           <p:cNvPr id="2" name="Titre 1">
             <a:extLst>
               <a:ext uri="{FF2B5EF4-FFF2-40B4-BE49-F238E27FC236}">
-                <a16:creationId xmlns:a16="http://schemas.microsoft.com/office/drawing/2014/main" id="{905637F9-282D-444C-BA13-51813A35C335}"/>
+                <a16:creationId xmlns:a16="http://schemas.microsoft.com/office/drawing/2014/main" id="{04FA63CD-AF69-440A-98D3-324EF10849B3}"/>
               </a:ext>
             </a:extLst>
           </p:cNvPr>
@@ -10428,7 +8882,7 @@
           <a:p>
             <a:r>
               <a:rPr lang="fr-BE" dirty="0"/>
-              <a:t>3 petites histoires</a:t>
+              <a:t>Cette présentation</a:t>
             </a:r>
             <a:endParaRPr lang="fr-FR" dirty="0"/>
           </a:p>
@@ -10439,7 +8893,7 @@
           <p:cNvPr id="3" name="Espace réservé du contenu 2">
             <a:extLst>
               <a:ext uri="{FF2B5EF4-FFF2-40B4-BE49-F238E27FC236}">
-                <a16:creationId xmlns:a16="http://schemas.microsoft.com/office/drawing/2014/main" id="{06336FC6-B582-4643-9C0C-3394DDDF5D24}"/>
+                <a16:creationId xmlns:a16="http://schemas.microsoft.com/office/drawing/2014/main" id="{73A26057-EE8B-434E-BEAA-6BD0BF597AEC}"/>
               </a:ext>
             </a:extLst>
           </p:cNvPr>
@@ -10456,69 +8910,20 @@
           <a:lstStyle/>
           <a:p>
             <a:r>
-              <a:rPr lang="fr-BE" dirty="0" err="1"/>
-              <a:t>Feature</a:t>
-            </a:r>
-            <a:r>
-              <a:rPr lang="fr-BE" dirty="0"/>
-              <a:t> estimée à 4 heures impossible à ajouter</a:t>
-            </a:r>
-          </a:p>
-          <a:p>
-            <a:pPr lvl="1"/>
-            <a:r>
-              <a:rPr lang="fr-BE" dirty="0"/>
-              <a:t>Injection de dépendance absente (SQL </a:t>
-            </a:r>
-            <a:r>
-              <a:rPr lang="fr-BE" dirty="0" err="1"/>
-              <a:t>Stored</a:t>
-            </a:r>
-            <a:r>
-              <a:rPr lang="fr-BE" dirty="0"/>
-              <a:t> proc)</a:t>
-            </a:r>
-          </a:p>
-          <a:p>
-            <a:r>
-              <a:rPr lang="fr-BE" dirty="0" err="1"/>
-              <a:t>Feature</a:t>
-            </a:r>
-            <a:r>
-              <a:rPr lang="fr-BE" dirty="0"/>
-              <a:t> estimée à 15 minutes a pris 1 semaine</a:t>
-            </a:r>
-          </a:p>
-          <a:p>
-            <a:pPr lvl="1"/>
-            <a:r>
-              <a:rPr lang="fr-BE" dirty="0"/>
-              <a:t>Abstraction manquante (Un service utilise </a:t>
-            </a:r>
-            <a:r>
-              <a:rPr lang="fr-BE" dirty="0" err="1"/>
-              <a:t>HttpContext.Current</a:t>
-            </a:r>
-            <a:r>
-              <a:rPr lang="fr-BE" dirty="0"/>
-              <a:t>, ce service était censé être appelé dans un autre thread/contexte)</a:t>
-            </a:r>
-          </a:p>
-          <a:p>
-            <a:r>
-              <a:rPr lang="fr-BE" dirty="0" err="1"/>
-              <a:t>Feature</a:t>
-            </a:r>
-            <a:r>
-              <a:rPr lang="fr-BE" dirty="0"/>
-              <a:t> estimée à 2 jours a pris 3 heure</a:t>
-            </a:r>
-          </a:p>
-          <a:p>
-            <a:pPr lvl="1"/>
-            <a:r>
-              <a:rPr lang="fr-BE" dirty="0"/>
-              <a:t>Le système utilisait les principes SOLID. Le décorateur a sauvé la mise</a:t>
+              <a:rPr lang="fr-BE" dirty="0"/>
+              <a:t>Est technique. </a:t>
+            </a:r>
+          </a:p>
+          <a:p>
+            <a:r>
+              <a:rPr lang="fr-BE" dirty="0"/>
+              <a:t>Présente divers principes pour le monde de l’orienté objet.</a:t>
+            </a:r>
+          </a:p>
+          <a:p>
+            <a:r>
+              <a:rPr lang="fr-BE" dirty="0"/>
+              <a:t>Est conviviale. Les réactions sont les bienvenues</a:t>
             </a:r>
             <a:endParaRPr lang="fr-FR" dirty="0"/>
           </a:p>
@@ -10527,7 +8932,7 @@
     </p:spTree>
     <p:extLst>
       <p:ext uri="{BB962C8B-B14F-4D97-AF65-F5344CB8AC3E}">
-        <p14:creationId xmlns:p14="http://schemas.microsoft.com/office/powerpoint/2010/main" val="3315869751"/>
+        <p14:creationId xmlns:p14="http://schemas.microsoft.com/office/powerpoint/2010/main" val="1321203283"/>
       </p:ext>
     </p:extLst>
   </p:cSld>
@@ -10559,7 +8964,7 @@
           <p:cNvPr id="2" name="Titre 1">
             <a:extLst>
               <a:ext uri="{FF2B5EF4-FFF2-40B4-BE49-F238E27FC236}">
-                <a16:creationId xmlns:a16="http://schemas.microsoft.com/office/drawing/2014/main" id="{04FA63CD-AF69-440A-98D3-324EF10849B3}"/>
+                <a16:creationId xmlns:a16="http://schemas.microsoft.com/office/drawing/2014/main" id="{9E1CA769-2C98-4743-A26A-756EFA17C0C7}"/>
               </a:ext>
             </a:extLst>
           </p:cNvPr>
@@ -10577,7 +8982,7 @@
           <a:p>
             <a:r>
               <a:rPr lang="fr-BE" dirty="0"/>
-              <a:t>Cette présentation</a:t>
+              <a:t>Cette présentation n’est pas</a:t>
             </a:r>
             <a:endParaRPr lang="fr-FR" dirty="0"/>
           </a:p>
@@ -10588,7 +8993,7 @@
           <p:cNvPr id="3" name="Espace réservé du contenu 2">
             <a:extLst>
               <a:ext uri="{FF2B5EF4-FFF2-40B4-BE49-F238E27FC236}">
-                <a16:creationId xmlns:a16="http://schemas.microsoft.com/office/drawing/2014/main" id="{73A26057-EE8B-434E-BEAA-6BD0BF597AEC}"/>
+                <a16:creationId xmlns:a16="http://schemas.microsoft.com/office/drawing/2014/main" id="{870015D7-3C92-4A00-9459-BD8563A76C9B}"/>
               </a:ext>
             </a:extLst>
           </p:cNvPr>
@@ -10606,19 +9011,13 @@
           <a:p>
             <a:r>
               <a:rPr lang="fr-BE" dirty="0"/>
-              <a:t>Est technique. </a:t>
-            </a:r>
-          </a:p>
-          <a:p>
-            <a:r>
-              <a:rPr lang="fr-BE" dirty="0"/>
-              <a:t>Présente divers principes pour le monde de l’orienté objet.</a:t>
-            </a:r>
-          </a:p>
-          <a:p>
-            <a:r>
-              <a:rPr lang="fr-BE" dirty="0"/>
-              <a:t>Est conviviale. Les réactions sont les bienvenues</a:t>
+              <a:t>Méthodologique</a:t>
+            </a:r>
+          </a:p>
+          <a:p>
+            <a:r>
+              <a:rPr lang="fr-BE" dirty="0"/>
+              <a:t>Absolue</a:t>
             </a:r>
             <a:endParaRPr lang="fr-FR" dirty="0"/>
           </a:p>
@@ -10627,7 +9026,7 @@
     </p:spTree>
     <p:extLst>
       <p:ext uri="{BB962C8B-B14F-4D97-AF65-F5344CB8AC3E}">
-        <p14:creationId xmlns:p14="http://schemas.microsoft.com/office/powerpoint/2010/main" val="1321203283"/>
+        <p14:creationId xmlns:p14="http://schemas.microsoft.com/office/powerpoint/2010/main" val="1814593532"/>
       </p:ext>
     </p:extLst>
   </p:cSld>
@@ -10659,100 +9058,6 @@
           <p:cNvPr id="2" name="Titre 1">
             <a:extLst>
               <a:ext uri="{FF2B5EF4-FFF2-40B4-BE49-F238E27FC236}">
-                <a16:creationId xmlns:a16="http://schemas.microsoft.com/office/drawing/2014/main" id="{9E1CA769-2C98-4743-A26A-756EFA17C0C7}"/>
-              </a:ext>
-            </a:extLst>
-          </p:cNvPr>
-          <p:cNvSpPr>
-            <a:spLocks noGrp="1"/>
-          </p:cNvSpPr>
-          <p:nvPr>
-            <p:ph type="title"/>
-          </p:nvPr>
-        </p:nvSpPr>
-        <p:spPr/>
-        <p:txBody>
-          <a:bodyPr/>
-          <a:lstStyle/>
-          <a:p>
-            <a:r>
-              <a:rPr lang="fr-BE" dirty="0"/>
-              <a:t>Cette présentation n’est pas</a:t>
-            </a:r>
-            <a:endParaRPr lang="fr-FR" dirty="0"/>
-          </a:p>
-        </p:txBody>
-      </p:sp>
-      <p:sp>
-        <p:nvSpPr>
-          <p:cNvPr id="3" name="Espace réservé du contenu 2">
-            <a:extLst>
-              <a:ext uri="{FF2B5EF4-FFF2-40B4-BE49-F238E27FC236}">
-                <a16:creationId xmlns:a16="http://schemas.microsoft.com/office/drawing/2014/main" id="{870015D7-3C92-4A00-9459-BD8563A76C9B}"/>
-              </a:ext>
-            </a:extLst>
-          </p:cNvPr>
-          <p:cNvSpPr>
-            <a:spLocks noGrp="1"/>
-          </p:cNvSpPr>
-          <p:nvPr>
-            <p:ph idx="1"/>
-          </p:nvPr>
-        </p:nvSpPr>
-        <p:spPr/>
-        <p:txBody>
-          <a:bodyPr/>
-          <a:lstStyle/>
-          <a:p>
-            <a:r>
-              <a:rPr lang="fr-BE" dirty="0"/>
-              <a:t>Méthodologique</a:t>
-            </a:r>
-          </a:p>
-          <a:p>
-            <a:r>
-              <a:rPr lang="fr-BE" dirty="0"/>
-              <a:t>Absolue</a:t>
-            </a:r>
-            <a:endParaRPr lang="fr-FR" dirty="0"/>
-          </a:p>
-        </p:txBody>
-      </p:sp>
-    </p:spTree>
-    <p:extLst>
-      <p:ext uri="{BB962C8B-B14F-4D97-AF65-F5344CB8AC3E}">
-        <p14:creationId xmlns:p14="http://schemas.microsoft.com/office/powerpoint/2010/main" val="1814593532"/>
-      </p:ext>
-    </p:extLst>
-  </p:cSld>
-  <p:clrMapOvr>
-    <a:masterClrMapping/>
-  </p:clrMapOvr>
-</p:sld>
-</file>
-
-<file path=ppt/slides/slide6.xml><?xml version="1.0" encoding="utf-8"?>
-<p:sld xmlns:a="http://schemas.openxmlformats.org/drawingml/2006/main" xmlns:r="http://schemas.openxmlformats.org/officeDocument/2006/relationships" xmlns:p="http://schemas.openxmlformats.org/presentationml/2006/main">
-  <p:cSld>
-    <p:spTree>
-      <p:nvGrpSpPr>
-        <p:cNvPr id="1" name=""/>
-        <p:cNvGrpSpPr/>
-        <p:nvPr/>
-      </p:nvGrpSpPr>
-      <p:grpSpPr>
-        <a:xfrm>
-          <a:off x="0" y="0"/>
-          <a:ext cx="0" cy="0"/>
-          <a:chOff x="0" y="0"/>
-          <a:chExt cx="0" cy="0"/>
-        </a:xfrm>
-      </p:grpSpPr>
-      <p:sp>
-        <p:nvSpPr>
-          <p:cNvPr id="2" name="Titre 1">
-            <a:extLst>
-              <a:ext uri="{FF2B5EF4-FFF2-40B4-BE49-F238E27FC236}">
                 <a16:creationId xmlns:a16="http://schemas.microsoft.com/office/drawing/2014/main" id="{69BDC34A-3138-4FB3-8E24-F832414295D3}"/>
               </a:ext>
             </a:extLst>
@@ -10808,48 +9113,42 @@
           <a:p>
             <a:r>
               <a:rPr lang="fr-BE" dirty="0"/>
-              <a:t>Auteur des principes SOLID</a:t>
+              <a:t>Auteur de Clean Code</a:t>
             </a:r>
           </a:p>
           <a:p>
             <a:pPr lvl="1"/>
             <a:r>
-              <a:rPr lang="fr-BE" dirty="0">
+              <a:rPr lang="fr-FR" dirty="0">
                 <a:hlinkClick r:id="rId2"/>
               </a:rPr>
-              <a:t>https://fr.wikipedia.org/wiki/SOLID_(informatique)</a:t>
-            </a:r>
-            <a:endParaRPr lang="fr-BE" dirty="0"/>
-          </a:p>
-          <a:p>
-            <a:r>
-              <a:rPr lang="fr-BE" dirty="0"/>
-              <a:t>Auteur de Clean Code</a:t>
+              <a:t>https://www.amazon.fr/Clean-Code-Handbook-Software-Craftsmanship/dp/0132350882</a:t>
+            </a:r>
+            <a:endParaRPr lang="fr-FR" dirty="0"/>
+          </a:p>
+          <a:p>
+            <a:r>
+              <a:rPr lang="fr-BE" dirty="0"/>
+              <a:t>Co-auteur du </a:t>
+            </a:r>
+            <a:r>
+              <a:rPr lang="fr-BE" dirty="0" err="1"/>
+              <a:t>manifesto</a:t>
+            </a:r>
+            <a:r>
+              <a:rPr lang="fr-BE" dirty="0"/>
+              <a:t> Agile</a:t>
             </a:r>
           </a:p>
           <a:p>
             <a:pPr lvl="1"/>
             <a:r>
-              <a:rPr lang="fr-FR" dirty="0">
+              <a:rPr lang="en-US" dirty="0">
                 <a:hlinkClick r:id="rId3"/>
               </a:rPr>
-              <a:t>https://www.amazon.fr/Clean-Code-Handbook-Software-Craftsmanship/dp/0132350882</a:t>
-            </a:r>
-            <a:endParaRPr lang="fr-FR" dirty="0"/>
-          </a:p>
-          <a:p>
-            <a:r>
-              <a:rPr lang="fr-BE" dirty="0"/>
-              <a:t>Co-auteur du </a:t>
-            </a:r>
-            <a:r>
-              <a:rPr lang="fr-BE" dirty="0" err="1"/>
-              <a:t>manifesto</a:t>
-            </a:r>
-            <a:r>
-              <a:rPr lang="fr-BE" dirty="0"/>
-              <a:t> Agile</a:t>
-            </a:r>
+              <a:t>https://agilemanifesto.org/principles.html</a:t>
+            </a:r>
+            <a:endParaRPr lang="fr-BE" dirty="0"/>
           </a:p>
           <a:p>
             <a:r>
@@ -10913,6 +9212,275 @@
 </p:sld>
 </file>
 
+<file path=ppt/slides/slide6.xml><?xml version="1.0" encoding="utf-8"?>
+<p:sld xmlns:a="http://schemas.openxmlformats.org/drawingml/2006/main" xmlns:r="http://schemas.openxmlformats.org/officeDocument/2006/relationships" xmlns:p="http://schemas.openxmlformats.org/presentationml/2006/main">
+  <p:cSld>
+    <p:spTree>
+      <p:nvGrpSpPr>
+        <p:cNvPr id="1" name=""/>
+        <p:cNvGrpSpPr/>
+        <p:nvPr/>
+      </p:nvGrpSpPr>
+      <p:grpSpPr>
+        <a:xfrm>
+          <a:off x="0" y="0"/>
+          <a:ext cx="0" cy="0"/>
+          <a:chOff x="0" y="0"/>
+          <a:chExt cx="0" cy="0"/>
+        </a:xfrm>
+      </p:grpSpPr>
+      <p:sp>
+        <p:nvSpPr>
+          <p:cNvPr id="2" name="Titre 1">
+            <a:extLst>
+              <a:ext uri="{FF2B5EF4-FFF2-40B4-BE49-F238E27FC236}">
+                <a16:creationId xmlns:a16="http://schemas.microsoft.com/office/drawing/2014/main" id="{335C7A81-D7EB-4606-9AD8-00CBA204F916}"/>
+              </a:ext>
+            </a:extLst>
+          </p:cNvPr>
+          <p:cNvSpPr>
+            <a:spLocks noGrp="1"/>
+          </p:cNvSpPr>
+          <p:nvPr>
+            <p:ph type="title"/>
+          </p:nvPr>
+        </p:nvSpPr>
+        <p:spPr/>
+        <p:txBody>
+          <a:bodyPr/>
+          <a:lstStyle/>
+          <a:p>
+            <a:r>
+              <a:rPr lang="fr-BE" dirty="0"/>
+              <a:t>Pourquoi Clean Code ?</a:t>
+            </a:r>
+            <a:endParaRPr lang="en-US" dirty="0"/>
+          </a:p>
+        </p:txBody>
+      </p:sp>
+      <p:sp>
+        <p:nvSpPr>
+          <p:cNvPr id="3" name="Espace réservé du contenu 2">
+            <a:extLst>
+              <a:ext uri="{FF2B5EF4-FFF2-40B4-BE49-F238E27FC236}">
+                <a16:creationId xmlns:a16="http://schemas.microsoft.com/office/drawing/2014/main" id="{005B7DC7-024A-4FAB-83A9-3FD206F45220}"/>
+              </a:ext>
+            </a:extLst>
+          </p:cNvPr>
+          <p:cNvSpPr>
+            <a:spLocks noGrp="1"/>
+          </p:cNvSpPr>
+          <p:nvPr>
+            <p:ph idx="1"/>
+          </p:nvPr>
+        </p:nvSpPr>
+        <p:spPr/>
+        <p:txBody>
+          <a:bodyPr/>
+          <a:lstStyle/>
+          <a:p>
+            <a:r>
+              <a:rPr lang="fr-BE" dirty="0"/>
+              <a:t>❌ Rien n’est important excepté une application qui fonctionne</a:t>
+            </a:r>
+          </a:p>
+          <a:p>
+            <a:r>
+              <a:rPr lang="en-US" dirty="0"/>
+              <a:t>❌ Un </a:t>
+            </a:r>
+            <a:r>
+              <a:rPr lang="fr-BE" dirty="0"/>
+              <a:t>développeur</a:t>
+            </a:r>
+            <a:r>
+              <a:rPr lang="en-US" dirty="0"/>
+              <a:t> ne fait </a:t>
+            </a:r>
+            <a:r>
+              <a:rPr lang="en-US" dirty="0" err="1"/>
+              <a:t>qu’écrire</a:t>
+            </a:r>
+            <a:r>
+              <a:rPr lang="en-US" dirty="0"/>
+              <a:t> du code</a:t>
+            </a:r>
+          </a:p>
+          <a:p>
+            <a:endParaRPr lang="en-US" dirty="0"/>
+          </a:p>
+          <a:p>
+            <a:r>
+              <a:rPr lang="en-US" dirty="0"/>
+              <a:t>✅ Un code qui </a:t>
+            </a:r>
+            <a:r>
+              <a:rPr lang="en-US" dirty="0" err="1"/>
+              <a:t>fonctionne</a:t>
+            </a:r>
+            <a:r>
+              <a:rPr lang="en-US" dirty="0"/>
+              <a:t> </a:t>
+            </a:r>
+            <a:r>
+              <a:rPr lang="en-US" dirty="0" err="1"/>
+              <a:t>est</a:t>
+            </a:r>
+            <a:r>
+              <a:rPr lang="en-US" dirty="0"/>
+              <a:t> la plus </a:t>
+            </a:r>
+            <a:r>
+              <a:rPr lang="en-US" dirty="0" err="1"/>
+              <a:t>grande</a:t>
+            </a:r>
+            <a:r>
+              <a:rPr lang="en-US" dirty="0"/>
+              <a:t> </a:t>
+            </a:r>
+            <a:r>
+              <a:rPr lang="en-US" dirty="0" err="1"/>
+              <a:t>priorité</a:t>
+            </a:r>
+            <a:r>
+              <a:rPr lang="en-US" dirty="0"/>
+              <a:t>, savoir le </a:t>
+            </a:r>
+            <a:r>
+              <a:rPr lang="en-US" dirty="0" err="1"/>
+              <a:t>maintenir</a:t>
+            </a:r>
+            <a:r>
+              <a:rPr lang="en-US" dirty="0"/>
+              <a:t> </a:t>
+            </a:r>
+            <a:r>
+              <a:rPr lang="en-US" dirty="0" err="1"/>
+              <a:t>est</a:t>
+            </a:r>
+            <a:r>
+              <a:rPr lang="en-US" dirty="0"/>
+              <a:t> tout </a:t>
+            </a:r>
+            <a:r>
+              <a:rPr lang="en-US" dirty="0" err="1"/>
+              <a:t>aussi</a:t>
+            </a:r>
+            <a:r>
+              <a:rPr lang="en-US" dirty="0"/>
+              <a:t> important</a:t>
+            </a:r>
+          </a:p>
+          <a:p>
+            <a:r>
+              <a:rPr lang="en-US" dirty="0"/>
+              <a:t>✅ Un </a:t>
+            </a:r>
+            <a:r>
+              <a:rPr lang="en-US" dirty="0" err="1"/>
+              <a:t>développeur</a:t>
+            </a:r>
+            <a:r>
+              <a:rPr lang="en-US" dirty="0"/>
+              <a:t> </a:t>
+            </a:r>
+            <a:r>
+              <a:rPr lang="en-US" dirty="0" err="1"/>
+              <a:t>passe</a:t>
+            </a:r>
+            <a:r>
+              <a:rPr lang="en-US" dirty="0"/>
+              <a:t> 9/10 de son temps à lire du code</a:t>
+            </a:r>
+          </a:p>
+          <a:p>
+            <a:endParaRPr lang="en-US" dirty="0"/>
+          </a:p>
+          <a:p>
+            <a:r>
+              <a:rPr lang="en-US" dirty="0"/>
+              <a:t>Conclusion: prendre un </a:t>
+            </a:r>
+            <a:r>
+              <a:rPr lang="en-US" dirty="0" err="1"/>
+              <a:t>peu</a:t>
+            </a:r>
+            <a:r>
+              <a:rPr lang="en-US" dirty="0"/>
+              <a:t> plus de temps pour aider son prochain a </a:t>
+            </a:r>
+            <a:r>
+              <a:rPr lang="en-US" dirty="0" err="1"/>
+              <a:t>une</a:t>
+            </a:r>
+            <a:r>
+              <a:rPr lang="en-US" dirty="0"/>
+              <a:t> </a:t>
+            </a:r>
+            <a:r>
+              <a:rPr lang="en-US" dirty="0" err="1"/>
+              <a:t>valeur</a:t>
+            </a:r>
+            <a:r>
+              <a:rPr lang="en-US" dirty="0"/>
+              <a:t> </a:t>
+            </a:r>
+            <a:r>
+              <a:rPr lang="fr-BE" dirty="0"/>
+              <a:t>presque</a:t>
+            </a:r>
+            <a:r>
+              <a:rPr lang="en-US" dirty="0"/>
+              <a:t> </a:t>
+            </a:r>
+            <a:r>
+              <a:rPr lang="en-US" dirty="0" err="1"/>
+              <a:t>aussi</a:t>
+            </a:r>
+            <a:r>
+              <a:rPr lang="en-US" dirty="0"/>
+              <a:t> </a:t>
+            </a:r>
+            <a:r>
+              <a:rPr lang="en-US" dirty="0" err="1"/>
+              <a:t>grande</a:t>
+            </a:r>
+            <a:r>
+              <a:rPr lang="en-US" dirty="0"/>
+              <a:t> que de </a:t>
+            </a:r>
+            <a:r>
+              <a:rPr lang="fr-BE" dirty="0"/>
+              <a:t>faire</a:t>
+            </a:r>
+            <a:r>
+              <a:rPr lang="en-US" dirty="0"/>
+              <a:t> du code qui </a:t>
+            </a:r>
+            <a:r>
+              <a:rPr lang="en-US" dirty="0" err="1"/>
+              <a:t>fonctionne</a:t>
+            </a:r>
+            <a:r>
+              <a:rPr lang="en-US" dirty="0"/>
+              <a:t>.</a:t>
+            </a:r>
+          </a:p>
+        </p:txBody>
+      </p:sp>
+    </p:spTree>
+    <p:extLst>
+      <p:ext uri="{BB962C8B-B14F-4D97-AF65-F5344CB8AC3E}">
+        <p14:creationId xmlns:p14="http://schemas.microsoft.com/office/powerpoint/2010/main" val="1473076665"/>
+      </p:ext>
+    </p:extLst>
+  </p:cSld>
+  <p:clrMapOvr>
+    <a:masterClrMapping/>
+  </p:clrMapOvr>
+</p:sld>
+</file>
+
 <file path=ppt/slides/slide7.xml><?xml version="1.0" encoding="utf-8"?>
 <p:sld xmlns:a="http://schemas.openxmlformats.org/drawingml/2006/main" xmlns:r="http://schemas.openxmlformats.org/officeDocument/2006/relationships" xmlns:p="http://schemas.openxmlformats.org/presentationml/2006/main">
   <p:cSld>
@@ -10935,7 +9503,7 @@
           <p:cNvPr id="2" name="Titre 1">
             <a:extLst>
               <a:ext uri="{FF2B5EF4-FFF2-40B4-BE49-F238E27FC236}">
-                <a16:creationId xmlns:a16="http://schemas.microsoft.com/office/drawing/2014/main" id="{52A3D9DF-F530-4BE1-B190-A899D3C67DD9}"/>
+                <a16:creationId xmlns:a16="http://schemas.microsoft.com/office/drawing/2014/main" id="{4B4F148B-D747-4463-A02A-A126E07E1A21}"/>
               </a:ext>
             </a:extLst>
           </p:cNvPr>
@@ -10953,14 +9521,22 @@
           <a:p>
             <a:r>
               <a:rPr lang="fr-BE" dirty="0"/>
-              <a:t>Principes SOLID</a:t>
+              <a:t>Clean Code: </a:t>
+            </a:r>
+            <a:r>
+              <a:rPr lang="fr-BE" dirty="0" err="1"/>
+              <a:t>mékeskeC</a:t>
+            </a:r>
+            <a:r>
+              <a:rPr lang="fr-BE" dirty="0"/>
+              <a:t> ?</a:t>
             </a:r>
             <a:br>
               <a:rPr lang="fr-BE" dirty="0"/>
             </a:br>
             <a:r>
-              <a:rPr lang="fr-BE" dirty="0"/>
-              <a:t>pour la programmation orienté objet</a:t>
+              <a:rPr lang="fr-BE" sz="2000" dirty="0"/>
+              <a:t>Du code qui est:</a:t>
             </a:r>
             <a:endParaRPr lang="fr-FR" dirty="0"/>
           </a:p>
@@ -10971,7 +9547,7 @@
           <p:cNvPr id="3" name="Espace réservé du contenu 2">
             <a:extLst>
               <a:ext uri="{FF2B5EF4-FFF2-40B4-BE49-F238E27FC236}">
-                <a16:creationId xmlns:a16="http://schemas.microsoft.com/office/drawing/2014/main" id="{30B38FAD-D682-433E-B6E3-1BA06CD7F0D1}"/>
+                <a16:creationId xmlns:a16="http://schemas.microsoft.com/office/drawing/2014/main" id="{BBA479F0-A022-4E96-A8F4-CBD9DCBFCD4E}"/>
               </a:ext>
             </a:extLst>
           </p:cNvPr>
@@ -10989,68 +9565,90 @@
           <a:p>
             <a:r>
               <a:rPr lang="fr-BE" dirty="0"/>
-              <a:t>Single </a:t>
-            </a:r>
-            <a:r>
-              <a:rPr lang="fr-BE" dirty="0" err="1"/>
-              <a:t>Responsibility</a:t>
-            </a:r>
-            <a:endParaRPr lang="fr-BE" dirty="0"/>
-          </a:p>
-          <a:p>
-            <a:r>
-              <a:rPr lang="fr-BE" dirty="0"/>
-              <a:t>Open </a:t>
-            </a:r>
-            <a:r>
-              <a:rPr lang="fr-BE" dirty="0" err="1"/>
-              <a:t>Closed</a:t>
-            </a:r>
-            <a:endParaRPr lang="fr-BE" dirty="0"/>
-          </a:p>
-          <a:p>
-            <a:r>
-              <a:rPr lang="fr-BE" dirty="0" err="1"/>
-              <a:t>Liskov</a:t>
-            </a:r>
-            <a:r>
-              <a:rPr lang="fr-BE" dirty="0"/>
-              <a:t> </a:t>
-            </a:r>
-            <a:r>
-              <a:rPr lang="fr-BE" dirty="0" err="1"/>
-              <a:t>Principle</a:t>
-            </a:r>
-            <a:endParaRPr lang="fr-BE" dirty="0"/>
-          </a:p>
-          <a:p>
-            <a:r>
-              <a:rPr lang="fr-BE" dirty="0"/>
-              <a:t>Interface </a:t>
-            </a:r>
-            <a:r>
-              <a:rPr lang="fr-BE" dirty="0" err="1"/>
-              <a:t>Segregation</a:t>
-            </a:r>
-            <a:endParaRPr lang="fr-BE" dirty="0"/>
-          </a:p>
-          <a:p>
-            <a:r>
-              <a:rPr lang="fr-BE" dirty="0" err="1"/>
-              <a:t>Dependency</a:t>
-            </a:r>
-            <a:r>
-              <a:rPr lang="fr-BE" dirty="0"/>
-              <a:t> Inversion</a:t>
+              <a:t>Expressif et explicite</a:t>
+            </a:r>
+          </a:p>
+          <a:p>
+            <a:r>
+              <a:rPr lang="fr-BE" dirty="0"/>
+              <a:t>Lisible</a:t>
+            </a:r>
+          </a:p>
+          <a:p>
+            <a:r>
+              <a:rPr lang="fr-BE" dirty="0"/>
+              <a:t>Compréhensible</a:t>
+            </a:r>
+          </a:p>
+          <a:p>
+            <a:r>
+              <a:rPr lang="fr-BE" dirty="0"/>
+              <a:t>Sans surprise</a:t>
+            </a:r>
+          </a:p>
+          <a:p>
+            <a:r>
+              <a:rPr lang="fr-BE" dirty="0"/>
+              <a:t>Transparent</a:t>
+            </a:r>
+          </a:p>
+          <a:p>
+            <a:r>
+              <a:rPr lang="fr-BE" dirty="0"/>
+              <a:t>Rassurant</a:t>
+            </a:r>
+          </a:p>
+          <a:p>
+            <a:r>
+              <a:rPr lang="fr-BE" dirty="0"/>
+              <a:t>Plaisant</a:t>
             </a:r>
             <a:endParaRPr lang="fr-FR" dirty="0"/>
+          </a:p>
+        </p:txBody>
+      </p:sp>
+      <p:sp>
+        <p:nvSpPr>
+          <p:cNvPr id="4" name="ZoneTexte 3">
+            <a:extLst>
+              <a:ext uri="{FF2B5EF4-FFF2-40B4-BE49-F238E27FC236}">
+                <a16:creationId xmlns:a16="http://schemas.microsoft.com/office/drawing/2014/main" id="{DFE9CAE5-8F03-4618-BCE1-DDFE0F9BF0DA}"/>
+              </a:ext>
+            </a:extLst>
+          </p:cNvPr>
+          <p:cNvSpPr txBox="1"/>
+          <p:nvPr/>
+        </p:nvSpPr>
+        <p:spPr>
+          <a:xfrm>
+            <a:off x="7532702" y="5602069"/>
+            <a:ext cx="1939771" cy="646331"/>
+          </a:xfrm>
+          <a:prstGeom prst="rect">
+            <a:avLst/>
+          </a:prstGeom>
+          <a:noFill/>
+        </p:spPr>
+        <p:txBody>
+          <a:bodyPr wrap="square" rtlCol="0">
+            <a:spAutoFit/>
+          </a:bodyPr>
+          <a:lstStyle/>
+          <a:p>
+            <a:r>
+              <a:rPr lang="en-US" i="1" dirty="0"/>
+              <a:t>Kate Gregory</a:t>
+            </a:r>
+          </a:p>
+          <a:p>
+            <a:endParaRPr lang="fr-FR" i="1" dirty="0"/>
           </a:p>
         </p:txBody>
       </p:sp>
     </p:spTree>
     <p:extLst>
       <p:ext uri="{BB962C8B-B14F-4D97-AF65-F5344CB8AC3E}">
-        <p14:creationId xmlns:p14="http://schemas.microsoft.com/office/powerpoint/2010/main" val="3441826691"/>
+        <p14:creationId xmlns:p14="http://schemas.microsoft.com/office/powerpoint/2010/main" val="3816974945"/>
       </p:ext>
     </p:extLst>
   </p:cSld>
@@ -11082,7 +9680,7 @@
           <p:cNvPr id="2" name="Titre 1">
             <a:extLst>
               <a:ext uri="{FF2B5EF4-FFF2-40B4-BE49-F238E27FC236}">
-                <a16:creationId xmlns:a16="http://schemas.microsoft.com/office/drawing/2014/main" id="{32CF8DAC-6DF0-4402-9482-7BF534B6FA75}"/>
+                <a16:creationId xmlns:a16="http://schemas.microsoft.com/office/drawing/2014/main" id="{436C22CA-B030-44C8-A13C-5DBC76D7129F}"/>
               </a:ext>
             </a:extLst>
           </p:cNvPr>
@@ -11100,19 +9698,7 @@
           <a:p>
             <a:r>
               <a:rPr lang="fr-BE" dirty="0"/>
-              <a:t>Single </a:t>
-            </a:r>
-            <a:r>
-              <a:rPr lang="fr-BE" dirty="0" err="1"/>
-              <a:t>Responsiblity</a:t>
-            </a:r>
-            <a:r>
-              <a:rPr lang="fr-BE" dirty="0"/>
-              <a:t> </a:t>
-            </a:r>
-            <a:r>
-              <a:rPr lang="fr-BE" i="1" dirty="0"/>
-              <a:t>SRP</a:t>
+              <a:t>Clean Code: mais comment ?</a:t>
             </a:r>
             <a:endParaRPr lang="fr-FR" dirty="0"/>
           </a:p>
@@ -11123,7 +9709,7 @@
           <p:cNvPr id="3" name="Espace réservé du contenu 2">
             <a:extLst>
               <a:ext uri="{FF2B5EF4-FFF2-40B4-BE49-F238E27FC236}">
-                <a16:creationId xmlns:a16="http://schemas.microsoft.com/office/drawing/2014/main" id="{B9DD855A-5681-4C6E-9A9F-5DA35C5FE089}"/>
+                <a16:creationId xmlns:a16="http://schemas.microsoft.com/office/drawing/2014/main" id="{43BB4507-A3E6-4C59-9787-89A0496EF5F2}"/>
               </a:ext>
             </a:extLst>
           </p:cNvPr>
@@ -11140,26 +9726,51 @@
           <a:lstStyle/>
           <a:p>
             <a:r>
-              <a:rPr lang="fr-BE" i="1" dirty="0"/>
-              <a:t>Une classe doit avoir une seule raison de changer</a:t>
-            </a:r>
-          </a:p>
-          <a:p>
-            <a:endParaRPr lang="fr-BE" i="1" dirty="0"/>
-          </a:p>
-          <a:p>
-            <a:r>
-              <a:rPr lang="fr-BE" dirty="0"/>
-              <a:t>Une classe qui a trop de responsabilités est dure à maintenir</a:t>
-            </a:r>
-            <a:endParaRPr lang="fr-FR" dirty="0"/>
+              <a:rPr lang="fr-BE" dirty="0"/>
+              <a:t>Restez Simple (KISS </a:t>
+            </a:r>
+            <a:r>
+              <a:rPr lang="fr-BE" dirty="0" err="1"/>
+              <a:t>principle</a:t>
+            </a:r>
+            <a:r>
+              <a:rPr lang="fr-BE" dirty="0"/>
+              <a:t>)</a:t>
+            </a:r>
+          </a:p>
+          <a:p>
+            <a:pPr lvl="1"/>
+            <a:r>
+              <a:rPr lang="fr-BE" dirty="0"/>
+              <a:t>« Simple: Facile à comprendre, à utiliser, à exécuter » - L’internaute</a:t>
+            </a:r>
+          </a:p>
+          <a:p>
+            <a:r>
+              <a:rPr lang="fr-BE" dirty="0"/>
+              <a:t>Pensez à raconter une histoire</a:t>
+            </a:r>
+          </a:p>
+          <a:p>
+            <a:r>
+              <a:rPr lang="fr-BE" dirty="0"/>
+              <a:t>Code </a:t>
+            </a:r>
+            <a:r>
+              <a:rPr lang="fr-BE" dirty="0" err="1"/>
+              <a:t>review</a:t>
+            </a:r>
+            <a:r>
+              <a:rPr lang="fr-BE" dirty="0"/>
+              <a:t> : faites voir votre code à un collègue. S’il le comprend, ce code est bon.</a:t>
+            </a:r>
           </a:p>
         </p:txBody>
       </p:sp>
     </p:spTree>
     <p:extLst>
       <p:ext uri="{BB962C8B-B14F-4D97-AF65-F5344CB8AC3E}">
-        <p14:creationId xmlns:p14="http://schemas.microsoft.com/office/powerpoint/2010/main" val="436678582"/>
+        <p14:creationId xmlns:p14="http://schemas.microsoft.com/office/powerpoint/2010/main" val="4155884551"/>
       </p:ext>
     </p:extLst>
   </p:cSld>
@@ -11191,7 +9802,7 @@
           <p:cNvPr id="2" name="Titre 1">
             <a:extLst>
               <a:ext uri="{FF2B5EF4-FFF2-40B4-BE49-F238E27FC236}">
-                <a16:creationId xmlns:a16="http://schemas.microsoft.com/office/drawing/2014/main" id="{F791825C-93F2-4815-BECA-26C2471FA877}"/>
+                <a16:creationId xmlns:a16="http://schemas.microsoft.com/office/drawing/2014/main" id="{4777C3CF-1BA8-4B86-9618-6AF002EB7E30}"/>
               </a:ext>
             </a:extLst>
           </p:cNvPr>
@@ -11208,12 +9819,16 @@
           <a:lstStyle/>
           <a:p>
             <a:r>
-              <a:rPr lang="fr-BE" dirty="0"/>
-              <a:t>Open (to extension) Close (to modification) </a:t>
-            </a:r>
-            <a:r>
-              <a:rPr lang="fr-BE" i="1" dirty="0"/>
-              <a:t>OCP</a:t>
+              <a:rPr lang="fr-FR" dirty="0" err="1"/>
+              <a:t>Nested</a:t>
+            </a:r>
+            <a:r>
+              <a:rPr lang="fr-FR" dirty="0"/>
+              <a:t> if are for </a:t>
+            </a:r>
+            <a:r>
+              <a:rPr lang="fr-FR" dirty="0" err="1"/>
+              <a:t>fools</a:t>
             </a:r>
             <a:endParaRPr lang="fr-FR" dirty="0"/>
           </a:p>
@@ -11224,7 +9839,7 @@
           <p:cNvPr id="3" name="Espace réservé du contenu 2">
             <a:extLst>
               <a:ext uri="{FF2B5EF4-FFF2-40B4-BE49-F238E27FC236}">
-                <a16:creationId xmlns:a16="http://schemas.microsoft.com/office/drawing/2014/main" id="{ED68C6A4-54B0-47DF-8BC1-9B5FEC00A9B7}"/>
+                <a16:creationId xmlns:a16="http://schemas.microsoft.com/office/drawing/2014/main" id="{090334CA-EAF4-4FDD-9B0B-2F1A9C8333FB}"/>
               </a:ext>
             </a:extLst>
           </p:cNvPr>
@@ -11241,23 +9856,60 @@
           <a:lstStyle/>
           <a:p>
             <a:r>
+              <a:rPr lang="fr-BE" dirty="0"/>
+              <a:t>Évitez &lt;</a:t>
+            </a:r>
+            <a:r>
+              <a:rPr lang="fr-BE" dirty="0" err="1"/>
+              <a:t>nested</a:t>
+            </a:r>
+            <a:r>
+              <a:rPr lang="fr-BE" dirty="0"/>
+              <a:t> if&gt;</a:t>
+            </a:r>
+            <a:endParaRPr lang="fr-FR" dirty="0"/>
+          </a:p>
+          <a:p>
+            <a:pPr lvl="1"/>
+            <a:r>
+              <a:rPr lang="fr-BE" dirty="0"/>
+              <a:t>Les </a:t>
+            </a:r>
+            <a:r>
               <a:rPr lang="fr-BE" i="1" dirty="0"/>
-              <a:t>Une classe doit être ouverte à l’extension, et fermée à la modification</a:t>
-            </a:r>
-          </a:p>
-          <a:p>
-            <a:endParaRPr lang="fr-BE" dirty="0"/>
-          </a:p>
-          <a:p>
-            <a:r>
-              <a:rPr lang="fr-BE" dirty="0"/>
-              <a:t>Ajouter une nouvelle fonctionnalité en ajoutant des classes a peu de risque d’avoir des bugs de régression.</a:t>
-            </a:r>
-          </a:p>
-          <a:p>
-            <a:r>
-              <a:rPr lang="fr-BE" dirty="0"/>
-              <a:t>A l’inverse modifier du code/une classe existant augmente les risques de régression</a:t>
+              <a:t>if</a:t>
+            </a:r>
+            <a:r>
+              <a:rPr lang="fr-BE" dirty="0"/>
+              <a:t> imbriqués diminuent la lisibilité à cause du décalage, et du </a:t>
+            </a:r>
+            <a:r>
+              <a:rPr lang="fr-BE" dirty="0" err="1"/>
+              <a:t>else</a:t>
+            </a:r>
+            <a:r>
+              <a:rPr lang="fr-BE" dirty="0"/>
+              <a:t> trop éloigné de sa condition</a:t>
+            </a:r>
+          </a:p>
+          <a:p>
+            <a:r>
+              <a:rPr lang="fr-FR" dirty="0"/>
+              <a:t>Aussi appelé le </a:t>
+            </a:r>
+            <a:r>
+              <a:rPr lang="fr-FR" dirty="0" err="1"/>
+              <a:t>gateway</a:t>
+            </a:r>
+            <a:r>
+              <a:rPr lang="fr-FR" dirty="0"/>
+              <a:t> style</a:t>
+            </a:r>
+          </a:p>
+          <a:p>
+            <a:r>
+              <a:rPr lang="fr-FR" dirty="0"/>
+              <a:t>Une fois les cas spécifique ou d’erreur écarté, nous pouvons nous concentrer sur le code business sans devoir retenir les if précédents</a:t>
             </a:r>
           </a:p>
         </p:txBody>
@@ -11265,7 +9917,7 @@
     </p:spTree>
     <p:extLst>
       <p:ext uri="{BB962C8B-B14F-4D97-AF65-F5344CB8AC3E}">
-        <p14:creationId xmlns:p14="http://schemas.microsoft.com/office/powerpoint/2010/main" val="2140292900"/>
+        <p14:creationId xmlns:p14="http://schemas.microsoft.com/office/powerpoint/2010/main" val="790854867"/>
       </p:ext>
     </p:extLst>
   </p:cSld>

</xml_diff>

<commit_message>
add horizontal vs vertical fun
</commit_message>
<xml_diff>
--- a/PPT/Easy != Simple.pptx
+++ b/PPT/Easy != Simple.pptx
@@ -7232,10 +7232,10 @@
       </p:sp>
       <p:pic>
         <p:nvPicPr>
-          <p:cNvPr id="4" name="Image 3">
+          <p:cNvPr id="6" name="Image 5">
             <a:extLst>
               <a:ext uri="{FF2B5EF4-FFF2-40B4-BE49-F238E27FC236}">
-                <a16:creationId xmlns:a16="http://schemas.microsoft.com/office/drawing/2014/main" id="{7B06619B-D68A-4DED-88CB-F09BFA56EBE4}"/>
+                <a16:creationId xmlns:a16="http://schemas.microsoft.com/office/drawing/2014/main" id="{25F1DAD4-DA15-48AB-AD7E-60F42B65C8CD}"/>
               </a:ext>
             </a:extLst>
           </p:cNvPr>
@@ -7252,38 +7252,8 @@
         </p:blipFill>
         <p:spPr>
           <a:xfrm>
-            <a:off x="927847" y="3579675"/>
-            <a:ext cx="10711028" cy="514954"/>
-          </a:xfrm>
-          <a:prstGeom prst="rect">
-            <a:avLst/>
-          </a:prstGeom>
-        </p:spPr>
-      </p:pic>
-      <p:pic>
-        <p:nvPicPr>
-          <p:cNvPr id="5" name="Image 4">
-            <a:extLst>
-              <a:ext uri="{FF2B5EF4-FFF2-40B4-BE49-F238E27FC236}">
-                <a16:creationId xmlns:a16="http://schemas.microsoft.com/office/drawing/2014/main" id="{8EA80769-7117-4BDA-BEC0-D643F24E2516}"/>
-              </a:ext>
-            </a:extLst>
-          </p:cNvPr>
-          <p:cNvPicPr>
-            <a:picLocks noChangeAspect="1"/>
-          </p:cNvPicPr>
-          <p:nvPr/>
-        </p:nvPicPr>
-        <p:blipFill>
-          <a:blip r:embed="rId3"/>
-          <a:stretch>
-            <a:fillRect/>
-          </a:stretch>
-        </p:blipFill>
-        <p:spPr>
-          <a:xfrm>
-            <a:off x="927847" y="4280826"/>
-            <a:ext cx="5076265" cy="1730733"/>
+            <a:off x="677334" y="3606053"/>
+            <a:ext cx="12192000" cy="3048000"/>
           </a:xfrm>
           <a:prstGeom prst="rect">
             <a:avLst/>

</xml_diff>

<commit_message>
Update PPT + proximite code
</commit_message>
<xml_diff>
--- a/PPT/Easy != Simple.pptx
+++ b/PPT/Easy != Simple.pptx
@@ -5,7 +5,7 @@
     <p:sldMasterId id="2147483648" r:id="rId1"/>
   </p:sldMasterIdLst>
   <p:notesMasterIdLst>
-    <p:notesMasterId r:id="rId23"/>
+    <p:notesMasterId r:id="rId26"/>
   </p:notesMasterIdLst>
   <p:sldIdLst>
     <p:sldId id="256" r:id="rId2"/>
@@ -14,21 +14,24 @@
     <p:sldId id="278" r:id="rId5"/>
     <p:sldId id="261" r:id="rId6"/>
     <p:sldId id="286" r:id="rId7"/>
-    <p:sldId id="269" r:id="rId8"/>
-    <p:sldId id="270" r:id="rId9"/>
-    <p:sldId id="275" r:id="rId10"/>
-    <p:sldId id="271" r:id="rId11"/>
-    <p:sldId id="284" r:id="rId12"/>
-    <p:sldId id="285" r:id="rId13"/>
-    <p:sldId id="272" r:id="rId14"/>
-    <p:sldId id="282" r:id="rId15"/>
-    <p:sldId id="273" r:id="rId16"/>
-    <p:sldId id="274" r:id="rId17"/>
-    <p:sldId id="279" r:id="rId18"/>
-    <p:sldId id="281" r:id="rId19"/>
-    <p:sldId id="280" r:id="rId20"/>
-    <p:sldId id="283" r:id="rId21"/>
-    <p:sldId id="260" r:id="rId22"/>
+    <p:sldId id="288" r:id="rId8"/>
+    <p:sldId id="269" r:id="rId9"/>
+    <p:sldId id="270" r:id="rId10"/>
+    <p:sldId id="275" r:id="rId11"/>
+    <p:sldId id="271" r:id="rId12"/>
+    <p:sldId id="284" r:id="rId13"/>
+    <p:sldId id="285" r:id="rId14"/>
+    <p:sldId id="272" r:id="rId15"/>
+    <p:sldId id="282" r:id="rId16"/>
+    <p:sldId id="273" r:id="rId17"/>
+    <p:sldId id="289" r:id="rId18"/>
+    <p:sldId id="287" r:id="rId19"/>
+    <p:sldId id="274" r:id="rId20"/>
+    <p:sldId id="279" r:id="rId21"/>
+    <p:sldId id="281" r:id="rId22"/>
+    <p:sldId id="280" r:id="rId23"/>
+    <p:sldId id="283" r:id="rId24"/>
+    <p:sldId id="260" r:id="rId25"/>
   </p:sldIdLst>
   <p:sldSz cx="12192000" cy="6858000"/>
   <p:notesSz cx="6858000" cy="9144000"/>
@@ -563,7 +566,7 @@
           <a:p>
             <a:fld id="{6F10D748-FFE4-4788-B13E-F644A7CDC41E}" type="slidenum">
               <a:rPr lang="fr-FR" smtClean="0"/>
-              <a:t>7</a:t>
+              <a:t>8</a:t>
             </a:fld>
             <a:endParaRPr lang="fr-FR"/>
           </a:p>
@@ -647,7 +650,7 @@
           <a:p>
             <a:fld id="{6F10D748-FFE4-4788-B13E-F644A7CDC41E}" type="slidenum">
               <a:rPr lang="fr-FR" smtClean="0"/>
-              <a:t>8</a:t>
+              <a:t>9</a:t>
             </a:fld>
             <a:endParaRPr lang="fr-FR"/>
           </a:p>
@@ -771,7 +774,7 @@
           <a:p>
             <a:fld id="{6F10D748-FFE4-4788-B13E-F644A7CDC41E}" type="slidenum">
               <a:rPr lang="fr-FR" smtClean="0"/>
-              <a:t>9</a:t>
+              <a:t>10</a:t>
             </a:fld>
             <a:endParaRPr lang="fr-FR"/>
           </a:p>
@@ -858,7 +861,7 @@
           <a:p>
             <a:fld id="{6F10D748-FFE4-4788-B13E-F644A7CDC41E}" type="slidenum">
               <a:rPr lang="fr-FR" smtClean="0"/>
-              <a:t>10</a:t>
+              <a:t>11</a:t>
             </a:fld>
             <a:endParaRPr lang="fr-FR"/>
           </a:p>
@@ -950,7 +953,7 @@
           <a:p>
             <a:fld id="{6F10D748-FFE4-4788-B13E-F644A7CDC41E}" type="slidenum">
               <a:rPr lang="fr-FR" smtClean="0"/>
-              <a:t>13</a:t>
+              <a:t>14</a:t>
             </a:fld>
             <a:endParaRPr lang="fr-FR"/>
           </a:p>
@@ -1045,7 +1048,7 @@
           <a:p>
             <a:fld id="{6F10D748-FFE4-4788-B13E-F644A7CDC41E}" type="slidenum">
               <a:rPr lang="fr-FR" smtClean="0"/>
-              <a:t>15</a:t>
+              <a:t>16</a:t>
             </a:fld>
             <a:endParaRPr lang="fr-FR"/>
           </a:p>
@@ -6863,6 +6866,153 @@
           <p:cNvPr id="2" name="Titre 1">
             <a:extLst>
               <a:ext uri="{FF2B5EF4-FFF2-40B4-BE49-F238E27FC236}">
+                <a16:creationId xmlns:a16="http://schemas.microsoft.com/office/drawing/2014/main" id="{4777C3CF-1BA8-4B86-9618-6AF002EB7E30}"/>
+              </a:ext>
+            </a:extLst>
+          </p:cNvPr>
+          <p:cNvSpPr>
+            <a:spLocks noGrp="1"/>
+          </p:cNvSpPr>
+          <p:nvPr>
+            <p:ph type="title"/>
+          </p:nvPr>
+        </p:nvSpPr>
+        <p:spPr/>
+        <p:txBody>
+          <a:bodyPr/>
+          <a:lstStyle/>
+          <a:p>
+            <a:r>
+              <a:rPr lang="fr-FR" dirty="0" err="1"/>
+              <a:t>Nested</a:t>
+            </a:r>
+            <a:r>
+              <a:rPr lang="fr-FR" dirty="0"/>
+              <a:t> if are for </a:t>
+            </a:r>
+            <a:r>
+              <a:rPr lang="fr-FR" dirty="0" err="1"/>
+              <a:t>fools</a:t>
+            </a:r>
+            <a:endParaRPr lang="fr-FR" dirty="0"/>
+          </a:p>
+        </p:txBody>
+      </p:sp>
+      <p:sp>
+        <p:nvSpPr>
+          <p:cNvPr id="3" name="Espace réservé du contenu 2">
+            <a:extLst>
+              <a:ext uri="{FF2B5EF4-FFF2-40B4-BE49-F238E27FC236}">
+                <a16:creationId xmlns:a16="http://schemas.microsoft.com/office/drawing/2014/main" id="{090334CA-EAF4-4FDD-9B0B-2F1A9C8333FB}"/>
+              </a:ext>
+            </a:extLst>
+          </p:cNvPr>
+          <p:cNvSpPr>
+            <a:spLocks noGrp="1"/>
+          </p:cNvSpPr>
+          <p:nvPr>
+            <p:ph idx="1"/>
+          </p:nvPr>
+        </p:nvSpPr>
+        <p:spPr/>
+        <p:txBody>
+          <a:bodyPr/>
+          <a:lstStyle/>
+          <a:p>
+            <a:r>
+              <a:rPr lang="fr-BE" dirty="0"/>
+              <a:t>Évitez &lt;</a:t>
+            </a:r>
+            <a:r>
+              <a:rPr lang="fr-BE" dirty="0" err="1"/>
+              <a:t>nested</a:t>
+            </a:r>
+            <a:r>
+              <a:rPr lang="fr-BE" dirty="0"/>
+              <a:t> if&gt;</a:t>
+            </a:r>
+            <a:endParaRPr lang="fr-FR" dirty="0"/>
+          </a:p>
+          <a:p>
+            <a:pPr lvl="1"/>
+            <a:r>
+              <a:rPr lang="fr-BE" dirty="0"/>
+              <a:t>Les </a:t>
+            </a:r>
+            <a:r>
+              <a:rPr lang="fr-BE" i="1" dirty="0"/>
+              <a:t>if</a:t>
+            </a:r>
+            <a:r>
+              <a:rPr lang="fr-BE" dirty="0"/>
+              <a:t> imbriqués diminuent la lisibilité à cause du décalage, et du </a:t>
+            </a:r>
+            <a:r>
+              <a:rPr lang="fr-BE" dirty="0" err="1"/>
+              <a:t>else</a:t>
+            </a:r>
+            <a:r>
+              <a:rPr lang="fr-BE" dirty="0"/>
+              <a:t> trop éloigné de sa condition</a:t>
+            </a:r>
+          </a:p>
+          <a:p>
+            <a:r>
+              <a:rPr lang="fr-FR" dirty="0"/>
+              <a:t>Aussi appelé le </a:t>
+            </a:r>
+            <a:r>
+              <a:rPr lang="fr-FR" dirty="0" err="1"/>
+              <a:t>gateway</a:t>
+            </a:r>
+            <a:r>
+              <a:rPr lang="fr-FR" dirty="0"/>
+              <a:t> style</a:t>
+            </a:r>
+          </a:p>
+          <a:p>
+            <a:r>
+              <a:rPr lang="fr-FR" dirty="0"/>
+              <a:t>Une fois les cas spécifique ou d’erreur écarté, nous pouvons nous concentrer sur le code business sans devoir retenir les if précédents</a:t>
+            </a:r>
+          </a:p>
+        </p:txBody>
+      </p:sp>
+    </p:spTree>
+    <p:extLst>
+      <p:ext uri="{BB962C8B-B14F-4D97-AF65-F5344CB8AC3E}">
+        <p14:creationId xmlns:p14="http://schemas.microsoft.com/office/powerpoint/2010/main" val="790854867"/>
+      </p:ext>
+    </p:extLst>
+  </p:cSld>
+  <p:clrMapOvr>
+    <a:masterClrMapping/>
+  </p:clrMapOvr>
+</p:sld>
+</file>
+
+<file path=ppt/slides/slide11.xml><?xml version="1.0" encoding="utf-8"?>
+<p:sld xmlns:a="http://schemas.openxmlformats.org/drawingml/2006/main" xmlns:r="http://schemas.openxmlformats.org/officeDocument/2006/relationships" xmlns:p="http://schemas.openxmlformats.org/presentationml/2006/main">
+  <p:cSld>
+    <p:spTree>
+      <p:nvGrpSpPr>
+        <p:cNvPr id="1" name=""/>
+        <p:cNvGrpSpPr/>
+        <p:nvPr/>
+      </p:nvGrpSpPr>
+      <p:grpSpPr>
+        <a:xfrm>
+          <a:off x="0" y="0"/>
+          <a:ext cx="0" cy="0"/>
+          <a:chOff x="0" y="0"/>
+          <a:chExt cx="0" cy="0"/>
+        </a:xfrm>
+      </p:grpSpPr>
+      <p:sp>
+        <p:nvSpPr>
+          <p:cNvPr id="2" name="Titre 1">
+            <a:extLst>
+              <a:ext uri="{FF2B5EF4-FFF2-40B4-BE49-F238E27FC236}">
                 <a16:creationId xmlns:a16="http://schemas.microsoft.com/office/drawing/2014/main" id="{6D4F9E05-D37A-4E88-923B-572C5F07ECF9}"/>
               </a:ext>
             </a:extLst>
@@ -7008,7 +7158,7 @@
 </p:sld>
 </file>
 
-<file path=ppt/slides/slide11.xml><?xml version="1.0" encoding="utf-8"?>
+<file path=ppt/slides/slide12.xml><?xml version="1.0" encoding="utf-8"?>
 <p:sld xmlns:a="http://schemas.openxmlformats.org/drawingml/2006/main" xmlns:r="http://schemas.openxmlformats.org/officeDocument/2006/relationships" xmlns:p="http://schemas.openxmlformats.org/presentationml/2006/main">
   <p:cSld>
     <p:spTree>
@@ -7095,10 +7245,10 @@
       </p:sp>
       <p:pic>
         <p:nvPicPr>
-          <p:cNvPr id="5" name="Image 4">
+          <p:cNvPr id="4" name="Image 3">
             <a:extLst>
               <a:ext uri="{FF2B5EF4-FFF2-40B4-BE49-F238E27FC236}">
-                <a16:creationId xmlns:a16="http://schemas.microsoft.com/office/drawing/2014/main" id="{D109321D-48B1-40B6-96D6-414050412385}"/>
+                <a16:creationId xmlns:a16="http://schemas.microsoft.com/office/drawing/2014/main" id="{9F5D2C0F-84C7-4797-94D5-C3732BBC6851}"/>
               </a:ext>
             </a:extLst>
           </p:cNvPr>
@@ -7115,8 +7265,8 @@
         </p:blipFill>
         <p:spPr>
           <a:xfrm>
-            <a:off x="995083" y="2682125"/>
-            <a:ext cx="4476469" cy="3720076"/>
+            <a:off x="4496299" y="2427247"/>
+            <a:ext cx="4667872" cy="3472090"/>
           </a:xfrm>
           <a:prstGeom prst="rect">
             <a:avLst/>
@@ -7136,7 +7286,7 @@
 </p:sld>
 </file>
 
-<file path=ppt/slides/slide12.xml><?xml version="1.0" encoding="utf-8"?>
+<file path=ppt/slides/slide13.xml><?xml version="1.0" encoding="utf-8"?>
 <p:sld xmlns:a="http://schemas.openxmlformats.org/drawingml/2006/main" xmlns:r="http://schemas.openxmlformats.org/officeDocument/2006/relationships" xmlns:p="http://schemas.openxmlformats.org/presentationml/2006/main">
   <p:cSld>
     <p:spTree>
@@ -7273,184 +7423,6 @@
 </p:sld>
 </file>
 
-<file path=ppt/slides/slide13.xml><?xml version="1.0" encoding="utf-8"?>
-<p:sld xmlns:a="http://schemas.openxmlformats.org/drawingml/2006/main" xmlns:r="http://schemas.openxmlformats.org/officeDocument/2006/relationships" xmlns:p="http://schemas.openxmlformats.org/presentationml/2006/main">
-  <p:cSld>
-    <p:spTree>
-      <p:nvGrpSpPr>
-        <p:cNvPr id="1" name=""/>
-        <p:cNvGrpSpPr/>
-        <p:nvPr/>
-      </p:nvGrpSpPr>
-      <p:grpSpPr>
-        <a:xfrm>
-          <a:off x="0" y="0"/>
-          <a:ext cx="0" cy="0"/>
-          <a:chOff x="0" y="0"/>
-          <a:chExt cx="0" cy="0"/>
-        </a:xfrm>
-      </p:grpSpPr>
-      <p:sp>
-        <p:nvSpPr>
-          <p:cNvPr id="2" name="Titre 1">
-            <a:extLst>
-              <a:ext uri="{FF2B5EF4-FFF2-40B4-BE49-F238E27FC236}">
-                <a16:creationId xmlns:a16="http://schemas.microsoft.com/office/drawing/2014/main" id="{57F4B6DA-48E9-4828-850D-939B1E27311A}"/>
-              </a:ext>
-            </a:extLst>
-          </p:cNvPr>
-          <p:cNvSpPr>
-            <a:spLocks noGrp="1"/>
-          </p:cNvSpPr>
-          <p:nvPr>
-            <p:ph type="title"/>
-          </p:nvPr>
-        </p:nvSpPr>
-        <p:spPr/>
-        <p:txBody>
-          <a:bodyPr/>
-          <a:lstStyle/>
-          <a:p>
-            <a:r>
-              <a:rPr lang="fr-FR" dirty="0" err="1"/>
-              <a:t>Refactoring</a:t>
-            </a:r>
-            <a:r>
-              <a:rPr lang="fr-FR" dirty="0"/>
-              <a:t> par itération</a:t>
-            </a:r>
-          </a:p>
-        </p:txBody>
-      </p:sp>
-      <p:sp>
-        <p:nvSpPr>
-          <p:cNvPr id="3" name="Espace réservé du contenu 2">
-            <a:extLst>
-              <a:ext uri="{FF2B5EF4-FFF2-40B4-BE49-F238E27FC236}">
-                <a16:creationId xmlns:a16="http://schemas.microsoft.com/office/drawing/2014/main" id="{254DCE19-13FE-4791-B71E-4FD5DC27B969}"/>
-              </a:ext>
-            </a:extLst>
-          </p:cNvPr>
-          <p:cNvSpPr>
-            <a:spLocks noGrp="1"/>
-          </p:cNvSpPr>
-          <p:nvPr>
-            <p:ph idx="1"/>
-          </p:nvPr>
-        </p:nvSpPr>
-        <p:spPr/>
-        <p:txBody>
-          <a:bodyPr/>
-          <a:lstStyle/>
-          <a:p>
-            <a:r>
-              <a:rPr lang="fr-FR" dirty="0"/>
-              <a:t>Le processus de </a:t>
-            </a:r>
-            <a:r>
-              <a:rPr lang="fr-FR" dirty="0" err="1"/>
-              <a:t>refactoring</a:t>
-            </a:r>
-            <a:r>
-              <a:rPr lang="fr-FR" dirty="0"/>
-              <a:t> est de modifier du code existant afin de le rendre plus </a:t>
-            </a:r>
-            <a:r>
-              <a:rPr lang="fr-FR" dirty="0" err="1"/>
-              <a:t>friendly</a:t>
-            </a:r>
-            <a:r>
-              <a:rPr lang="fr-FR" dirty="0"/>
-              <a:t>.</a:t>
-            </a:r>
-          </a:p>
-          <a:p>
-            <a:pPr lvl="1"/>
-            <a:r>
-              <a:rPr lang="fr-FR" dirty="0"/>
-              <a:t>En le rendant plus extensible ou plus lisible</a:t>
-            </a:r>
-          </a:p>
-          <a:p>
-            <a:r>
-              <a:rPr lang="fr-BE" dirty="0"/>
-              <a:t>Seulement si on peut faire confiance aux </a:t>
-            </a:r>
-            <a:r>
-              <a:rPr lang="fr-BE" dirty="0" err="1"/>
-              <a:t>units</a:t>
-            </a:r>
-            <a:r>
-              <a:rPr lang="fr-BE" dirty="0"/>
-              <a:t> tests</a:t>
-            </a:r>
-          </a:p>
-          <a:p>
-            <a:r>
-              <a:rPr lang="fr-BE" dirty="0"/>
-              <a:t>Boy scout </a:t>
-            </a:r>
-            <a:r>
-              <a:rPr lang="fr-BE" dirty="0" err="1"/>
-              <a:t>rule</a:t>
-            </a:r>
-            <a:r>
-              <a:rPr lang="fr-BE" dirty="0"/>
-              <a:t>: laissez l’endroit plus propre en sortant qu’en entrant</a:t>
-            </a:r>
-          </a:p>
-          <a:p>
-            <a:pPr lvl="1"/>
-            <a:r>
-              <a:rPr lang="fr-BE" dirty="0"/>
-              <a:t>Une méthode mal nommée ? N’ouvrez pas un ticket JIRA pour le modifier.</a:t>
-            </a:r>
-          </a:p>
-          <a:p>
-            <a:pPr lvl="1"/>
-            <a:r>
-              <a:rPr lang="fr-BE" dirty="0"/>
-              <a:t>Un ordre d’exécution de code illogique et non lisible ? Ne lancez pas un meeting pour en discuter à 5 développeurs. Changez l’ordre vous même.</a:t>
-            </a:r>
-          </a:p>
-          <a:p>
-            <a:r>
-              <a:rPr lang="fr-BE" dirty="0"/>
-              <a:t>N’ayez pas peur de </a:t>
-            </a:r>
-            <a:r>
-              <a:rPr lang="fr-BE" dirty="0" err="1"/>
-              <a:t>refactorer</a:t>
-            </a:r>
-            <a:r>
-              <a:rPr lang="fr-BE" dirty="0"/>
-              <a:t> ! Il vaut mieux </a:t>
-            </a:r>
-            <a:r>
-              <a:rPr lang="fr-BE" dirty="0" err="1"/>
-              <a:t>refactorer</a:t>
-            </a:r>
-            <a:r>
-              <a:rPr lang="fr-BE" dirty="0"/>
-              <a:t> que de rajouter de la logique dans un design qui ne convient pas aux nouveaux besoins.</a:t>
-            </a:r>
-            <a:endParaRPr lang="fr-FR" dirty="0"/>
-          </a:p>
-        </p:txBody>
-      </p:sp>
-    </p:spTree>
-    <p:extLst>
-      <p:ext uri="{BB962C8B-B14F-4D97-AF65-F5344CB8AC3E}">
-        <p14:creationId xmlns:p14="http://schemas.microsoft.com/office/powerpoint/2010/main" val="487566736"/>
-      </p:ext>
-    </p:extLst>
-  </p:cSld>
-  <p:clrMapOvr>
-    <a:masterClrMapping/>
-  </p:clrMapOvr>
-</p:sld>
-</file>
-
 <file path=ppt/slides/slide14.xml><?xml version="1.0" encoding="utf-8"?>
 <p:sld xmlns:a="http://schemas.openxmlformats.org/drawingml/2006/main" xmlns:r="http://schemas.openxmlformats.org/officeDocument/2006/relationships" xmlns:p="http://schemas.openxmlformats.org/presentationml/2006/main">
   <p:cSld>
@@ -7473,7 +7445,7 @@
           <p:cNvPr id="2" name="Titre 1">
             <a:extLst>
               <a:ext uri="{FF2B5EF4-FFF2-40B4-BE49-F238E27FC236}">
-                <a16:creationId xmlns:a16="http://schemas.microsoft.com/office/drawing/2014/main" id="{476215F0-8B96-4F95-B32E-44073A7F5CCF}"/>
+                <a16:creationId xmlns:a16="http://schemas.microsoft.com/office/drawing/2014/main" id="{57F4B6DA-48E9-4828-850D-939B1E27311A}"/>
               </a:ext>
             </a:extLst>
           </p:cNvPr>
@@ -7490,10 +7462,13 @@
           <a:lstStyle/>
           <a:p>
             <a:r>
-              <a:rPr lang="fr-BE" dirty="0"/>
-              <a:t>Classes</a:t>
-            </a:r>
-            <a:endParaRPr lang="fr-FR" dirty="0"/>
+              <a:rPr lang="fr-FR" dirty="0" err="1"/>
+              <a:t>Refactoring</a:t>
+            </a:r>
+            <a:r>
+              <a:rPr lang="fr-FR" dirty="0"/>
+              <a:t> par itération</a:t>
+            </a:r>
           </a:p>
         </p:txBody>
       </p:sp>
@@ -7502,7 +7477,7 @@
           <p:cNvPr id="3" name="Espace réservé du contenu 2">
             <a:extLst>
               <a:ext uri="{FF2B5EF4-FFF2-40B4-BE49-F238E27FC236}">
-                <a16:creationId xmlns:a16="http://schemas.microsoft.com/office/drawing/2014/main" id="{068C7292-1B12-4A77-AF94-4011D46ACEB6}"/>
+                <a16:creationId xmlns:a16="http://schemas.microsoft.com/office/drawing/2014/main" id="{254DCE19-13FE-4791-B71E-4FD5DC27B969}"/>
               </a:ext>
             </a:extLst>
           </p:cNvPr>
@@ -7519,133 +7494,97 @@
           <a:lstStyle/>
           <a:p>
             <a:r>
-              <a:rPr lang="fr-BE" dirty="0"/>
-              <a:t>Doit faire qu’une seule chose (SRP)</a:t>
-            </a:r>
-          </a:p>
-          <a:p>
-            <a:r>
-              <a:rPr lang="fr-BE" dirty="0"/>
-              <a:t>Doit faire abstraction (Interfaces)</a:t>
+              <a:rPr lang="fr-FR" dirty="0"/>
+              <a:t>Le processus de </a:t>
+            </a:r>
+            <a:r>
+              <a:rPr lang="fr-FR" dirty="0" err="1"/>
+              <a:t>refactoring</a:t>
+            </a:r>
+            <a:r>
+              <a:rPr lang="fr-FR" dirty="0"/>
+              <a:t> est de modifier du code existant afin de le rendre plus </a:t>
+            </a:r>
+            <a:r>
+              <a:rPr lang="fr-FR" dirty="0" err="1"/>
+              <a:t>friendly</a:t>
+            </a:r>
+            <a:r>
+              <a:rPr lang="fr-FR" dirty="0"/>
+              <a:t>.</a:t>
             </a:r>
           </a:p>
           <a:p>
             <a:pPr lvl="1"/>
             <a:r>
-              <a:rPr lang="fr-BE" dirty="0"/>
-              <a:t>Prenez exemple sur le </a:t>
+              <a:rPr lang="fr-FR" dirty="0"/>
+              <a:t>En le rendant plus extensible ou plus lisible</a:t>
+            </a:r>
+          </a:p>
+          <a:p>
+            <a:r>
+              <a:rPr lang="fr-BE" dirty="0"/>
+              <a:t>Seulement si on peut faire confiance aux </a:t>
             </a:r>
             <a:r>
               <a:rPr lang="fr-BE" dirty="0" err="1"/>
-              <a:t>serializer</a:t>
-            </a:r>
-            <a:r>
-              <a:rPr lang="fr-BE" dirty="0"/>
-              <a:t> xml</a:t>
-            </a:r>
-            <a:br>
-              <a:rPr lang="fr-FR" dirty="0"/>
-            </a:br>
-            <a:r>
-              <a:rPr lang="en-US" dirty="0">
-                <a:hlinkClick r:id="rId2"/>
-              </a:rPr>
-              <a:t>https://github.com/Microsoft/referencesource/blob/master/System.Xml/System/Xml/Serialization/XmlSerializer.cs</a:t>
-            </a:r>
-            <a:br>
-              <a:rPr lang="en-US" dirty="0"/>
-            </a:br>
-            <a:r>
-              <a:rPr lang="en-US" dirty="0" err="1"/>
-              <a:t>XmlSerializer</a:t>
-            </a:r>
-            <a:r>
-              <a:rPr lang="en-US" dirty="0"/>
-              <a:t> </a:t>
-            </a:r>
-            <a:r>
-              <a:rPr lang="en-US" dirty="0" err="1"/>
-              <a:t>décrit</a:t>
-            </a:r>
-            <a:r>
-              <a:rPr lang="en-US" dirty="0"/>
-              <a:t> comment interpreter un </a:t>
-            </a:r>
-            <a:r>
-              <a:rPr lang="en-US" dirty="0" err="1"/>
-              <a:t>objet</a:t>
-            </a:r>
-            <a:r>
-              <a:rPr lang="en-US" dirty="0"/>
-              <a:t> </a:t>
-            </a:r>
-            <a:r>
-              <a:rPr lang="en-US" dirty="0" err="1"/>
-              <a:t>en</a:t>
-            </a:r>
-            <a:r>
-              <a:rPr lang="en-US" dirty="0"/>
-              <a:t> entrée</a:t>
-            </a:r>
-            <a:br>
-              <a:rPr lang="en-US" dirty="0"/>
-            </a:br>
-            <a:r>
-              <a:rPr lang="en-US" dirty="0" err="1"/>
-              <a:t>XmlTextWriter</a:t>
-            </a:r>
-            <a:r>
-              <a:rPr lang="en-US" dirty="0"/>
-              <a:t> </a:t>
-            </a:r>
-            <a:r>
-              <a:rPr lang="en-US" dirty="0" err="1"/>
-              <a:t>est</a:t>
-            </a:r>
-            <a:r>
-              <a:rPr lang="en-US" dirty="0"/>
-              <a:t> responsible de </a:t>
-            </a:r>
-            <a:r>
-              <a:rPr lang="en-US" dirty="0" err="1"/>
-              <a:t>l’écriture</a:t>
-            </a:r>
-            <a:r>
-              <a:rPr lang="en-US" dirty="0"/>
-              <a:t>, et comment </a:t>
-            </a:r>
-            <a:r>
-              <a:rPr lang="en-US" dirty="0" err="1"/>
-              <a:t>il</a:t>
-            </a:r>
-            <a:r>
-              <a:rPr lang="en-US" dirty="0"/>
-              <a:t> </a:t>
-            </a:r>
-            <a:r>
-              <a:rPr lang="en-US" dirty="0" err="1"/>
-              <a:t>est</a:t>
-            </a:r>
-            <a:r>
-              <a:rPr lang="en-US" dirty="0"/>
-              <a:t> </a:t>
-            </a:r>
-            <a:r>
-              <a:rPr lang="en-US" dirty="0" err="1"/>
-              <a:t>écrit</a:t>
-            </a:r>
-            <a:r>
-              <a:rPr lang="en-US" dirty="0"/>
-              <a:t>.</a:t>
-            </a:r>
-            <a:endParaRPr lang="fr-BE" dirty="0"/>
+              <a:t>units</a:t>
+            </a:r>
+            <a:r>
+              <a:rPr lang="fr-BE" dirty="0"/>
+              <a:t> tests</a:t>
+            </a:r>
+          </a:p>
+          <a:p>
+            <a:r>
+              <a:rPr lang="fr-BE" dirty="0"/>
+              <a:t>Boy scout </a:t>
+            </a:r>
+            <a:r>
+              <a:rPr lang="fr-BE" dirty="0" err="1"/>
+              <a:t>rule</a:t>
+            </a:r>
+            <a:r>
+              <a:rPr lang="fr-BE" dirty="0"/>
+              <a:t>: laissez l’endroit plus propre en sortant qu’en entrant</a:t>
+            </a:r>
+          </a:p>
+          <a:p>
+            <a:pPr lvl="1"/>
+            <a:r>
+              <a:rPr lang="fr-BE" dirty="0"/>
+              <a:t>Un ordre d’exécution de code illogique et non lisible ? Ne lancez pas un meeting pour en discuter à 5 développeurs. Changez l’ordre vous même.</a:t>
+            </a:r>
+          </a:p>
+          <a:p>
+            <a:r>
+              <a:rPr lang="fr-BE" dirty="0"/>
+              <a:t>N’ayez pas peur de </a:t>
+            </a:r>
+            <a:r>
+              <a:rPr lang="fr-BE" dirty="0" err="1"/>
+              <a:t>refactorer</a:t>
+            </a:r>
+            <a:r>
+              <a:rPr lang="fr-BE" dirty="0"/>
+              <a:t> ! Il vaut mieux </a:t>
+            </a:r>
+            <a:r>
+              <a:rPr lang="fr-BE" dirty="0" err="1"/>
+              <a:t>refactorer</a:t>
+            </a:r>
+            <a:r>
+              <a:rPr lang="fr-BE" dirty="0"/>
+              <a:t> que de rajouter de la logique dans un design qui ne convient pas aux nouveaux besoins.</a:t>
+            </a:r>
+            <a:endParaRPr lang="fr-FR" dirty="0"/>
           </a:p>
         </p:txBody>
       </p:sp>
     </p:spTree>
     <p:extLst>
       <p:ext uri="{BB962C8B-B14F-4D97-AF65-F5344CB8AC3E}">
-        <p14:creationId xmlns:p14="http://schemas.microsoft.com/office/powerpoint/2010/main" val="1061946456"/>
+        <p14:creationId xmlns:p14="http://schemas.microsoft.com/office/powerpoint/2010/main" val="487566736"/>
       </p:ext>
     </p:extLst>
   </p:cSld>
@@ -7677,7 +7616,7 @@
           <p:cNvPr id="2" name="Titre 1">
             <a:extLst>
               <a:ext uri="{FF2B5EF4-FFF2-40B4-BE49-F238E27FC236}">
-                <a16:creationId xmlns:a16="http://schemas.microsoft.com/office/drawing/2014/main" id="{48C712FB-944A-4745-A5DF-D6FB5112DD5E}"/>
+                <a16:creationId xmlns:a16="http://schemas.microsoft.com/office/drawing/2014/main" id="{476215F0-8B96-4F95-B32E-44073A7F5CCF}"/>
               </a:ext>
             </a:extLst>
           </p:cNvPr>
@@ -7694,9 +7633,10 @@
           <a:lstStyle/>
           <a:p>
             <a:r>
-              <a:rPr lang="fr-FR" dirty="0"/>
-              <a:t>Fonctions et méthodes</a:t>
-            </a:r>
+              <a:rPr lang="fr-BE" dirty="0"/>
+              <a:t>Classes</a:t>
+            </a:r>
+            <a:endParaRPr lang="fr-FR" dirty="0"/>
           </a:p>
         </p:txBody>
       </p:sp>
@@ -7705,7 +7645,7 @@
           <p:cNvPr id="3" name="Espace réservé du contenu 2">
             <a:extLst>
               <a:ext uri="{FF2B5EF4-FFF2-40B4-BE49-F238E27FC236}">
-                <a16:creationId xmlns:a16="http://schemas.microsoft.com/office/drawing/2014/main" id="{69346411-177B-4F2D-B384-2D5C9000B5AD}"/>
+                <a16:creationId xmlns:a16="http://schemas.microsoft.com/office/drawing/2014/main" id="{068C7292-1B12-4A77-AF94-4011D46ACEB6}"/>
               </a:ext>
             </a:extLst>
           </p:cNvPr>
@@ -7722,62 +7662,76 @@
           <a:lstStyle/>
           <a:p>
             <a:r>
-              <a:rPr lang="fr-FR" dirty="0"/>
-              <a:t>Les fonctions doivent être courtes</a:t>
-            </a:r>
-          </a:p>
-          <a:p>
-            <a:r>
-              <a:rPr lang="fr-FR" dirty="0"/>
-              <a:t>Pas de </a:t>
-            </a:r>
-            <a:r>
-              <a:rPr lang="fr-FR" dirty="0" err="1"/>
-              <a:t>side</a:t>
-            </a:r>
-            <a:r>
-              <a:rPr lang="fr-FR" dirty="0"/>
-              <a:t> </a:t>
-            </a:r>
-            <a:r>
-              <a:rPr lang="fr-FR" dirty="0" err="1"/>
-              <a:t>effects</a:t>
-            </a:r>
-            <a:endParaRPr lang="fr-FR" dirty="0"/>
+              <a:rPr lang="fr-BE" dirty="0"/>
+              <a:t>Doit faire qu’une seule chose (SRP), ou se limiter a un minimum de responsabilité</a:t>
+            </a:r>
           </a:p>
           <a:p>
             <a:pPr lvl="1"/>
             <a:r>
-              <a:rPr lang="fr-FR" dirty="0"/>
-              <a:t>Une fonction doit faire une et une unique chose. Tout ce qui est superflu est malvenu</a:t>
-            </a:r>
-          </a:p>
-          <a:p>
-            <a:r>
-              <a:rPr lang="fr-FR" dirty="0"/>
-              <a:t>Le moins d’argument possible</a:t>
-            </a:r>
-          </a:p>
-          <a:p>
-            <a:r>
-              <a:rPr lang="fr-BE" dirty="0"/>
-              <a:t>R</a:t>
-            </a:r>
-            <a:r>
-              <a:rPr lang="fr-FR" dirty="0" err="1"/>
-              <a:t>ègle</a:t>
-            </a:r>
-            <a:r>
-              <a:rPr lang="fr-FR" dirty="0"/>
-              <a:t> des 10 secondes: Si on ne peut pas comprendre en 10 secondes ce que fait une fonction, elle est trop compliquée</a:t>
-            </a:r>
+              <a:rPr lang="fr-BE" dirty="0"/>
+              <a:t>Ne comptez pas les lignes. Comptez les responsabilités.</a:t>
+            </a:r>
+          </a:p>
+          <a:p>
+            <a:r>
+              <a:rPr lang="fr-BE" dirty="0"/>
+              <a:t>Doit faire abstraction (Interfaces), et avoir un faible couplement</a:t>
+            </a:r>
+          </a:p>
+          <a:p>
+            <a:pPr lvl="1"/>
+            <a:r>
+              <a:rPr lang="fr-BE" dirty="0"/>
+              <a:t>Un </a:t>
+            </a:r>
+            <a:r>
+              <a:rPr lang="fr-BE" dirty="0" err="1"/>
+              <a:t>sérializer</a:t>
+            </a:r>
+            <a:r>
+              <a:rPr lang="fr-BE" dirty="0"/>
+              <a:t> doit savoir </a:t>
+            </a:r>
+            <a:r>
+              <a:rPr lang="fr-BE" dirty="0" err="1"/>
+              <a:t>sérializer</a:t>
+            </a:r>
+            <a:r>
+              <a:rPr lang="fr-BE" dirty="0"/>
+              <a:t> n’importe quel type d’objet</a:t>
+            </a:r>
+          </a:p>
+          <a:p>
+            <a:r>
+              <a:rPr lang="fr-BE" dirty="0"/>
+              <a:t>Doit avoir une grande cohésion</a:t>
+            </a:r>
+          </a:p>
+          <a:p>
+            <a:pPr lvl="1"/>
+            <a:r>
+              <a:rPr lang="fr-BE" dirty="0"/>
+              <a:t>Un </a:t>
+            </a:r>
+            <a:r>
+              <a:rPr lang="fr-BE" dirty="0" err="1"/>
+              <a:t>sérializer</a:t>
+            </a:r>
+            <a:r>
+              <a:rPr lang="fr-BE" dirty="0"/>
+              <a:t> doit utiliser au maximum ses outils interne</a:t>
+            </a:r>
+          </a:p>
+          <a:p>
+            <a:endParaRPr lang="fr-BE" dirty="0"/>
           </a:p>
         </p:txBody>
       </p:sp>
     </p:spTree>
     <p:extLst>
       <p:ext uri="{BB962C8B-B14F-4D97-AF65-F5344CB8AC3E}">
-        <p14:creationId xmlns:p14="http://schemas.microsoft.com/office/powerpoint/2010/main" val="2098087113"/>
+        <p14:creationId xmlns:p14="http://schemas.microsoft.com/office/powerpoint/2010/main" val="1061946456"/>
       </p:ext>
     </p:extLst>
   </p:cSld>
@@ -7809,7 +7763,7 @@
           <p:cNvPr id="2" name="Titre 1">
             <a:extLst>
               <a:ext uri="{FF2B5EF4-FFF2-40B4-BE49-F238E27FC236}">
-                <a16:creationId xmlns:a16="http://schemas.microsoft.com/office/drawing/2014/main" id="{CF98D8E5-F87E-45C1-9892-03634FDE4A8E}"/>
+                <a16:creationId xmlns:a16="http://schemas.microsoft.com/office/drawing/2014/main" id="{48C712FB-944A-4745-A5DF-D6FB5112DD5E}"/>
               </a:ext>
             </a:extLst>
           </p:cNvPr>
@@ -7827,13 +7781,8 @@
           <a:p>
             <a:r>
               <a:rPr lang="fr-FR" dirty="0"/>
-              <a:t>Exceptions over </a:t>
-            </a:r>
-            <a:r>
-              <a:rPr lang="fr-FR" dirty="0" err="1"/>
-              <a:t>ErrorCode</a:t>
-            </a:r>
-            <a:endParaRPr lang="fr-FR" dirty="0"/>
+              <a:t>Fonctions et méthodes</a:t>
+            </a:r>
           </a:p>
         </p:txBody>
       </p:sp>
@@ -7842,7 +7791,7 @@
           <p:cNvPr id="3" name="Espace réservé du contenu 2">
             <a:extLst>
               <a:ext uri="{FF2B5EF4-FFF2-40B4-BE49-F238E27FC236}">
-                <a16:creationId xmlns:a16="http://schemas.microsoft.com/office/drawing/2014/main" id="{0108E065-6979-440C-9F8A-591E638116D6}"/>
+                <a16:creationId xmlns:a16="http://schemas.microsoft.com/office/drawing/2014/main" id="{69346411-177B-4F2D-B384-2D5C9000B5AD}"/>
               </a:ext>
             </a:extLst>
           </p:cNvPr>
@@ -7855,52 +7804,91 @@
         </p:nvSpPr>
         <p:spPr/>
         <p:txBody>
-          <a:bodyPr/>
+          <a:bodyPr>
+            <a:normAutofit lnSpcReduction="10000"/>
+          </a:bodyPr>
           <a:lstStyle/>
           <a:p>
             <a:r>
               <a:rPr lang="fr-FR" dirty="0"/>
-              <a:t>Si quelque chose d’inachevable arrive, préférez renvoyer une exception plutôt que de renvoyer en résultat un code d’erreur.</a:t>
+              <a:t>Les fonctions doivent être courtes</a:t>
             </a:r>
           </a:p>
           <a:p>
             <a:r>
               <a:rPr lang="fr-FR" dirty="0"/>
-              <a:t>Qui a déjà vu un </a:t>
+              <a:t>Un minimum d’effet de bord</a:t>
+            </a:r>
+          </a:p>
+          <a:p>
+            <a:pPr lvl="1"/>
+            <a:r>
+              <a:rPr lang="fr-FR" dirty="0"/>
+              <a:t>Faites un maximum de fonction pures. </a:t>
+            </a:r>
+          </a:p>
+          <a:p>
+            <a:pPr lvl="2"/>
+            <a:r>
+              <a:rPr lang="fr-FR" dirty="0"/>
+              <a:t>Ne dépend que des argument</a:t>
+            </a:r>
+          </a:p>
+          <a:p>
+            <a:pPr lvl="2"/>
+            <a:r>
+              <a:rPr lang="fr-FR" dirty="0"/>
+              <a:t>Ne modifie aucun autre </a:t>
             </a:r>
             <a:r>
               <a:rPr lang="fr-FR" dirty="0" err="1"/>
-              <a:t>HttpStatus</a:t>
+              <a:t>object</a:t>
             </a:r>
             <a:r>
               <a:rPr lang="fr-FR" dirty="0"/>
-              <a:t> 200 avec un code d’erreur en body ? </a:t>
+              <a:t>/valeur/structure</a:t>
             </a:r>
           </a:p>
           <a:p>
             <a:pPr lvl="1"/>
             <a:r>
               <a:rPr lang="fr-FR" dirty="0"/>
-              <a:t>L’occasion d’interpréter facilement une réponse est ratée. Un </a:t>
+              <a:t>Une fonction doit faire une et une unique chose. Tout ce qui est superflu est malvenu</a:t>
+            </a:r>
+          </a:p>
+          <a:p>
+            <a:r>
+              <a:rPr lang="fr-FR" dirty="0"/>
+              <a:t>Le moins d’argument possible</a:t>
+            </a:r>
+          </a:p>
+          <a:p>
+            <a:pPr lvl="1"/>
+            <a:r>
+              <a:rPr lang="fr-FR" dirty="0"/>
+              <a:t>0 est excellent. 1 est ok. 2 doivent avoir une bonne raison. 3 ou plus doivent être validé par le pape.</a:t>
+            </a:r>
+          </a:p>
+          <a:p>
+            <a:r>
+              <a:rPr lang="fr-BE" dirty="0"/>
+              <a:t>R</a:t>
             </a:r>
             <a:r>
               <a:rPr lang="fr-FR" dirty="0" err="1"/>
-              <a:t>parsing</a:t>
+              <a:t>ègle</a:t>
             </a:r>
             <a:r>
               <a:rPr lang="fr-FR" dirty="0"/>
-              <a:t> devient obligatoire dans une couche qui n’en a aucun autre besoin.</a:t>
-            </a:r>
-          </a:p>
-          <a:p>
-            <a:endParaRPr lang="fr-FR" dirty="0"/>
+              <a:t> des 10 secondes: Si on ne peut pas comprendre en 10 secondes ce que fait une fonction, elle est trop compliquée</a:t>
+            </a:r>
           </a:p>
         </p:txBody>
       </p:sp>
     </p:spTree>
     <p:extLst>
       <p:ext uri="{BB962C8B-B14F-4D97-AF65-F5344CB8AC3E}">
-        <p14:creationId xmlns:p14="http://schemas.microsoft.com/office/powerpoint/2010/main" val="1306852992"/>
+        <p14:creationId xmlns:p14="http://schemas.microsoft.com/office/powerpoint/2010/main" val="2098087113"/>
       </p:ext>
     </p:extLst>
   </p:cSld>
@@ -7932,7 +7920,7 @@
           <p:cNvPr id="2" name="Titre 1">
             <a:extLst>
               <a:ext uri="{FF2B5EF4-FFF2-40B4-BE49-F238E27FC236}">
-                <a16:creationId xmlns:a16="http://schemas.microsoft.com/office/drawing/2014/main" id="{DE1664DD-B4F7-4020-BE92-2A58A05A38B1}"/>
+                <a16:creationId xmlns:a16="http://schemas.microsoft.com/office/drawing/2014/main" id="{AA219D52-9079-4351-AA6F-5FFF4F1658BA}"/>
               </a:ext>
             </a:extLst>
           </p:cNvPr>
@@ -7950,9 +7938,9 @@
           <a:p>
             <a:r>
               <a:rPr lang="fr-BE" dirty="0"/>
-              <a:t>Abstraction</a:t>
-            </a:r>
-            <a:endParaRPr lang="fr-FR" dirty="0"/>
+              <a:t>Relier physiquement les objets proches	</a:t>
+            </a:r>
+            <a:endParaRPr lang="en-GB" dirty="0"/>
           </a:p>
         </p:txBody>
       </p:sp>
@@ -7961,7 +7949,7 @@
           <p:cNvPr id="3" name="Espace réservé du contenu 2">
             <a:extLst>
               <a:ext uri="{FF2B5EF4-FFF2-40B4-BE49-F238E27FC236}">
-                <a16:creationId xmlns:a16="http://schemas.microsoft.com/office/drawing/2014/main" id="{6A14E086-54B0-42A3-90BA-DE32F034CF5E}"/>
+                <a16:creationId xmlns:a16="http://schemas.microsoft.com/office/drawing/2014/main" id="{2E9B418F-BF5A-42B9-B303-A44044C41AC3}"/>
               </a:ext>
             </a:extLst>
           </p:cNvPr>
@@ -7979,28 +7967,48 @@
           <a:p>
             <a:r>
               <a:rPr lang="fr-BE" dirty="0"/>
-              <a:t>Une méthode ne doit pas savoir comment ni par qui elle est appelée</a:t>
-            </a:r>
-          </a:p>
-          <a:p>
-            <a:r>
-              <a:rPr lang="fr-BE" dirty="0"/>
-              <a:t>Une méthode ne doit pas connaitre comment fonctionne ses dépendances</a:t>
-            </a:r>
-          </a:p>
-          <a:p>
-            <a:r>
-              <a:rPr lang="fr-BE" dirty="0"/>
-              <a:t>S’applique en architecture logiciel</a:t>
-            </a:r>
-            <a:endParaRPr lang="fr-FR" dirty="0"/>
-          </a:p>
-        </p:txBody>
-      </p:sp>
+              <a:t>Lier ce qui est attaché dans le monde réel dans le code.</a:t>
+            </a:r>
+          </a:p>
+          <a:p>
+            <a:endParaRPr lang="fr-BE" dirty="0"/>
+          </a:p>
+        </p:txBody>
+      </p:sp>
+      <p:pic>
+        <p:nvPicPr>
+          <p:cNvPr id="4" name="Image 3">
+            <a:extLst>
+              <a:ext uri="{FF2B5EF4-FFF2-40B4-BE49-F238E27FC236}">
+                <a16:creationId xmlns:a16="http://schemas.microsoft.com/office/drawing/2014/main" id="{D91095BF-D649-45B2-A96D-D53A75EFD902}"/>
+              </a:ext>
+            </a:extLst>
+          </p:cNvPr>
+          <p:cNvPicPr>
+            <a:picLocks noChangeAspect="1"/>
+          </p:cNvPicPr>
+          <p:nvPr/>
+        </p:nvPicPr>
+        <p:blipFill>
+          <a:blip r:embed="rId2"/>
+          <a:stretch>
+            <a:fillRect/>
+          </a:stretch>
+        </p:blipFill>
+        <p:spPr>
+          <a:xfrm>
+            <a:off x="1297676" y="2751985"/>
+            <a:ext cx="7355984" cy="3496415"/>
+          </a:xfrm>
+          <a:prstGeom prst="rect">
+            <a:avLst/>
+          </a:prstGeom>
+        </p:spPr>
+      </p:pic>
     </p:spTree>
     <p:extLst>
       <p:ext uri="{BB962C8B-B14F-4D97-AF65-F5344CB8AC3E}">
-        <p14:creationId xmlns:p14="http://schemas.microsoft.com/office/powerpoint/2010/main" val="3520938063"/>
+        <p14:creationId xmlns:p14="http://schemas.microsoft.com/office/powerpoint/2010/main" val="847528560"/>
       </p:ext>
     </p:extLst>
   </p:cSld>
@@ -8032,6 +8040,485 @@
           <p:cNvPr id="2" name="Titre 1">
             <a:extLst>
               <a:ext uri="{FF2B5EF4-FFF2-40B4-BE49-F238E27FC236}">
+                <a16:creationId xmlns:a16="http://schemas.microsoft.com/office/drawing/2014/main" id="{8BB893B9-03F9-4468-BA37-A4F9D33E3477}"/>
+              </a:ext>
+            </a:extLst>
+          </p:cNvPr>
+          <p:cNvSpPr>
+            <a:spLocks noGrp="1"/>
+          </p:cNvSpPr>
+          <p:nvPr>
+            <p:ph type="title"/>
+          </p:nvPr>
+        </p:nvSpPr>
+        <p:spPr/>
+        <p:txBody>
+          <a:bodyPr/>
+          <a:lstStyle/>
+          <a:p>
+            <a:r>
+              <a:rPr lang="fr-FR" dirty="0"/>
+              <a:t>Fonctions et méthodes (suite).</a:t>
+            </a:r>
+            <a:br>
+              <a:rPr lang="fr-FR" dirty="0"/>
+            </a:br>
+            <a:r>
+              <a:rPr lang="fr-FR" dirty="0"/>
+              <a:t>Règles extrêmes ?</a:t>
+            </a:r>
+            <a:endParaRPr lang="en-GB" dirty="0"/>
+          </a:p>
+        </p:txBody>
+      </p:sp>
+      <p:sp>
+        <p:nvSpPr>
+          <p:cNvPr id="3" name="Espace réservé du contenu 2">
+            <a:extLst>
+              <a:ext uri="{FF2B5EF4-FFF2-40B4-BE49-F238E27FC236}">
+                <a16:creationId xmlns:a16="http://schemas.microsoft.com/office/drawing/2014/main" id="{F880C207-8512-472A-8056-DC1286119BA3}"/>
+              </a:ext>
+            </a:extLst>
+          </p:cNvPr>
+          <p:cNvSpPr>
+            <a:spLocks noGrp="1"/>
+          </p:cNvSpPr>
+          <p:nvPr>
+            <p:ph idx="1"/>
+          </p:nvPr>
+        </p:nvSpPr>
+        <p:spPr/>
+        <p:txBody>
+          <a:bodyPr/>
+          <a:lstStyle/>
+          <a:p>
+            <a:r>
+              <a:rPr lang="fr-BE" dirty="0"/>
+              <a:t>Ces règles sont extrêmes</a:t>
+            </a:r>
+            <a:endParaRPr lang="en-GB" dirty="0"/>
+          </a:p>
+        </p:txBody>
+      </p:sp>
+    </p:spTree>
+    <p:extLst>
+      <p:ext uri="{BB962C8B-B14F-4D97-AF65-F5344CB8AC3E}">
+        <p14:creationId xmlns:p14="http://schemas.microsoft.com/office/powerpoint/2010/main" val="2795573043"/>
+      </p:ext>
+    </p:extLst>
+  </p:cSld>
+  <p:clrMapOvr>
+    <a:masterClrMapping/>
+  </p:clrMapOvr>
+</p:sld>
+</file>
+
+<file path=ppt/slides/slide19.xml><?xml version="1.0" encoding="utf-8"?>
+<p:sld xmlns:a="http://schemas.openxmlformats.org/drawingml/2006/main" xmlns:r="http://schemas.openxmlformats.org/officeDocument/2006/relationships" xmlns:p="http://schemas.openxmlformats.org/presentationml/2006/main">
+  <p:cSld>
+    <p:spTree>
+      <p:nvGrpSpPr>
+        <p:cNvPr id="1" name=""/>
+        <p:cNvGrpSpPr/>
+        <p:nvPr/>
+      </p:nvGrpSpPr>
+      <p:grpSpPr>
+        <a:xfrm>
+          <a:off x="0" y="0"/>
+          <a:ext cx="0" cy="0"/>
+          <a:chOff x="0" y="0"/>
+          <a:chExt cx="0" cy="0"/>
+        </a:xfrm>
+      </p:grpSpPr>
+      <p:sp>
+        <p:nvSpPr>
+          <p:cNvPr id="2" name="Titre 1">
+            <a:extLst>
+              <a:ext uri="{FF2B5EF4-FFF2-40B4-BE49-F238E27FC236}">
+                <a16:creationId xmlns:a16="http://schemas.microsoft.com/office/drawing/2014/main" id="{CF98D8E5-F87E-45C1-9892-03634FDE4A8E}"/>
+              </a:ext>
+            </a:extLst>
+          </p:cNvPr>
+          <p:cNvSpPr>
+            <a:spLocks noGrp="1"/>
+          </p:cNvSpPr>
+          <p:nvPr>
+            <p:ph type="title"/>
+          </p:nvPr>
+        </p:nvSpPr>
+        <p:spPr/>
+        <p:txBody>
+          <a:bodyPr/>
+          <a:lstStyle/>
+          <a:p>
+            <a:r>
+              <a:rPr lang="fr-FR" dirty="0"/>
+              <a:t>Exceptions over </a:t>
+            </a:r>
+            <a:r>
+              <a:rPr lang="fr-FR" dirty="0" err="1"/>
+              <a:t>ErrorCode</a:t>
+            </a:r>
+            <a:endParaRPr lang="fr-FR" dirty="0"/>
+          </a:p>
+        </p:txBody>
+      </p:sp>
+      <p:sp>
+        <p:nvSpPr>
+          <p:cNvPr id="3" name="Espace réservé du contenu 2">
+            <a:extLst>
+              <a:ext uri="{FF2B5EF4-FFF2-40B4-BE49-F238E27FC236}">
+                <a16:creationId xmlns:a16="http://schemas.microsoft.com/office/drawing/2014/main" id="{0108E065-6979-440C-9F8A-591E638116D6}"/>
+              </a:ext>
+            </a:extLst>
+          </p:cNvPr>
+          <p:cNvSpPr>
+            <a:spLocks noGrp="1"/>
+          </p:cNvSpPr>
+          <p:nvPr>
+            <p:ph idx="1"/>
+          </p:nvPr>
+        </p:nvSpPr>
+        <p:spPr/>
+        <p:txBody>
+          <a:bodyPr/>
+          <a:lstStyle/>
+          <a:p>
+            <a:r>
+              <a:rPr lang="fr-FR" dirty="0"/>
+              <a:t>Si quelque chose d’inachevable arrive, préférez renvoyer une exception plutôt que de renvoyer en résultat un code d’erreur.</a:t>
+            </a:r>
+          </a:p>
+          <a:p>
+            <a:pPr lvl="1"/>
+            <a:r>
+              <a:rPr lang="fr-FR" dirty="0"/>
+              <a:t>Parfois un objet d’erreur est la bienvenu si</a:t>
+            </a:r>
+          </a:p>
+          <a:p>
+            <a:pPr lvl="2"/>
+            <a:r>
+              <a:rPr lang="fr-FR" dirty="0"/>
+              <a:t>Les performances sont critiques</a:t>
+            </a:r>
+          </a:p>
+          <a:p>
+            <a:pPr lvl="2"/>
+            <a:r>
+              <a:rPr lang="fr-FR" dirty="0"/>
+              <a:t>Si une erreur arrive souvent (rejoint un flow business)</a:t>
+            </a:r>
+          </a:p>
+          <a:p>
+            <a:r>
+              <a:rPr lang="fr-FR" dirty="0"/>
+              <a:t>Utilisez les conventions et gestion d’exception à disposition</a:t>
+            </a:r>
+          </a:p>
+          <a:p>
+            <a:pPr lvl="1"/>
+            <a:r>
+              <a:rPr lang="fr-FR" dirty="0"/>
+              <a:t>http </a:t>
+            </a:r>
+            <a:r>
+              <a:rPr lang="fr-FR" dirty="0" err="1"/>
+              <a:t>status</a:t>
+            </a:r>
+            <a:endParaRPr lang="fr-FR" dirty="0"/>
+          </a:p>
+          <a:p>
+            <a:pPr lvl="1"/>
+            <a:r>
+              <a:rPr lang="fr-FR" dirty="0" err="1"/>
+              <a:t>Error</a:t>
+            </a:r>
+            <a:r>
+              <a:rPr lang="fr-FR" dirty="0"/>
+              <a:t> position dans la réponse en go</a:t>
+            </a:r>
+          </a:p>
+          <a:p>
+            <a:pPr lvl="1"/>
+            <a:r>
+              <a:rPr lang="fr-FR" dirty="0"/>
+              <a:t>Try catch dans la majorité des </a:t>
+            </a:r>
+            <a:r>
+              <a:rPr lang="fr-FR" dirty="0" err="1"/>
+              <a:t>languages</a:t>
+            </a:r>
+            <a:endParaRPr lang="fr-FR" dirty="0"/>
+          </a:p>
+        </p:txBody>
+      </p:sp>
+    </p:spTree>
+    <p:extLst>
+      <p:ext uri="{BB962C8B-B14F-4D97-AF65-F5344CB8AC3E}">
+        <p14:creationId xmlns:p14="http://schemas.microsoft.com/office/powerpoint/2010/main" val="1306852992"/>
+      </p:ext>
+    </p:extLst>
+  </p:cSld>
+  <p:clrMapOvr>
+    <a:masterClrMapping/>
+  </p:clrMapOvr>
+</p:sld>
+</file>
+
+<file path=ppt/slides/slide2.xml><?xml version="1.0" encoding="utf-8"?>
+<p:sld xmlns:a="http://schemas.openxmlformats.org/drawingml/2006/main" xmlns:r="http://schemas.openxmlformats.org/officeDocument/2006/relationships" xmlns:p="http://schemas.openxmlformats.org/presentationml/2006/main">
+  <p:cSld>
+    <p:spTree>
+      <p:nvGrpSpPr>
+        <p:cNvPr id="1" name=""/>
+        <p:cNvGrpSpPr/>
+        <p:nvPr/>
+      </p:nvGrpSpPr>
+      <p:grpSpPr>
+        <a:xfrm>
+          <a:off x="0" y="0"/>
+          <a:ext cx="0" cy="0"/>
+          <a:chOff x="0" y="0"/>
+          <a:chExt cx="0" cy="0"/>
+        </a:xfrm>
+      </p:grpSpPr>
+      <p:sp>
+        <p:nvSpPr>
+          <p:cNvPr id="2" name="Titre 1">
+            <a:extLst>
+              <a:ext uri="{FF2B5EF4-FFF2-40B4-BE49-F238E27FC236}">
+                <a16:creationId xmlns:a16="http://schemas.microsoft.com/office/drawing/2014/main" id="{731E7863-2D70-44AD-BB81-4687E4532035}"/>
+              </a:ext>
+            </a:extLst>
+          </p:cNvPr>
+          <p:cNvSpPr>
+            <a:spLocks noGrp="1"/>
+          </p:cNvSpPr>
+          <p:nvPr>
+            <p:ph type="title"/>
+          </p:nvPr>
+        </p:nvSpPr>
+        <p:spPr/>
+        <p:txBody>
+          <a:bodyPr/>
+          <a:lstStyle/>
+          <a:p>
+            <a:r>
+              <a:rPr lang="fr-BE" dirty="0"/>
+              <a:t>About me</a:t>
+            </a:r>
+            <a:endParaRPr lang="fr-FR" dirty="0"/>
+          </a:p>
+        </p:txBody>
+      </p:sp>
+      <p:sp>
+        <p:nvSpPr>
+          <p:cNvPr id="3" name="Espace réservé du contenu 2">
+            <a:extLst>
+              <a:ext uri="{FF2B5EF4-FFF2-40B4-BE49-F238E27FC236}">
+                <a16:creationId xmlns:a16="http://schemas.microsoft.com/office/drawing/2014/main" id="{B234D7DB-80D1-420C-A598-13E2FD71FC74}"/>
+              </a:ext>
+            </a:extLst>
+          </p:cNvPr>
+          <p:cNvSpPr>
+            <a:spLocks noGrp="1"/>
+          </p:cNvSpPr>
+          <p:nvPr>
+            <p:ph idx="1"/>
+          </p:nvPr>
+        </p:nvSpPr>
+        <p:spPr/>
+        <p:txBody>
+          <a:bodyPr/>
+          <a:lstStyle/>
+          <a:p>
+            <a:r>
+              <a:rPr lang="fr-BE" dirty="0"/>
+              <a:t>A quitté la </a:t>
+            </a:r>
+            <a:r>
+              <a:rPr lang="fr-BE" dirty="0" err="1"/>
+              <a:t>HELHa</a:t>
+            </a:r>
+            <a:r>
+              <a:rPr lang="fr-BE" dirty="0"/>
+              <a:t> en 2014</a:t>
+            </a:r>
+          </a:p>
+          <a:p>
+            <a:r>
+              <a:rPr lang="fr-BE" dirty="0"/>
+              <a:t>Développeur dans la région de Tournai (à 15 minutes d’ici)</a:t>
+            </a:r>
+          </a:p>
+          <a:p>
+            <a:r>
+              <a:rPr lang="fr-BE" dirty="0"/>
+              <a:t>Travaille à Bruxelles</a:t>
+            </a:r>
+            <a:r>
+              <a:rPr lang="fr-FR" dirty="0"/>
+              <a:t> depuis 2016</a:t>
+            </a:r>
+          </a:p>
+          <a:p>
+            <a:r>
+              <a:rPr lang="fr-BE" dirty="0"/>
+              <a:t>I</a:t>
+            </a:r>
+            <a:r>
+              <a:rPr lang="fr-FR" dirty="0" err="1"/>
+              <a:t>ndépendant</a:t>
+            </a:r>
+            <a:r>
+              <a:rPr lang="fr-FR" dirty="0"/>
+              <a:t> depuis 2018</a:t>
+            </a:r>
+          </a:p>
+          <a:p>
+            <a:endParaRPr lang="fr-FR" dirty="0"/>
+          </a:p>
+          <a:p>
+            <a:endParaRPr lang="fr-BE" dirty="0"/>
+          </a:p>
+        </p:txBody>
+      </p:sp>
+    </p:spTree>
+    <p:extLst>
+      <p:ext uri="{BB962C8B-B14F-4D97-AF65-F5344CB8AC3E}">
+        <p14:creationId xmlns:p14="http://schemas.microsoft.com/office/powerpoint/2010/main" val="287629656"/>
+      </p:ext>
+    </p:extLst>
+  </p:cSld>
+  <p:clrMapOvr>
+    <a:masterClrMapping/>
+  </p:clrMapOvr>
+</p:sld>
+</file>
+
+<file path=ppt/slides/slide20.xml><?xml version="1.0" encoding="utf-8"?>
+<p:sld xmlns:a="http://schemas.openxmlformats.org/drawingml/2006/main" xmlns:r="http://schemas.openxmlformats.org/officeDocument/2006/relationships" xmlns:p="http://schemas.openxmlformats.org/presentationml/2006/main">
+  <p:cSld>
+    <p:spTree>
+      <p:nvGrpSpPr>
+        <p:cNvPr id="1" name=""/>
+        <p:cNvGrpSpPr/>
+        <p:nvPr/>
+      </p:nvGrpSpPr>
+      <p:grpSpPr>
+        <a:xfrm>
+          <a:off x="0" y="0"/>
+          <a:ext cx="0" cy="0"/>
+          <a:chOff x="0" y="0"/>
+          <a:chExt cx="0" cy="0"/>
+        </a:xfrm>
+      </p:grpSpPr>
+      <p:sp>
+        <p:nvSpPr>
+          <p:cNvPr id="2" name="Titre 1">
+            <a:extLst>
+              <a:ext uri="{FF2B5EF4-FFF2-40B4-BE49-F238E27FC236}">
+                <a16:creationId xmlns:a16="http://schemas.microsoft.com/office/drawing/2014/main" id="{DE1664DD-B4F7-4020-BE92-2A58A05A38B1}"/>
+              </a:ext>
+            </a:extLst>
+          </p:cNvPr>
+          <p:cNvSpPr>
+            <a:spLocks noGrp="1"/>
+          </p:cNvSpPr>
+          <p:nvPr>
+            <p:ph type="title"/>
+          </p:nvPr>
+        </p:nvSpPr>
+        <p:spPr/>
+        <p:txBody>
+          <a:bodyPr/>
+          <a:lstStyle/>
+          <a:p>
+            <a:r>
+              <a:rPr lang="fr-BE" dirty="0"/>
+              <a:t>Abstraction</a:t>
+            </a:r>
+            <a:endParaRPr lang="fr-FR" dirty="0"/>
+          </a:p>
+        </p:txBody>
+      </p:sp>
+      <p:sp>
+        <p:nvSpPr>
+          <p:cNvPr id="3" name="Espace réservé du contenu 2">
+            <a:extLst>
+              <a:ext uri="{FF2B5EF4-FFF2-40B4-BE49-F238E27FC236}">
+                <a16:creationId xmlns:a16="http://schemas.microsoft.com/office/drawing/2014/main" id="{6A14E086-54B0-42A3-90BA-DE32F034CF5E}"/>
+              </a:ext>
+            </a:extLst>
+          </p:cNvPr>
+          <p:cNvSpPr>
+            <a:spLocks noGrp="1"/>
+          </p:cNvSpPr>
+          <p:nvPr>
+            <p:ph idx="1"/>
+          </p:nvPr>
+        </p:nvSpPr>
+        <p:spPr/>
+        <p:txBody>
+          <a:bodyPr/>
+          <a:lstStyle/>
+          <a:p>
+            <a:r>
+              <a:rPr lang="fr-BE" dirty="0"/>
+              <a:t>Une méthode ne doit pas savoir comment ni par qui elle est appelée</a:t>
+            </a:r>
+          </a:p>
+          <a:p>
+            <a:r>
+              <a:rPr lang="fr-BE" dirty="0"/>
+              <a:t>Une méthode ne doit pas connaitre comment fonctionne ses dépendances</a:t>
+            </a:r>
+          </a:p>
+          <a:p>
+            <a:r>
+              <a:rPr lang="fr-BE" dirty="0"/>
+              <a:t>S’applique en architecture logiciel</a:t>
+            </a:r>
+            <a:endParaRPr lang="fr-FR" dirty="0"/>
+          </a:p>
+        </p:txBody>
+      </p:sp>
+    </p:spTree>
+    <p:extLst>
+      <p:ext uri="{BB962C8B-B14F-4D97-AF65-F5344CB8AC3E}">
+        <p14:creationId xmlns:p14="http://schemas.microsoft.com/office/powerpoint/2010/main" val="3520938063"/>
+      </p:ext>
+    </p:extLst>
+  </p:cSld>
+  <p:clrMapOvr>
+    <a:masterClrMapping/>
+  </p:clrMapOvr>
+</p:sld>
+</file>
+
+<file path=ppt/slides/slide21.xml><?xml version="1.0" encoding="utf-8"?>
+<p:sld xmlns:a="http://schemas.openxmlformats.org/drawingml/2006/main" xmlns:r="http://schemas.openxmlformats.org/officeDocument/2006/relationships" xmlns:p="http://schemas.openxmlformats.org/presentationml/2006/main">
+  <p:cSld>
+    <p:spTree>
+      <p:nvGrpSpPr>
+        <p:cNvPr id="1" name=""/>
+        <p:cNvGrpSpPr/>
+        <p:nvPr/>
+      </p:nvGrpSpPr>
+      <p:grpSpPr>
+        <a:xfrm>
+          <a:off x="0" y="0"/>
+          <a:ext cx="0" cy="0"/>
+          <a:chOff x="0" y="0"/>
+          <a:chExt cx="0" cy="0"/>
+        </a:xfrm>
+      </p:grpSpPr>
+      <p:sp>
+        <p:nvSpPr>
+          <p:cNvPr id="2" name="Titre 1">
+            <a:extLst>
+              <a:ext uri="{FF2B5EF4-FFF2-40B4-BE49-F238E27FC236}">
                 <a16:creationId xmlns:a16="http://schemas.microsoft.com/office/drawing/2014/main" id="{B2AAB231-6678-43CB-93F3-45AF0BF0E3FB}"/>
               </a:ext>
             </a:extLst>
@@ -8127,7 +8614,38 @@
             <a:pPr lvl="2"/>
             <a:r>
               <a:rPr lang="fr-BE" dirty="0"/>
-              <a:t>Pourquoi devoir expliquer si le code répond déjà à cette question ?</a:t>
+              <a:t>Pourquoi devoir expliquer si le code répond déjà à cette question ? </a:t>
+            </a:r>
+          </a:p>
+          <a:p>
+            <a:pPr lvl="2"/>
+            <a:r>
+              <a:rPr lang="fr-BE" dirty="0"/>
+              <a:t>Violation du DRY </a:t>
+            </a:r>
+            <a:r>
+              <a:rPr lang="fr-BE" dirty="0" err="1"/>
+              <a:t>principle</a:t>
+            </a:r>
+            <a:r>
+              <a:rPr lang="fr-BE" dirty="0"/>
+              <a:t> (Don’t </a:t>
+            </a:r>
+            <a:r>
+              <a:rPr lang="fr-BE" dirty="0" err="1"/>
+              <a:t>Repeat</a:t>
+            </a:r>
+            <a:r>
+              <a:rPr lang="fr-BE" dirty="0"/>
+              <a:t> </a:t>
+            </a:r>
+            <a:r>
+              <a:rPr lang="fr-BE" dirty="0" err="1"/>
+              <a:t>Yourself</a:t>
+            </a:r>
+            <a:r>
+              <a:rPr lang="fr-BE" dirty="0"/>
+              <a:t>). Le code décrit déjà quoi.</a:t>
             </a:r>
           </a:p>
           <a:p>
@@ -8145,7 +8663,7 @@
             </a:r>
             <a:r>
               <a:rPr lang="fr-BE" dirty="0" err="1"/>
-              <a:t>débug</a:t>
+              <a:t>debug</a:t>
             </a:r>
             <a:r>
               <a:rPr lang="fr-BE" dirty="0"/>
@@ -8168,7 +8686,7 @@
 </p:sld>
 </file>
 
-<file path=ppt/slides/slide19.xml><?xml version="1.0" encoding="utf-8"?>
+<file path=ppt/slides/slide22.xml><?xml version="1.0" encoding="utf-8"?>
 <p:sld xmlns:a="http://schemas.openxmlformats.org/drawingml/2006/main" xmlns:r="http://schemas.openxmlformats.org/officeDocument/2006/relationships" xmlns:p="http://schemas.openxmlformats.org/presentationml/2006/main">
   <p:cSld>
     <p:spTree>
@@ -8312,7 +8830,7 @@
 </p:sld>
 </file>
 
-<file path=ppt/slides/slide2.xml><?xml version="1.0" encoding="utf-8"?>
+<file path=ppt/slides/slide23.xml><?xml version="1.0" encoding="utf-8"?>
 <p:sld xmlns:a="http://schemas.openxmlformats.org/drawingml/2006/main" xmlns:r="http://schemas.openxmlformats.org/officeDocument/2006/relationships" xmlns:p="http://schemas.openxmlformats.org/presentationml/2006/main">
   <p:cSld>
     <p:spTree>
@@ -8334,137 +8852,6 @@
           <p:cNvPr id="2" name="Titre 1">
             <a:extLst>
               <a:ext uri="{FF2B5EF4-FFF2-40B4-BE49-F238E27FC236}">
-                <a16:creationId xmlns:a16="http://schemas.microsoft.com/office/drawing/2014/main" id="{731E7863-2D70-44AD-BB81-4687E4532035}"/>
-              </a:ext>
-            </a:extLst>
-          </p:cNvPr>
-          <p:cNvSpPr>
-            <a:spLocks noGrp="1"/>
-          </p:cNvSpPr>
-          <p:nvPr>
-            <p:ph type="title"/>
-          </p:nvPr>
-        </p:nvSpPr>
-        <p:spPr/>
-        <p:txBody>
-          <a:bodyPr/>
-          <a:lstStyle/>
-          <a:p>
-            <a:r>
-              <a:rPr lang="fr-BE" dirty="0"/>
-              <a:t>About me</a:t>
-            </a:r>
-            <a:endParaRPr lang="fr-FR" dirty="0"/>
-          </a:p>
-        </p:txBody>
-      </p:sp>
-      <p:sp>
-        <p:nvSpPr>
-          <p:cNvPr id="3" name="Espace réservé du contenu 2">
-            <a:extLst>
-              <a:ext uri="{FF2B5EF4-FFF2-40B4-BE49-F238E27FC236}">
-                <a16:creationId xmlns:a16="http://schemas.microsoft.com/office/drawing/2014/main" id="{B234D7DB-80D1-420C-A598-13E2FD71FC74}"/>
-              </a:ext>
-            </a:extLst>
-          </p:cNvPr>
-          <p:cNvSpPr>
-            <a:spLocks noGrp="1"/>
-          </p:cNvSpPr>
-          <p:nvPr>
-            <p:ph idx="1"/>
-          </p:nvPr>
-        </p:nvSpPr>
-        <p:spPr/>
-        <p:txBody>
-          <a:bodyPr/>
-          <a:lstStyle/>
-          <a:p>
-            <a:r>
-              <a:rPr lang="fr-BE" dirty="0"/>
-              <a:t>A quitté la </a:t>
-            </a:r>
-            <a:r>
-              <a:rPr lang="fr-BE" dirty="0" err="1"/>
-              <a:t>HELHa</a:t>
-            </a:r>
-            <a:r>
-              <a:rPr lang="fr-BE" dirty="0"/>
-              <a:t> en 2014</a:t>
-            </a:r>
-          </a:p>
-          <a:p>
-            <a:r>
-              <a:rPr lang="fr-BE" dirty="0"/>
-              <a:t>Développeur dans la région de Tournai (à 15 minutes d’ici)</a:t>
-            </a:r>
-          </a:p>
-          <a:p>
-            <a:r>
-              <a:rPr lang="fr-BE" dirty="0"/>
-              <a:t>Travaille à Bruxelles</a:t>
-            </a:r>
-            <a:r>
-              <a:rPr lang="fr-FR" dirty="0"/>
-              <a:t> depuis 2016</a:t>
-            </a:r>
-          </a:p>
-          <a:p>
-            <a:r>
-              <a:rPr lang="fr-BE" dirty="0"/>
-              <a:t>I</a:t>
-            </a:r>
-            <a:r>
-              <a:rPr lang="fr-FR" dirty="0" err="1"/>
-              <a:t>ndépendant</a:t>
-            </a:r>
-            <a:r>
-              <a:rPr lang="fr-FR" dirty="0"/>
-              <a:t> depuis 2018</a:t>
-            </a:r>
-          </a:p>
-          <a:p>
-            <a:endParaRPr lang="fr-FR" dirty="0"/>
-          </a:p>
-          <a:p>
-            <a:endParaRPr lang="fr-BE" dirty="0"/>
-          </a:p>
-        </p:txBody>
-      </p:sp>
-    </p:spTree>
-    <p:extLst>
-      <p:ext uri="{BB962C8B-B14F-4D97-AF65-F5344CB8AC3E}">
-        <p14:creationId xmlns:p14="http://schemas.microsoft.com/office/powerpoint/2010/main" val="287629656"/>
-      </p:ext>
-    </p:extLst>
-  </p:cSld>
-  <p:clrMapOvr>
-    <a:masterClrMapping/>
-  </p:clrMapOvr>
-</p:sld>
-</file>
-
-<file path=ppt/slides/slide20.xml><?xml version="1.0" encoding="utf-8"?>
-<p:sld xmlns:a="http://schemas.openxmlformats.org/drawingml/2006/main" xmlns:r="http://schemas.openxmlformats.org/officeDocument/2006/relationships" xmlns:p="http://schemas.openxmlformats.org/presentationml/2006/main">
-  <p:cSld>
-    <p:spTree>
-      <p:nvGrpSpPr>
-        <p:cNvPr id="1" name=""/>
-        <p:cNvGrpSpPr/>
-        <p:nvPr/>
-      </p:nvGrpSpPr>
-      <p:grpSpPr>
-        <a:xfrm>
-          <a:off x="0" y="0"/>
-          <a:ext cx="0" cy="0"/>
-          <a:chOff x="0" y="0"/>
-          <a:chExt cx="0" cy="0"/>
-        </a:xfrm>
-      </p:grpSpPr>
-      <p:sp>
-        <p:nvSpPr>
-          <p:cNvPr id="2" name="Titre 1">
-            <a:extLst>
-              <a:ext uri="{FF2B5EF4-FFF2-40B4-BE49-F238E27FC236}">
                 <a16:creationId xmlns:a16="http://schemas.microsoft.com/office/drawing/2014/main" id="{A3A33D8A-2C84-4629-A906-96FA1E0427DE}"/>
               </a:ext>
             </a:extLst>
@@ -8634,7 +9021,7 @@
 </p:sld>
 </file>
 
-<file path=ppt/slides/slide21.xml><?xml version="1.0" encoding="utf-8"?>
+<file path=ppt/slides/slide24.xml><?xml version="1.0" encoding="utf-8"?>
 <p:sld xmlns:a="http://schemas.openxmlformats.org/drawingml/2006/main" xmlns:r="http://schemas.openxmlformats.org/officeDocument/2006/relationships" xmlns:p="http://schemas.openxmlformats.org/presentationml/2006/main">
   <p:cSld>
     <p:spTree>
@@ -9473,7 +9860,7 @@
           <p:cNvPr id="2" name="Titre 1">
             <a:extLst>
               <a:ext uri="{FF2B5EF4-FFF2-40B4-BE49-F238E27FC236}">
-                <a16:creationId xmlns:a16="http://schemas.microsoft.com/office/drawing/2014/main" id="{4B4F148B-D747-4463-A02A-A126E07E1A21}"/>
+                <a16:creationId xmlns:a16="http://schemas.microsoft.com/office/drawing/2014/main" id="{D7974CF9-3B3D-403F-9BD6-C5BD4FC04428}"/>
               </a:ext>
             </a:extLst>
           </p:cNvPr>
@@ -9491,24 +9878,9 @@
           <a:p>
             <a:r>
               <a:rPr lang="fr-BE" dirty="0"/>
-              <a:t>Clean Code: </a:t>
-            </a:r>
-            <a:r>
-              <a:rPr lang="fr-BE" dirty="0" err="1"/>
-              <a:t>mékeskeC</a:t>
-            </a:r>
-            <a:r>
-              <a:rPr lang="fr-BE" dirty="0"/>
-              <a:t> ?</a:t>
-            </a:r>
-            <a:br>
-              <a:rPr lang="fr-BE" dirty="0"/>
-            </a:br>
-            <a:r>
-              <a:rPr lang="fr-BE" sz="2000" dirty="0"/>
-              <a:t>Du code qui est:</a:t>
-            </a:r>
-            <a:endParaRPr lang="fr-FR" dirty="0"/>
+              <a:t>L’humain est cérébralement limité</a:t>
+            </a:r>
+            <a:endParaRPr lang="en-GB" dirty="0"/>
           </a:p>
         </p:txBody>
       </p:sp>
@@ -9517,7 +9889,7 @@
           <p:cNvPr id="3" name="Espace réservé du contenu 2">
             <a:extLst>
               <a:ext uri="{FF2B5EF4-FFF2-40B4-BE49-F238E27FC236}">
-                <a16:creationId xmlns:a16="http://schemas.microsoft.com/office/drawing/2014/main" id="{BBA479F0-A022-4E96-A8F4-CBD9DCBFCD4E}"/>
+                <a16:creationId xmlns:a16="http://schemas.microsoft.com/office/drawing/2014/main" id="{2F7DBA5B-4B61-475B-9884-B8735A943E6C}"/>
               </a:ext>
             </a:extLst>
           </p:cNvPr>
@@ -9530,95 +9902,95 @@
         </p:nvSpPr>
         <p:spPr/>
         <p:txBody>
-          <a:bodyPr/>
-          <a:lstStyle/>
-          <a:p>
-            <a:r>
-              <a:rPr lang="fr-BE" dirty="0"/>
-              <a:t>Expressif et explicite</a:t>
-            </a:r>
-          </a:p>
-          <a:p>
-            <a:r>
-              <a:rPr lang="fr-BE" dirty="0"/>
-              <a:t>Lisible</a:t>
-            </a:r>
-          </a:p>
-          <a:p>
-            <a:r>
-              <a:rPr lang="fr-BE" dirty="0"/>
-              <a:t>Compréhensible</a:t>
-            </a:r>
-          </a:p>
-          <a:p>
-            <a:r>
-              <a:rPr lang="fr-BE" dirty="0"/>
-              <a:t>Sans surprise</a:t>
-            </a:r>
-          </a:p>
-          <a:p>
-            <a:r>
-              <a:rPr lang="fr-BE" dirty="0"/>
-              <a:t>Transparent</a:t>
-            </a:r>
-          </a:p>
-          <a:p>
-            <a:r>
-              <a:rPr lang="fr-BE" dirty="0"/>
-              <a:t>Rassurant</a:t>
-            </a:r>
-          </a:p>
-          <a:p>
-            <a:r>
-              <a:rPr lang="fr-BE" dirty="0"/>
-              <a:t>Plaisant</a:t>
-            </a:r>
-            <a:endParaRPr lang="fr-FR" dirty="0"/>
-          </a:p>
-        </p:txBody>
-      </p:sp>
-      <p:sp>
-        <p:nvSpPr>
-          <p:cNvPr id="4" name="ZoneTexte 3">
-            <a:extLst>
-              <a:ext uri="{FF2B5EF4-FFF2-40B4-BE49-F238E27FC236}">
-                <a16:creationId xmlns:a16="http://schemas.microsoft.com/office/drawing/2014/main" id="{DFE9CAE5-8F03-4618-BCE1-DDFE0F9BF0DA}"/>
-              </a:ext>
-            </a:extLst>
-          </p:cNvPr>
-          <p:cNvSpPr txBox="1"/>
-          <p:nvPr/>
-        </p:nvSpPr>
-        <p:spPr>
-          <a:xfrm>
-            <a:off x="7532702" y="5602069"/>
-            <a:ext cx="1939771" cy="646331"/>
-          </a:xfrm>
-          <a:prstGeom prst="rect">
-            <a:avLst/>
-          </a:prstGeom>
-          <a:noFill/>
-        </p:spPr>
-        <p:txBody>
-          <a:bodyPr wrap="square" rtlCol="0">
-            <a:spAutoFit/>
+          <a:bodyPr>
+            <a:normAutofit/>
           </a:bodyPr>
           <a:lstStyle/>
           <a:p>
             <a:r>
-              <a:rPr lang="en-US" i="1" dirty="0"/>
-              <a:t>Kate Gregory</a:t>
-            </a:r>
-          </a:p>
-          <a:p>
-            <a:endParaRPr lang="fr-FR" i="1" dirty="0"/>
+              <a:rPr lang="fr-BE" dirty="0"/>
+              <a:t>Essayez le burger de la mort.</a:t>
+            </a:r>
+          </a:p>
+          <a:p>
+            <a:r>
+              <a:rPr lang="fr-BE" dirty="0"/>
+              <a:t>Mais en plus vous devez répondre aux questions pairs, ensuite impairs,</a:t>
+            </a:r>
+          </a:p>
+          <a:p>
+            <a:r>
+              <a:rPr lang="fr-BE" dirty="0"/>
+              <a:t>Les questions 2, 8 et 7 comportent des doubles sens,</a:t>
+            </a:r>
+          </a:p>
+          <a:p>
+            <a:r>
+              <a:rPr lang="fr-BE" dirty="0"/>
+              <a:t>Vous avez reçu un mail urgent à la 5</a:t>
+            </a:r>
+            <a:r>
+              <a:rPr lang="fr-BE" baseline="30000" dirty="0"/>
+              <a:t>e</a:t>
+            </a:r>
+            <a:r>
+              <a:rPr lang="fr-BE" dirty="0"/>
+              <a:t> question,</a:t>
+            </a:r>
+          </a:p>
+          <a:p>
+            <a:r>
+              <a:rPr lang="fr-BE" dirty="0"/>
+              <a:t>Finalement ignorez la question 3 et 5,</a:t>
+            </a:r>
+          </a:p>
+          <a:p>
+            <a:r>
+              <a:rPr lang="fr-BE" dirty="0"/>
+              <a:t>Il y a 5 questions supplémentaires,</a:t>
+            </a:r>
+          </a:p>
+          <a:p>
+            <a:r>
+              <a:rPr lang="fr-BE" dirty="0"/>
+              <a:t>La question 7 est en norvégien,</a:t>
+            </a:r>
+          </a:p>
+          <a:p>
+            <a:r>
+              <a:rPr lang="fr-BE" dirty="0"/>
+              <a:t>La question 3 a quand même un impacte car la question 10 dépend de la 3.</a:t>
+            </a:r>
+          </a:p>
+          <a:p>
+            <a:r>
+              <a:rPr lang="fr-BE" dirty="0"/>
+              <a:t>Voilà, vous avez lu une méthode </a:t>
+            </a:r>
+            <a:r>
+              <a:rPr lang="fr-BE" dirty="0" err="1"/>
+              <a:t>legacy</a:t>
+            </a:r>
+            <a:r>
+              <a:rPr lang="fr-BE" dirty="0"/>
+              <a:t> qui implémente 200 </a:t>
+            </a:r>
+            <a:r>
+              <a:rPr lang="fr-BE" dirty="0" err="1"/>
+              <a:t>features</a:t>
+            </a:r>
+            <a:r>
+              <a:rPr lang="fr-BE" dirty="0"/>
+              <a:t> et 7 paramètres. </a:t>
+            </a:r>
+            <a:endParaRPr lang="en-GB" dirty="0"/>
           </a:p>
         </p:txBody>
       </p:sp>
     </p:spTree>
     <p:extLst>
       <p:ext uri="{BB962C8B-B14F-4D97-AF65-F5344CB8AC3E}">
-        <p14:creationId xmlns:p14="http://schemas.microsoft.com/office/powerpoint/2010/main" val="3816974945"/>
+        <p14:creationId xmlns:p14="http://schemas.microsoft.com/office/powerpoint/2010/main" val="1106729968"/>
       </p:ext>
     </p:extLst>
   </p:cSld>
@@ -9650,7 +10022,7 @@
           <p:cNvPr id="2" name="Titre 1">
             <a:extLst>
               <a:ext uri="{FF2B5EF4-FFF2-40B4-BE49-F238E27FC236}">
-                <a16:creationId xmlns:a16="http://schemas.microsoft.com/office/drawing/2014/main" id="{436C22CA-B030-44C8-A13C-5DBC76D7129F}"/>
+                <a16:creationId xmlns:a16="http://schemas.microsoft.com/office/drawing/2014/main" id="{4B4F148B-D747-4463-A02A-A126E07E1A21}"/>
               </a:ext>
             </a:extLst>
           </p:cNvPr>
@@ -9668,7 +10040,22 @@
           <a:p>
             <a:r>
               <a:rPr lang="fr-BE" dirty="0"/>
-              <a:t>Clean Code: mais comment ?</a:t>
+              <a:t>Clean Code: </a:t>
+            </a:r>
+            <a:r>
+              <a:rPr lang="fr-BE" dirty="0" err="1"/>
+              <a:t>mékeskeC</a:t>
+            </a:r>
+            <a:r>
+              <a:rPr lang="fr-BE" dirty="0"/>
+              <a:t> ?</a:t>
+            </a:r>
+            <a:br>
+              <a:rPr lang="fr-BE" dirty="0"/>
+            </a:br>
+            <a:r>
+              <a:rPr lang="fr-BE" sz="2000" dirty="0"/>
+              <a:t>Du code qui est:</a:t>
             </a:r>
             <a:endParaRPr lang="fr-FR" dirty="0"/>
           </a:p>
@@ -9679,7 +10066,7 @@
           <p:cNvPr id="3" name="Espace réservé du contenu 2">
             <a:extLst>
               <a:ext uri="{FF2B5EF4-FFF2-40B4-BE49-F238E27FC236}">
-                <a16:creationId xmlns:a16="http://schemas.microsoft.com/office/drawing/2014/main" id="{43BB4507-A3E6-4C59-9787-89A0496EF5F2}"/>
+                <a16:creationId xmlns:a16="http://schemas.microsoft.com/office/drawing/2014/main" id="{BBA479F0-A022-4E96-A8F4-CBD9DCBFCD4E}"/>
               </a:ext>
             </a:extLst>
           </p:cNvPr>
@@ -9697,50 +10084,90 @@
           <a:p>
             <a:r>
               <a:rPr lang="fr-BE" dirty="0"/>
-              <a:t>Restez Simple (KISS </a:t>
-            </a:r>
-            <a:r>
-              <a:rPr lang="fr-BE" dirty="0" err="1"/>
-              <a:t>principle</a:t>
-            </a:r>
-            <a:r>
-              <a:rPr lang="fr-BE" dirty="0"/>
-              <a:t>)</a:t>
-            </a:r>
-          </a:p>
-          <a:p>
-            <a:pPr lvl="1"/>
-            <a:r>
-              <a:rPr lang="fr-BE" dirty="0"/>
-              <a:t>« Simple: Facile à comprendre, à utiliser, à exécuter » - L’internaute</a:t>
-            </a:r>
-          </a:p>
-          <a:p>
-            <a:r>
-              <a:rPr lang="fr-BE" dirty="0"/>
-              <a:t>Pensez à raconter une histoire</a:t>
-            </a:r>
-          </a:p>
-          <a:p>
-            <a:r>
-              <a:rPr lang="fr-BE" dirty="0"/>
-              <a:t>Code </a:t>
-            </a:r>
-            <a:r>
-              <a:rPr lang="fr-BE" dirty="0" err="1"/>
-              <a:t>review</a:t>
-            </a:r>
-            <a:r>
-              <a:rPr lang="fr-BE" dirty="0"/>
-              <a:t> : faites voir votre code à un collègue. S’il le comprend, ce code est bon.</a:t>
-            </a:r>
+              <a:t>Expressif et explicite</a:t>
+            </a:r>
+          </a:p>
+          <a:p>
+            <a:r>
+              <a:rPr lang="fr-BE" dirty="0"/>
+              <a:t>Lisible</a:t>
+            </a:r>
+          </a:p>
+          <a:p>
+            <a:r>
+              <a:rPr lang="fr-BE" dirty="0"/>
+              <a:t>Compréhensible</a:t>
+            </a:r>
+          </a:p>
+          <a:p>
+            <a:r>
+              <a:rPr lang="fr-BE" dirty="0"/>
+              <a:t>Sans surprise</a:t>
+            </a:r>
+          </a:p>
+          <a:p>
+            <a:r>
+              <a:rPr lang="fr-BE" dirty="0"/>
+              <a:t>Transparent</a:t>
+            </a:r>
+          </a:p>
+          <a:p>
+            <a:r>
+              <a:rPr lang="fr-BE" dirty="0"/>
+              <a:t>Rassurant</a:t>
+            </a:r>
+          </a:p>
+          <a:p>
+            <a:r>
+              <a:rPr lang="fr-BE" dirty="0"/>
+              <a:t>Plaisant</a:t>
+            </a:r>
+            <a:endParaRPr lang="fr-FR" dirty="0"/>
+          </a:p>
+        </p:txBody>
+      </p:sp>
+      <p:sp>
+        <p:nvSpPr>
+          <p:cNvPr id="4" name="ZoneTexte 3">
+            <a:extLst>
+              <a:ext uri="{FF2B5EF4-FFF2-40B4-BE49-F238E27FC236}">
+                <a16:creationId xmlns:a16="http://schemas.microsoft.com/office/drawing/2014/main" id="{DFE9CAE5-8F03-4618-BCE1-DDFE0F9BF0DA}"/>
+              </a:ext>
+            </a:extLst>
+          </p:cNvPr>
+          <p:cNvSpPr txBox="1"/>
+          <p:nvPr/>
+        </p:nvSpPr>
+        <p:spPr>
+          <a:xfrm>
+            <a:off x="7532702" y="5602069"/>
+            <a:ext cx="1939771" cy="646331"/>
+          </a:xfrm>
+          <a:prstGeom prst="rect">
+            <a:avLst/>
+          </a:prstGeom>
+          <a:noFill/>
+        </p:spPr>
+        <p:txBody>
+          <a:bodyPr wrap="square" rtlCol="0">
+            <a:spAutoFit/>
+          </a:bodyPr>
+          <a:lstStyle/>
+          <a:p>
+            <a:r>
+              <a:rPr lang="en-US" i="1" dirty="0"/>
+              <a:t>Kate Gregory</a:t>
+            </a:r>
+          </a:p>
+          <a:p>
+            <a:endParaRPr lang="fr-FR" i="1" dirty="0"/>
           </a:p>
         </p:txBody>
       </p:sp>
     </p:spTree>
     <p:extLst>
       <p:ext uri="{BB962C8B-B14F-4D97-AF65-F5344CB8AC3E}">
-        <p14:creationId xmlns:p14="http://schemas.microsoft.com/office/powerpoint/2010/main" val="4155884551"/>
+        <p14:creationId xmlns:p14="http://schemas.microsoft.com/office/powerpoint/2010/main" val="3816974945"/>
       </p:ext>
     </p:extLst>
   </p:cSld>
@@ -9772,7 +10199,7 @@
           <p:cNvPr id="2" name="Titre 1">
             <a:extLst>
               <a:ext uri="{FF2B5EF4-FFF2-40B4-BE49-F238E27FC236}">
-                <a16:creationId xmlns:a16="http://schemas.microsoft.com/office/drawing/2014/main" id="{4777C3CF-1BA8-4B86-9618-6AF002EB7E30}"/>
+                <a16:creationId xmlns:a16="http://schemas.microsoft.com/office/drawing/2014/main" id="{436C22CA-B030-44C8-A13C-5DBC76D7129F}"/>
               </a:ext>
             </a:extLst>
           </p:cNvPr>
@@ -9789,16 +10216,8 @@
           <a:lstStyle/>
           <a:p>
             <a:r>
-              <a:rPr lang="fr-FR" dirty="0" err="1"/>
-              <a:t>Nested</a:t>
-            </a:r>
-            <a:r>
-              <a:rPr lang="fr-FR" dirty="0"/>
-              <a:t> if are for </a:t>
-            </a:r>
-            <a:r>
-              <a:rPr lang="fr-FR" dirty="0" err="1"/>
-              <a:t>fools</a:t>
+              <a:rPr lang="fr-BE" dirty="0"/>
+              <a:t>Clean Code: mais comment ?</a:t>
             </a:r>
             <a:endParaRPr lang="fr-FR" dirty="0"/>
           </a:p>
@@ -9809,7 +10228,7 @@
           <p:cNvPr id="3" name="Espace réservé du contenu 2">
             <a:extLst>
               <a:ext uri="{FF2B5EF4-FFF2-40B4-BE49-F238E27FC236}">
-                <a16:creationId xmlns:a16="http://schemas.microsoft.com/office/drawing/2014/main" id="{090334CA-EAF4-4FDD-9B0B-2F1A9C8333FB}"/>
+                <a16:creationId xmlns:a16="http://schemas.microsoft.com/office/drawing/2014/main" id="{43BB4507-A3E6-4C59-9787-89A0496EF5F2}"/>
               </a:ext>
             </a:extLst>
           </p:cNvPr>
@@ -9827,59 +10246,42 @@
           <a:p>
             <a:r>
               <a:rPr lang="fr-BE" dirty="0"/>
-              <a:t>Évitez &lt;</a:t>
+              <a:t>Restez Simple (KISS </a:t>
             </a:r>
             <a:r>
               <a:rPr lang="fr-BE" dirty="0" err="1"/>
-              <a:t>nested</a:t>
-            </a:r>
-            <a:r>
-              <a:rPr lang="fr-BE" dirty="0"/>
-              <a:t> if&gt;</a:t>
-            </a:r>
-            <a:endParaRPr lang="fr-FR" dirty="0"/>
+              <a:t>principle</a:t>
+            </a:r>
+            <a:r>
+              <a:rPr lang="fr-BE" dirty="0"/>
+              <a:t>)</a:t>
+            </a:r>
           </a:p>
           <a:p>
             <a:pPr lvl="1"/>
             <a:r>
               <a:rPr lang="fr-BE" dirty="0"/>
-              <a:t>Les </a:t>
-            </a:r>
-            <a:r>
-              <a:rPr lang="fr-BE" i="1" dirty="0"/>
-              <a:t>if</a:t>
-            </a:r>
-            <a:r>
-              <a:rPr lang="fr-BE" dirty="0"/>
-              <a:t> imbriqués diminuent la lisibilité à cause du décalage, et du </a:t>
+              <a:t>« Simple: Facile à comprendre, à utiliser, à exécuter » - L’internaute</a:t>
+            </a:r>
+          </a:p>
+          <a:p>
+            <a:r>
+              <a:rPr lang="fr-BE" dirty="0"/>
+              <a:t>Pensez à raconter une histoire</a:t>
+            </a:r>
+          </a:p>
+          <a:p>
+            <a:r>
+              <a:rPr lang="fr-BE" dirty="0"/>
+              <a:t>Code </a:t>
             </a:r>
             <a:r>
               <a:rPr lang="fr-BE" dirty="0" err="1"/>
-              <a:t>else</a:t>
-            </a:r>
-            <a:r>
-              <a:rPr lang="fr-BE" dirty="0"/>
-              <a:t> trop éloigné de sa condition</a:t>
-            </a:r>
-          </a:p>
-          <a:p>
-            <a:r>
-              <a:rPr lang="fr-FR" dirty="0"/>
-              <a:t>Aussi appelé le </a:t>
-            </a:r>
-            <a:r>
-              <a:rPr lang="fr-FR" dirty="0" err="1"/>
-              <a:t>gateway</a:t>
-            </a:r>
-            <a:r>
-              <a:rPr lang="fr-FR" dirty="0"/>
-              <a:t> style</a:t>
-            </a:r>
-          </a:p>
-          <a:p>
-            <a:r>
-              <a:rPr lang="fr-FR" dirty="0"/>
-              <a:t>Une fois les cas spécifique ou d’erreur écarté, nous pouvons nous concentrer sur le code business sans devoir retenir les if précédents</a:t>
+              <a:t>review</a:t>
+            </a:r>
+            <a:r>
+              <a:rPr lang="fr-BE" dirty="0"/>
+              <a:t> : faites voir votre code à un collègue. S’il le comprend, ce code est bon.</a:t>
             </a:r>
           </a:p>
         </p:txBody>
@@ -9887,7 +10289,7 @@
     </p:spTree>
     <p:extLst>
       <p:ext uri="{BB962C8B-B14F-4D97-AF65-F5344CB8AC3E}">
-        <p14:creationId xmlns:p14="http://schemas.microsoft.com/office/powerpoint/2010/main" val="790854867"/>
+        <p14:creationId xmlns:p14="http://schemas.microsoft.com/office/powerpoint/2010/main" val="4155884551"/>
       </p:ext>
     </p:extLst>
   </p:cSld>

</xml_diff>

<commit_message>
logo et mise en page
</commit_message>
<xml_diff>
--- a/PPT/Easy != Simple.pptx
+++ b/PPT/Easy != Simple.pptx
@@ -223,7 +223,7 @@
           <a:p>
             <a:fld id="{29301A56-A927-403C-8918-21E784444591}" type="datetimeFigureOut">
               <a:rPr lang="fr-FR" smtClean="0"/>
-              <a:t>01/08/2019</a:t>
+              <a:t>02/08/2019</a:t>
             </a:fld>
             <a:endParaRPr lang="fr-FR"/>
           </a:p>
@@ -1793,7 +1793,7 @@
             <a:fld id="{B61BEF0D-F0BB-DE4B-95CE-6DB70DBA9567}" type="datetimeFigureOut">
               <a:rPr lang="en-US" dirty="0"/>
               <a:pPr/>
-              <a:t>8/1/2019</a:t>
+              <a:t>8/2/2019</a:t>
             </a:fld>
             <a:endParaRPr lang="en-US" dirty="0"/>
           </a:p>
@@ -2041,7 +2041,7 @@
             <a:fld id="{B61BEF0D-F0BB-DE4B-95CE-6DB70DBA9567}" type="datetimeFigureOut">
               <a:rPr lang="en-US" dirty="0"/>
               <a:pPr/>
-              <a:t>8/1/2019</a:t>
+              <a:t>8/2/2019</a:t>
             </a:fld>
             <a:endParaRPr lang="en-US" dirty="0"/>
           </a:p>
@@ -2352,7 +2352,7 @@
             <a:fld id="{B61BEF0D-F0BB-DE4B-95CE-6DB70DBA9567}" type="datetimeFigureOut">
               <a:rPr lang="en-US" dirty="0"/>
               <a:pPr/>
-              <a:t>8/1/2019</a:t>
+              <a:t>8/2/2019</a:t>
             </a:fld>
             <a:endParaRPr lang="en-US" dirty="0"/>
           </a:p>
@@ -2690,7 +2690,7 @@
             <a:fld id="{B61BEF0D-F0BB-DE4B-95CE-6DB70DBA9567}" type="datetimeFigureOut">
               <a:rPr lang="en-US" dirty="0"/>
               <a:pPr/>
-              <a:t>8/1/2019</a:t>
+              <a:t>8/2/2019</a:t>
             </a:fld>
             <a:endParaRPr lang="en-US" dirty="0"/>
           </a:p>
@@ -3001,7 +3001,7 @@
             <a:fld id="{B61BEF0D-F0BB-DE4B-95CE-6DB70DBA9567}" type="datetimeFigureOut">
               <a:rPr lang="en-US" dirty="0"/>
               <a:pPr/>
-              <a:t>8/1/2019</a:t>
+              <a:t>8/2/2019</a:t>
             </a:fld>
             <a:endParaRPr lang="en-US" dirty="0"/>
           </a:p>
@@ -3391,7 +3391,7 @@
             <a:fld id="{B61BEF0D-F0BB-DE4B-95CE-6DB70DBA9567}" type="datetimeFigureOut">
               <a:rPr lang="en-US" dirty="0"/>
               <a:pPr/>
-              <a:t>8/1/2019</a:t>
+              <a:t>8/2/2019</a:t>
             </a:fld>
             <a:endParaRPr lang="en-US" dirty="0"/>
           </a:p>
@@ -3557,7 +3557,7 @@
           <a:p>
             <a:fld id="{55C6B4A9-1611-4792-9094-5F34BCA07E0B}" type="datetimeFigureOut">
               <a:rPr lang="en-US" dirty="0"/>
-              <a:t>8/1/2019</a:t>
+              <a:t>8/2/2019</a:t>
             </a:fld>
             <a:endParaRPr lang="en-US" dirty="0"/>
           </a:p>
@@ -3733,7 +3733,7 @@
             <a:fld id="{B61BEF0D-F0BB-DE4B-95CE-6DB70DBA9567}" type="datetimeFigureOut">
               <a:rPr lang="en-US" dirty="0"/>
               <a:pPr/>
-              <a:t>8/1/2019</a:t>
+              <a:t>8/2/2019</a:t>
             </a:fld>
             <a:endParaRPr lang="en-US" dirty="0"/>
           </a:p>
@@ -3906,7 +3906,7 @@
             <a:fld id="{B61BEF0D-F0BB-DE4B-95CE-6DB70DBA9567}" type="datetimeFigureOut">
               <a:rPr lang="en-US" dirty="0"/>
               <a:pPr/>
-              <a:t>8/1/2019</a:t>
+              <a:t>8/2/2019</a:t>
             </a:fld>
             <a:endParaRPr lang="en-US" dirty="0"/>
           </a:p>
@@ -4150,7 +4150,7 @@
             <a:fld id="{B61BEF0D-F0BB-DE4B-95CE-6DB70DBA9567}" type="datetimeFigureOut">
               <a:rPr lang="en-US" dirty="0"/>
               <a:pPr/>
-              <a:t>8/1/2019</a:t>
+              <a:t>8/2/2019</a:t>
             </a:fld>
             <a:endParaRPr lang="en-US" dirty="0"/>
           </a:p>
@@ -4378,7 +4378,7 @@
           <a:p>
             <a:fld id="{EB712588-04B1-427B-82EE-E8DB90309F08}" type="datetimeFigureOut">
               <a:rPr lang="en-US" dirty="0"/>
-              <a:t>8/1/2019</a:t>
+              <a:t>8/2/2019</a:t>
             </a:fld>
             <a:endParaRPr lang="en-US" dirty="0"/>
           </a:p>
@@ -4748,7 +4748,7 @@
             <a:fld id="{B61BEF0D-F0BB-DE4B-95CE-6DB70DBA9567}" type="datetimeFigureOut">
               <a:rPr lang="en-US" dirty="0"/>
               <a:pPr/>
-              <a:t>8/1/2019</a:t>
+              <a:t>8/2/2019</a:t>
             </a:fld>
             <a:endParaRPr lang="en-US" dirty="0"/>
           </a:p>
@@ -4868,7 +4868,7 @@
             <a:fld id="{B61BEF0D-F0BB-DE4B-95CE-6DB70DBA9567}" type="datetimeFigureOut">
               <a:rPr lang="en-US" dirty="0"/>
               <a:pPr/>
-              <a:t>8/1/2019</a:t>
+              <a:t>8/2/2019</a:t>
             </a:fld>
             <a:endParaRPr lang="en-US" dirty="0"/>
           </a:p>
@@ -4960,7 +4960,7 @@
             <a:fld id="{B61BEF0D-F0BB-DE4B-95CE-6DB70DBA9567}" type="datetimeFigureOut">
               <a:rPr lang="en-US" dirty="0"/>
               <a:pPr/>
-              <a:t>8/1/2019</a:t>
+              <a:t>8/2/2019</a:t>
             </a:fld>
             <a:endParaRPr lang="en-US" dirty="0"/>
           </a:p>
@@ -5211,7 +5211,7 @@
           <a:p>
             <a:fld id="{42A54C80-263E-416B-A8E0-580EDEADCBDC}" type="datetimeFigureOut">
               <a:rPr lang="en-US" dirty="0"/>
-              <a:t>8/1/2019</a:t>
+              <a:t>8/2/2019</a:t>
             </a:fld>
             <a:endParaRPr lang="en-US" dirty="0"/>
           </a:p>
@@ -5470,7 +5470,7 @@
             <a:fld id="{B61BEF0D-F0BB-DE4B-95CE-6DB70DBA9567}" type="datetimeFigureOut">
               <a:rPr lang="en-US" dirty="0"/>
               <a:pPr/>
-              <a:t>8/1/2019</a:t>
+              <a:t>8/2/2019</a:t>
             </a:fld>
             <a:endParaRPr lang="en-US" dirty="0"/>
           </a:p>
@@ -6210,7 +6210,7 @@
             <a:fld id="{B61BEF0D-F0BB-DE4B-95CE-6DB70DBA9567}" type="datetimeFigureOut">
               <a:rPr lang="en-US" dirty="0"/>
               <a:pPr/>
-              <a:t>8/1/2019</a:t>
+              <a:t>8/2/2019</a:t>
             </a:fld>
             <a:endParaRPr lang="en-US" dirty="0"/>
           </a:p>
@@ -6850,6 +6850,14 @@
 <file path=ppt/slides/slide10.xml><?xml version="1.0" encoding="utf-8"?>
 <p:sld xmlns:a="http://schemas.openxmlformats.org/drawingml/2006/main" xmlns:r="http://schemas.openxmlformats.org/officeDocument/2006/relationships" xmlns:p="http://schemas.openxmlformats.org/presentationml/2006/main">
   <p:cSld>
+    <p:bg>
+      <p:bgPr>
+        <a:solidFill>
+          <a:schemeClr val="bg1"/>
+        </a:solidFill>
+        <a:effectLst/>
+      </p:bgPr>
+    </p:bg>
     <p:spTree>
       <p:nvGrpSpPr>
         <p:cNvPr id="1" name=""/>
@@ -6864,6 +6872,66 @@
           <a:chExt cx="0" cy="0"/>
         </a:xfrm>
       </p:grpSpPr>
+      <p:sp useBgFill="1">
+        <p:nvSpPr>
+          <p:cNvPr id="8" name="Rectangle 7">
+            <a:extLst>
+              <a:ext uri="{FF2B5EF4-FFF2-40B4-BE49-F238E27FC236}">
+                <a16:creationId xmlns:a16="http://schemas.microsoft.com/office/drawing/2014/main" id="{8DF4D7F6-81B5-452A-9CE6-76D81F91D41B}"/>
+              </a:ext>
+              <a:ext uri="{C183D7F6-B498-43B3-948B-1728B52AA6E4}">
+                <adec:decorative xmlns:adec="http://schemas.microsoft.com/office/drawing/2017/decorative" val="1"/>
+              </a:ext>
+            </a:extLst>
+          </p:cNvPr>
+          <p:cNvSpPr>
+            <a:spLocks noGrp="1" noRot="1" noChangeAspect="1" noMove="1" noResize="1" noEditPoints="1" noAdjustHandles="1" noChangeArrowheads="1" noChangeShapeType="1" noTextEdit="1"/>
+          </p:cNvSpPr>
+          <p:nvPr>
+            <p:extLst>
+              <p:ext uri="{386F3935-93C4-4BCD-93E2-E3B085C9AB24}">
+                <p16:designElem xmlns:p16="http://schemas.microsoft.com/office/powerpoint/2015/main" val="1"/>
+              </p:ext>
+            </p:extLst>
+          </p:nvPr>
+        </p:nvSpPr>
+        <p:spPr>
+          <a:xfrm>
+            <a:off x="0" y="0"/>
+            <a:ext cx="12192000" cy="6858000"/>
+          </a:xfrm>
+          <a:prstGeom prst="rect">
+            <a:avLst/>
+          </a:prstGeom>
+          <a:ln>
+            <a:noFill/>
+          </a:ln>
+        </p:spPr>
+        <p:style>
+          <a:lnRef idx="2">
+            <a:schemeClr val="accent1">
+              <a:shade val="50000"/>
+            </a:schemeClr>
+          </a:lnRef>
+          <a:fillRef idx="1">
+            <a:schemeClr val="accent1"/>
+          </a:fillRef>
+          <a:effectRef idx="0">
+            <a:schemeClr val="accent1"/>
+          </a:effectRef>
+          <a:fontRef idx="minor">
+            <a:schemeClr val="lt1"/>
+          </a:fontRef>
+        </p:style>
+        <p:txBody>
+          <a:bodyPr rtlCol="0" anchor="ctr"/>
+          <a:lstStyle/>
+          <a:p>
+            <a:pPr algn="ctr"/>
+            <a:endParaRPr lang="en-US"/>
+          </a:p>
+        </p:txBody>
+      </p:sp>
       <p:sp>
         <p:nvSpPr>
           <p:cNvPr id="2" name="Titre 1">
@@ -6880,9 +6948,16 @@
             <p:ph type="title"/>
           </p:nvPr>
         </p:nvSpPr>
-        <p:spPr/>
-        <p:txBody>
-          <a:bodyPr/>
+        <p:spPr>
+          <a:xfrm>
+            <a:off x="1333502" y="609600"/>
+            <a:ext cx="8596668" cy="1320800"/>
+          </a:xfrm>
+        </p:spPr>
+        <p:txBody>
+          <a:bodyPr>
+            <a:normAutofit/>
+          </a:bodyPr>
           <a:lstStyle/>
           <a:p>
             <a:r>
@@ -6901,6 +6976,225 @@
           </a:p>
         </p:txBody>
       </p:sp>
+      <p:sp>
+        <p:nvSpPr>
+          <p:cNvPr id="10" name="Isosceles Triangle 9">
+            <a:extLst>
+              <a:ext uri="{FF2B5EF4-FFF2-40B4-BE49-F238E27FC236}">
+                <a16:creationId xmlns:a16="http://schemas.microsoft.com/office/drawing/2014/main" id="{4600514D-20FB-4559-97DC-D1DC39E6C3DE}"/>
+              </a:ext>
+              <a:ext uri="{C183D7F6-B498-43B3-948B-1728B52AA6E4}">
+                <adec:decorative xmlns:adec="http://schemas.microsoft.com/office/drawing/2017/decorative" val="1"/>
+              </a:ext>
+            </a:extLst>
+          </p:cNvPr>
+          <p:cNvSpPr>
+            <a:spLocks noGrp="1" noRot="1" noChangeAspect="1" noMove="1" noResize="1" noEditPoints="1" noAdjustHandles="1" noChangeArrowheads="1" noChangeShapeType="1" noTextEdit="1"/>
+          </p:cNvSpPr>
+          <p:nvPr>
+            <p:extLst>
+              <p:ext uri="{386F3935-93C4-4BCD-93E2-E3B085C9AB24}">
+                <p16:designElem xmlns:p16="http://schemas.microsoft.com/office/powerpoint/2015/main" val="1"/>
+              </p:ext>
+            </p:extLst>
+          </p:nvPr>
+        </p:nvSpPr>
+        <p:spPr>
+          <a:xfrm flipV="1">
+            <a:off x="0" y="0"/>
+            <a:ext cx="448733" cy="2844800"/>
+          </a:xfrm>
+          <a:prstGeom prst="triangle">
+            <a:avLst>
+              <a:gd name="adj" fmla="val 0"/>
+            </a:avLst>
+          </a:prstGeom>
+          <a:solidFill>
+            <a:schemeClr val="accent1">
+              <a:alpha val="85000"/>
+            </a:schemeClr>
+          </a:solidFill>
+          <a:ln>
+            <a:noFill/>
+          </a:ln>
+          <a:effectLst/>
+        </p:spPr>
+        <p:style>
+          <a:lnRef idx="1">
+            <a:schemeClr val="accent1"/>
+          </a:lnRef>
+          <a:fillRef idx="3">
+            <a:schemeClr val="accent1"/>
+          </a:fillRef>
+          <a:effectRef idx="2">
+            <a:schemeClr val="accent1"/>
+          </a:effectRef>
+          <a:fontRef idx="minor">
+            <a:schemeClr val="lt1"/>
+          </a:fontRef>
+        </p:style>
+      </p:sp>
+      <p:sp>
+        <p:nvSpPr>
+          <p:cNvPr id="12" name="Isosceles Triangle 11">
+            <a:extLst>
+              <a:ext uri="{FF2B5EF4-FFF2-40B4-BE49-F238E27FC236}">
+                <a16:creationId xmlns:a16="http://schemas.microsoft.com/office/drawing/2014/main" id="{266F638A-E405-4AC0-B984-72E5813B0DD1}"/>
+              </a:ext>
+              <a:ext uri="{C183D7F6-B498-43B3-948B-1728B52AA6E4}">
+                <adec:decorative xmlns:adec="http://schemas.microsoft.com/office/drawing/2017/decorative" val="1"/>
+              </a:ext>
+            </a:extLst>
+          </p:cNvPr>
+          <p:cNvSpPr>
+            <a:spLocks noGrp="1" noRot="1" noChangeAspect="1" noMove="1" noResize="1" noEditPoints="1" noAdjustHandles="1" noChangeArrowheads="1" noChangeShapeType="1" noTextEdit="1"/>
+          </p:cNvSpPr>
+          <p:nvPr>
+            <p:extLst>
+              <p:ext uri="{386F3935-93C4-4BCD-93E2-E3B085C9AB24}">
+                <p16:designElem xmlns:p16="http://schemas.microsoft.com/office/powerpoint/2015/main" val="1"/>
+              </p:ext>
+            </p:extLst>
+          </p:nvPr>
+        </p:nvSpPr>
+        <p:spPr>
+          <a:xfrm>
+            <a:off x="7738534" y="3818467"/>
+            <a:ext cx="4450292" cy="3039533"/>
+          </a:xfrm>
+          <a:prstGeom prst="triangle">
+            <a:avLst>
+              <a:gd name="adj" fmla="val 100000"/>
+            </a:avLst>
+          </a:prstGeom>
+          <a:solidFill>
+            <a:schemeClr val="accent1"/>
+          </a:solidFill>
+          <a:ln>
+            <a:noFill/>
+          </a:ln>
+          <a:effectLst/>
+        </p:spPr>
+        <p:style>
+          <a:lnRef idx="1">
+            <a:schemeClr val="accent1"/>
+          </a:lnRef>
+          <a:fillRef idx="3">
+            <a:schemeClr val="accent1"/>
+          </a:fillRef>
+          <a:effectRef idx="2">
+            <a:schemeClr val="accent1"/>
+          </a:effectRef>
+          <a:fontRef idx="minor">
+            <a:schemeClr val="lt1"/>
+          </a:fontRef>
+        </p:style>
+      </p:sp>
+      <p:cxnSp>
+        <p:nvCxnSpPr>
+          <p:cNvPr id="14" name="Straight Connector 13">
+            <a:extLst>
+              <a:ext uri="{FF2B5EF4-FFF2-40B4-BE49-F238E27FC236}">
+                <a16:creationId xmlns:a16="http://schemas.microsoft.com/office/drawing/2014/main" id="{7D1CBE93-B17D-4509-843C-82287C38032A}"/>
+              </a:ext>
+              <a:ext uri="{C183D7F6-B498-43B3-948B-1728B52AA6E4}">
+                <adec:decorative xmlns:adec="http://schemas.microsoft.com/office/drawing/2017/decorative" val="1"/>
+              </a:ext>
+            </a:extLst>
+          </p:cNvPr>
+          <p:cNvCxnSpPr>
+            <a:cxnSpLocks noGrp="1" noRot="1" noChangeAspect="1" noMove="1" noResize="1" noEditPoints="1" noAdjustHandles="1" noChangeArrowheads="1" noChangeShapeType="1"/>
+          </p:cNvCxnSpPr>
+          <p:nvPr>
+            <p:extLst>
+              <p:ext uri="{386F3935-93C4-4BCD-93E2-E3B085C9AB24}">
+                <p16:designElem xmlns:p16="http://schemas.microsoft.com/office/powerpoint/2015/main" val="1"/>
+              </p:ext>
+            </p:extLst>
+          </p:nvPr>
+        </p:nvCxnSpPr>
+        <p:spPr>
+          <a:xfrm>
+            <a:off x="10134600" y="0"/>
+            <a:ext cx="1727200" cy="6858000"/>
+          </a:xfrm>
+          <a:prstGeom prst="line">
+            <a:avLst/>
+          </a:prstGeom>
+          <a:ln w="15875" cap="sq">
+            <a:solidFill>
+              <a:schemeClr val="accent2"/>
+            </a:solidFill>
+            <a:bevel/>
+          </a:ln>
+        </p:spPr>
+        <p:style>
+          <a:lnRef idx="2">
+            <a:schemeClr val="accent1"/>
+          </a:lnRef>
+          <a:fillRef idx="0">
+            <a:schemeClr val="accent1"/>
+          </a:fillRef>
+          <a:effectRef idx="1">
+            <a:schemeClr val="accent1"/>
+          </a:effectRef>
+          <a:fontRef idx="minor">
+            <a:schemeClr val="tx1"/>
+          </a:fontRef>
+        </p:style>
+      </p:cxnSp>
+      <p:cxnSp>
+        <p:nvCxnSpPr>
+          <p:cNvPr id="16" name="Straight Connector 15">
+            <a:extLst>
+              <a:ext uri="{FF2B5EF4-FFF2-40B4-BE49-F238E27FC236}">
+                <a16:creationId xmlns:a16="http://schemas.microsoft.com/office/drawing/2014/main" id="{AE6277B4-6A43-48AB-89B2-3442221619CC}"/>
+              </a:ext>
+              <a:ext uri="{C183D7F6-B498-43B3-948B-1728B52AA6E4}">
+                <adec:decorative xmlns:adec="http://schemas.microsoft.com/office/drawing/2017/decorative" val="1"/>
+              </a:ext>
+            </a:extLst>
+          </p:cNvPr>
+          <p:cNvCxnSpPr>
+            <a:cxnSpLocks noGrp="1" noRot="1" noChangeAspect="1" noMove="1" noResize="1" noEditPoints="1" noAdjustHandles="1" noChangeArrowheads="1" noChangeShapeType="1"/>
+          </p:cNvCxnSpPr>
+          <p:nvPr>
+            <p:extLst>
+              <p:ext uri="{386F3935-93C4-4BCD-93E2-E3B085C9AB24}">
+                <p16:designElem xmlns:p16="http://schemas.microsoft.com/office/powerpoint/2015/main" val="1"/>
+              </p:ext>
+            </p:extLst>
+          </p:nvPr>
+        </p:nvCxnSpPr>
+        <p:spPr>
+          <a:xfrm flipH="1">
+            <a:off x="7425267" y="3681413"/>
+            <a:ext cx="4763558" cy="3176587"/>
+          </a:xfrm>
+          <a:prstGeom prst="line">
+            <a:avLst/>
+          </a:prstGeom>
+          <a:ln w="15875">
+            <a:solidFill>
+              <a:schemeClr val="accent1"/>
+            </a:solidFill>
+          </a:ln>
+        </p:spPr>
+        <p:style>
+          <a:lnRef idx="2">
+            <a:schemeClr val="accent1"/>
+          </a:lnRef>
+          <a:fillRef idx="0">
+            <a:schemeClr val="accent1"/>
+          </a:fillRef>
+          <a:effectRef idx="1">
+            <a:schemeClr val="accent1"/>
+          </a:effectRef>
+          <a:fontRef idx="minor">
+            <a:schemeClr val="tx1"/>
+          </a:fontRef>
+        </p:style>
+      </p:cxnSp>
       <p:sp>
         <p:nvSpPr>
           <p:cNvPr id="3" name="Espace réservé du contenu 2">
@@ -6917,9 +7211,16 @@
             <p:ph idx="1"/>
           </p:nvPr>
         </p:nvSpPr>
-        <p:spPr/>
-        <p:txBody>
-          <a:bodyPr/>
+        <p:spPr>
+          <a:xfrm>
+            <a:off x="1333502" y="2160590"/>
+            <a:ext cx="8470898" cy="3429260"/>
+          </a:xfrm>
+        </p:spPr>
+        <p:txBody>
+          <a:bodyPr>
+            <a:normAutofit/>
+          </a:bodyPr>
           <a:lstStyle/>
           <a:p>
             <a:r>
@@ -6980,6 +7281,84 @@
             </a:r>
           </a:p>
         </p:txBody>
+      </p:sp>
+      <p:sp>
+        <p:nvSpPr>
+          <p:cNvPr id="18" name="Rectangle 27">
+            <a:extLst>
+              <a:ext uri="{FF2B5EF4-FFF2-40B4-BE49-F238E27FC236}">
+                <a16:creationId xmlns:a16="http://schemas.microsoft.com/office/drawing/2014/main" id="{27B538D5-95DB-47ED-9CB4-34AE5BF78E6B}"/>
+              </a:ext>
+              <a:ext uri="{C183D7F6-B498-43B3-948B-1728B52AA6E4}">
+                <adec:decorative xmlns:adec="http://schemas.microsoft.com/office/drawing/2017/decorative" val="1"/>
+              </a:ext>
+            </a:extLst>
+          </p:cNvPr>
+          <p:cNvSpPr>
+            <a:spLocks noGrp="1" noRot="1" noChangeAspect="1" noMove="1" noResize="1" noEditPoints="1" noAdjustHandles="1" noChangeArrowheads="1" noChangeShapeType="1" noTextEdit="1"/>
+          </p:cNvSpPr>
+          <p:nvPr>
+            <p:extLst>
+              <p:ext uri="{386F3935-93C4-4BCD-93E2-E3B085C9AB24}">
+                <p16:designElem xmlns:p16="http://schemas.microsoft.com/office/powerpoint/2015/main" val="1"/>
+              </p:ext>
+            </p:extLst>
+          </p:nvPr>
+        </p:nvSpPr>
+        <p:spPr>
+          <a:xfrm>
+            <a:off x="10425641" y="0"/>
+            <a:ext cx="1766359" cy="6858000"/>
+          </a:xfrm>
+          <a:custGeom>
+            <a:avLst/>
+            <a:gdLst/>
+            <a:ahLst/>
+            <a:cxnLst/>
+            <a:rect l="l" t="t" r="r" b="b"/>
+            <a:pathLst>
+              <a:path w="2858013" h="6866467">
+                <a:moveTo>
+                  <a:pt x="0" y="0"/>
+                </a:moveTo>
+                <a:lnTo>
+                  <a:pt x="2858013" y="0"/>
+                </a:lnTo>
+                <a:lnTo>
+                  <a:pt x="2858013" y="6866467"/>
+                </a:lnTo>
+                <a:lnTo>
+                  <a:pt x="2473942" y="6866467"/>
+                </a:lnTo>
+                <a:lnTo>
+                  <a:pt x="0" y="0"/>
+                </a:lnTo>
+                <a:close/>
+              </a:path>
+            </a:pathLst>
+          </a:custGeom>
+          <a:solidFill>
+            <a:schemeClr val="accent2"/>
+          </a:solidFill>
+          <a:ln>
+            <a:noFill/>
+          </a:ln>
+          <a:effectLst/>
+        </p:spPr>
+        <p:style>
+          <a:lnRef idx="1">
+            <a:schemeClr val="accent1"/>
+          </a:lnRef>
+          <a:fillRef idx="3">
+            <a:schemeClr val="accent1"/>
+          </a:fillRef>
+          <a:effectRef idx="2">
+            <a:schemeClr val="accent1"/>
+          </a:effectRef>
+          <a:fontRef idx="minor">
+            <a:schemeClr val="lt1"/>
+          </a:fontRef>
+        </p:style>
       </p:sp>
     </p:spTree>
     <p:extLst>
@@ -7027,13 +7406,18 @@
             <p:ph type="title"/>
           </p:nvPr>
         </p:nvSpPr>
-        <p:spPr/>
+        <p:spPr>
+          <a:xfrm>
+            <a:off x="677334" y="609600"/>
+            <a:ext cx="8596668" cy="1320800"/>
+          </a:xfrm>
+        </p:spPr>
         <p:txBody>
           <a:bodyPr/>
           <a:lstStyle/>
           <a:p>
             <a:r>
-              <a:rPr lang="fr-BE" dirty="0"/>
+              <a:rPr lang="fr-BE"/>
               <a:t>Des variables avec des noms</a:t>
             </a:r>
             <a:endParaRPr lang="fr-FR" dirty="0"/>
@@ -7056,7 +7440,12 @@
             <p:ph idx="1"/>
           </p:nvPr>
         </p:nvSpPr>
-        <p:spPr/>
+        <p:spPr>
+          <a:xfrm>
+            <a:off x="677334" y="1347042"/>
+            <a:ext cx="8596668" cy="3880773"/>
+          </a:xfrm>
+        </p:spPr>
         <p:txBody>
           <a:bodyPr/>
           <a:lstStyle/>
@@ -7110,8 +7499,8 @@
         </p:blipFill>
         <p:spPr>
           <a:xfrm>
-            <a:off x="624003" y="3179666"/>
-            <a:ext cx="4258726" cy="2455030"/>
+            <a:off x="203968" y="2201485"/>
+            <a:ext cx="5262261" cy="3033538"/>
           </a:xfrm>
           <a:prstGeom prst="rect">
             <a:avLst/>
@@ -7140,8 +7529,8 @@
         </p:blipFill>
         <p:spPr>
           <a:xfrm>
-            <a:off x="5103159" y="3179666"/>
-            <a:ext cx="4811307" cy="2462091"/>
+            <a:off x="5715001" y="2201485"/>
+            <a:ext cx="5913918" cy="3026330"/>
           </a:xfrm>
           <a:prstGeom prst="rect">
             <a:avLst/>
@@ -7164,6 +7553,14 @@
 <file path=ppt/slides/slide12.xml><?xml version="1.0" encoding="utf-8"?>
 <p:sld xmlns:a="http://schemas.openxmlformats.org/drawingml/2006/main" xmlns:r="http://schemas.openxmlformats.org/officeDocument/2006/relationships" xmlns:p="http://schemas.openxmlformats.org/presentationml/2006/main">
   <p:cSld>
+    <p:bg>
+      <p:bgPr>
+        <a:solidFill>
+          <a:schemeClr val="bg1"/>
+        </a:solidFill>
+        <a:effectLst/>
+      </p:bgPr>
+    </p:bg>
     <p:spTree>
       <p:nvGrpSpPr>
         <p:cNvPr id="1" name=""/>
@@ -7197,11 +7594,13 @@
         <p:spPr>
           <a:xfrm>
             <a:off x="677334" y="609600"/>
-            <a:ext cx="8596668" cy="775447"/>
+            <a:ext cx="8596668" cy="1320800"/>
           </a:xfrm>
         </p:spPr>
         <p:txBody>
-          <a:bodyPr/>
+          <a:bodyPr anchor="t">
+            <a:normAutofit/>
+          </a:bodyPr>
           <a:lstStyle/>
           <a:p>
             <a:r>
@@ -7230,12 +7629,14 @@
         </p:nvSpPr>
         <p:spPr>
           <a:xfrm>
-            <a:off x="677334" y="1548764"/>
-            <a:ext cx="8596668" cy="3880773"/>
+            <a:off x="6336287" y="2160589"/>
+            <a:ext cx="2934714" cy="3880773"/>
           </a:xfrm>
         </p:spPr>
         <p:txBody>
-          <a:bodyPr/>
+          <a:bodyPr>
+            <a:normAutofit/>
+          </a:bodyPr>
           <a:lstStyle/>
           <a:p>
             <a:r>
@@ -7260,16 +7661,15 @@
           </p:cNvPicPr>
           <p:nvPr/>
         </p:nvPicPr>
-        <p:blipFill>
+        <p:blipFill rotWithShape="1">
           <a:blip r:embed="rId2"/>
-          <a:stretch>
-            <a:fillRect/>
-          </a:stretch>
+          <a:srcRect r="3" b="3916"/>
+          <a:stretch/>
         </p:blipFill>
         <p:spPr>
           <a:xfrm>
-            <a:off x="4496299" y="2427247"/>
-            <a:ext cx="4667872" cy="3472090"/>
+            <a:off x="677334" y="2159331"/>
+            <a:ext cx="5423429" cy="3882362"/>
           </a:xfrm>
           <a:prstGeom prst="rect">
             <a:avLst/>
@@ -7364,7 +7764,12 @@
             <p:ph idx="1"/>
           </p:nvPr>
         </p:nvSpPr>
-        <p:spPr/>
+        <p:spPr>
+          <a:xfrm>
+            <a:off x="677512" y="2920348"/>
+            <a:ext cx="8596668" cy="3880773"/>
+          </a:xfrm>
+        </p:spPr>
         <p:txBody>
           <a:bodyPr/>
           <a:lstStyle/>
@@ -7424,7 +7829,7 @@
         <p:spPr>
           <a:xfrm>
             <a:off x="677690" y="1788546"/>
-            <a:ext cx="8596312" cy="2946350"/>
+            <a:ext cx="11142012" cy="3818878"/>
           </a:xfrm>
           <a:prstGeom prst="rect">
             <a:avLst/>
@@ -7521,7 +7926,12 @@
             <p:ph idx="1"/>
           </p:nvPr>
         </p:nvSpPr>
-        <p:spPr/>
+        <p:spPr>
+          <a:xfrm>
+            <a:off x="677334" y="2832942"/>
+            <a:ext cx="8596668" cy="3880773"/>
+          </a:xfrm>
+        </p:spPr>
         <p:txBody>
           <a:bodyPr/>
           <a:lstStyle/>
@@ -7581,7 +7991,7 @@
         <p:spPr>
           <a:xfrm>
             <a:off x="677334" y="1930400"/>
-            <a:ext cx="7395470" cy="3369909"/>
+            <a:ext cx="8910498" cy="4060265"/>
           </a:xfrm>
           <a:prstGeom prst="rect">
             <a:avLst/>
@@ -7985,7 +8395,12 @@
             <p:ph idx="1"/>
           </p:nvPr>
         </p:nvSpPr>
-        <p:spPr/>
+        <p:spPr>
+          <a:xfrm>
+            <a:off x="677334" y="1542025"/>
+            <a:ext cx="8596668" cy="3880773"/>
+          </a:xfrm>
+        </p:spPr>
         <p:txBody>
           <a:bodyPr/>
           <a:lstStyle/>
@@ -8039,8 +8454,8 @@
         </p:blipFill>
         <p:spPr>
           <a:xfrm>
-            <a:off x="677334" y="3606053"/>
-            <a:ext cx="12192000" cy="3048000"/>
+            <a:off x="677334" y="3135406"/>
+            <a:ext cx="13841504" cy="3460376"/>
           </a:xfrm>
           <a:prstGeom prst="rect">
             <a:avLst/>
@@ -8063,6 +8478,14 @@
 <file path=ppt/slides/slide17.xml><?xml version="1.0" encoding="utf-8"?>
 <p:sld xmlns:a="http://schemas.openxmlformats.org/drawingml/2006/main" xmlns:r="http://schemas.openxmlformats.org/officeDocument/2006/relationships" xmlns:p="http://schemas.openxmlformats.org/presentationml/2006/main">
   <p:cSld>
+    <p:bg>
+      <p:bgPr>
+        <a:solidFill>
+          <a:schemeClr val="bg1"/>
+        </a:solidFill>
+        <a:effectLst/>
+      </p:bgPr>
+    </p:bg>
     <p:spTree>
       <p:nvGrpSpPr>
         <p:cNvPr id="1" name=""/>
@@ -8077,6 +8500,66 @@
           <a:chExt cx="0" cy="0"/>
         </a:xfrm>
       </p:grpSpPr>
+      <p:sp useBgFill="1">
+        <p:nvSpPr>
+          <p:cNvPr id="8" name="Rectangle 7">
+            <a:extLst>
+              <a:ext uri="{FF2B5EF4-FFF2-40B4-BE49-F238E27FC236}">
+                <a16:creationId xmlns:a16="http://schemas.microsoft.com/office/drawing/2014/main" id="{8DF4D7F6-81B5-452A-9CE6-76D81F91D41B}"/>
+              </a:ext>
+              <a:ext uri="{C183D7F6-B498-43B3-948B-1728B52AA6E4}">
+                <adec:decorative xmlns:adec="http://schemas.microsoft.com/office/drawing/2017/decorative" val="1"/>
+              </a:ext>
+            </a:extLst>
+          </p:cNvPr>
+          <p:cNvSpPr>
+            <a:spLocks noGrp="1" noRot="1" noChangeAspect="1" noMove="1" noResize="1" noEditPoints="1" noAdjustHandles="1" noChangeArrowheads="1" noChangeShapeType="1" noTextEdit="1"/>
+          </p:cNvSpPr>
+          <p:nvPr>
+            <p:extLst>
+              <p:ext uri="{386F3935-93C4-4BCD-93E2-E3B085C9AB24}">
+                <p16:designElem xmlns:p16="http://schemas.microsoft.com/office/powerpoint/2015/main" val="1"/>
+              </p:ext>
+            </p:extLst>
+          </p:nvPr>
+        </p:nvSpPr>
+        <p:spPr>
+          <a:xfrm>
+            <a:off x="0" y="0"/>
+            <a:ext cx="12192000" cy="6858000"/>
+          </a:xfrm>
+          <a:prstGeom prst="rect">
+            <a:avLst/>
+          </a:prstGeom>
+          <a:ln>
+            <a:noFill/>
+          </a:ln>
+        </p:spPr>
+        <p:style>
+          <a:lnRef idx="2">
+            <a:schemeClr val="accent1">
+              <a:shade val="50000"/>
+            </a:schemeClr>
+          </a:lnRef>
+          <a:fillRef idx="1">
+            <a:schemeClr val="accent1"/>
+          </a:fillRef>
+          <a:effectRef idx="0">
+            <a:schemeClr val="accent1"/>
+          </a:effectRef>
+          <a:fontRef idx="minor">
+            <a:schemeClr val="lt1"/>
+          </a:fontRef>
+        </p:style>
+        <p:txBody>
+          <a:bodyPr rtlCol="0" anchor="ctr"/>
+          <a:lstStyle/>
+          <a:p>
+            <a:pPr algn="ctr"/>
+            <a:endParaRPr lang="en-US"/>
+          </a:p>
+        </p:txBody>
+      </p:sp>
       <p:sp>
         <p:nvSpPr>
           <p:cNvPr id="2" name="Titre 1">
@@ -8093,9 +8576,16 @@
             <p:ph type="title"/>
           </p:nvPr>
         </p:nvSpPr>
-        <p:spPr/>
-        <p:txBody>
-          <a:bodyPr/>
+        <p:spPr>
+          <a:xfrm>
+            <a:off x="1333502" y="609600"/>
+            <a:ext cx="8596668" cy="1320800"/>
+          </a:xfrm>
+        </p:spPr>
+        <p:txBody>
+          <a:bodyPr>
+            <a:normAutofit/>
+          </a:bodyPr>
           <a:lstStyle/>
           <a:p>
             <a:r>
@@ -8109,6 +8599,225 @@
           </a:p>
         </p:txBody>
       </p:sp>
+      <p:sp>
+        <p:nvSpPr>
+          <p:cNvPr id="10" name="Isosceles Triangle 9">
+            <a:extLst>
+              <a:ext uri="{FF2B5EF4-FFF2-40B4-BE49-F238E27FC236}">
+                <a16:creationId xmlns:a16="http://schemas.microsoft.com/office/drawing/2014/main" id="{4600514D-20FB-4559-97DC-D1DC39E6C3DE}"/>
+              </a:ext>
+              <a:ext uri="{C183D7F6-B498-43B3-948B-1728B52AA6E4}">
+                <adec:decorative xmlns:adec="http://schemas.microsoft.com/office/drawing/2017/decorative" val="1"/>
+              </a:ext>
+            </a:extLst>
+          </p:cNvPr>
+          <p:cNvSpPr>
+            <a:spLocks noGrp="1" noRot="1" noChangeAspect="1" noMove="1" noResize="1" noEditPoints="1" noAdjustHandles="1" noChangeArrowheads="1" noChangeShapeType="1" noTextEdit="1"/>
+          </p:cNvSpPr>
+          <p:nvPr>
+            <p:extLst>
+              <p:ext uri="{386F3935-93C4-4BCD-93E2-E3B085C9AB24}">
+                <p16:designElem xmlns:p16="http://schemas.microsoft.com/office/powerpoint/2015/main" val="1"/>
+              </p:ext>
+            </p:extLst>
+          </p:nvPr>
+        </p:nvSpPr>
+        <p:spPr>
+          <a:xfrm flipV="1">
+            <a:off x="0" y="0"/>
+            <a:ext cx="448733" cy="2844800"/>
+          </a:xfrm>
+          <a:prstGeom prst="triangle">
+            <a:avLst>
+              <a:gd name="adj" fmla="val 0"/>
+            </a:avLst>
+          </a:prstGeom>
+          <a:solidFill>
+            <a:schemeClr val="accent1">
+              <a:alpha val="85000"/>
+            </a:schemeClr>
+          </a:solidFill>
+          <a:ln>
+            <a:noFill/>
+          </a:ln>
+          <a:effectLst/>
+        </p:spPr>
+        <p:style>
+          <a:lnRef idx="1">
+            <a:schemeClr val="accent1"/>
+          </a:lnRef>
+          <a:fillRef idx="3">
+            <a:schemeClr val="accent1"/>
+          </a:fillRef>
+          <a:effectRef idx="2">
+            <a:schemeClr val="accent1"/>
+          </a:effectRef>
+          <a:fontRef idx="minor">
+            <a:schemeClr val="lt1"/>
+          </a:fontRef>
+        </p:style>
+      </p:sp>
+      <p:sp>
+        <p:nvSpPr>
+          <p:cNvPr id="12" name="Isosceles Triangle 11">
+            <a:extLst>
+              <a:ext uri="{FF2B5EF4-FFF2-40B4-BE49-F238E27FC236}">
+                <a16:creationId xmlns:a16="http://schemas.microsoft.com/office/drawing/2014/main" id="{266F638A-E405-4AC0-B984-72E5813B0DD1}"/>
+              </a:ext>
+              <a:ext uri="{C183D7F6-B498-43B3-948B-1728B52AA6E4}">
+                <adec:decorative xmlns:adec="http://schemas.microsoft.com/office/drawing/2017/decorative" val="1"/>
+              </a:ext>
+            </a:extLst>
+          </p:cNvPr>
+          <p:cNvSpPr>
+            <a:spLocks noGrp="1" noRot="1" noChangeAspect="1" noMove="1" noResize="1" noEditPoints="1" noAdjustHandles="1" noChangeArrowheads="1" noChangeShapeType="1" noTextEdit="1"/>
+          </p:cNvSpPr>
+          <p:nvPr>
+            <p:extLst>
+              <p:ext uri="{386F3935-93C4-4BCD-93E2-E3B085C9AB24}">
+                <p16:designElem xmlns:p16="http://schemas.microsoft.com/office/powerpoint/2015/main" val="1"/>
+              </p:ext>
+            </p:extLst>
+          </p:nvPr>
+        </p:nvSpPr>
+        <p:spPr>
+          <a:xfrm>
+            <a:off x="7738534" y="3818467"/>
+            <a:ext cx="4450292" cy="3039533"/>
+          </a:xfrm>
+          <a:prstGeom prst="triangle">
+            <a:avLst>
+              <a:gd name="adj" fmla="val 100000"/>
+            </a:avLst>
+          </a:prstGeom>
+          <a:solidFill>
+            <a:schemeClr val="accent1"/>
+          </a:solidFill>
+          <a:ln>
+            <a:noFill/>
+          </a:ln>
+          <a:effectLst/>
+        </p:spPr>
+        <p:style>
+          <a:lnRef idx="1">
+            <a:schemeClr val="accent1"/>
+          </a:lnRef>
+          <a:fillRef idx="3">
+            <a:schemeClr val="accent1"/>
+          </a:fillRef>
+          <a:effectRef idx="2">
+            <a:schemeClr val="accent1"/>
+          </a:effectRef>
+          <a:fontRef idx="minor">
+            <a:schemeClr val="lt1"/>
+          </a:fontRef>
+        </p:style>
+      </p:sp>
+      <p:cxnSp>
+        <p:nvCxnSpPr>
+          <p:cNvPr id="14" name="Straight Connector 13">
+            <a:extLst>
+              <a:ext uri="{FF2B5EF4-FFF2-40B4-BE49-F238E27FC236}">
+                <a16:creationId xmlns:a16="http://schemas.microsoft.com/office/drawing/2014/main" id="{7D1CBE93-B17D-4509-843C-82287C38032A}"/>
+              </a:ext>
+              <a:ext uri="{C183D7F6-B498-43B3-948B-1728B52AA6E4}">
+                <adec:decorative xmlns:adec="http://schemas.microsoft.com/office/drawing/2017/decorative" val="1"/>
+              </a:ext>
+            </a:extLst>
+          </p:cNvPr>
+          <p:cNvCxnSpPr>
+            <a:cxnSpLocks noGrp="1" noRot="1" noChangeAspect="1" noMove="1" noResize="1" noEditPoints="1" noAdjustHandles="1" noChangeArrowheads="1" noChangeShapeType="1"/>
+          </p:cNvCxnSpPr>
+          <p:nvPr>
+            <p:extLst>
+              <p:ext uri="{386F3935-93C4-4BCD-93E2-E3B085C9AB24}">
+                <p16:designElem xmlns:p16="http://schemas.microsoft.com/office/powerpoint/2015/main" val="1"/>
+              </p:ext>
+            </p:extLst>
+          </p:nvPr>
+        </p:nvCxnSpPr>
+        <p:spPr>
+          <a:xfrm>
+            <a:off x="10134600" y="0"/>
+            <a:ext cx="1727200" cy="6858000"/>
+          </a:xfrm>
+          <a:prstGeom prst="line">
+            <a:avLst/>
+          </a:prstGeom>
+          <a:ln w="15875" cap="sq">
+            <a:solidFill>
+              <a:schemeClr val="accent2"/>
+            </a:solidFill>
+            <a:bevel/>
+          </a:ln>
+        </p:spPr>
+        <p:style>
+          <a:lnRef idx="2">
+            <a:schemeClr val="accent1"/>
+          </a:lnRef>
+          <a:fillRef idx="0">
+            <a:schemeClr val="accent1"/>
+          </a:fillRef>
+          <a:effectRef idx="1">
+            <a:schemeClr val="accent1"/>
+          </a:effectRef>
+          <a:fontRef idx="minor">
+            <a:schemeClr val="tx1"/>
+          </a:fontRef>
+        </p:style>
+      </p:cxnSp>
+      <p:cxnSp>
+        <p:nvCxnSpPr>
+          <p:cNvPr id="16" name="Straight Connector 15">
+            <a:extLst>
+              <a:ext uri="{FF2B5EF4-FFF2-40B4-BE49-F238E27FC236}">
+                <a16:creationId xmlns:a16="http://schemas.microsoft.com/office/drawing/2014/main" id="{AE6277B4-6A43-48AB-89B2-3442221619CC}"/>
+              </a:ext>
+              <a:ext uri="{C183D7F6-B498-43B3-948B-1728B52AA6E4}">
+                <adec:decorative xmlns:adec="http://schemas.microsoft.com/office/drawing/2017/decorative" val="1"/>
+              </a:ext>
+            </a:extLst>
+          </p:cNvPr>
+          <p:cNvCxnSpPr>
+            <a:cxnSpLocks noGrp="1" noRot="1" noChangeAspect="1" noMove="1" noResize="1" noEditPoints="1" noAdjustHandles="1" noChangeArrowheads="1" noChangeShapeType="1"/>
+          </p:cNvCxnSpPr>
+          <p:nvPr>
+            <p:extLst>
+              <p:ext uri="{386F3935-93C4-4BCD-93E2-E3B085C9AB24}">
+                <p16:designElem xmlns:p16="http://schemas.microsoft.com/office/powerpoint/2015/main" val="1"/>
+              </p:ext>
+            </p:extLst>
+          </p:nvPr>
+        </p:nvCxnSpPr>
+        <p:spPr>
+          <a:xfrm flipH="1">
+            <a:off x="7425267" y="3681413"/>
+            <a:ext cx="4763558" cy="3176587"/>
+          </a:xfrm>
+          <a:prstGeom prst="line">
+            <a:avLst/>
+          </a:prstGeom>
+          <a:ln w="15875">
+            <a:solidFill>
+              <a:schemeClr val="accent1"/>
+            </a:solidFill>
+          </a:ln>
+        </p:spPr>
+        <p:style>
+          <a:lnRef idx="2">
+            <a:schemeClr val="accent1"/>
+          </a:lnRef>
+          <a:fillRef idx="0">
+            <a:schemeClr val="accent1"/>
+          </a:fillRef>
+          <a:effectRef idx="1">
+            <a:schemeClr val="accent1"/>
+          </a:effectRef>
+          <a:fontRef idx="minor">
+            <a:schemeClr val="tx1"/>
+          </a:fontRef>
+        </p:style>
+      </p:cxnSp>
       <p:sp>
         <p:nvSpPr>
           <p:cNvPr id="3" name="Espace réservé du contenu 2">
@@ -8125,9 +8834,16 @@
             <p:ph idx="1"/>
           </p:nvPr>
         </p:nvSpPr>
-        <p:spPr/>
-        <p:txBody>
-          <a:bodyPr/>
+        <p:spPr>
+          <a:xfrm>
+            <a:off x="1333502" y="2160590"/>
+            <a:ext cx="8470898" cy="3429260"/>
+          </a:xfrm>
+        </p:spPr>
+        <p:txBody>
+          <a:bodyPr>
+            <a:normAutofit/>
+          </a:bodyPr>
           <a:lstStyle/>
           <a:p>
             <a:r>
@@ -8217,6 +8933,84 @@
             <a:endParaRPr lang="fr-FR" dirty="0"/>
           </a:p>
         </p:txBody>
+      </p:sp>
+      <p:sp>
+        <p:nvSpPr>
+          <p:cNvPr id="18" name="Rectangle 27">
+            <a:extLst>
+              <a:ext uri="{FF2B5EF4-FFF2-40B4-BE49-F238E27FC236}">
+                <a16:creationId xmlns:a16="http://schemas.microsoft.com/office/drawing/2014/main" id="{27B538D5-95DB-47ED-9CB4-34AE5BF78E6B}"/>
+              </a:ext>
+              <a:ext uri="{C183D7F6-B498-43B3-948B-1728B52AA6E4}">
+                <adec:decorative xmlns:adec="http://schemas.microsoft.com/office/drawing/2017/decorative" val="1"/>
+              </a:ext>
+            </a:extLst>
+          </p:cNvPr>
+          <p:cNvSpPr>
+            <a:spLocks noGrp="1" noRot="1" noChangeAspect="1" noMove="1" noResize="1" noEditPoints="1" noAdjustHandles="1" noChangeArrowheads="1" noChangeShapeType="1" noTextEdit="1"/>
+          </p:cNvSpPr>
+          <p:nvPr>
+            <p:extLst>
+              <p:ext uri="{386F3935-93C4-4BCD-93E2-E3B085C9AB24}">
+                <p16:designElem xmlns:p16="http://schemas.microsoft.com/office/powerpoint/2015/main" val="1"/>
+              </p:ext>
+            </p:extLst>
+          </p:nvPr>
+        </p:nvSpPr>
+        <p:spPr>
+          <a:xfrm>
+            <a:off x="10425641" y="0"/>
+            <a:ext cx="1766359" cy="6858000"/>
+          </a:xfrm>
+          <a:custGeom>
+            <a:avLst/>
+            <a:gdLst/>
+            <a:ahLst/>
+            <a:cxnLst/>
+            <a:rect l="l" t="t" r="r" b="b"/>
+            <a:pathLst>
+              <a:path w="2858013" h="6866467">
+                <a:moveTo>
+                  <a:pt x="0" y="0"/>
+                </a:moveTo>
+                <a:lnTo>
+                  <a:pt x="2858013" y="0"/>
+                </a:lnTo>
+                <a:lnTo>
+                  <a:pt x="2858013" y="6866467"/>
+                </a:lnTo>
+                <a:lnTo>
+                  <a:pt x="2473942" y="6866467"/>
+                </a:lnTo>
+                <a:lnTo>
+                  <a:pt x="0" y="0"/>
+                </a:lnTo>
+                <a:close/>
+              </a:path>
+            </a:pathLst>
+          </a:custGeom>
+          <a:solidFill>
+            <a:schemeClr val="accent2"/>
+          </a:solidFill>
+          <a:ln>
+            <a:noFill/>
+          </a:ln>
+          <a:effectLst/>
+        </p:spPr>
+        <p:style>
+          <a:lnRef idx="1">
+            <a:schemeClr val="accent1"/>
+          </a:lnRef>
+          <a:fillRef idx="3">
+            <a:schemeClr val="accent1"/>
+          </a:fillRef>
+          <a:effectRef idx="2">
+            <a:schemeClr val="accent1"/>
+          </a:effectRef>
+          <a:fontRef idx="minor">
+            <a:schemeClr val="lt1"/>
+          </a:fontRef>
+        </p:style>
       </p:sp>
     </p:spTree>
     <p:extLst>
@@ -8234,6 +9028,14 @@
 <file path=ppt/slides/slide18.xml><?xml version="1.0" encoding="utf-8"?>
 <p:sld xmlns:a="http://schemas.openxmlformats.org/drawingml/2006/main" xmlns:r="http://schemas.openxmlformats.org/officeDocument/2006/relationships" xmlns:p="http://schemas.openxmlformats.org/presentationml/2006/main">
   <p:cSld>
+    <p:bg>
+      <p:bgPr>
+        <a:solidFill>
+          <a:schemeClr val="bg1"/>
+        </a:solidFill>
+        <a:effectLst/>
+      </p:bgPr>
+    </p:bg>
     <p:spTree>
       <p:nvGrpSpPr>
         <p:cNvPr id="1" name=""/>
@@ -8248,6 +9050,53 @@
           <a:chExt cx="0" cy="0"/>
         </a:xfrm>
       </p:grpSpPr>
+      <p:cxnSp>
+        <p:nvCxnSpPr>
+          <p:cNvPr id="8" name="Straight Connector 7">
+            <a:extLst>
+              <a:ext uri="{FF2B5EF4-FFF2-40B4-BE49-F238E27FC236}">
+                <a16:creationId xmlns:a16="http://schemas.microsoft.com/office/drawing/2014/main" id="{0B5F7E3B-C5F1-40E0-A491-558BAFBC1127}"/>
+              </a:ext>
+              <a:ext uri="{C183D7F6-B498-43B3-948B-1728B52AA6E4}">
+                <adec:decorative xmlns:adec="http://schemas.microsoft.com/office/drawing/2017/decorative" val="1"/>
+              </a:ext>
+            </a:extLst>
+          </p:cNvPr>
+          <p:cNvCxnSpPr>
+            <a:cxnSpLocks noGrp="1" noRot="1" noChangeAspect="1" noMove="1" noResize="1" noEditPoints="1" noAdjustHandles="1" noChangeArrowheads="1" noChangeShapeType="1"/>
+          </p:cNvCxnSpPr>
+          <p:nvPr>
+            <p:extLst>
+              <p:ext uri="{386F3935-93C4-4BCD-93E2-E3B085C9AB24}">
+                <p16:designElem xmlns:p16="http://schemas.microsoft.com/office/powerpoint/2015/main" val="1"/>
+              </p:ext>
+            </p:extLst>
+          </p:nvPr>
+        </p:nvCxnSpPr>
+        <p:spPr>
+          <a:xfrm>
+            <a:off x="4241804" y="1460500"/>
+            <a:ext cx="0" cy="3937000"/>
+          </a:xfrm>
+          <a:prstGeom prst="line">
+            <a:avLst/>
+          </a:prstGeom>
+        </p:spPr>
+        <p:style>
+          <a:lnRef idx="1">
+            <a:schemeClr val="accent1"/>
+          </a:lnRef>
+          <a:fillRef idx="0">
+            <a:schemeClr val="accent1"/>
+          </a:fillRef>
+          <a:effectRef idx="0">
+            <a:schemeClr val="accent1"/>
+          </a:effectRef>
+          <a:fontRef idx="minor">
+            <a:schemeClr val="tx1"/>
+          </a:fontRef>
+        </p:style>
+      </p:cxnSp>
       <p:sp>
         <p:nvSpPr>
           <p:cNvPr id="2" name="Titre 1">
@@ -8264,9 +9113,16 @@
             <p:ph type="title"/>
           </p:nvPr>
         </p:nvSpPr>
-        <p:spPr/>
-        <p:txBody>
-          <a:bodyPr/>
+        <p:spPr>
+          <a:xfrm>
+            <a:off x="643467" y="816638"/>
+            <a:ext cx="3367359" cy="5224724"/>
+          </a:xfrm>
+        </p:spPr>
+        <p:txBody>
+          <a:bodyPr anchor="ctr">
+            <a:normAutofit/>
+          </a:bodyPr>
           <a:lstStyle/>
           <a:p>
             <a:r>
@@ -8293,9 +9149,16 @@
             <p:ph idx="1"/>
           </p:nvPr>
         </p:nvSpPr>
-        <p:spPr/>
-        <p:txBody>
-          <a:bodyPr/>
+        <p:spPr>
+          <a:xfrm>
+            <a:off x="4654295" y="816638"/>
+            <a:ext cx="4619706" cy="5224724"/>
+          </a:xfrm>
+        </p:spPr>
+        <p:txBody>
+          <a:bodyPr anchor="ctr">
+            <a:normAutofit/>
+          </a:bodyPr>
           <a:lstStyle/>
           <a:p>
             <a:r>
@@ -8411,7 +9274,12 @@
             <p:ph type="title"/>
           </p:nvPr>
         </p:nvSpPr>
-        <p:spPr/>
+        <p:spPr>
+          <a:xfrm>
+            <a:off x="677334" y="609600"/>
+            <a:ext cx="8596668" cy="1320800"/>
+          </a:xfrm>
+        </p:spPr>
         <p:txBody>
           <a:bodyPr/>
           <a:lstStyle/>
@@ -8439,7 +9307,12 @@
             <p:ph idx="1"/>
           </p:nvPr>
         </p:nvSpPr>
-        <p:spPr/>
+        <p:spPr>
+          <a:xfrm>
+            <a:off x="677334" y="2160589"/>
+            <a:ext cx="8596668" cy="3880773"/>
+          </a:xfrm>
+        </p:spPr>
         <p:txBody>
           <a:bodyPr>
             <a:normAutofit lnSpcReduction="10000"/>
@@ -8447,78 +9320,67 @@
           <a:lstStyle/>
           <a:p>
             <a:r>
-              <a:rPr lang="fr-FR" dirty="0"/>
+              <a:rPr lang="fr-FR"/>
               <a:t>Les fonctions doivent être courtes</a:t>
             </a:r>
           </a:p>
           <a:p>
             <a:r>
-              <a:rPr lang="fr-FR" dirty="0"/>
+              <a:rPr lang="fr-FR"/>
               <a:t>Un minimum d’effet de bord</a:t>
             </a:r>
           </a:p>
           <a:p>
             <a:pPr lvl="1"/>
             <a:r>
-              <a:rPr lang="fr-FR" dirty="0"/>
+              <a:rPr lang="fr-FR"/>
               <a:t>Faites un maximum de fonction pures. </a:t>
             </a:r>
           </a:p>
           <a:p>
             <a:pPr lvl="2"/>
             <a:r>
-              <a:rPr lang="fr-FR" dirty="0"/>
+              <a:rPr lang="fr-FR"/>
               <a:t>Ne dépend que des argument</a:t>
             </a:r>
           </a:p>
           <a:p>
             <a:pPr lvl="2"/>
             <a:r>
-              <a:rPr lang="fr-FR" dirty="0"/>
-              <a:t>Ne modifie aucun autre </a:t>
-            </a:r>
-            <a:r>
-              <a:rPr lang="fr-FR" dirty="0" err="1"/>
-              <a:t>object</a:t>
-            </a:r>
-            <a:r>
-              <a:rPr lang="fr-FR" dirty="0"/>
-              <a:t>/valeur/structure</a:t>
+              <a:rPr lang="fr-FR"/>
+              <a:t>Ne modifie aucun autre object/valeur/structure</a:t>
             </a:r>
           </a:p>
           <a:p>
             <a:pPr lvl="1"/>
             <a:r>
-              <a:rPr lang="fr-FR" dirty="0"/>
+              <a:rPr lang="fr-FR"/>
               <a:t>Une fonction doit faire une et une unique chose. Tout ce qui est superflu est malvenu</a:t>
             </a:r>
           </a:p>
           <a:p>
             <a:r>
-              <a:rPr lang="fr-FR" dirty="0"/>
+              <a:rPr lang="fr-FR"/>
               <a:t>Le moins d’argument possible</a:t>
             </a:r>
           </a:p>
           <a:p>
             <a:pPr lvl="1"/>
             <a:r>
-              <a:rPr lang="fr-FR" dirty="0"/>
+              <a:rPr lang="fr-FR"/>
               <a:t>0 est excellent. 1 est ok. 2 doivent avoir une bonne raison. 3 ou plus doivent être validé par le pape.</a:t>
             </a:r>
           </a:p>
           <a:p>
             <a:r>
-              <a:rPr lang="fr-BE" dirty="0"/>
+              <a:rPr lang="fr-BE"/>
               <a:t>R</a:t>
             </a:r>
             <a:r>
-              <a:rPr lang="fr-FR" dirty="0" err="1"/>
-              <a:t>ègle</a:t>
-            </a:r>
-            <a:r>
-              <a:rPr lang="fr-FR" dirty="0"/>
-              <a:t> des 10 secondes: Si on ne peut pas comprendre en 10 secondes ce que fait une fonction, elle est trop compliquée</a:t>
-            </a:r>
+              <a:rPr lang="fr-FR"/>
+              <a:t>ègle des 10 secondes: Si on ne peut pas comprendre en 10 secondes ce que fait une fonction, elle est trop compliquée</a:t>
+            </a:r>
+            <a:endParaRPr lang="fr-FR" dirty="0"/>
           </a:p>
         </p:txBody>
       </p:sp>
@@ -8728,7 +9590,12 @@
             <p:ph idx="1"/>
           </p:nvPr>
         </p:nvSpPr>
-        <p:spPr/>
+        <p:spPr>
+          <a:xfrm>
+            <a:off x="677334" y="1562072"/>
+            <a:ext cx="8596668" cy="3880773"/>
+          </a:xfrm>
+        </p:spPr>
         <p:txBody>
           <a:bodyPr/>
           <a:lstStyle/>
@@ -8765,8 +9632,8 @@
         </p:blipFill>
         <p:spPr>
           <a:xfrm>
-            <a:off x="1297676" y="2751985"/>
-            <a:ext cx="7355984" cy="3496415"/>
+            <a:off x="677334" y="2120218"/>
+            <a:ext cx="9285588" cy="4413586"/>
           </a:xfrm>
           <a:prstGeom prst="rect">
             <a:avLst/>
@@ -8789,6 +9656,14 @@
 <file path=ppt/slides/slide21.xml><?xml version="1.0" encoding="utf-8"?>
 <p:sld xmlns:a="http://schemas.openxmlformats.org/drawingml/2006/main" xmlns:r="http://schemas.openxmlformats.org/officeDocument/2006/relationships" xmlns:p="http://schemas.openxmlformats.org/presentationml/2006/main">
   <p:cSld>
+    <p:bg>
+      <p:bgPr>
+        <a:solidFill>
+          <a:schemeClr val="bg1"/>
+        </a:solidFill>
+        <a:effectLst/>
+      </p:bgPr>
+    </p:bg>
     <p:spTree>
       <p:nvGrpSpPr>
         <p:cNvPr id="1" name=""/>
@@ -8803,6 +9678,53 @@
           <a:chExt cx="0" cy="0"/>
         </a:xfrm>
       </p:grpSpPr>
+      <p:cxnSp>
+        <p:nvCxnSpPr>
+          <p:cNvPr id="8" name="Straight Connector 7">
+            <a:extLst>
+              <a:ext uri="{FF2B5EF4-FFF2-40B4-BE49-F238E27FC236}">
+                <a16:creationId xmlns:a16="http://schemas.microsoft.com/office/drawing/2014/main" id="{0B5F7E3B-C5F1-40E0-A491-558BAFBC1127}"/>
+              </a:ext>
+              <a:ext uri="{C183D7F6-B498-43B3-948B-1728B52AA6E4}">
+                <adec:decorative xmlns:adec="http://schemas.microsoft.com/office/drawing/2017/decorative" val="1"/>
+              </a:ext>
+            </a:extLst>
+          </p:cNvPr>
+          <p:cNvCxnSpPr>
+            <a:cxnSpLocks noGrp="1" noRot="1" noChangeAspect="1" noMove="1" noResize="1" noEditPoints="1" noAdjustHandles="1" noChangeArrowheads="1" noChangeShapeType="1"/>
+          </p:cNvCxnSpPr>
+          <p:nvPr>
+            <p:extLst>
+              <p:ext uri="{386F3935-93C4-4BCD-93E2-E3B085C9AB24}">
+                <p16:designElem xmlns:p16="http://schemas.microsoft.com/office/powerpoint/2015/main" val="1"/>
+              </p:ext>
+            </p:extLst>
+          </p:nvPr>
+        </p:nvCxnSpPr>
+        <p:spPr>
+          <a:xfrm>
+            <a:off x="4241804" y="1460500"/>
+            <a:ext cx="0" cy="3937000"/>
+          </a:xfrm>
+          <a:prstGeom prst="line">
+            <a:avLst/>
+          </a:prstGeom>
+        </p:spPr>
+        <p:style>
+          <a:lnRef idx="1">
+            <a:schemeClr val="accent1"/>
+          </a:lnRef>
+          <a:fillRef idx="0">
+            <a:schemeClr val="accent1"/>
+          </a:fillRef>
+          <a:effectRef idx="0">
+            <a:schemeClr val="accent1"/>
+          </a:effectRef>
+          <a:fontRef idx="minor">
+            <a:schemeClr val="tx1"/>
+          </a:fontRef>
+        </p:style>
+      </p:cxnSp>
       <p:sp>
         <p:nvSpPr>
           <p:cNvPr id="2" name="Titre 1">
@@ -8819,9 +9741,16 @@
             <p:ph type="title"/>
           </p:nvPr>
         </p:nvSpPr>
-        <p:spPr/>
-        <p:txBody>
-          <a:bodyPr/>
+        <p:spPr>
+          <a:xfrm>
+            <a:off x="643467" y="816638"/>
+            <a:ext cx="3367359" cy="5224724"/>
+          </a:xfrm>
+        </p:spPr>
+        <p:txBody>
+          <a:bodyPr anchor="ctr">
+            <a:normAutofit/>
+          </a:bodyPr>
           <a:lstStyle/>
           <a:p>
             <a:r>
@@ -8855,9 +9784,16 @@
             <p:ph idx="1"/>
           </p:nvPr>
         </p:nvSpPr>
-        <p:spPr/>
-        <p:txBody>
-          <a:bodyPr/>
+        <p:spPr>
+          <a:xfrm>
+            <a:off x="4654295" y="816638"/>
+            <a:ext cx="4619706" cy="5224724"/>
+          </a:xfrm>
+        </p:spPr>
+        <p:txBody>
+          <a:bodyPr anchor="ctr">
+            <a:normAutofit/>
+          </a:bodyPr>
           <a:lstStyle/>
           <a:p>
             <a:r>
@@ -9839,6 +10775,14 @@
 <file path=ppt/slides/slide3.xml><?xml version="1.0" encoding="utf-8"?>
 <p:sld xmlns:a="http://schemas.openxmlformats.org/drawingml/2006/main" xmlns:r="http://schemas.openxmlformats.org/officeDocument/2006/relationships" xmlns:p="http://schemas.openxmlformats.org/presentationml/2006/main">
   <p:cSld>
+    <p:bg>
+      <p:bgPr>
+        <a:solidFill>
+          <a:schemeClr val="bg1"/>
+        </a:solidFill>
+        <a:effectLst/>
+      </p:bgPr>
+    </p:bg>
     <p:spTree>
       <p:nvGrpSpPr>
         <p:cNvPr id="1" name=""/>
@@ -9869,9 +10813,16 @@
             <p:ph type="title"/>
           </p:nvPr>
         </p:nvSpPr>
-        <p:spPr/>
-        <p:txBody>
-          <a:bodyPr/>
+        <p:spPr>
+          <a:xfrm>
+            <a:off x="4159225" y="609600"/>
+            <a:ext cx="5114776" cy="1320800"/>
+          </a:xfrm>
+        </p:spPr>
+        <p:txBody>
+          <a:bodyPr>
+            <a:normAutofit/>
+          </a:bodyPr>
           <a:lstStyle/>
           <a:p>
             <a:r>
@@ -9881,6 +10832,596 @@
             <a:endParaRPr lang="fr-FR" dirty="0"/>
           </a:p>
         </p:txBody>
+      </p:sp>
+      <p:pic>
+        <p:nvPicPr>
+          <p:cNvPr id="5" name="Image 4">
+            <a:extLst>
+              <a:ext uri="{FF2B5EF4-FFF2-40B4-BE49-F238E27FC236}">
+                <a16:creationId xmlns:a16="http://schemas.microsoft.com/office/drawing/2014/main" id="{9343C02A-DACE-4E4C-B323-8AD2B6CE6F97}"/>
+              </a:ext>
+            </a:extLst>
+          </p:cNvPr>
+          <p:cNvPicPr>
+            <a:picLocks noChangeAspect="1"/>
+          </p:cNvPicPr>
+          <p:nvPr/>
+        </p:nvPicPr>
+        <p:blipFill rotWithShape="1">
+          <a:blip r:embed="rId2">
+            <a:alphaModFix/>
+          </a:blip>
+          <a:srcRect l="21295" r="3107" b="-2"/>
+          <a:stretch/>
+        </p:blipFill>
+        <p:spPr>
+          <a:xfrm>
+            <a:off x="593649" y="10"/>
+            <a:ext cx="3433363" cy="1714490"/>
+          </a:xfrm>
+          <a:custGeom>
+            <a:avLst/>
+            <a:gdLst>
+              <a:gd name="connsiteX0" fmla="*/ 254958 w 3433363"/>
+              <a:gd name="connsiteY0" fmla="*/ 0 h 1714500"/>
+              <a:gd name="connsiteX1" fmla="*/ 3433363 w 3433363"/>
+              <a:gd name="connsiteY1" fmla="*/ 0 h 1714500"/>
+              <a:gd name="connsiteX2" fmla="*/ 3386734 w 3433363"/>
+              <a:gd name="connsiteY2" fmla="*/ 312174 h 1714500"/>
+              <a:gd name="connsiteX3" fmla="*/ 3386620 w 3433363"/>
+              <a:gd name="connsiteY3" fmla="*/ 312174 h 1714500"/>
+              <a:gd name="connsiteX4" fmla="*/ 3177155 w 3433363"/>
+              <a:gd name="connsiteY4" fmla="*/ 1714500 h 1714500"/>
+              <a:gd name="connsiteX5" fmla="*/ 0 w 3433363"/>
+              <a:gd name="connsiteY5" fmla="*/ 1714500 h 1714500"/>
+            </a:gdLst>
+            <a:ahLst/>
+            <a:cxnLst>
+              <a:cxn ang="0">
+                <a:pos x="connsiteX0" y="connsiteY0"/>
+              </a:cxn>
+              <a:cxn ang="0">
+                <a:pos x="connsiteX1" y="connsiteY1"/>
+              </a:cxn>
+              <a:cxn ang="0">
+                <a:pos x="connsiteX2" y="connsiteY2"/>
+              </a:cxn>
+              <a:cxn ang="0">
+                <a:pos x="connsiteX3" y="connsiteY3"/>
+              </a:cxn>
+              <a:cxn ang="0">
+                <a:pos x="connsiteX4" y="connsiteY4"/>
+              </a:cxn>
+              <a:cxn ang="0">
+                <a:pos x="connsiteX5" y="connsiteY5"/>
+              </a:cxn>
+            </a:cxnLst>
+            <a:rect l="l" t="t" r="r" b="b"/>
+            <a:pathLst>
+              <a:path w="3433363" h="1714500">
+                <a:moveTo>
+                  <a:pt x="254958" y="0"/>
+                </a:moveTo>
+                <a:lnTo>
+                  <a:pt x="3433363" y="0"/>
+                </a:lnTo>
+                <a:lnTo>
+                  <a:pt x="3386734" y="312174"/>
+                </a:lnTo>
+                <a:lnTo>
+                  <a:pt x="3386620" y="312174"/>
+                </a:lnTo>
+                <a:lnTo>
+                  <a:pt x="3177155" y="1714500"/>
+                </a:lnTo>
+                <a:lnTo>
+                  <a:pt x="0" y="1714500"/>
+                </a:lnTo>
+                <a:close/>
+              </a:path>
+            </a:pathLst>
+          </a:custGeom>
+        </p:spPr>
+      </p:pic>
+      <p:pic>
+        <p:nvPicPr>
+          <p:cNvPr id="9" name="Image 8">
+            <a:extLst>
+              <a:ext uri="{FF2B5EF4-FFF2-40B4-BE49-F238E27FC236}">
+                <a16:creationId xmlns:a16="http://schemas.microsoft.com/office/drawing/2014/main" id="{1AC4F439-7667-474A-A4BE-D8C06C08CCD7}"/>
+              </a:ext>
+            </a:extLst>
+          </p:cNvPr>
+          <p:cNvPicPr>
+            <a:picLocks noChangeAspect="1"/>
+          </p:cNvPicPr>
+          <p:nvPr/>
+        </p:nvPicPr>
+        <p:blipFill rotWithShape="1">
+          <a:blip r:embed="rId3">
+            <a:alphaModFix/>
+          </a:blip>
+          <a:srcRect t="26367" r="-1" b="27175"/>
+          <a:stretch/>
+        </p:blipFill>
+        <p:spPr>
+          <a:xfrm>
+            <a:off x="338691" y="1714500"/>
+            <a:ext cx="3432113" cy="1714500"/>
+          </a:xfrm>
+          <a:custGeom>
+            <a:avLst/>
+            <a:gdLst>
+              <a:gd name="connsiteX0" fmla="*/ 254958 w 3432113"/>
+              <a:gd name="connsiteY0" fmla="*/ 0 h 1714500"/>
+              <a:gd name="connsiteX1" fmla="*/ 3432113 w 3432113"/>
+              <a:gd name="connsiteY1" fmla="*/ 0 h 1714500"/>
+              <a:gd name="connsiteX2" fmla="*/ 3176018 w 3432113"/>
+              <a:gd name="connsiteY2" fmla="*/ 1714500 h 1714500"/>
+              <a:gd name="connsiteX3" fmla="*/ 0 w 3432113"/>
+              <a:gd name="connsiteY3" fmla="*/ 1714500 h 1714500"/>
+            </a:gdLst>
+            <a:ahLst/>
+            <a:cxnLst>
+              <a:cxn ang="0">
+                <a:pos x="connsiteX0" y="connsiteY0"/>
+              </a:cxn>
+              <a:cxn ang="0">
+                <a:pos x="connsiteX1" y="connsiteY1"/>
+              </a:cxn>
+              <a:cxn ang="0">
+                <a:pos x="connsiteX2" y="connsiteY2"/>
+              </a:cxn>
+              <a:cxn ang="0">
+                <a:pos x="connsiteX3" y="connsiteY3"/>
+              </a:cxn>
+            </a:cxnLst>
+            <a:rect l="l" t="t" r="r" b="b"/>
+            <a:pathLst>
+              <a:path w="3432113" h="1714500">
+                <a:moveTo>
+                  <a:pt x="254958" y="0"/>
+                </a:moveTo>
+                <a:lnTo>
+                  <a:pt x="3432113" y="0"/>
+                </a:lnTo>
+                <a:lnTo>
+                  <a:pt x="3176018" y="1714500"/>
+                </a:lnTo>
+                <a:lnTo>
+                  <a:pt x="0" y="1714500"/>
+                </a:lnTo>
+                <a:close/>
+              </a:path>
+            </a:pathLst>
+          </a:custGeom>
+        </p:spPr>
+      </p:pic>
+      <p:pic>
+        <p:nvPicPr>
+          <p:cNvPr id="7" name="Image 6">
+            <a:extLst>
+              <a:ext uri="{FF2B5EF4-FFF2-40B4-BE49-F238E27FC236}">
+                <a16:creationId xmlns:a16="http://schemas.microsoft.com/office/drawing/2014/main" id="{167F8586-6221-4C0D-9BD4-9F6FB327435B}"/>
+              </a:ext>
+            </a:extLst>
+          </p:cNvPr>
+          <p:cNvPicPr>
+            <a:picLocks noChangeAspect="1"/>
+          </p:cNvPicPr>
+          <p:nvPr/>
+        </p:nvPicPr>
+        <p:blipFill rotWithShape="1">
+          <a:blip r:embed="rId4">
+            <a:alphaModFix/>
+          </a:blip>
+          <a:srcRect t="43894" r="-5" b="6132"/>
+          <a:stretch/>
+        </p:blipFill>
+        <p:spPr>
+          <a:xfrm>
+            <a:off x="83733" y="3429000"/>
+            <a:ext cx="3430976" cy="1714500"/>
+          </a:xfrm>
+          <a:custGeom>
+            <a:avLst/>
+            <a:gdLst>
+              <a:gd name="connsiteX0" fmla="*/ 254958 w 3430976"/>
+              <a:gd name="connsiteY0" fmla="*/ 0 h 1714500"/>
+              <a:gd name="connsiteX1" fmla="*/ 3430976 w 3430976"/>
+              <a:gd name="connsiteY1" fmla="*/ 0 h 1714500"/>
+              <a:gd name="connsiteX2" fmla="*/ 3174882 w 3430976"/>
+              <a:gd name="connsiteY2" fmla="*/ 1714500 h 1714500"/>
+              <a:gd name="connsiteX3" fmla="*/ 0 w 3430976"/>
+              <a:gd name="connsiteY3" fmla="*/ 1714500 h 1714500"/>
+            </a:gdLst>
+            <a:ahLst/>
+            <a:cxnLst>
+              <a:cxn ang="0">
+                <a:pos x="connsiteX0" y="connsiteY0"/>
+              </a:cxn>
+              <a:cxn ang="0">
+                <a:pos x="connsiteX1" y="connsiteY1"/>
+              </a:cxn>
+              <a:cxn ang="0">
+                <a:pos x="connsiteX2" y="connsiteY2"/>
+              </a:cxn>
+              <a:cxn ang="0">
+                <a:pos x="connsiteX3" y="connsiteY3"/>
+              </a:cxn>
+            </a:cxnLst>
+            <a:rect l="l" t="t" r="r" b="b"/>
+            <a:pathLst>
+              <a:path w="3430976" h="1714500">
+                <a:moveTo>
+                  <a:pt x="254958" y="0"/>
+                </a:moveTo>
+                <a:lnTo>
+                  <a:pt x="3430976" y="0"/>
+                </a:lnTo>
+                <a:lnTo>
+                  <a:pt x="3174882" y="1714500"/>
+                </a:lnTo>
+                <a:lnTo>
+                  <a:pt x="0" y="1714500"/>
+                </a:lnTo>
+                <a:close/>
+              </a:path>
+            </a:pathLst>
+          </a:custGeom>
+        </p:spPr>
+      </p:pic>
+      <p:pic>
+        <p:nvPicPr>
+          <p:cNvPr id="11" name="Image 10">
+            <a:extLst>
+              <a:ext uri="{FF2B5EF4-FFF2-40B4-BE49-F238E27FC236}">
+                <a16:creationId xmlns:a16="http://schemas.microsoft.com/office/drawing/2014/main" id="{2655B536-85CC-434F-B14E-7ACFC6B5AF29}"/>
+              </a:ext>
+            </a:extLst>
+          </p:cNvPr>
+          <p:cNvPicPr>
+            <a:picLocks noChangeAspect="1"/>
+          </p:cNvPicPr>
+          <p:nvPr/>
+        </p:nvPicPr>
+        <p:blipFill rotWithShape="1">
+          <a:blip r:embed="rId5">
+            <a:alphaModFix/>
+          </a:blip>
+          <a:srcRect t="39928" r="1" b="7192"/>
+          <a:stretch/>
+        </p:blipFill>
+        <p:spPr>
+          <a:xfrm>
+            <a:off x="-10633" y="5127992"/>
+            <a:ext cx="3271564" cy="1730008"/>
+          </a:xfrm>
+          <a:custGeom>
+            <a:avLst/>
+            <a:gdLst>
+              <a:gd name="connsiteX0" fmla="*/ 96673 w 3271564"/>
+              <a:gd name="connsiteY0" fmla="*/ 0 h 1730008"/>
+              <a:gd name="connsiteX1" fmla="*/ 3271564 w 3271564"/>
+              <a:gd name="connsiteY1" fmla="*/ 0 h 1730008"/>
+              <a:gd name="connsiteX2" fmla="*/ 3013153 w 3271564"/>
+              <a:gd name="connsiteY2" fmla="*/ 1730008 h 1730008"/>
+              <a:gd name="connsiteX3" fmla="*/ 0 w 3271564"/>
+              <a:gd name="connsiteY3" fmla="*/ 1730008 h 1730008"/>
+              <a:gd name="connsiteX4" fmla="*/ 0 w 3271564"/>
+              <a:gd name="connsiteY4" fmla="*/ 650088 h 1730008"/>
+            </a:gdLst>
+            <a:ahLst/>
+            <a:cxnLst>
+              <a:cxn ang="0">
+                <a:pos x="connsiteX0" y="connsiteY0"/>
+              </a:cxn>
+              <a:cxn ang="0">
+                <a:pos x="connsiteX1" y="connsiteY1"/>
+              </a:cxn>
+              <a:cxn ang="0">
+                <a:pos x="connsiteX2" y="connsiteY2"/>
+              </a:cxn>
+              <a:cxn ang="0">
+                <a:pos x="connsiteX3" y="connsiteY3"/>
+              </a:cxn>
+              <a:cxn ang="0">
+                <a:pos x="connsiteX4" y="connsiteY4"/>
+              </a:cxn>
+            </a:cxnLst>
+            <a:rect l="l" t="t" r="r" b="b"/>
+            <a:pathLst>
+              <a:path w="3271564" h="1730008">
+                <a:moveTo>
+                  <a:pt x="96673" y="0"/>
+                </a:moveTo>
+                <a:lnTo>
+                  <a:pt x="3271564" y="0"/>
+                </a:lnTo>
+                <a:lnTo>
+                  <a:pt x="3013153" y="1730008"/>
+                </a:lnTo>
+                <a:lnTo>
+                  <a:pt x="0" y="1730008"/>
+                </a:lnTo>
+                <a:lnTo>
+                  <a:pt x="0" y="650088"/>
+                </a:lnTo>
+                <a:close/>
+              </a:path>
+            </a:pathLst>
+          </a:custGeom>
+        </p:spPr>
+      </p:pic>
+      <p:sp>
+        <p:nvSpPr>
+          <p:cNvPr id="16" name="Isosceles Triangle 30">
+            <a:extLst>
+              <a:ext uri="{FF2B5EF4-FFF2-40B4-BE49-F238E27FC236}">
+                <a16:creationId xmlns:a16="http://schemas.microsoft.com/office/drawing/2014/main" id="{E09C6EA1-A72F-431C-A81E-14B793A2884E}"/>
+              </a:ext>
+              <a:ext uri="{C183D7F6-B498-43B3-948B-1728B52AA6E4}">
+                <adec:decorative xmlns:adec="http://schemas.microsoft.com/office/drawing/2017/decorative" val="1"/>
+              </a:ext>
+            </a:extLst>
+          </p:cNvPr>
+          <p:cNvSpPr>
+            <a:spLocks noGrp="1" noRot="1" noChangeAspect="1" noMove="1" noResize="1" noEditPoints="1" noAdjustHandles="1" noChangeArrowheads="1" noChangeShapeType="1" noTextEdit="1"/>
+          </p:cNvSpPr>
+          <p:nvPr>
+            <p:extLst>
+              <p:ext uri="{386F3935-93C4-4BCD-93E2-E3B085C9AB24}">
+                <p16:designElem xmlns:p16="http://schemas.microsoft.com/office/powerpoint/2015/main" val="1"/>
+              </p:ext>
+            </p:extLst>
+          </p:nvPr>
+        </p:nvSpPr>
+        <p:spPr>
+          <a:xfrm rot="10800000">
+            <a:off x="-10634" y="0"/>
+            <a:ext cx="842596" cy="5666154"/>
+          </a:xfrm>
+          <a:prstGeom prst="triangle">
+            <a:avLst>
+              <a:gd name="adj" fmla="val 100000"/>
+            </a:avLst>
+          </a:prstGeom>
+          <a:solidFill>
+            <a:schemeClr val="accent1">
+              <a:alpha val="85000"/>
+            </a:schemeClr>
+          </a:solidFill>
+          <a:ln>
+            <a:noFill/>
+          </a:ln>
+          <a:effectLst/>
+        </p:spPr>
+        <p:style>
+          <a:lnRef idx="1">
+            <a:schemeClr val="accent1"/>
+          </a:lnRef>
+          <a:fillRef idx="3">
+            <a:schemeClr val="accent1"/>
+          </a:fillRef>
+          <a:effectRef idx="2">
+            <a:schemeClr val="accent1"/>
+          </a:effectRef>
+          <a:fontRef idx="minor">
+            <a:schemeClr val="lt1"/>
+          </a:fontRef>
+        </p:style>
+      </p:sp>
+      <p:cxnSp>
+        <p:nvCxnSpPr>
+          <p:cNvPr id="18" name="Straight Connector 17">
+            <a:extLst>
+              <a:ext uri="{FF2B5EF4-FFF2-40B4-BE49-F238E27FC236}">
+                <a16:creationId xmlns:a16="http://schemas.microsoft.com/office/drawing/2014/main" id="{F335CC31-F319-461D-9045-F34BF78A2FA3}"/>
+              </a:ext>
+              <a:ext uri="{C183D7F6-B498-43B3-948B-1728B52AA6E4}">
+                <adec:decorative xmlns:adec="http://schemas.microsoft.com/office/drawing/2017/decorative" val="1"/>
+              </a:ext>
+            </a:extLst>
+          </p:cNvPr>
+          <p:cNvCxnSpPr>
+            <a:cxnSpLocks noGrp="1" noRot="1" noChangeAspect="1" noMove="1" noResize="1" noEditPoints="1" noAdjustHandles="1" noChangeArrowheads="1" noChangeShapeType="1"/>
+          </p:cNvCxnSpPr>
+          <p:nvPr>
+            <p:extLst>
+              <p:ext uri="{386F3935-93C4-4BCD-93E2-E3B085C9AB24}">
+                <p16:designElem xmlns:p16="http://schemas.microsoft.com/office/powerpoint/2015/main" val="1"/>
+              </p:ext>
+            </p:extLst>
+          </p:nvPr>
+        </p:nvCxnSpPr>
+        <p:spPr>
+          <a:xfrm>
+            <a:off x="578712" y="1714500"/>
+            <a:ext cx="3206088" cy="0"/>
+          </a:xfrm>
+          <a:prstGeom prst="line">
+            <a:avLst/>
+          </a:prstGeom>
+          <a:ln>
+            <a:solidFill>
+              <a:schemeClr val="bg1"/>
+            </a:solidFill>
+          </a:ln>
+        </p:spPr>
+        <p:style>
+          <a:lnRef idx="1">
+            <a:schemeClr val="accent1"/>
+          </a:lnRef>
+          <a:fillRef idx="0">
+            <a:schemeClr val="accent1"/>
+          </a:fillRef>
+          <a:effectRef idx="0">
+            <a:schemeClr val="accent1"/>
+          </a:effectRef>
+          <a:fontRef idx="minor">
+            <a:schemeClr val="tx1"/>
+          </a:fontRef>
+        </p:style>
+      </p:cxnSp>
+      <p:cxnSp>
+        <p:nvCxnSpPr>
+          <p:cNvPr id="20" name="Straight Connector 19">
+            <a:extLst>
+              <a:ext uri="{FF2B5EF4-FFF2-40B4-BE49-F238E27FC236}">
+                <a16:creationId xmlns:a16="http://schemas.microsoft.com/office/drawing/2014/main" id="{B7BCA152-E42A-42E3-8DE8-3C8B59DCB845}"/>
+              </a:ext>
+              <a:ext uri="{C183D7F6-B498-43B3-948B-1728B52AA6E4}">
+                <adec:decorative xmlns:adec="http://schemas.microsoft.com/office/drawing/2017/decorative" val="1"/>
+              </a:ext>
+            </a:extLst>
+          </p:cNvPr>
+          <p:cNvCxnSpPr>
+            <a:cxnSpLocks noGrp="1" noRot="1" noChangeAspect="1" noMove="1" noResize="1" noEditPoints="1" noAdjustHandles="1" noChangeArrowheads="1" noChangeShapeType="1"/>
+          </p:cNvCxnSpPr>
+          <p:nvPr>
+            <p:extLst>
+              <p:ext uri="{386F3935-93C4-4BCD-93E2-E3B085C9AB24}">
+                <p16:designElem xmlns:p16="http://schemas.microsoft.com/office/powerpoint/2015/main" val="1"/>
+              </p:ext>
+            </p:extLst>
+          </p:nvPr>
+        </p:nvCxnSpPr>
+        <p:spPr>
+          <a:xfrm>
+            <a:off x="317088" y="3421959"/>
+            <a:ext cx="3206088" cy="0"/>
+          </a:xfrm>
+          <a:prstGeom prst="line">
+            <a:avLst/>
+          </a:prstGeom>
+          <a:ln>
+            <a:solidFill>
+              <a:schemeClr val="bg1"/>
+            </a:solidFill>
+          </a:ln>
+        </p:spPr>
+        <p:style>
+          <a:lnRef idx="1">
+            <a:schemeClr val="accent1"/>
+          </a:lnRef>
+          <a:fillRef idx="0">
+            <a:schemeClr val="accent1"/>
+          </a:fillRef>
+          <a:effectRef idx="0">
+            <a:schemeClr val="accent1"/>
+          </a:effectRef>
+          <a:fontRef idx="minor">
+            <a:schemeClr val="tx1"/>
+          </a:fontRef>
+        </p:style>
+      </p:cxnSp>
+      <p:cxnSp>
+        <p:nvCxnSpPr>
+          <p:cNvPr id="22" name="Straight Connector 21">
+            <a:extLst>
+              <a:ext uri="{FF2B5EF4-FFF2-40B4-BE49-F238E27FC236}">
+                <a16:creationId xmlns:a16="http://schemas.microsoft.com/office/drawing/2014/main" id="{041DA940-D863-420D-A3F8-9F997C09FA42}"/>
+              </a:ext>
+              <a:ext uri="{C183D7F6-B498-43B3-948B-1728B52AA6E4}">
+                <adec:decorative xmlns:adec="http://schemas.microsoft.com/office/drawing/2017/decorative" val="1"/>
+              </a:ext>
+            </a:extLst>
+          </p:cNvPr>
+          <p:cNvCxnSpPr>
+            <a:cxnSpLocks noGrp="1" noRot="1" noChangeAspect="1" noMove="1" noResize="1" noEditPoints="1" noAdjustHandles="1" noChangeArrowheads="1" noChangeShapeType="1"/>
+          </p:cNvCxnSpPr>
+          <p:nvPr>
+            <p:extLst>
+              <p:ext uri="{386F3935-93C4-4BCD-93E2-E3B085C9AB24}">
+                <p16:designElem xmlns:p16="http://schemas.microsoft.com/office/powerpoint/2015/main" val="1"/>
+              </p:ext>
+            </p:extLst>
+          </p:nvPr>
+        </p:nvCxnSpPr>
+        <p:spPr>
+          <a:xfrm>
+            <a:off x="68950" y="5127992"/>
+            <a:ext cx="3206088" cy="0"/>
+          </a:xfrm>
+          <a:prstGeom prst="line">
+            <a:avLst/>
+          </a:prstGeom>
+          <a:ln>
+            <a:solidFill>
+              <a:schemeClr val="bg1"/>
+            </a:solidFill>
+          </a:ln>
+        </p:spPr>
+        <p:style>
+          <a:lnRef idx="1">
+            <a:schemeClr val="accent1"/>
+          </a:lnRef>
+          <a:fillRef idx="0">
+            <a:schemeClr val="accent1"/>
+          </a:fillRef>
+          <a:effectRef idx="0">
+            <a:schemeClr val="accent1"/>
+          </a:effectRef>
+          <a:fontRef idx="minor">
+            <a:schemeClr val="tx1"/>
+          </a:fontRef>
+        </p:style>
+      </p:cxnSp>
+      <p:sp>
+        <p:nvSpPr>
+          <p:cNvPr id="24" name="Isosceles Triangle 30">
+            <a:extLst>
+              <a:ext uri="{FF2B5EF4-FFF2-40B4-BE49-F238E27FC236}">
+                <a16:creationId xmlns:a16="http://schemas.microsoft.com/office/drawing/2014/main" id="{56E4DBE8-15E2-4BA3-B171-C959C9CDF6BD}"/>
+              </a:ext>
+              <a:ext uri="{C183D7F6-B498-43B3-948B-1728B52AA6E4}">
+                <adec:decorative xmlns:adec="http://schemas.microsoft.com/office/drawing/2017/decorative" val="1"/>
+              </a:ext>
+            </a:extLst>
+          </p:cNvPr>
+          <p:cNvSpPr>
+            <a:spLocks noGrp="1" noRot="1" noChangeAspect="1" noMove="1" noResize="1" noEditPoints="1" noAdjustHandles="1" noChangeArrowheads="1" noChangeShapeType="1" noTextEdit="1"/>
+          </p:cNvSpPr>
+          <p:nvPr>
+            <p:extLst>
+              <p:ext uri="{386F3935-93C4-4BCD-93E2-E3B085C9AB24}">
+                <p16:designElem xmlns:p16="http://schemas.microsoft.com/office/powerpoint/2015/main" val="1"/>
+              </p:ext>
+            </p:extLst>
+          </p:nvPr>
+        </p:nvSpPr>
+        <p:spPr>
+          <a:xfrm rot="10800000">
+            <a:off x="9940" y="0"/>
+            <a:ext cx="842596" cy="5666154"/>
+          </a:xfrm>
+          <a:prstGeom prst="triangle">
+            <a:avLst>
+              <a:gd name="adj" fmla="val 100000"/>
+            </a:avLst>
+          </a:prstGeom>
+          <a:solidFill>
+            <a:schemeClr val="accent1"/>
+          </a:solidFill>
+          <a:ln>
+            <a:noFill/>
+          </a:ln>
+          <a:effectLst/>
+        </p:spPr>
+        <p:style>
+          <a:lnRef idx="1">
+            <a:schemeClr val="accent1"/>
+          </a:lnRef>
+          <a:fillRef idx="3">
+            <a:schemeClr val="accent1"/>
+          </a:fillRef>
+          <a:effectRef idx="2">
+            <a:schemeClr val="accent1"/>
+          </a:effectRef>
+          <a:fontRef idx="minor">
+            <a:schemeClr val="lt1"/>
+          </a:fontRef>
+        </p:style>
       </p:sp>
       <p:sp>
         <p:nvSpPr>
@@ -9898,9 +11439,16 @@
             <p:ph idx="1"/>
           </p:nvPr>
         </p:nvSpPr>
-        <p:spPr/>
-        <p:txBody>
-          <a:bodyPr/>
+        <p:spPr>
+          <a:xfrm>
+            <a:off x="4159225" y="2160589"/>
+            <a:ext cx="5114776" cy="3880773"/>
+          </a:xfrm>
+        </p:spPr>
+        <p:txBody>
+          <a:bodyPr>
+            <a:normAutofit/>
+          </a:bodyPr>
           <a:lstStyle/>
           <a:p>
             <a:r>
@@ -9911,14 +11459,21 @@
           <a:p>
             <a:r>
               <a:rPr lang="fr-BE" dirty="0"/>
-              <a:t>Présente divers principes pour le monde de l’orienté objet.</a:t>
-            </a:r>
-          </a:p>
-          <a:p>
+              <a:t>Utilise plusieurs </a:t>
+            </a:r>
+            <a:r>
+              <a:rPr lang="fr-BE" dirty="0" err="1"/>
+              <a:t>languages</a:t>
+            </a:r>
             <a:r>
               <a:rPr lang="fr-BE" dirty="0"/>
-              <a:t>Est conviviale. Les réactions sont les bienvenues</a:t>
-            </a:r>
+              <a:t>.</a:t>
+            </a:r>
+          </a:p>
+          <a:p>
+            <a:endParaRPr lang="fr-BE" dirty="0"/>
+          </a:p>
+          <a:p>
             <a:endParaRPr lang="fr-FR" dirty="0"/>
           </a:p>
         </p:txBody>
@@ -9939,6 +11494,14 @@
 <file path=ppt/slides/slide4.xml><?xml version="1.0" encoding="utf-8"?>
 <p:sld xmlns:a="http://schemas.openxmlformats.org/drawingml/2006/main" xmlns:r="http://schemas.openxmlformats.org/officeDocument/2006/relationships" xmlns:p="http://schemas.openxmlformats.org/presentationml/2006/main">
   <p:cSld>
+    <p:bg>
+      <p:bgPr>
+        <a:solidFill>
+          <a:schemeClr val="bg1"/>
+        </a:solidFill>
+        <a:effectLst/>
+      </p:bgPr>
+    </p:bg>
     <p:spTree>
       <p:nvGrpSpPr>
         <p:cNvPr id="1" name=""/>
@@ -9953,6 +11516,53 @@
           <a:chExt cx="0" cy="0"/>
         </a:xfrm>
       </p:grpSpPr>
+      <p:cxnSp>
+        <p:nvCxnSpPr>
+          <p:cNvPr id="8" name="Straight Connector 7">
+            <a:extLst>
+              <a:ext uri="{FF2B5EF4-FFF2-40B4-BE49-F238E27FC236}">
+                <a16:creationId xmlns:a16="http://schemas.microsoft.com/office/drawing/2014/main" id="{0B5F7E3B-C5F1-40E0-A491-558BAFBC1127}"/>
+              </a:ext>
+              <a:ext uri="{C183D7F6-B498-43B3-948B-1728B52AA6E4}">
+                <adec:decorative xmlns:adec="http://schemas.microsoft.com/office/drawing/2017/decorative" val="1"/>
+              </a:ext>
+            </a:extLst>
+          </p:cNvPr>
+          <p:cNvCxnSpPr>
+            <a:cxnSpLocks noGrp="1" noRot="1" noChangeAspect="1" noMove="1" noResize="1" noEditPoints="1" noAdjustHandles="1" noChangeArrowheads="1" noChangeShapeType="1"/>
+          </p:cNvCxnSpPr>
+          <p:nvPr>
+            <p:extLst>
+              <p:ext uri="{386F3935-93C4-4BCD-93E2-E3B085C9AB24}">
+                <p16:designElem xmlns:p16="http://schemas.microsoft.com/office/powerpoint/2015/main" val="1"/>
+              </p:ext>
+            </p:extLst>
+          </p:nvPr>
+        </p:nvCxnSpPr>
+        <p:spPr>
+          <a:xfrm>
+            <a:off x="4241804" y="1460500"/>
+            <a:ext cx="0" cy="3937000"/>
+          </a:xfrm>
+          <a:prstGeom prst="line">
+            <a:avLst/>
+          </a:prstGeom>
+        </p:spPr>
+        <p:style>
+          <a:lnRef idx="1">
+            <a:schemeClr val="accent1"/>
+          </a:lnRef>
+          <a:fillRef idx="0">
+            <a:schemeClr val="accent1"/>
+          </a:fillRef>
+          <a:effectRef idx="0">
+            <a:schemeClr val="accent1"/>
+          </a:effectRef>
+          <a:fontRef idx="minor">
+            <a:schemeClr val="tx1"/>
+          </a:fontRef>
+        </p:style>
+      </p:cxnSp>
       <p:sp>
         <p:nvSpPr>
           <p:cNvPr id="2" name="Titre 1">
@@ -9969,9 +11579,16 @@
             <p:ph type="title"/>
           </p:nvPr>
         </p:nvSpPr>
-        <p:spPr/>
-        <p:txBody>
-          <a:bodyPr/>
+        <p:spPr>
+          <a:xfrm>
+            <a:off x="643467" y="816638"/>
+            <a:ext cx="3367359" cy="5224724"/>
+          </a:xfrm>
+        </p:spPr>
+        <p:txBody>
+          <a:bodyPr anchor="ctr">
+            <a:normAutofit/>
+          </a:bodyPr>
           <a:lstStyle/>
           <a:p>
             <a:r>
@@ -9998,9 +11615,16 @@
             <p:ph idx="1"/>
           </p:nvPr>
         </p:nvSpPr>
-        <p:spPr/>
-        <p:txBody>
-          <a:bodyPr/>
+        <p:spPr>
+          <a:xfrm>
+            <a:off x="4654295" y="816638"/>
+            <a:ext cx="4619706" cy="5224724"/>
+          </a:xfrm>
+        </p:spPr>
+        <p:txBody>
+          <a:bodyPr anchor="ctr">
+            <a:normAutofit/>
+          </a:bodyPr>
           <a:lstStyle/>
           <a:p>
             <a:r>
@@ -10033,6 +11657,14 @@
 <file path=ppt/slides/slide5.xml><?xml version="1.0" encoding="utf-8"?>
 <p:sld xmlns:a="http://schemas.openxmlformats.org/drawingml/2006/main" xmlns:r="http://schemas.openxmlformats.org/officeDocument/2006/relationships" xmlns:p="http://schemas.openxmlformats.org/presentationml/2006/main">
   <p:cSld>
+    <p:bg>
+      <p:bgPr>
+        <a:solidFill>
+          <a:schemeClr val="bg1"/>
+        </a:solidFill>
+        <a:effectLst/>
+      </p:bgPr>
+    </p:bg>
     <p:spTree>
       <p:nvGrpSpPr>
         <p:cNvPr id="1" name=""/>
@@ -10063,24 +11695,31 @@
             <p:ph type="title"/>
           </p:nvPr>
         </p:nvSpPr>
-        <p:spPr/>
-        <p:txBody>
-          <a:bodyPr/>
-          <a:lstStyle/>
-          <a:p>
-            <a:r>
-              <a:rPr lang="fr-BE" dirty="0"/>
+        <p:spPr>
+          <a:xfrm>
+            <a:off x="5536734" y="609600"/>
+            <a:ext cx="3737268" cy="1320800"/>
+          </a:xfrm>
+        </p:spPr>
+        <p:txBody>
+          <a:bodyPr>
+            <a:normAutofit/>
+          </a:bodyPr>
+          <a:lstStyle/>
+          <a:p>
+            <a:r>
+              <a:rPr lang="fr-BE" sz="3300"/>
               <a:t>Robert Cecil Martin, </a:t>
             </a:r>
             <a:r>
-              <a:rPr lang="fr-BE" dirty="0" err="1"/>
+              <a:rPr lang="fr-BE" sz="3300" err="1"/>
               <a:t>Uncle</a:t>
             </a:r>
             <a:r>
-              <a:rPr lang="fr-BE" dirty="0"/>
+              <a:rPr lang="fr-BE" sz="3300"/>
               <a:t> Bob</a:t>
             </a:r>
-            <a:endParaRPr lang="fr-FR" dirty="0"/>
+            <a:endParaRPr lang="fr-FR" sz="3300"/>
           </a:p>
         </p:txBody>
       </p:sp>
@@ -10100,9 +11739,16 @@
             <p:ph idx="1"/>
           </p:nvPr>
         </p:nvSpPr>
-        <p:spPr/>
-        <p:txBody>
-          <a:bodyPr/>
+        <p:spPr>
+          <a:xfrm>
+            <a:off x="5209563" y="2160589"/>
+            <a:ext cx="4064439" cy="3880773"/>
+          </a:xfrm>
+        </p:spPr>
+        <p:txBody>
+          <a:bodyPr>
+            <a:normAutofit/>
+          </a:bodyPr>
           <a:lstStyle/>
           <a:p>
             <a:r>
@@ -10177,22 +11823,136 @@
           </p:cNvPicPr>
           <p:nvPr/>
         </p:nvPicPr>
-        <p:blipFill>
+        <p:blipFill rotWithShape="1">
           <a:blip r:embed="rId4"/>
-          <a:stretch>
-            <a:fillRect/>
-          </a:stretch>
+          <a:srcRect l="137" r="3318"/>
+          <a:stretch/>
         </p:blipFill>
         <p:spPr>
           <a:xfrm>
-            <a:off x="7887629" y="4339904"/>
-            <a:ext cx="1386373" cy="1701458"/>
+            <a:off x="20" y="-1"/>
+            <a:ext cx="5394940" cy="6858001"/>
           </a:xfrm>
-          <a:prstGeom prst="rect">
+          <a:custGeom>
             <a:avLst/>
-          </a:prstGeom>
+            <a:gdLst>
+              <a:gd name="connsiteX0" fmla="*/ 842596 w 5394960"/>
+              <a:gd name="connsiteY0" fmla="*/ 0 h 6858000"/>
+              <a:gd name="connsiteX1" fmla="*/ 5394960 w 5394960"/>
+              <a:gd name="connsiteY1" fmla="*/ 0 h 6858000"/>
+              <a:gd name="connsiteX2" fmla="*/ 5394960 w 5394960"/>
+              <a:gd name="connsiteY2" fmla="*/ 21851 h 6858000"/>
+              <a:gd name="connsiteX3" fmla="*/ 4365943 w 5394960"/>
+              <a:gd name="connsiteY3" fmla="*/ 6858000 h 6858000"/>
+              <a:gd name="connsiteX4" fmla="*/ 0 w 5394960"/>
+              <a:gd name="connsiteY4" fmla="*/ 6858000 h 6858000"/>
+              <a:gd name="connsiteX5" fmla="*/ 0 w 5394960"/>
+              <a:gd name="connsiteY5" fmla="*/ 5666154 h 6858000"/>
+            </a:gdLst>
+            <a:ahLst/>
+            <a:cxnLst>
+              <a:cxn ang="0">
+                <a:pos x="connsiteX0" y="connsiteY0"/>
+              </a:cxn>
+              <a:cxn ang="0">
+                <a:pos x="connsiteX1" y="connsiteY1"/>
+              </a:cxn>
+              <a:cxn ang="0">
+                <a:pos x="connsiteX2" y="connsiteY2"/>
+              </a:cxn>
+              <a:cxn ang="0">
+                <a:pos x="connsiteX3" y="connsiteY3"/>
+              </a:cxn>
+              <a:cxn ang="0">
+                <a:pos x="connsiteX4" y="connsiteY4"/>
+              </a:cxn>
+              <a:cxn ang="0">
+                <a:pos x="connsiteX5" y="connsiteY5"/>
+              </a:cxn>
+            </a:cxnLst>
+            <a:rect l="l" t="t" r="r" b="b"/>
+            <a:pathLst>
+              <a:path w="5394960" h="6858000">
+                <a:moveTo>
+                  <a:pt x="842596" y="0"/>
+                </a:moveTo>
+                <a:lnTo>
+                  <a:pt x="5394960" y="0"/>
+                </a:lnTo>
+                <a:lnTo>
+                  <a:pt x="5394960" y="21851"/>
+                </a:lnTo>
+                <a:lnTo>
+                  <a:pt x="4365943" y="6858000"/>
+                </a:lnTo>
+                <a:lnTo>
+                  <a:pt x="0" y="6858000"/>
+                </a:lnTo>
+                <a:lnTo>
+                  <a:pt x="0" y="5666154"/>
+                </a:lnTo>
+                <a:close/>
+              </a:path>
+            </a:pathLst>
+          </a:custGeom>
         </p:spPr>
       </p:pic>
+      <p:sp>
+        <p:nvSpPr>
+          <p:cNvPr id="10" name="Isosceles Triangle 9">
+            <a:extLst>
+              <a:ext uri="{FF2B5EF4-FFF2-40B4-BE49-F238E27FC236}">
+                <a16:creationId xmlns:a16="http://schemas.microsoft.com/office/drawing/2014/main" id="{3BCB5F6A-9EB0-40B0-9D13-3023E9A20508}"/>
+              </a:ext>
+              <a:ext uri="{C183D7F6-B498-43B3-948B-1728B52AA6E4}">
+                <adec:decorative xmlns:adec="http://schemas.microsoft.com/office/drawing/2017/decorative" val="1"/>
+              </a:ext>
+            </a:extLst>
+          </p:cNvPr>
+          <p:cNvSpPr>
+            <a:spLocks noGrp="1" noRot="1" noChangeAspect="1" noMove="1" noResize="1" noEditPoints="1" noAdjustHandles="1" noChangeArrowheads="1" noChangeShapeType="1" noTextEdit="1"/>
+          </p:cNvSpPr>
+          <p:nvPr>
+            <p:extLst>
+              <p:ext uri="{386F3935-93C4-4BCD-93E2-E3B085C9AB24}">
+                <p16:designElem xmlns:p16="http://schemas.microsoft.com/office/powerpoint/2015/main" val="1"/>
+              </p:ext>
+            </p:extLst>
+          </p:nvPr>
+        </p:nvSpPr>
+        <p:spPr>
+          <a:xfrm rot="10800000">
+            <a:off x="0" y="0"/>
+            <a:ext cx="842596" cy="5666154"/>
+          </a:xfrm>
+          <a:prstGeom prst="triangle">
+            <a:avLst>
+              <a:gd name="adj" fmla="val 100000"/>
+            </a:avLst>
+          </a:prstGeom>
+          <a:solidFill>
+            <a:schemeClr val="accent1"/>
+          </a:solidFill>
+          <a:ln>
+            <a:noFill/>
+          </a:ln>
+          <a:effectLst/>
+        </p:spPr>
+        <p:style>
+          <a:lnRef idx="1">
+            <a:schemeClr val="accent1"/>
+          </a:lnRef>
+          <a:fillRef idx="3">
+            <a:schemeClr val="accent1"/>
+          </a:fillRef>
+          <a:effectRef idx="2">
+            <a:schemeClr val="accent1"/>
+          </a:effectRef>
+          <a:fontRef idx="minor">
+            <a:schemeClr val="lt1"/>
+          </a:fontRef>
+        </p:style>
+      </p:sp>
     </p:spTree>
     <p:extLst>
       <p:ext uri="{BB962C8B-B14F-4D97-AF65-F5344CB8AC3E}">
@@ -10209,6 +11969,14 @@
 <file path=ppt/slides/slide6.xml><?xml version="1.0" encoding="utf-8"?>
 <p:sld xmlns:a="http://schemas.openxmlformats.org/drawingml/2006/main" xmlns:r="http://schemas.openxmlformats.org/officeDocument/2006/relationships" xmlns:p="http://schemas.openxmlformats.org/presentationml/2006/main">
   <p:cSld>
+    <p:bg>
+      <p:bgPr>
+        <a:solidFill>
+          <a:schemeClr val="bg1"/>
+        </a:solidFill>
+        <a:effectLst/>
+      </p:bgPr>
+    </p:bg>
     <p:spTree>
       <p:nvGrpSpPr>
         <p:cNvPr id="1" name=""/>
@@ -10223,6 +11991,53 @@
           <a:chExt cx="0" cy="0"/>
         </a:xfrm>
       </p:grpSpPr>
+      <p:cxnSp>
+        <p:nvCxnSpPr>
+          <p:cNvPr id="8" name="Straight Connector 7">
+            <a:extLst>
+              <a:ext uri="{FF2B5EF4-FFF2-40B4-BE49-F238E27FC236}">
+                <a16:creationId xmlns:a16="http://schemas.microsoft.com/office/drawing/2014/main" id="{0B5F7E3B-C5F1-40E0-A491-558BAFBC1127}"/>
+              </a:ext>
+              <a:ext uri="{C183D7F6-B498-43B3-948B-1728B52AA6E4}">
+                <adec:decorative xmlns:adec="http://schemas.microsoft.com/office/drawing/2017/decorative" val="1"/>
+              </a:ext>
+            </a:extLst>
+          </p:cNvPr>
+          <p:cNvCxnSpPr>
+            <a:cxnSpLocks noGrp="1" noRot="1" noChangeAspect="1" noMove="1" noResize="1" noEditPoints="1" noAdjustHandles="1" noChangeArrowheads="1" noChangeShapeType="1"/>
+          </p:cNvCxnSpPr>
+          <p:nvPr>
+            <p:extLst>
+              <p:ext uri="{386F3935-93C4-4BCD-93E2-E3B085C9AB24}">
+                <p16:designElem xmlns:p16="http://schemas.microsoft.com/office/powerpoint/2015/main" val="1"/>
+              </p:ext>
+            </p:extLst>
+          </p:nvPr>
+        </p:nvCxnSpPr>
+        <p:spPr>
+          <a:xfrm>
+            <a:off x="4241804" y="1460500"/>
+            <a:ext cx="0" cy="3937000"/>
+          </a:xfrm>
+          <a:prstGeom prst="line">
+            <a:avLst/>
+          </a:prstGeom>
+        </p:spPr>
+        <p:style>
+          <a:lnRef idx="1">
+            <a:schemeClr val="accent1"/>
+          </a:lnRef>
+          <a:fillRef idx="0">
+            <a:schemeClr val="accent1"/>
+          </a:fillRef>
+          <a:effectRef idx="0">
+            <a:schemeClr val="accent1"/>
+          </a:effectRef>
+          <a:fontRef idx="minor">
+            <a:schemeClr val="tx1"/>
+          </a:fontRef>
+        </p:style>
+      </p:cxnSp>
       <p:sp>
         <p:nvSpPr>
           <p:cNvPr id="2" name="Titre 1">
@@ -10239,9 +12054,16 @@
             <p:ph type="title"/>
           </p:nvPr>
         </p:nvSpPr>
-        <p:spPr/>
-        <p:txBody>
-          <a:bodyPr/>
+        <p:spPr>
+          <a:xfrm>
+            <a:off x="643467" y="816638"/>
+            <a:ext cx="3367359" cy="5224724"/>
+          </a:xfrm>
+        </p:spPr>
+        <p:txBody>
+          <a:bodyPr anchor="ctr">
+            <a:normAutofit/>
+          </a:bodyPr>
           <a:lstStyle/>
           <a:p>
             <a:r>
@@ -10268,9 +12090,16 @@
             <p:ph idx="1"/>
           </p:nvPr>
         </p:nvSpPr>
-        <p:spPr/>
-        <p:txBody>
-          <a:bodyPr/>
+        <p:spPr>
+          <a:xfrm>
+            <a:off x="4654295" y="816638"/>
+            <a:ext cx="4619706" cy="5224724"/>
+          </a:xfrm>
+        </p:spPr>
+        <p:txBody>
+          <a:bodyPr anchor="ctr">
+            <a:normAutofit/>
+          </a:bodyPr>
           <a:lstStyle/>
           <a:p>
             <a:r>
@@ -10478,6 +12307,14 @@
 <file path=ppt/slides/slide7.xml><?xml version="1.0" encoding="utf-8"?>
 <p:sld xmlns:a="http://schemas.openxmlformats.org/drawingml/2006/main" xmlns:r="http://schemas.openxmlformats.org/officeDocument/2006/relationships" xmlns:p="http://schemas.openxmlformats.org/presentationml/2006/main">
   <p:cSld>
+    <p:bg>
+      <p:bgPr>
+        <a:solidFill>
+          <a:schemeClr val="bg1"/>
+        </a:solidFill>
+        <a:effectLst/>
+      </p:bgPr>
+    </p:bg>
     <p:spTree>
       <p:nvGrpSpPr>
         <p:cNvPr id="1" name=""/>
@@ -10492,6 +12329,66 @@
           <a:chExt cx="0" cy="0"/>
         </a:xfrm>
       </p:grpSpPr>
+      <p:sp useBgFill="1">
+        <p:nvSpPr>
+          <p:cNvPr id="8" name="Rectangle 7">
+            <a:extLst>
+              <a:ext uri="{FF2B5EF4-FFF2-40B4-BE49-F238E27FC236}">
+                <a16:creationId xmlns:a16="http://schemas.microsoft.com/office/drawing/2014/main" id="{8DF4D7F6-81B5-452A-9CE6-76D81F91D41B}"/>
+              </a:ext>
+              <a:ext uri="{C183D7F6-B498-43B3-948B-1728B52AA6E4}">
+                <adec:decorative xmlns:adec="http://schemas.microsoft.com/office/drawing/2017/decorative" val="1"/>
+              </a:ext>
+            </a:extLst>
+          </p:cNvPr>
+          <p:cNvSpPr>
+            <a:spLocks noGrp="1" noRot="1" noChangeAspect="1" noMove="1" noResize="1" noEditPoints="1" noAdjustHandles="1" noChangeArrowheads="1" noChangeShapeType="1" noTextEdit="1"/>
+          </p:cNvSpPr>
+          <p:nvPr>
+            <p:extLst>
+              <p:ext uri="{386F3935-93C4-4BCD-93E2-E3B085C9AB24}">
+                <p16:designElem xmlns:p16="http://schemas.microsoft.com/office/powerpoint/2015/main" val="1"/>
+              </p:ext>
+            </p:extLst>
+          </p:nvPr>
+        </p:nvSpPr>
+        <p:spPr>
+          <a:xfrm>
+            <a:off x="0" y="0"/>
+            <a:ext cx="12192000" cy="6858000"/>
+          </a:xfrm>
+          <a:prstGeom prst="rect">
+            <a:avLst/>
+          </a:prstGeom>
+          <a:ln>
+            <a:noFill/>
+          </a:ln>
+        </p:spPr>
+        <p:style>
+          <a:lnRef idx="2">
+            <a:schemeClr val="accent1">
+              <a:shade val="50000"/>
+            </a:schemeClr>
+          </a:lnRef>
+          <a:fillRef idx="1">
+            <a:schemeClr val="accent1"/>
+          </a:fillRef>
+          <a:effectRef idx="0">
+            <a:schemeClr val="accent1"/>
+          </a:effectRef>
+          <a:fontRef idx="minor">
+            <a:schemeClr val="lt1"/>
+          </a:fontRef>
+        </p:style>
+        <p:txBody>
+          <a:bodyPr rtlCol="0" anchor="ctr"/>
+          <a:lstStyle/>
+          <a:p>
+            <a:pPr algn="ctr"/>
+            <a:endParaRPr lang="en-US"/>
+          </a:p>
+        </p:txBody>
+      </p:sp>
       <p:sp>
         <p:nvSpPr>
           <p:cNvPr id="2" name="Titre 1">
@@ -10508,9 +12405,16 @@
             <p:ph type="title"/>
           </p:nvPr>
         </p:nvSpPr>
-        <p:spPr/>
-        <p:txBody>
-          <a:bodyPr/>
+        <p:spPr>
+          <a:xfrm>
+            <a:off x="1333502" y="609600"/>
+            <a:ext cx="8596668" cy="1320800"/>
+          </a:xfrm>
+        </p:spPr>
+        <p:txBody>
+          <a:bodyPr>
+            <a:normAutofit/>
+          </a:bodyPr>
           <a:lstStyle/>
           <a:p>
             <a:r>
@@ -10521,6 +12425,225 @@
           </a:p>
         </p:txBody>
       </p:sp>
+      <p:sp>
+        <p:nvSpPr>
+          <p:cNvPr id="10" name="Isosceles Triangle 9">
+            <a:extLst>
+              <a:ext uri="{FF2B5EF4-FFF2-40B4-BE49-F238E27FC236}">
+                <a16:creationId xmlns:a16="http://schemas.microsoft.com/office/drawing/2014/main" id="{4600514D-20FB-4559-97DC-D1DC39E6C3DE}"/>
+              </a:ext>
+              <a:ext uri="{C183D7F6-B498-43B3-948B-1728B52AA6E4}">
+                <adec:decorative xmlns:adec="http://schemas.microsoft.com/office/drawing/2017/decorative" val="1"/>
+              </a:ext>
+            </a:extLst>
+          </p:cNvPr>
+          <p:cNvSpPr>
+            <a:spLocks noGrp="1" noRot="1" noChangeAspect="1" noMove="1" noResize="1" noEditPoints="1" noAdjustHandles="1" noChangeArrowheads="1" noChangeShapeType="1" noTextEdit="1"/>
+          </p:cNvSpPr>
+          <p:nvPr>
+            <p:extLst>
+              <p:ext uri="{386F3935-93C4-4BCD-93E2-E3B085C9AB24}">
+                <p16:designElem xmlns:p16="http://schemas.microsoft.com/office/powerpoint/2015/main" val="1"/>
+              </p:ext>
+            </p:extLst>
+          </p:nvPr>
+        </p:nvSpPr>
+        <p:spPr>
+          <a:xfrm flipV="1">
+            <a:off x="0" y="0"/>
+            <a:ext cx="448733" cy="2844800"/>
+          </a:xfrm>
+          <a:prstGeom prst="triangle">
+            <a:avLst>
+              <a:gd name="adj" fmla="val 0"/>
+            </a:avLst>
+          </a:prstGeom>
+          <a:solidFill>
+            <a:schemeClr val="accent1">
+              <a:alpha val="85000"/>
+            </a:schemeClr>
+          </a:solidFill>
+          <a:ln>
+            <a:noFill/>
+          </a:ln>
+          <a:effectLst/>
+        </p:spPr>
+        <p:style>
+          <a:lnRef idx="1">
+            <a:schemeClr val="accent1"/>
+          </a:lnRef>
+          <a:fillRef idx="3">
+            <a:schemeClr val="accent1"/>
+          </a:fillRef>
+          <a:effectRef idx="2">
+            <a:schemeClr val="accent1"/>
+          </a:effectRef>
+          <a:fontRef idx="minor">
+            <a:schemeClr val="lt1"/>
+          </a:fontRef>
+        </p:style>
+      </p:sp>
+      <p:sp>
+        <p:nvSpPr>
+          <p:cNvPr id="12" name="Isosceles Triangle 11">
+            <a:extLst>
+              <a:ext uri="{FF2B5EF4-FFF2-40B4-BE49-F238E27FC236}">
+                <a16:creationId xmlns:a16="http://schemas.microsoft.com/office/drawing/2014/main" id="{266F638A-E405-4AC0-B984-72E5813B0DD1}"/>
+              </a:ext>
+              <a:ext uri="{C183D7F6-B498-43B3-948B-1728B52AA6E4}">
+                <adec:decorative xmlns:adec="http://schemas.microsoft.com/office/drawing/2017/decorative" val="1"/>
+              </a:ext>
+            </a:extLst>
+          </p:cNvPr>
+          <p:cNvSpPr>
+            <a:spLocks noGrp="1" noRot="1" noChangeAspect="1" noMove="1" noResize="1" noEditPoints="1" noAdjustHandles="1" noChangeArrowheads="1" noChangeShapeType="1" noTextEdit="1"/>
+          </p:cNvSpPr>
+          <p:nvPr>
+            <p:extLst>
+              <p:ext uri="{386F3935-93C4-4BCD-93E2-E3B085C9AB24}">
+                <p16:designElem xmlns:p16="http://schemas.microsoft.com/office/powerpoint/2015/main" val="1"/>
+              </p:ext>
+            </p:extLst>
+          </p:nvPr>
+        </p:nvSpPr>
+        <p:spPr>
+          <a:xfrm>
+            <a:off x="7738534" y="3818467"/>
+            <a:ext cx="4450292" cy="3039533"/>
+          </a:xfrm>
+          <a:prstGeom prst="triangle">
+            <a:avLst>
+              <a:gd name="adj" fmla="val 100000"/>
+            </a:avLst>
+          </a:prstGeom>
+          <a:solidFill>
+            <a:schemeClr val="accent1"/>
+          </a:solidFill>
+          <a:ln>
+            <a:noFill/>
+          </a:ln>
+          <a:effectLst/>
+        </p:spPr>
+        <p:style>
+          <a:lnRef idx="1">
+            <a:schemeClr val="accent1"/>
+          </a:lnRef>
+          <a:fillRef idx="3">
+            <a:schemeClr val="accent1"/>
+          </a:fillRef>
+          <a:effectRef idx="2">
+            <a:schemeClr val="accent1"/>
+          </a:effectRef>
+          <a:fontRef idx="minor">
+            <a:schemeClr val="lt1"/>
+          </a:fontRef>
+        </p:style>
+      </p:sp>
+      <p:cxnSp>
+        <p:nvCxnSpPr>
+          <p:cNvPr id="14" name="Straight Connector 13">
+            <a:extLst>
+              <a:ext uri="{FF2B5EF4-FFF2-40B4-BE49-F238E27FC236}">
+                <a16:creationId xmlns:a16="http://schemas.microsoft.com/office/drawing/2014/main" id="{7D1CBE93-B17D-4509-843C-82287C38032A}"/>
+              </a:ext>
+              <a:ext uri="{C183D7F6-B498-43B3-948B-1728B52AA6E4}">
+                <adec:decorative xmlns:adec="http://schemas.microsoft.com/office/drawing/2017/decorative" val="1"/>
+              </a:ext>
+            </a:extLst>
+          </p:cNvPr>
+          <p:cNvCxnSpPr>
+            <a:cxnSpLocks noGrp="1" noRot="1" noChangeAspect="1" noMove="1" noResize="1" noEditPoints="1" noAdjustHandles="1" noChangeArrowheads="1" noChangeShapeType="1"/>
+          </p:cNvCxnSpPr>
+          <p:nvPr>
+            <p:extLst>
+              <p:ext uri="{386F3935-93C4-4BCD-93E2-E3B085C9AB24}">
+                <p16:designElem xmlns:p16="http://schemas.microsoft.com/office/powerpoint/2015/main" val="1"/>
+              </p:ext>
+            </p:extLst>
+          </p:nvPr>
+        </p:nvCxnSpPr>
+        <p:spPr>
+          <a:xfrm>
+            <a:off x="10134600" y="0"/>
+            <a:ext cx="1727200" cy="6858000"/>
+          </a:xfrm>
+          <a:prstGeom prst="line">
+            <a:avLst/>
+          </a:prstGeom>
+          <a:ln w="15875" cap="sq">
+            <a:solidFill>
+              <a:schemeClr val="accent2"/>
+            </a:solidFill>
+            <a:bevel/>
+          </a:ln>
+        </p:spPr>
+        <p:style>
+          <a:lnRef idx="2">
+            <a:schemeClr val="accent1"/>
+          </a:lnRef>
+          <a:fillRef idx="0">
+            <a:schemeClr val="accent1"/>
+          </a:fillRef>
+          <a:effectRef idx="1">
+            <a:schemeClr val="accent1"/>
+          </a:effectRef>
+          <a:fontRef idx="minor">
+            <a:schemeClr val="tx1"/>
+          </a:fontRef>
+        </p:style>
+      </p:cxnSp>
+      <p:cxnSp>
+        <p:nvCxnSpPr>
+          <p:cNvPr id="16" name="Straight Connector 15">
+            <a:extLst>
+              <a:ext uri="{FF2B5EF4-FFF2-40B4-BE49-F238E27FC236}">
+                <a16:creationId xmlns:a16="http://schemas.microsoft.com/office/drawing/2014/main" id="{AE6277B4-6A43-48AB-89B2-3442221619CC}"/>
+              </a:ext>
+              <a:ext uri="{C183D7F6-B498-43B3-948B-1728B52AA6E4}">
+                <adec:decorative xmlns:adec="http://schemas.microsoft.com/office/drawing/2017/decorative" val="1"/>
+              </a:ext>
+            </a:extLst>
+          </p:cNvPr>
+          <p:cNvCxnSpPr>
+            <a:cxnSpLocks noGrp="1" noRot="1" noChangeAspect="1" noMove="1" noResize="1" noEditPoints="1" noAdjustHandles="1" noChangeArrowheads="1" noChangeShapeType="1"/>
+          </p:cNvCxnSpPr>
+          <p:nvPr>
+            <p:extLst>
+              <p:ext uri="{386F3935-93C4-4BCD-93E2-E3B085C9AB24}">
+                <p16:designElem xmlns:p16="http://schemas.microsoft.com/office/powerpoint/2015/main" val="1"/>
+              </p:ext>
+            </p:extLst>
+          </p:nvPr>
+        </p:nvCxnSpPr>
+        <p:spPr>
+          <a:xfrm flipH="1">
+            <a:off x="7425267" y="3681413"/>
+            <a:ext cx="4763558" cy="3176587"/>
+          </a:xfrm>
+          <a:prstGeom prst="line">
+            <a:avLst/>
+          </a:prstGeom>
+          <a:ln w="15875">
+            <a:solidFill>
+              <a:schemeClr val="accent1"/>
+            </a:solidFill>
+          </a:ln>
+        </p:spPr>
+        <p:style>
+          <a:lnRef idx="2">
+            <a:schemeClr val="accent1"/>
+          </a:lnRef>
+          <a:fillRef idx="0">
+            <a:schemeClr val="accent1"/>
+          </a:fillRef>
+          <a:effectRef idx="1">
+            <a:schemeClr val="accent1"/>
+          </a:effectRef>
+          <a:fontRef idx="minor">
+            <a:schemeClr val="tx1"/>
+          </a:fontRef>
+        </p:style>
+      </p:cxnSp>
       <p:sp>
         <p:nvSpPr>
           <p:cNvPr id="3" name="Espace réservé du contenu 2">
@@ -10537,92 +12660,220 @@
             <p:ph idx="1"/>
           </p:nvPr>
         </p:nvSpPr>
-        <p:spPr/>
+        <p:spPr>
+          <a:xfrm>
+            <a:off x="1333502" y="2160590"/>
+            <a:ext cx="8470898" cy="3429260"/>
+          </a:xfrm>
+        </p:spPr>
         <p:txBody>
           <a:bodyPr>
             <a:normAutofit/>
           </a:bodyPr>
           <a:lstStyle/>
           <a:p>
-            <a:r>
-              <a:rPr lang="fr-BE" dirty="0"/>
+            <a:pPr>
+              <a:lnSpc>
+                <a:spcPct val="90000"/>
+              </a:lnSpc>
+            </a:pPr>
+            <a:r>
+              <a:rPr lang="fr-BE" sz="1500"/>
               <a:t>Essayez le burger de la mort.</a:t>
             </a:r>
           </a:p>
           <a:p>
-            <a:r>
-              <a:rPr lang="fr-BE" dirty="0"/>
+            <a:pPr>
+              <a:lnSpc>
+                <a:spcPct val="90000"/>
+              </a:lnSpc>
+            </a:pPr>
+            <a:r>
+              <a:rPr lang="fr-BE" sz="1500"/>
               <a:t>Mais en plus vous devez répondre aux questions pairs, ensuite impairs,</a:t>
             </a:r>
           </a:p>
           <a:p>
-            <a:r>
-              <a:rPr lang="fr-BE" dirty="0"/>
+            <a:pPr>
+              <a:lnSpc>
+                <a:spcPct val="90000"/>
+              </a:lnSpc>
+            </a:pPr>
+            <a:r>
+              <a:rPr lang="fr-BE" sz="1500"/>
               <a:t>Les questions 2, 8 et 7 comportent des doubles sens,</a:t>
             </a:r>
           </a:p>
           <a:p>
-            <a:r>
-              <a:rPr lang="fr-BE" dirty="0"/>
+            <a:pPr>
+              <a:lnSpc>
+                <a:spcPct val="90000"/>
+              </a:lnSpc>
+            </a:pPr>
+            <a:r>
+              <a:rPr lang="fr-BE" sz="1500"/>
               <a:t>Vous avez reçu un mail urgent à la 5</a:t>
             </a:r>
             <a:r>
-              <a:rPr lang="fr-BE" baseline="30000" dirty="0"/>
+              <a:rPr lang="fr-BE" sz="1500" baseline="30000"/>
               <a:t>e</a:t>
             </a:r>
             <a:r>
-              <a:rPr lang="fr-BE" dirty="0"/>
+              <a:rPr lang="fr-BE" sz="1500"/>
               <a:t> question,</a:t>
             </a:r>
           </a:p>
           <a:p>
-            <a:r>
-              <a:rPr lang="fr-BE" dirty="0"/>
+            <a:pPr>
+              <a:lnSpc>
+                <a:spcPct val="90000"/>
+              </a:lnSpc>
+            </a:pPr>
+            <a:r>
+              <a:rPr lang="fr-BE" sz="1500"/>
               <a:t>Finalement ignorez la question 3 et 5,</a:t>
             </a:r>
           </a:p>
           <a:p>
-            <a:r>
-              <a:rPr lang="fr-BE" dirty="0"/>
+            <a:pPr>
+              <a:lnSpc>
+                <a:spcPct val="90000"/>
+              </a:lnSpc>
+            </a:pPr>
+            <a:r>
+              <a:rPr lang="fr-BE" sz="1500"/>
               <a:t>Il y a 5 questions supplémentaires,</a:t>
             </a:r>
           </a:p>
           <a:p>
-            <a:r>
-              <a:rPr lang="fr-BE" dirty="0"/>
+            <a:pPr>
+              <a:lnSpc>
+                <a:spcPct val="90000"/>
+              </a:lnSpc>
+            </a:pPr>
+            <a:r>
+              <a:rPr lang="fr-BE" sz="1500"/>
               <a:t>La question 7 est en norvégien,</a:t>
             </a:r>
           </a:p>
           <a:p>
-            <a:r>
-              <a:rPr lang="fr-BE" dirty="0"/>
+            <a:pPr>
+              <a:lnSpc>
+                <a:spcPct val="90000"/>
+              </a:lnSpc>
+            </a:pPr>
+            <a:r>
+              <a:rPr lang="fr-BE" sz="1500"/>
               <a:t>La question 3 a quand même un impacte car la question 10 dépend de la 3.</a:t>
             </a:r>
           </a:p>
           <a:p>
-            <a:r>
-              <a:rPr lang="fr-BE" dirty="0"/>
+            <a:pPr>
+              <a:lnSpc>
+                <a:spcPct val="90000"/>
+              </a:lnSpc>
+            </a:pPr>
+            <a:r>
+              <a:rPr lang="fr-BE" sz="1500"/>
               <a:t>Voilà, vous avez lu une méthode </a:t>
             </a:r>
             <a:r>
-              <a:rPr lang="fr-BE" dirty="0" err="1"/>
+              <a:rPr lang="fr-BE" sz="1500" err="1"/>
               <a:t>legacy</a:t>
             </a:r>
             <a:r>
-              <a:rPr lang="fr-BE" dirty="0"/>
+              <a:rPr lang="fr-BE" sz="1500"/>
               <a:t> qui implémente 200 </a:t>
             </a:r>
             <a:r>
-              <a:rPr lang="fr-BE" dirty="0" err="1"/>
+              <a:rPr lang="fr-BE" sz="1500" err="1"/>
               <a:t>features</a:t>
             </a:r>
             <a:r>
-              <a:rPr lang="fr-BE" dirty="0"/>
+              <a:rPr lang="fr-BE" sz="1500"/>
               <a:t> et 7 paramètres. </a:t>
             </a:r>
-            <a:endParaRPr lang="en-GB" dirty="0"/>
-          </a:p>
-        </p:txBody>
+            <a:endParaRPr lang="en-GB" sz="1500"/>
+          </a:p>
+        </p:txBody>
+      </p:sp>
+      <p:sp>
+        <p:nvSpPr>
+          <p:cNvPr id="18" name="Rectangle 27">
+            <a:extLst>
+              <a:ext uri="{FF2B5EF4-FFF2-40B4-BE49-F238E27FC236}">
+                <a16:creationId xmlns:a16="http://schemas.microsoft.com/office/drawing/2014/main" id="{27B538D5-95DB-47ED-9CB4-34AE5BF78E6B}"/>
+              </a:ext>
+              <a:ext uri="{C183D7F6-B498-43B3-948B-1728B52AA6E4}">
+                <adec:decorative xmlns:adec="http://schemas.microsoft.com/office/drawing/2017/decorative" val="1"/>
+              </a:ext>
+            </a:extLst>
+          </p:cNvPr>
+          <p:cNvSpPr>
+            <a:spLocks noGrp="1" noRot="1" noChangeAspect="1" noMove="1" noResize="1" noEditPoints="1" noAdjustHandles="1" noChangeArrowheads="1" noChangeShapeType="1" noTextEdit="1"/>
+          </p:cNvSpPr>
+          <p:nvPr>
+            <p:extLst>
+              <p:ext uri="{386F3935-93C4-4BCD-93E2-E3B085C9AB24}">
+                <p16:designElem xmlns:p16="http://schemas.microsoft.com/office/powerpoint/2015/main" val="1"/>
+              </p:ext>
+            </p:extLst>
+          </p:nvPr>
+        </p:nvSpPr>
+        <p:spPr>
+          <a:xfrm>
+            <a:off x="10425641" y="0"/>
+            <a:ext cx="1766359" cy="6858000"/>
+          </a:xfrm>
+          <a:custGeom>
+            <a:avLst/>
+            <a:gdLst/>
+            <a:ahLst/>
+            <a:cxnLst/>
+            <a:rect l="l" t="t" r="r" b="b"/>
+            <a:pathLst>
+              <a:path w="2858013" h="6866467">
+                <a:moveTo>
+                  <a:pt x="0" y="0"/>
+                </a:moveTo>
+                <a:lnTo>
+                  <a:pt x="2858013" y="0"/>
+                </a:lnTo>
+                <a:lnTo>
+                  <a:pt x="2858013" y="6866467"/>
+                </a:lnTo>
+                <a:lnTo>
+                  <a:pt x="2473942" y="6866467"/>
+                </a:lnTo>
+                <a:lnTo>
+                  <a:pt x="0" y="0"/>
+                </a:lnTo>
+                <a:close/>
+              </a:path>
+            </a:pathLst>
+          </a:custGeom>
+          <a:solidFill>
+            <a:schemeClr val="accent2"/>
+          </a:solidFill>
+          <a:ln>
+            <a:noFill/>
+          </a:ln>
+          <a:effectLst/>
+        </p:spPr>
+        <p:style>
+          <a:lnRef idx="1">
+            <a:schemeClr val="accent1"/>
+          </a:lnRef>
+          <a:fillRef idx="3">
+            <a:schemeClr val="accent1"/>
+          </a:fillRef>
+          <a:effectRef idx="2">
+            <a:schemeClr val="accent1"/>
+          </a:effectRef>
+          <a:fontRef idx="minor">
+            <a:schemeClr val="lt1"/>
+          </a:fontRef>
+        </p:style>
       </p:sp>
     </p:spTree>
     <p:extLst>

</xml_diff>

<commit_message>
fond ppt en noir
</commit_message>
<xml_diff>
--- a/PPT/Easy != Simple.pptx
+++ b/PPT/Easy != Simple.pptx
@@ -2,7 +2,7 @@
 <file path=ppt/presentation.xml><?xml version="1.0" encoding="utf-8"?>
 <p:presentation xmlns:a="http://schemas.openxmlformats.org/drawingml/2006/main" xmlns:r="http://schemas.openxmlformats.org/officeDocument/2006/relationships" xmlns:p="http://schemas.openxmlformats.org/presentationml/2006/main" autoCompressPictures="0">
   <p:sldMasterIdLst>
-    <p:sldMasterId id="2147483648" r:id="rId1"/>
+    <p:sldMasterId id="2147483668" r:id="rId1"/>
   </p:sldMasterIdLst>
   <p:notesMasterIdLst>
     <p:notesMasterId r:id="rId37"/>
@@ -231,7 +231,7 @@
           <a:p>
             <a:fld id="{29301A56-A927-403C-8918-21E784444591}" type="datetimeFigureOut">
               <a:rPr lang="fr-FR" smtClean="0"/>
-              <a:t>11/11/2019</a:t>
+              <a:t>12/11/2019</a:t>
             </a:fld>
             <a:endParaRPr lang="fr-FR"/>
           </a:p>
@@ -1596,7 +1596,7 @@
       </p:grpSpPr>
       <p:grpSp>
         <p:nvGrpSpPr>
-          <p:cNvPr id="7" name="Group 6"/>
+          <p:cNvPr id="8" name="Group 7"/>
           <p:cNvGrpSpPr/>
           <p:nvPr/>
         </p:nvGrpSpPr>
@@ -1625,7 +1625,8 @@
             <a:ln w="9525">
               <a:solidFill>
                 <a:schemeClr val="bg1">
-                  <a:lumMod val="75000"/>
+                  <a:lumMod val="85000"/>
+                  <a:lumOff val="15000"/>
                 </a:schemeClr>
               </a:solidFill>
             </a:ln>
@@ -1663,6 +1664,7 @@
               <a:solidFill>
                 <a:schemeClr val="bg1">
                   <a:lumMod val="85000"/>
+                  <a:lumOff val="15000"/>
                 </a:schemeClr>
               </a:solidFill>
             </a:ln>
@@ -2298,9 +2300,9 @@
           <a:lstStyle/>
           <a:p>
             <a:fld id="{B61BEF0D-F0BB-DE4B-95CE-6DB70DBA9567}" type="datetimeFigureOut">
-              <a:rPr lang="en-US" dirty="0"/>
+              <a:rPr lang="en-US" smtClean="0"/>
               <a:pPr/>
-              <a:t>11/11/2019</a:t>
+              <a:t>11/12/2019</a:t>
             </a:fld>
             <a:endParaRPr lang="en-US" dirty="0"/>
           </a:p>
@@ -2341,7 +2343,7 @@
           <a:lstStyle/>
           <a:p>
             <a:fld id="{D57F1E4F-1CFF-5643-939E-217C01CDF565}" type="slidenum">
-              <a:rPr lang="en-US" dirty="0"/>
+              <a:rPr lang="en-US" smtClean="0"/>
               <a:pPr/>
               <a:t>‹N°›</a:t>
             </a:fld>
@@ -2350,6 +2352,11 @@
         </p:txBody>
       </p:sp>
     </p:spTree>
+    <p:extLst>
+      <p:ext uri="{BB962C8B-B14F-4D97-AF65-F5344CB8AC3E}">
+        <p14:creationId xmlns:p14="http://schemas.microsoft.com/office/powerpoint/2010/main" val="449443938"/>
+      </p:ext>
+    </p:extLst>
   </p:cSld>
   <p:clrMapOvr>
     <a:masterClrMapping/>
@@ -2525,7 +2532,7 @@
             <a:pPr lvl="0"/>
             <a:r>
               <a:rPr lang="fr-FR"/>
-              <a:t>Modifier les styles du texte du masque</a:t>
+              <a:t>Cliquez pour modifier les styles du texte du masque</a:t>
             </a:r>
           </a:p>
         </p:txBody>
@@ -2546,9 +2553,9 @@
           <a:lstStyle/>
           <a:p>
             <a:fld id="{B61BEF0D-F0BB-DE4B-95CE-6DB70DBA9567}" type="datetimeFigureOut">
-              <a:rPr lang="en-US" dirty="0"/>
+              <a:rPr lang="en-US" smtClean="0"/>
               <a:pPr/>
-              <a:t>11/11/2019</a:t>
+              <a:t>11/12/2019</a:t>
             </a:fld>
             <a:endParaRPr lang="en-US" dirty="0"/>
           </a:p>
@@ -2589,7 +2596,7 @@
           <a:lstStyle/>
           <a:p>
             <a:fld id="{D57F1E4F-1CFF-5643-939E-217C01CDF565}" type="slidenum">
-              <a:rPr lang="en-US" dirty="0"/>
+              <a:rPr lang="en-US" smtClean="0"/>
               <a:pPr/>
               <a:t>‹N°›</a:t>
             </a:fld>
@@ -2598,6 +2605,11 @@
         </p:txBody>
       </p:sp>
     </p:spTree>
+    <p:extLst>
+      <p:ext uri="{BB962C8B-B14F-4D97-AF65-F5344CB8AC3E}">
+        <p14:creationId xmlns:p14="http://schemas.microsoft.com/office/powerpoint/2010/main" val="455138835"/>
+      </p:ext>
+    </p:extLst>
   </p:cSld>
   <p:clrMapOvr>
     <a:masterClrMapping/>
@@ -2714,7 +2726,7 @@
             <a:pPr lvl="0"/>
             <a:r>
               <a:rPr lang="fr-FR"/>
-              <a:t>Modifier les styles du texte du masque</a:t>
+              <a:t>Cliquez pour modifier les styles du texte du masque</a:t>
             </a:r>
           </a:p>
         </p:txBody>
@@ -2836,7 +2848,7 @@
             <a:pPr lvl="0"/>
             <a:r>
               <a:rPr lang="fr-FR"/>
-              <a:t>Modifier les styles du texte du masque</a:t>
+              <a:t>Cliquez pour modifier les styles du texte du masque</a:t>
             </a:r>
           </a:p>
         </p:txBody>
@@ -2857,9 +2869,9 @@
           <a:lstStyle/>
           <a:p>
             <a:fld id="{B61BEF0D-F0BB-DE4B-95CE-6DB70DBA9567}" type="datetimeFigureOut">
-              <a:rPr lang="en-US" dirty="0"/>
+              <a:rPr lang="en-US" smtClean="0"/>
               <a:pPr/>
-              <a:t>11/11/2019</a:t>
+              <a:t>11/12/2019</a:t>
             </a:fld>
             <a:endParaRPr lang="en-US" dirty="0"/>
           </a:p>
@@ -2900,7 +2912,7 @@
           <a:lstStyle/>
           <a:p>
             <a:fld id="{D57F1E4F-1CFF-5643-939E-217C01CDF565}" type="slidenum">
-              <a:rPr lang="en-US" dirty="0"/>
+              <a:rPr lang="en-US" smtClean="0"/>
               <a:pPr/>
               <a:t>‹N°›</a:t>
             </a:fld>
@@ -2936,10 +2948,7 @@
                   <a:noFill/>
                 </a:ln>
                 <a:solidFill>
-                  <a:schemeClr val="accent1">
-                    <a:lumMod val="60000"/>
-                    <a:lumOff val="40000"/>
-                  </a:schemeClr>
+                  <a:schemeClr val="accent1"/>
                 </a:solidFill>
                 <a:effectLst/>
                 <a:latin typeface="Arial"/>
@@ -2977,28 +2986,22 @@
                   <a:noFill/>
                 </a:ln>
                 <a:solidFill>
-                  <a:schemeClr val="accent1">
-                    <a:lumMod val="60000"/>
-                    <a:lumOff val="40000"/>
-                  </a:schemeClr>
+                  <a:schemeClr val="accent1"/>
                 </a:solidFill>
+                <a:effectLst/>
                 <a:latin typeface="Arial"/>
               </a:rPr>
               <a:t>”</a:t>
             </a:r>
-            <a:endParaRPr lang="en-US" dirty="0">
-              <a:solidFill>
-                <a:schemeClr val="accent1">
-                  <a:lumMod val="60000"/>
-                  <a:lumOff val="40000"/>
-                </a:schemeClr>
-              </a:solidFill>
-              <a:latin typeface="Arial"/>
-            </a:endParaRPr>
           </a:p>
         </p:txBody>
       </p:sp>
     </p:spTree>
+    <p:extLst>
+      <p:ext uri="{BB962C8B-B14F-4D97-AF65-F5344CB8AC3E}">
+        <p14:creationId xmlns:p14="http://schemas.microsoft.com/office/powerpoint/2010/main" val="1528148732"/>
+      </p:ext>
+    </p:extLst>
   </p:cSld>
   <p:clrMapOvr>
     <a:masterClrMapping/>
@@ -3174,7 +3177,7 @@
             <a:pPr lvl="0"/>
             <a:r>
               <a:rPr lang="fr-FR"/>
-              <a:t>Modifier les styles du texte du masque</a:t>
+              <a:t>Cliquez pour modifier les styles du texte du masque</a:t>
             </a:r>
           </a:p>
         </p:txBody>
@@ -3195,9 +3198,9 @@
           <a:lstStyle/>
           <a:p>
             <a:fld id="{B61BEF0D-F0BB-DE4B-95CE-6DB70DBA9567}" type="datetimeFigureOut">
-              <a:rPr lang="en-US" dirty="0"/>
+              <a:rPr lang="en-US" smtClean="0"/>
               <a:pPr/>
-              <a:t>11/11/2019</a:t>
+              <a:t>11/12/2019</a:t>
             </a:fld>
             <a:endParaRPr lang="en-US" dirty="0"/>
           </a:p>
@@ -3238,7 +3241,7 @@
           <a:lstStyle/>
           <a:p>
             <a:fld id="{D57F1E4F-1CFF-5643-939E-217C01CDF565}" type="slidenum">
-              <a:rPr lang="en-US" dirty="0"/>
+              <a:rPr lang="en-US" smtClean="0"/>
               <a:pPr/>
               <a:t>‹N°›</a:t>
             </a:fld>
@@ -3247,6 +3250,11 @@
         </p:txBody>
       </p:sp>
     </p:spTree>
+    <p:extLst>
+      <p:ext uri="{BB962C8B-B14F-4D97-AF65-F5344CB8AC3E}">
+        <p14:creationId xmlns:p14="http://schemas.microsoft.com/office/powerpoint/2010/main" val="3837319162"/>
+      </p:ext>
+    </p:extLst>
   </p:cSld>
   <p:clrMapOvr>
     <a:masterClrMapping/>
@@ -3363,7 +3371,7 @@
             <a:pPr lvl="0"/>
             <a:r>
               <a:rPr lang="fr-FR"/>
-              <a:t>Modifier les styles du texte du masque</a:t>
+              <a:t>Cliquez pour modifier les styles du texte du masque</a:t>
             </a:r>
           </a:p>
         </p:txBody>
@@ -3485,7 +3493,7 @@
             <a:pPr lvl="0"/>
             <a:r>
               <a:rPr lang="fr-FR"/>
-              <a:t>Modifier les styles du texte du masque</a:t>
+              <a:t>Cliquez pour modifier les styles du texte du masque</a:t>
             </a:r>
           </a:p>
         </p:txBody>
@@ -3506,9 +3514,9 @@
           <a:lstStyle/>
           <a:p>
             <a:fld id="{B61BEF0D-F0BB-DE4B-95CE-6DB70DBA9567}" type="datetimeFigureOut">
-              <a:rPr lang="en-US" dirty="0"/>
+              <a:rPr lang="en-US" smtClean="0"/>
               <a:pPr/>
-              <a:t>11/11/2019</a:t>
+              <a:t>11/12/2019</a:t>
             </a:fld>
             <a:endParaRPr lang="en-US" dirty="0"/>
           </a:p>
@@ -3549,7 +3557,7 @@
           <a:lstStyle/>
           <a:p>
             <a:fld id="{D57F1E4F-1CFF-5643-939E-217C01CDF565}" type="slidenum">
-              <a:rPr lang="en-US" dirty="0"/>
+              <a:rPr lang="en-US" smtClean="0"/>
               <a:pPr/>
               <a:t>‹N°›</a:t>
             </a:fld>
@@ -3585,10 +3593,7 @@
                   <a:noFill/>
                 </a:ln>
                 <a:solidFill>
-                  <a:schemeClr val="accent1">
-                    <a:lumMod val="60000"/>
-                    <a:lumOff val="40000"/>
-                  </a:schemeClr>
+                  <a:schemeClr val="accent1"/>
                 </a:solidFill>
                 <a:effectLst/>
                 <a:latin typeface="Arial"/>
@@ -3626,10 +3631,7 @@
                   <a:noFill/>
                 </a:ln>
                 <a:solidFill>
-                  <a:schemeClr val="accent1">
-                    <a:lumMod val="60000"/>
-                    <a:lumOff val="40000"/>
-                  </a:schemeClr>
+                  <a:schemeClr val="accent1"/>
                 </a:solidFill>
                 <a:effectLst/>
                 <a:latin typeface="Arial"/>
@@ -3640,6 +3642,11 @@
         </p:txBody>
       </p:sp>
     </p:spTree>
+    <p:extLst>
+      <p:ext uri="{BB962C8B-B14F-4D97-AF65-F5344CB8AC3E}">
+        <p14:creationId xmlns:p14="http://schemas.microsoft.com/office/powerpoint/2010/main" val="3779671877"/>
+      </p:ext>
+    </p:extLst>
   </p:cSld>
   <p:clrMapOvr>
     <a:masterClrMapping/>
@@ -3753,7 +3760,7 @@
             <a:pPr lvl="0"/>
             <a:r>
               <a:rPr lang="fr-FR"/>
-              <a:t>Modifier les styles du texte du masque</a:t>
+              <a:t>Cliquez pour modifier les styles du texte du masque</a:t>
             </a:r>
           </a:p>
         </p:txBody>
@@ -3875,7 +3882,7 @@
             <a:pPr lvl="0"/>
             <a:r>
               <a:rPr lang="fr-FR"/>
-              <a:t>Modifier les styles du texte du masque</a:t>
+              <a:t>Cliquez pour modifier les styles du texte du masque</a:t>
             </a:r>
           </a:p>
         </p:txBody>
@@ -3896,9 +3903,9 @@
           <a:lstStyle/>
           <a:p>
             <a:fld id="{B61BEF0D-F0BB-DE4B-95CE-6DB70DBA9567}" type="datetimeFigureOut">
-              <a:rPr lang="en-US" dirty="0"/>
+              <a:rPr lang="en-US" smtClean="0"/>
               <a:pPr/>
-              <a:t>11/11/2019</a:t>
+              <a:t>11/12/2019</a:t>
             </a:fld>
             <a:endParaRPr lang="en-US" dirty="0"/>
           </a:p>
@@ -3939,7 +3946,7 @@
           <a:lstStyle/>
           <a:p>
             <a:fld id="{D57F1E4F-1CFF-5643-939E-217C01CDF565}" type="slidenum">
-              <a:rPr lang="en-US" dirty="0"/>
+              <a:rPr lang="en-US" smtClean="0"/>
               <a:pPr/>
               <a:t>‹N°›</a:t>
             </a:fld>
@@ -3948,6 +3955,11 @@
         </p:txBody>
       </p:sp>
     </p:spTree>
+    <p:extLst>
+      <p:ext uri="{BB962C8B-B14F-4D97-AF65-F5344CB8AC3E}">
+        <p14:creationId xmlns:p14="http://schemas.microsoft.com/office/powerpoint/2010/main" val="4161281036"/>
+      </p:ext>
+    </p:extLst>
   </p:cSld>
   <p:clrMapOvr>
     <a:masterClrMapping/>
@@ -4013,7 +4025,7 @@
             <a:pPr lvl="0"/>
             <a:r>
               <a:rPr lang="fr-FR"/>
-              <a:t>Modifier les styles du texte du masque</a:t>
+              <a:t>Cliquez pour modifier les styles du texte du masque</a:t>
             </a:r>
           </a:p>
           <a:p>
@@ -4063,8 +4075,8 @@
           <a:lstStyle/>
           <a:p>
             <a:fld id="{55C6B4A9-1611-4792-9094-5F34BCA07E0B}" type="datetimeFigureOut">
-              <a:rPr lang="en-US" dirty="0"/>
-              <a:t>11/11/2019</a:t>
+              <a:rPr lang="en-US" smtClean="0"/>
+              <a:t>11/12/2019</a:t>
             </a:fld>
             <a:endParaRPr lang="en-US" dirty="0"/>
           </a:p>
@@ -4105,7 +4117,7 @@
           <a:lstStyle/>
           <a:p>
             <a:fld id="{89333C77-0158-454C-844F-B7AB9BD7DAD4}" type="slidenum">
-              <a:rPr lang="en-US" dirty="0"/>
+              <a:rPr lang="en-US" smtClean="0"/>
               <a:t>‹N°›</a:t>
             </a:fld>
             <a:endParaRPr lang="en-US" dirty="0"/>
@@ -4113,6 +4125,11 @@
         </p:txBody>
       </p:sp>
     </p:spTree>
+    <p:extLst>
+      <p:ext uri="{BB962C8B-B14F-4D97-AF65-F5344CB8AC3E}">
+        <p14:creationId xmlns:p14="http://schemas.microsoft.com/office/powerpoint/2010/main" val="3599887454"/>
+      </p:ext>
+    </p:extLst>
   </p:cSld>
   <p:clrMapOvr>
     <a:masterClrMapping/>
@@ -4188,7 +4205,7 @@
             <a:pPr lvl="0"/>
             <a:r>
               <a:rPr lang="fr-FR"/>
-              <a:t>Modifier les styles du texte du masque</a:t>
+              <a:t>Cliquez pour modifier les styles du texte du masque</a:t>
             </a:r>
           </a:p>
           <a:p>
@@ -4238,9 +4255,9 @@
           <a:lstStyle/>
           <a:p>
             <a:fld id="{B61BEF0D-F0BB-DE4B-95CE-6DB70DBA9567}" type="datetimeFigureOut">
-              <a:rPr lang="en-US" dirty="0"/>
+              <a:rPr lang="en-US" smtClean="0"/>
               <a:pPr/>
-              <a:t>11/11/2019</a:t>
+              <a:t>11/12/2019</a:t>
             </a:fld>
             <a:endParaRPr lang="en-US" dirty="0"/>
           </a:p>
@@ -4281,7 +4298,7 @@
           <a:lstStyle/>
           <a:p>
             <a:fld id="{D57F1E4F-1CFF-5643-939E-217C01CDF565}" type="slidenum">
-              <a:rPr lang="en-US" dirty="0"/>
+              <a:rPr lang="en-US" smtClean="0"/>
               <a:pPr/>
               <a:t>‹N°›</a:t>
             </a:fld>
@@ -4290,6 +4307,11 @@
         </p:txBody>
       </p:sp>
     </p:spTree>
+    <p:extLst>
+      <p:ext uri="{BB962C8B-B14F-4D97-AF65-F5344CB8AC3E}">
+        <p14:creationId xmlns:p14="http://schemas.microsoft.com/office/powerpoint/2010/main" val="726314464"/>
+      </p:ext>
+    </p:extLst>
   </p:cSld>
   <p:clrMapOvr>
     <a:masterClrMapping/>
@@ -4361,7 +4383,7 @@
             <a:pPr lvl="0"/>
             <a:r>
               <a:rPr lang="fr-FR"/>
-              <a:t>Modifier les styles du texte du masque</a:t>
+              <a:t>Cliquez pour modifier les styles du texte du masque</a:t>
             </a:r>
           </a:p>
           <a:p>
@@ -4411,9 +4433,9 @@
           <a:lstStyle/>
           <a:p>
             <a:fld id="{B61BEF0D-F0BB-DE4B-95CE-6DB70DBA9567}" type="datetimeFigureOut">
-              <a:rPr lang="en-US" dirty="0"/>
+              <a:rPr lang="en-US" smtClean="0"/>
               <a:pPr/>
-              <a:t>11/11/2019</a:t>
+              <a:t>11/12/2019</a:t>
             </a:fld>
             <a:endParaRPr lang="en-US" dirty="0"/>
           </a:p>
@@ -4454,7 +4476,7 @@
           <a:lstStyle/>
           <a:p>
             <a:fld id="{D57F1E4F-1CFF-5643-939E-217C01CDF565}" type="slidenum">
-              <a:rPr lang="en-US" dirty="0"/>
+              <a:rPr lang="en-US" smtClean="0"/>
               <a:pPr/>
               <a:t>‹N°›</a:t>
             </a:fld>
@@ -4463,6 +4485,11 @@
         </p:txBody>
       </p:sp>
     </p:spTree>
+    <p:extLst>
+      <p:ext uri="{BB962C8B-B14F-4D97-AF65-F5344CB8AC3E}">
+        <p14:creationId xmlns:p14="http://schemas.microsoft.com/office/powerpoint/2010/main" val="1390391251"/>
+      </p:ext>
+    </p:extLst>
   </p:cSld>
   <p:clrMapOvr>
     <a:masterClrMapping/>
@@ -4634,7 +4661,7 @@
             <a:pPr lvl="0"/>
             <a:r>
               <a:rPr lang="fr-FR"/>
-              <a:t>Modifier les styles du texte du masque</a:t>
+              <a:t>Cliquez pour modifier les styles du texte du masque</a:t>
             </a:r>
           </a:p>
         </p:txBody>
@@ -4655,9 +4682,9 @@
           <a:lstStyle/>
           <a:p>
             <a:fld id="{B61BEF0D-F0BB-DE4B-95CE-6DB70DBA9567}" type="datetimeFigureOut">
-              <a:rPr lang="en-US" dirty="0"/>
+              <a:rPr lang="en-US" smtClean="0"/>
               <a:pPr/>
-              <a:t>11/11/2019</a:t>
+              <a:t>11/12/2019</a:t>
             </a:fld>
             <a:endParaRPr lang="en-US" dirty="0"/>
           </a:p>
@@ -4698,7 +4725,7 @@
           <a:lstStyle/>
           <a:p>
             <a:fld id="{D57F1E4F-1CFF-5643-939E-217C01CDF565}" type="slidenum">
-              <a:rPr lang="en-US" dirty="0"/>
+              <a:rPr lang="en-US" smtClean="0"/>
               <a:pPr/>
               <a:t>‹N°›</a:t>
             </a:fld>
@@ -4707,6 +4734,11 @@
         </p:txBody>
       </p:sp>
     </p:spTree>
+    <p:extLst>
+      <p:ext uri="{BB962C8B-B14F-4D97-AF65-F5344CB8AC3E}">
+        <p14:creationId xmlns:p14="http://schemas.microsoft.com/office/powerpoint/2010/main" val="514393376"/>
+      </p:ext>
+    </p:extLst>
   </p:cSld>
   <p:clrMapOvr>
     <a:masterClrMapping/>
@@ -4777,7 +4809,7 @@
             <a:pPr lvl="0"/>
             <a:r>
               <a:rPr lang="fr-FR"/>
-              <a:t>Modifier les styles du texte du masque</a:t>
+              <a:t>Cliquez pour modifier les styles du texte du masque</a:t>
             </a:r>
           </a:p>
           <a:p>
@@ -4834,7 +4866,7 @@
             <a:pPr lvl="0"/>
             <a:r>
               <a:rPr lang="fr-FR"/>
-              <a:t>Modifier les styles du texte du masque</a:t>
+              <a:t>Cliquez pour modifier les styles du texte du masque</a:t>
             </a:r>
           </a:p>
           <a:p>
@@ -4884,8 +4916,8 @@
           <a:lstStyle/>
           <a:p>
             <a:fld id="{EB712588-04B1-427B-82EE-E8DB90309F08}" type="datetimeFigureOut">
-              <a:rPr lang="en-US" dirty="0"/>
-              <a:t>11/11/2019</a:t>
+              <a:rPr lang="en-US" smtClean="0"/>
+              <a:t>11/12/2019</a:t>
             </a:fld>
             <a:endParaRPr lang="en-US" dirty="0"/>
           </a:p>
@@ -4926,7 +4958,7 @@
           <a:lstStyle/>
           <a:p>
             <a:fld id="{6FF9F0C5-380F-41C2-899A-BAC0F0927E16}" type="slidenum">
-              <a:rPr lang="en-US" dirty="0"/>
+              <a:rPr lang="en-US" smtClean="0"/>
               <a:t>‹N°›</a:t>
             </a:fld>
             <a:endParaRPr lang="en-US" dirty="0"/>
@@ -4934,6 +4966,11 @@
         </p:txBody>
       </p:sp>
     </p:spTree>
+    <p:extLst>
+      <p:ext uri="{BB962C8B-B14F-4D97-AF65-F5344CB8AC3E}">
+        <p14:creationId xmlns:p14="http://schemas.microsoft.com/office/powerpoint/2010/main" val="672775442"/>
+      </p:ext>
+    </p:extLst>
   </p:cSld>
   <p:clrMapOvr>
     <a:masterClrMapping/>
@@ -5047,7 +5084,7 @@
             <a:pPr lvl="0"/>
             <a:r>
               <a:rPr lang="fr-FR"/>
-              <a:t>Modifier les styles du texte du masque</a:t>
+              <a:t>Cliquez pour modifier les styles du texte du masque</a:t>
             </a:r>
           </a:p>
         </p:txBody>
@@ -5077,7 +5114,7 @@
             <a:pPr lvl="0"/>
             <a:r>
               <a:rPr lang="fr-FR"/>
-              <a:t>Modifier les styles du texte du masque</a:t>
+              <a:t>Cliquez pour modifier les styles du texte du masque</a:t>
             </a:r>
           </a:p>
           <a:p>
@@ -5173,7 +5210,7 @@
             <a:pPr lvl="0"/>
             <a:r>
               <a:rPr lang="fr-FR"/>
-              <a:t>Modifier les styles du texte du masque</a:t>
+              <a:t>Cliquez pour modifier les styles du texte du masque</a:t>
             </a:r>
           </a:p>
         </p:txBody>
@@ -5203,7 +5240,7 @@
             <a:pPr lvl="0"/>
             <a:r>
               <a:rPr lang="fr-FR"/>
-              <a:t>Modifier les styles du texte du masque</a:t>
+              <a:t>Cliquez pour modifier les styles du texte du masque</a:t>
             </a:r>
           </a:p>
           <a:p>
@@ -5253,9 +5290,9 @@
           <a:lstStyle/>
           <a:p>
             <a:fld id="{B61BEF0D-F0BB-DE4B-95CE-6DB70DBA9567}" type="datetimeFigureOut">
-              <a:rPr lang="en-US" dirty="0"/>
+              <a:rPr lang="en-US" smtClean="0"/>
               <a:pPr/>
-              <a:t>11/11/2019</a:t>
+              <a:t>11/12/2019</a:t>
             </a:fld>
             <a:endParaRPr lang="en-US" dirty="0"/>
           </a:p>
@@ -5296,7 +5333,7 @@
           <a:lstStyle/>
           <a:p>
             <a:fld id="{D57F1E4F-1CFF-5643-939E-217C01CDF565}" type="slidenum">
-              <a:rPr lang="en-US" dirty="0"/>
+              <a:rPr lang="en-US" smtClean="0"/>
               <a:pPr/>
               <a:t>‹N°›</a:t>
             </a:fld>
@@ -5305,6 +5342,11 @@
         </p:txBody>
       </p:sp>
     </p:spTree>
+    <p:extLst>
+      <p:ext uri="{BB962C8B-B14F-4D97-AF65-F5344CB8AC3E}">
+        <p14:creationId xmlns:p14="http://schemas.microsoft.com/office/powerpoint/2010/main" val="1389566683"/>
+      </p:ext>
+    </p:extLst>
   </p:cSld>
   <p:clrMapOvr>
     <a:masterClrMapping/>
@@ -5373,9 +5415,9 @@
           <a:lstStyle/>
           <a:p>
             <a:fld id="{B61BEF0D-F0BB-DE4B-95CE-6DB70DBA9567}" type="datetimeFigureOut">
-              <a:rPr lang="en-US" dirty="0"/>
+              <a:rPr lang="en-US" smtClean="0"/>
               <a:pPr/>
-              <a:t>11/11/2019</a:t>
+              <a:t>11/12/2019</a:t>
             </a:fld>
             <a:endParaRPr lang="en-US" dirty="0"/>
           </a:p>
@@ -5416,7 +5458,7 @@
           <a:lstStyle/>
           <a:p>
             <a:fld id="{D57F1E4F-1CFF-5643-939E-217C01CDF565}" type="slidenum">
-              <a:rPr lang="en-US" dirty="0"/>
+              <a:rPr lang="en-US" smtClean="0"/>
               <a:pPr/>
               <a:t>‹N°›</a:t>
             </a:fld>
@@ -5425,6 +5467,11 @@
         </p:txBody>
       </p:sp>
     </p:spTree>
+    <p:extLst>
+      <p:ext uri="{BB962C8B-B14F-4D97-AF65-F5344CB8AC3E}">
+        <p14:creationId xmlns:p14="http://schemas.microsoft.com/office/powerpoint/2010/main" val="4139300990"/>
+      </p:ext>
+    </p:extLst>
   </p:cSld>
   <p:clrMapOvr>
     <a:masterClrMapping/>
@@ -5465,9 +5512,9 @@
           <a:lstStyle/>
           <a:p>
             <a:fld id="{B61BEF0D-F0BB-DE4B-95CE-6DB70DBA9567}" type="datetimeFigureOut">
-              <a:rPr lang="en-US" dirty="0"/>
+              <a:rPr lang="en-US" smtClean="0"/>
               <a:pPr/>
-              <a:t>11/11/2019</a:t>
+              <a:t>11/12/2019</a:t>
             </a:fld>
             <a:endParaRPr lang="en-US" dirty="0"/>
           </a:p>
@@ -5508,7 +5555,7 @@
           <a:lstStyle/>
           <a:p>
             <a:fld id="{D57F1E4F-1CFF-5643-939E-217C01CDF565}" type="slidenum">
-              <a:rPr lang="en-US" dirty="0"/>
+              <a:rPr lang="en-US" smtClean="0"/>
               <a:pPr/>
               <a:t>‹N°›</a:t>
             </a:fld>
@@ -5517,6 +5564,11 @@
         </p:txBody>
       </p:sp>
     </p:spTree>
+    <p:extLst>
+      <p:ext uri="{BB962C8B-B14F-4D97-AF65-F5344CB8AC3E}">
+        <p14:creationId xmlns:p14="http://schemas.microsoft.com/office/powerpoint/2010/main" val="1849910059"/>
+      </p:ext>
+    </p:extLst>
   </p:cSld>
   <p:clrMapOvr>
     <a:masterClrMapping/>
@@ -5600,7 +5652,7 @@
             <a:pPr lvl="0"/>
             <a:r>
               <a:rPr lang="fr-FR"/>
-              <a:t>Modifier les styles du texte du masque</a:t>
+              <a:t>Cliquez pour modifier les styles du texte du masque</a:t>
             </a:r>
           </a:p>
           <a:p>
@@ -5696,7 +5748,7 @@
             <a:pPr lvl="0"/>
             <a:r>
               <a:rPr lang="fr-FR"/>
-              <a:t>Modifier les styles du texte du masque</a:t>
+              <a:t>Cliquez pour modifier les styles du texte du masque</a:t>
             </a:r>
           </a:p>
         </p:txBody>
@@ -5717,8 +5769,8 @@
           <a:lstStyle/>
           <a:p>
             <a:fld id="{42A54C80-263E-416B-A8E0-580EDEADCBDC}" type="datetimeFigureOut">
-              <a:rPr lang="en-US" dirty="0"/>
-              <a:t>11/11/2019</a:t>
+              <a:rPr lang="en-US" smtClean="0"/>
+              <a:t>11/12/2019</a:t>
             </a:fld>
             <a:endParaRPr lang="en-US" dirty="0"/>
           </a:p>
@@ -5759,7 +5811,7 @@
           <a:lstStyle/>
           <a:p>
             <a:fld id="{519954A3-9DFD-4C44-94BA-B95130A3BA1C}" type="slidenum">
-              <a:rPr lang="en-US" dirty="0"/>
+              <a:rPr lang="en-US" smtClean="0"/>
               <a:t>‹N°›</a:t>
             </a:fld>
             <a:endParaRPr lang="en-US" dirty="0"/>
@@ -5767,6 +5819,11 @@
         </p:txBody>
       </p:sp>
     </p:spTree>
+    <p:extLst>
+      <p:ext uri="{BB962C8B-B14F-4D97-AF65-F5344CB8AC3E}">
+        <p14:creationId xmlns:p14="http://schemas.microsoft.com/office/powerpoint/2010/main" val="3998405892"/>
+      </p:ext>
+    </p:extLst>
   </p:cSld>
   <p:clrMapOvr>
     <a:masterClrMapping/>
@@ -5954,7 +6011,7 @@
             <a:pPr lvl="0"/>
             <a:r>
               <a:rPr lang="fr-FR"/>
-              <a:t>Modifier les styles du texte du masque</a:t>
+              <a:t>Cliquez pour modifier les styles du texte du masque</a:t>
             </a:r>
           </a:p>
         </p:txBody>
@@ -5975,9 +6032,9 @@
           <a:lstStyle/>
           <a:p>
             <a:fld id="{B61BEF0D-F0BB-DE4B-95CE-6DB70DBA9567}" type="datetimeFigureOut">
-              <a:rPr lang="en-US" dirty="0"/>
+              <a:rPr lang="en-US" smtClean="0"/>
               <a:pPr/>
-              <a:t>11/11/2019</a:t>
+              <a:t>11/12/2019</a:t>
             </a:fld>
             <a:endParaRPr lang="en-US" dirty="0"/>
           </a:p>
@@ -6018,7 +6075,7 @@
           <a:lstStyle/>
           <a:p>
             <a:fld id="{D57F1E4F-1CFF-5643-939E-217C01CDF565}" type="slidenum">
-              <a:rPr lang="en-US" dirty="0"/>
+              <a:rPr lang="en-US" smtClean="0"/>
               <a:pPr/>
               <a:t>‹N°›</a:t>
             </a:fld>
@@ -6027,6 +6084,11 @@
         </p:txBody>
       </p:sp>
     </p:spTree>
+    <p:extLst>
+      <p:ext uri="{BB962C8B-B14F-4D97-AF65-F5344CB8AC3E}">
+        <p14:creationId xmlns:p14="http://schemas.microsoft.com/office/powerpoint/2010/main" val="164717795"/>
+      </p:ext>
+    </p:extLst>
   </p:cSld>
   <p:clrMapOvr>
     <a:masterClrMapping/>
@@ -6039,7 +6101,7 @@
   <p:cSld>
     <p:bg>
       <p:bgRef idx="1001">
-        <a:schemeClr val="bg1"/>
+        <a:schemeClr val="bg2"/>
       </p:bgRef>
     </p:bg>
     <p:spTree>
@@ -6058,7 +6120,7 @@
       </p:grpSpPr>
       <p:grpSp>
         <p:nvGrpSpPr>
-          <p:cNvPr id="7" name="Group 6"/>
+          <p:cNvPr id="8" name="Group 7"/>
           <p:cNvGrpSpPr/>
           <p:nvPr/>
         </p:nvGrpSpPr>
@@ -6087,7 +6149,8 @@
             <a:ln w="9525">
               <a:solidFill>
                 <a:schemeClr val="bg1">
-                  <a:lumMod val="75000"/>
+                  <a:lumMod val="85000"/>
+                  <a:lumOff val="15000"/>
                 </a:schemeClr>
               </a:solidFill>
             </a:ln>
@@ -6125,6 +6188,7 @@
               <a:solidFill>
                 <a:schemeClr val="bg1">
                   <a:lumMod val="85000"/>
+                  <a:lumOff val="15000"/>
                 </a:schemeClr>
               </a:solidFill>
             </a:ln>
@@ -6647,7 +6711,7 @@
             <a:pPr lvl="0"/>
             <a:r>
               <a:rPr lang="fr-FR"/>
-              <a:t>Modifier les styles du texte du masque</a:t>
+              <a:t>Cliquez pour modifier les styles du texte du masque</a:t>
             </a:r>
           </a:p>
           <a:p>
@@ -6715,9 +6779,9 @@
           </a:lstStyle>
           <a:p>
             <a:fld id="{B61BEF0D-F0BB-DE4B-95CE-6DB70DBA9567}" type="datetimeFigureOut">
-              <a:rPr lang="en-US" dirty="0"/>
+              <a:rPr lang="en-US" smtClean="0"/>
               <a:pPr/>
-              <a:t>11/11/2019</a:t>
+              <a:t>11/12/2019</a:t>
             </a:fld>
             <a:endParaRPr lang="en-US" dirty="0"/>
           </a:p>
@@ -6792,7 +6856,7 @@
           </a:lstStyle>
           <a:p>
             <a:fld id="{D57F1E4F-1CFF-5643-939E-217C01CDF565}" type="slidenum">
-              <a:rPr lang="en-US" dirty="0"/>
+              <a:rPr lang="en-US" smtClean="0"/>
               <a:pPr/>
               <a:t>‹N°›</a:t>
             </a:fld>
@@ -6801,25 +6865,30 @@
         </p:txBody>
       </p:sp>
     </p:spTree>
+    <p:extLst>
+      <p:ext uri="{BB962C8B-B14F-4D97-AF65-F5344CB8AC3E}">
+        <p14:creationId xmlns:p14="http://schemas.microsoft.com/office/powerpoint/2010/main" val="2850802362"/>
+      </p:ext>
+    </p:extLst>
   </p:cSld>
-  <p:clrMap bg1="lt1" tx1="dk1" bg2="lt2" tx2="dk2" accent1="accent1" accent2="accent2" accent3="accent3" accent4="accent4" accent5="accent5" accent6="accent6" hlink="hlink" folHlink="folHlink"/>
+  <p:clrMap bg1="dk1" tx1="lt1" bg2="dk2" tx2="lt2" accent1="accent1" accent2="accent2" accent3="accent3" accent4="accent4" accent5="accent5" accent6="accent6" hlink="hlink" folHlink="folHlink"/>
   <p:sldLayoutIdLst>
-    <p:sldLayoutId id="2147483649" r:id="rId1"/>
-    <p:sldLayoutId id="2147483650" r:id="rId2"/>
-    <p:sldLayoutId id="2147483651" r:id="rId3"/>
-    <p:sldLayoutId id="2147483665" r:id="rId4"/>
-    <p:sldLayoutId id="2147483653" r:id="rId5"/>
-    <p:sldLayoutId id="2147483654" r:id="rId6"/>
-    <p:sldLayoutId id="2147483655" r:id="rId7"/>
-    <p:sldLayoutId id="2147483666" r:id="rId8"/>
-    <p:sldLayoutId id="2147483657" r:id="rId9"/>
-    <p:sldLayoutId id="2147483660" r:id="rId10"/>
-    <p:sldLayoutId id="2147483661" r:id="rId11"/>
-    <p:sldLayoutId id="2147483662" r:id="rId12"/>
-    <p:sldLayoutId id="2147483663" r:id="rId13"/>
-    <p:sldLayoutId id="2147483664" r:id="rId14"/>
-    <p:sldLayoutId id="2147483667" r:id="rId15"/>
-    <p:sldLayoutId id="2147483659" r:id="rId16"/>
+    <p:sldLayoutId id="2147483669" r:id="rId1"/>
+    <p:sldLayoutId id="2147483670" r:id="rId2"/>
+    <p:sldLayoutId id="2147483671" r:id="rId3"/>
+    <p:sldLayoutId id="2147483672" r:id="rId4"/>
+    <p:sldLayoutId id="2147483673" r:id="rId5"/>
+    <p:sldLayoutId id="2147483674" r:id="rId6"/>
+    <p:sldLayoutId id="2147483675" r:id="rId7"/>
+    <p:sldLayoutId id="2147483676" r:id="rId8"/>
+    <p:sldLayoutId id="2147483677" r:id="rId9"/>
+    <p:sldLayoutId id="2147483678" r:id="rId10"/>
+    <p:sldLayoutId id="2147483679" r:id="rId11"/>
+    <p:sldLayoutId id="2147483680" r:id="rId12"/>
+    <p:sldLayoutId id="2147483681" r:id="rId13"/>
+    <p:sldLayoutId id="2147483682" r:id="rId14"/>
+    <p:sldLayoutId id="2147483683" r:id="rId15"/>
+    <p:sldLayoutId id="2147483684" r:id="rId16"/>
   </p:sldLayoutIdLst>
   <p:txStyles>
     <p:titleStyle>
@@ -7904,53 +7973,6 @@
           <a:chExt cx="0" cy="0"/>
         </a:xfrm>
       </p:grpSpPr>
-      <p:cxnSp>
-        <p:nvCxnSpPr>
-          <p:cNvPr id="8" name="Straight Connector 7">
-            <a:extLst>
-              <a:ext uri="{FF2B5EF4-FFF2-40B4-BE49-F238E27FC236}">
-                <a16:creationId xmlns:a16="http://schemas.microsoft.com/office/drawing/2014/main" id="{0B5F7E3B-C5F1-40E0-A491-558BAFBC1127}"/>
-              </a:ext>
-              <a:ext uri="{C183D7F6-B498-43B3-948B-1728B52AA6E4}">
-                <adec:decorative xmlns:adec="http://schemas.microsoft.com/office/drawing/2017/decorative" val="1"/>
-              </a:ext>
-            </a:extLst>
-          </p:cNvPr>
-          <p:cNvCxnSpPr>
-            <a:cxnSpLocks noGrp="1" noRot="1" noChangeAspect="1" noMove="1" noResize="1" noEditPoints="1" noAdjustHandles="1" noChangeArrowheads="1" noChangeShapeType="1"/>
-          </p:cNvCxnSpPr>
-          <p:nvPr>
-            <p:extLst>
-              <p:ext uri="{386F3935-93C4-4BCD-93E2-E3B085C9AB24}">
-                <p16:designElem xmlns:p16="http://schemas.microsoft.com/office/powerpoint/2015/main" val="1"/>
-              </p:ext>
-            </p:extLst>
-          </p:nvPr>
-        </p:nvCxnSpPr>
-        <p:spPr>
-          <a:xfrm>
-            <a:off x="4241804" y="1460500"/>
-            <a:ext cx="0" cy="3937000"/>
-          </a:xfrm>
-          <a:prstGeom prst="line">
-            <a:avLst/>
-          </a:prstGeom>
-        </p:spPr>
-        <p:style>
-          <a:lnRef idx="1">
-            <a:schemeClr val="accent1"/>
-          </a:lnRef>
-          <a:fillRef idx="0">
-            <a:schemeClr val="accent1"/>
-          </a:fillRef>
-          <a:effectRef idx="0">
-            <a:schemeClr val="accent1"/>
-          </a:effectRef>
-          <a:fontRef idx="minor">
-            <a:schemeClr val="tx1"/>
-          </a:fontRef>
-        </p:style>
-      </p:cxnSp>
       <p:sp>
         <p:nvSpPr>
           <p:cNvPr id="2" name="Titre 1">
@@ -8150,66 +8172,6 @@
           <a:chExt cx="0" cy="0"/>
         </a:xfrm>
       </p:grpSpPr>
-      <p:sp useBgFill="1">
-        <p:nvSpPr>
-          <p:cNvPr id="8" name="Rectangle 7">
-            <a:extLst>
-              <a:ext uri="{FF2B5EF4-FFF2-40B4-BE49-F238E27FC236}">
-                <a16:creationId xmlns:a16="http://schemas.microsoft.com/office/drawing/2014/main" id="{8DF4D7F6-81B5-452A-9CE6-76D81F91D41B}"/>
-              </a:ext>
-              <a:ext uri="{C183D7F6-B498-43B3-948B-1728B52AA6E4}">
-                <adec:decorative xmlns:adec="http://schemas.microsoft.com/office/drawing/2017/decorative" val="1"/>
-              </a:ext>
-            </a:extLst>
-          </p:cNvPr>
-          <p:cNvSpPr>
-            <a:spLocks noGrp="1" noRot="1" noChangeAspect="1" noMove="1" noResize="1" noEditPoints="1" noAdjustHandles="1" noChangeArrowheads="1" noChangeShapeType="1" noTextEdit="1"/>
-          </p:cNvSpPr>
-          <p:nvPr>
-            <p:extLst>
-              <p:ext uri="{386F3935-93C4-4BCD-93E2-E3B085C9AB24}">
-                <p16:designElem xmlns:p16="http://schemas.microsoft.com/office/powerpoint/2015/main" val="1"/>
-              </p:ext>
-            </p:extLst>
-          </p:nvPr>
-        </p:nvSpPr>
-        <p:spPr>
-          <a:xfrm>
-            <a:off x="0" y="0"/>
-            <a:ext cx="12192000" cy="6858000"/>
-          </a:xfrm>
-          <a:prstGeom prst="rect">
-            <a:avLst/>
-          </a:prstGeom>
-          <a:ln>
-            <a:noFill/>
-          </a:ln>
-        </p:spPr>
-        <p:style>
-          <a:lnRef idx="2">
-            <a:schemeClr val="accent1">
-              <a:shade val="50000"/>
-            </a:schemeClr>
-          </a:lnRef>
-          <a:fillRef idx="1">
-            <a:schemeClr val="accent1"/>
-          </a:fillRef>
-          <a:effectRef idx="0">
-            <a:schemeClr val="accent1"/>
-          </a:effectRef>
-          <a:fontRef idx="minor">
-            <a:schemeClr val="lt1"/>
-          </a:fontRef>
-        </p:style>
-        <p:txBody>
-          <a:bodyPr rtlCol="0" anchor="ctr"/>
-          <a:lstStyle/>
-          <a:p>
-            <a:pPr algn="ctr"/>
-            <a:endParaRPr lang="en-US"/>
-          </a:p>
-        </p:txBody>
-      </p:sp>
       <p:sp>
         <p:nvSpPr>
           <p:cNvPr id="2" name="Titre 1">
@@ -8248,225 +8210,6 @@
       </p:sp>
       <p:sp>
         <p:nvSpPr>
-          <p:cNvPr id="10" name="Isosceles Triangle 9">
-            <a:extLst>
-              <a:ext uri="{FF2B5EF4-FFF2-40B4-BE49-F238E27FC236}">
-                <a16:creationId xmlns:a16="http://schemas.microsoft.com/office/drawing/2014/main" id="{4600514D-20FB-4559-97DC-D1DC39E6C3DE}"/>
-              </a:ext>
-              <a:ext uri="{C183D7F6-B498-43B3-948B-1728B52AA6E4}">
-                <adec:decorative xmlns:adec="http://schemas.microsoft.com/office/drawing/2017/decorative" val="1"/>
-              </a:ext>
-            </a:extLst>
-          </p:cNvPr>
-          <p:cNvSpPr>
-            <a:spLocks noGrp="1" noRot="1" noChangeAspect="1" noMove="1" noResize="1" noEditPoints="1" noAdjustHandles="1" noChangeArrowheads="1" noChangeShapeType="1" noTextEdit="1"/>
-          </p:cNvSpPr>
-          <p:nvPr>
-            <p:extLst>
-              <p:ext uri="{386F3935-93C4-4BCD-93E2-E3B085C9AB24}">
-                <p16:designElem xmlns:p16="http://schemas.microsoft.com/office/powerpoint/2015/main" val="1"/>
-              </p:ext>
-            </p:extLst>
-          </p:nvPr>
-        </p:nvSpPr>
-        <p:spPr>
-          <a:xfrm flipV="1">
-            <a:off x="0" y="0"/>
-            <a:ext cx="448733" cy="2844800"/>
-          </a:xfrm>
-          <a:prstGeom prst="triangle">
-            <a:avLst>
-              <a:gd name="adj" fmla="val 0"/>
-            </a:avLst>
-          </a:prstGeom>
-          <a:solidFill>
-            <a:schemeClr val="accent1">
-              <a:alpha val="85000"/>
-            </a:schemeClr>
-          </a:solidFill>
-          <a:ln>
-            <a:noFill/>
-          </a:ln>
-          <a:effectLst/>
-        </p:spPr>
-        <p:style>
-          <a:lnRef idx="1">
-            <a:schemeClr val="accent1"/>
-          </a:lnRef>
-          <a:fillRef idx="3">
-            <a:schemeClr val="accent1"/>
-          </a:fillRef>
-          <a:effectRef idx="2">
-            <a:schemeClr val="accent1"/>
-          </a:effectRef>
-          <a:fontRef idx="minor">
-            <a:schemeClr val="lt1"/>
-          </a:fontRef>
-        </p:style>
-      </p:sp>
-      <p:sp>
-        <p:nvSpPr>
-          <p:cNvPr id="12" name="Isosceles Triangle 11">
-            <a:extLst>
-              <a:ext uri="{FF2B5EF4-FFF2-40B4-BE49-F238E27FC236}">
-                <a16:creationId xmlns:a16="http://schemas.microsoft.com/office/drawing/2014/main" id="{266F638A-E405-4AC0-B984-72E5813B0DD1}"/>
-              </a:ext>
-              <a:ext uri="{C183D7F6-B498-43B3-948B-1728B52AA6E4}">
-                <adec:decorative xmlns:adec="http://schemas.microsoft.com/office/drawing/2017/decorative" val="1"/>
-              </a:ext>
-            </a:extLst>
-          </p:cNvPr>
-          <p:cNvSpPr>
-            <a:spLocks noGrp="1" noRot="1" noChangeAspect="1" noMove="1" noResize="1" noEditPoints="1" noAdjustHandles="1" noChangeArrowheads="1" noChangeShapeType="1" noTextEdit="1"/>
-          </p:cNvSpPr>
-          <p:nvPr>
-            <p:extLst>
-              <p:ext uri="{386F3935-93C4-4BCD-93E2-E3B085C9AB24}">
-                <p16:designElem xmlns:p16="http://schemas.microsoft.com/office/powerpoint/2015/main" val="1"/>
-              </p:ext>
-            </p:extLst>
-          </p:nvPr>
-        </p:nvSpPr>
-        <p:spPr>
-          <a:xfrm>
-            <a:off x="7738534" y="3818467"/>
-            <a:ext cx="4450292" cy="3039533"/>
-          </a:xfrm>
-          <a:prstGeom prst="triangle">
-            <a:avLst>
-              <a:gd name="adj" fmla="val 100000"/>
-            </a:avLst>
-          </a:prstGeom>
-          <a:solidFill>
-            <a:schemeClr val="accent1"/>
-          </a:solidFill>
-          <a:ln>
-            <a:noFill/>
-          </a:ln>
-          <a:effectLst/>
-        </p:spPr>
-        <p:style>
-          <a:lnRef idx="1">
-            <a:schemeClr val="accent1"/>
-          </a:lnRef>
-          <a:fillRef idx="3">
-            <a:schemeClr val="accent1"/>
-          </a:fillRef>
-          <a:effectRef idx="2">
-            <a:schemeClr val="accent1"/>
-          </a:effectRef>
-          <a:fontRef idx="minor">
-            <a:schemeClr val="lt1"/>
-          </a:fontRef>
-        </p:style>
-      </p:sp>
-      <p:cxnSp>
-        <p:nvCxnSpPr>
-          <p:cNvPr id="14" name="Straight Connector 13">
-            <a:extLst>
-              <a:ext uri="{FF2B5EF4-FFF2-40B4-BE49-F238E27FC236}">
-                <a16:creationId xmlns:a16="http://schemas.microsoft.com/office/drawing/2014/main" id="{7D1CBE93-B17D-4509-843C-82287C38032A}"/>
-              </a:ext>
-              <a:ext uri="{C183D7F6-B498-43B3-948B-1728B52AA6E4}">
-                <adec:decorative xmlns:adec="http://schemas.microsoft.com/office/drawing/2017/decorative" val="1"/>
-              </a:ext>
-            </a:extLst>
-          </p:cNvPr>
-          <p:cNvCxnSpPr>
-            <a:cxnSpLocks noGrp="1" noRot="1" noChangeAspect="1" noMove="1" noResize="1" noEditPoints="1" noAdjustHandles="1" noChangeArrowheads="1" noChangeShapeType="1"/>
-          </p:cNvCxnSpPr>
-          <p:nvPr>
-            <p:extLst>
-              <p:ext uri="{386F3935-93C4-4BCD-93E2-E3B085C9AB24}">
-                <p16:designElem xmlns:p16="http://schemas.microsoft.com/office/powerpoint/2015/main" val="1"/>
-              </p:ext>
-            </p:extLst>
-          </p:nvPr>
-        </p:nvCxnSpPr>
-        <p:spPr>
-          <a:xfrm>
-            <a:off x="10134600" y="0"/>
-            <a:ext cx="1727200" cy="6858000"/>
-          </a:xfrm>
-          <a:prstGeom prst="line">
-            <a:avLst/>
-          </a:prstGeom>
-          <a:ln w="15875" cap="sq">
-            <a:solidFill>
-              <a:schemeClr val="accent2"/>
-            </a:solidFill>
-            <a:bevel/>
-          </a:ln>
-        </p:spPr>
-        <p:style>
-          <a:lnRef idx="2">
-            <a:schemeClr val="accent1"/>
-          </a:lnRef>
-          <a:fillRef idx="0">
-            <a:schemeClr val="accent1"/>
-          </a:fillRef>
-          <a:effectRef idx="1">
-            <a:schemeClr val="accent1"/>
-          </a:effectRef>
-          <a:fontRef idx="minor">
-            <a:schemeClr val="tx1"/>
-          </a:fontRef>
-        </p:style>
-      </p:cxnSp>
-      <p:cxnSp>
-        <p:nvCxnSpPr>
-          <p:cNvPr id="16" name="Straight Connector 15">
-            <a:extLst>
-              <a:ext uri="{FF2B5EF4-FFF2-40B4-BE49-F238E27FC236}">
-                <a16:creationId xmlns:a16="http://schemas.microsoft.com/office/drawing/2014/main" id="{AE6277B4-6A43-48AB-89B2-3442221619CC}"/>
-              </a:ext>
-              <a:ext uri="{C183D7F6-B498-43B3-948B-1728B52AA6E4}">
-                <adec:decorative xmlns:adec="http://schemas.microsoft.com/office/drawing/2017/decorative" val="1"/>
-              </a:ext>
-            </a:extLst>
-          </p:cNvPr>
-          <p:cNvCxnSpPr>
-            <a:cxnSpLocks noGrp="1" noRot="1" noChangeAspect="1" noMove="1" noResize="1" noEditPoints="1" noAdjustHandles="1" noChangeArrowheads="1" noChangeShapeType="1"/>
-          </p:cNvCxnSpPr>
-          <p:nvPr>
-            <p:extLst>
-              <p:ext uri="{386F3935-93C4-4BCD-93E2-E3B085C9AB24}">
-                <p16:designElem xmlns:p16="http://schemas.microsoft.com/office/powerpoint/2015/main" val="1"/>
-              </p:ext>
-            </p:extLst>
-          </p:nvPr>
-        </p:nvCxnSpPr>
-        <p:spPr>
-          <a:xfrm flipH="1">
-            <a:off x="7425267" y="3681413"/>
-            <a:ext cx="4763558" cy="3176587"/>
-          </a:xfrm>
-          <a:prstGeom prst="line">
-            <a:avLst/>
-          </a:prstGeom>
-          <a:ln w="15875">
-            <a:solidFill>
-              <a:schemeClr val="accent1"/>
-            </a:solidFill>
-          </a:ln>
-        </p:spPr>
-        <p:style>
-          <a:lnRef idx="2">
-            <a:schemeClr val="accent1"/>
-          </a:lnRef>
-          <a:fillRef idx="0">
-            <a:schemeClr val="accent1"/>
-          </a:fillRef>
-          <a:effectRef idx="1">
-            <a:schemeClr val="accent1"/>
-          </a:effectRef>
-          <a:fontRef idx="minor">
-            <a:schemeClr val="tx1"/>
-          </a:fontRef>
-        </p:style>
-      </p:cxnSp>
-      <p:sp>
-        <p:nvSpPr>
           <p:cNvPr id="3" name="Espace réservé du contenu 2">
             <a:extLst>
               <a:ext uri="{FF2B5EF4-FFF2-40B4-BE49-F238E27FC236}">
@@ -8617,84 +8360,6 @@
             <a:endParaRPr lang="en-GB" sz="1500" dirty="0"/>
           </a:p>
         </p:txBody>
-      </p:sp>
-      <p:sp>
-        <p:nvSpPr>
-          <p:cNvPr id="18" name="Rectangle 27">
-            <a:extLst>
-              <a:ext uri="{FF2B5EF4-FFF2-40B4-BE49-F238E27FC236}">
-                <a16:creationId xmlns:a16="http://schemas.microsoft.com/office/drawing/2014/main" id="{27B538D5-95DB-47ED-9CB4-34AE5BF78E6B}"/>
-              </a:ext>
-              <a:ext uri="{C183D7F6-B498-43B3-948B-1728B52AA6E4}">
-                <adec:decorative xmlns:adec="http://schemas.microsoft.com/office/drawing/2017/decorative" val="1"/>
-              </a:ext>
-            </a:extLst>
-          </p:cNvPr>
-          <p:cNvSpPr>
-            <a:spLocks noGrp="1" noRot="1" noChangeAspect="1" noMove="1" noResize="1" noEditPoints="1" noAdjustHandles="1" noChangeArrowheads="1" noChangeShapeType="1" noTextEdit="1"/>
-          </p:cNvSpPr>
-          <p:nvPr>
-            <p:extLst>
-              <p:ext uri="{386F3935-93C4-4BCD-93E2-E3B085C9AB24}">
-                <p16:designElem xmlns:p16="http://schemas.microsoft.com/office/powerpoint/2015/main" val="1"/>
-              </p:ext>
-            </p:extLst>
-          </p:nvPr>
-        </p:nvSpPr>
-        <p:spPr>
-          <a:xfrm>
-            <a:off x="10425641" y="0"/>
-            <a:ext cx="1766359" cy="6858000"/>
-          </a:xfrm>
-          <a:custGeom>
-            <a:avLst/>
-            <a:gdLst/>
-            <a:ahLst/>
-            <a:cxnLst/>
-            <a:rect l="l" t="t" r="r" b="b"/>
-            <a:pathLst>
-              <a:path w="2858013" h="6866467">
-                <a:moveTo>
-                  <a:pt x="0" y="0"/>
-                </a:moveTo>
-                <a:lnTo>
-                  <a:pt x="2858013" y="0"/>
-                </a:lnTo>
-                <a:lnTo>
-                  <a:pt x="2858013" y="6866467"/>
-                </a:lnTo>
-                <a:lnTo>
-                  <a:pt x="2473942" y="6866467"/>
-                </a:lnTo>
-                <a:lnTo>
-                  <a:pt x="0" y="0"/>
-                </a:lnTo>
-                <a:close/>
-              </a:path>
-            </a:pathLst>
-          </a:custGeom>
-          <a:solidFill>
-            <a:schemeClr val="accent2"/>
-          </a:solidFill>
-          <a:ln>
-            <a:noFill/>
-          </a:ln>
-          <a:effectLst/>
-        </p:spPr>
-        <p:style>
-          <a:lnRef idx="1">
-            <a:schemeClr val="accent1"/>
-          </a:lnRef>
-          <a:fillRef idx="3">
-            <a:schemeClr val="accent1"/>
-          </a:fillRef>
-          <a:effectRef idx="2">
-            <a:schemeClr val="accent1"/>
-          </a:effectRef>
-          <a:fontRef idx="minor">
-            <a:schemeClr val="lt1"/>
-          </a:fontRef>
-        </p:style>
       </p:sp>
     </p:spTree>
     <p:extLst>
@@ -9058,12 +8723,7 @@
             <p:ph type="title"/>
           </p:nvPr>
         </p:nvSpPr>
-        <p:spPr>
-          <a:xfrm>
-            <a:off x="677334" y="609600"/>
-            <a:ext cx="8596668" cy="1320800"/>
-          </a:xfrm>
-        </p:spPr>
+        <p:spPr/>
         <p:txBody>
           <a:bodyPr/>
           <a:lstStyle/>
@@ -9227,66 +8887,6 @@
           <a:chExt cx="0" cy="0"/>
         </a:xfrm>
       </p:grpSpPr>
-      <p:sp useBgFill="1">
-        <p:nvSpPr>
-          <p:cNvPr id="8" name="Rectangle 7">
-            <a:extLst>
-              <a:ext uri="{FF2B5EF4-FFF2-40B4-BE49-F238E27FC236}">
-                <a16:creationId xmlns:a16="http://schemas.microsoft.com/office/drawing/2014/main" id="{8DF4D7F6-81B5-452A-9CE6-76D81F91D41B}"/>
-              </a:ext>
-              <a:ext uri="{C183D7F6-B498-43B3-948B-1728B52AA6E4}">
-                <adec:decorative xmlns:adec="http://schemas.microsoft.com/office/drawing/2017/decorative" val="1"/>
-              </a:ext>
-            </a:extLst>
-          </p:cNvPr>
-          <p:cNvSpPr>
-            <a:spLocks noGrp="1" noRot="1" noChangeAspect="1" noMove="1" noResize="1" noEditPoints="1" noAdjustHandles="1" noChangeArrowheads="1" noChangeShapeType="1" noTextEdit="1"/>
-          </p:cNvSpPr>
-          <p:nvPr>
-            <p:extLst>
-              <p:ext uri="{386F3935-93C4-4BCD-93E2-E3B085C9AB24}">
-                <p16:designElem xmlns:p16="http://schemas.microsoft.com/office/powerpoint/2015/main" val="1"/>
-              </p:ext>
-            </p:extLst>
-          </p:nvPr>
-        </p:nvSpPr>
-        <p:spPr>
-          <a:xfrm>
-            <a:off x="0" y="0"/>
-            <a:ext cx="12192000" cy="6858000"/>
-          </a:xfrm>
-          <a:prstGeom prst="rect">
-            <a:avLst/>
-          </a:prstGeom>
-          <a:ln>
-            <a:noFill/>
-          </a:ln>
-        </p:spPr>
-        <p:style>
-          <a:lnRef idx="2">
-            <a:schemeClr val="accent1">
-              <a:shade val="50000"/>
-            </a:schemeClr>
-          </a:lnRef>
-          <a:fillRef idx="1">
-            <a:schemeClr val="accent1"/>
-          </a:fillRef>
-          <a:effectRef idx="0">
-            <a:schemeClr val="accent1"/>
-          </a:effectRef>
-          <a:fontRef idx="minor">
-            <a:schemeClr val="lt1"/>
-          </a:fontRef>
-        </p:style>
-        <p:txBody>
-          <a:bodyPr rtlCol="0" anchor="ctr"/>
-          <a:lstStyle/>
-          <a:p>
-            <a:pPr algn="ctr"/>
-            <a:endParaRPr lang="en-US"/>
-          </a:p>
-        </p:txBody>
-      </p:sp>
       <p:sp>
         <p:nvSpPr>
           <p:cNvPr id="2" name="Titre 1">
@@ -9333,225 +8933,6 @@
       </p:sp>
       <p:sp>
         <p:nvSpPr>
-          <p:cNvPr id="10" name="Isosceles Triangle 9">
-            <a:extLst>
-              <a:ext uri="{FF2B5EF4-FFF2-40B4-BE49-F238E27FC236}">
-                <a16:creationId xmlns:a16="http://schemas.microsoft.com/office/drawing/2014/main" id="{4600514D-20FB-4559-97DC-D1DC39E6C3DE}"/>
-              </a:ext>
-              <a:ext uri="{C183D7F6-B498-43B3-948B-1728B52AA6E4}">
-                <adec:decorative xmlns:adec="http://schemas.microsoft.com/office/drawing/2017/decorative" val="1"/>
-              </a:ext>
-            </a:extLst>
-          </p:cNvPr>
-          <p:cNvSpPr>
-            <a:spLocks noGrp="1" noRot="1" noChangeAspect="1" noMove="1" noResize="1" noEditPoints="1" noAdjustHandles="1" noChangeArrowheads="1" noChangeShapeType="1" noTextEdit="1"/>
-          </p:cNvSpPr>
-          <p:nvPr>
-            <p:extLst>
-              <p:ext uri="{386F3935-93C4-4BCD-93E2-E3B085C9AB24}">
-                <p16:designElem xmlns:p16="http://schemas.microsoft.com/office/powerpoint/2015/main" val="1"/>
-              </p:ext>
-            </p:extLst>
-          </p:nvPr>
-        </p:nvSpPr>
-        <p:spPr>
-          <a:xfrm flipV="1">
-            <a:off x="0" y="0"/>
-            <a:ext cx="448733" cy="2844800"/>
-          </a:xfrm>
-          <a:prstGeom prst="triangle">
-            <a:avLst>
-              <a:gd name="adj" fmla="val 0"/>
-            </a:avLst>
-          </a:prstGeom>
-          <a:solidFill>
-            <a:schemeClr val="accent1">
-              <a:alpha val="85000"/>
-            </a:schemeClr>
-          </a:solidFill>
-          <a:ln>
-            <a:noFill/>
-          </a:ln>
-          <a:effectLst/>
-        </p:spPr>
-        <p:style>
-          <a:lnRef idx="1">
-            <a:schemeClr val="accent1"/>
-          </a:lnRef>
-          <a:fillRef idx="3">
-            <a:schemeClr val="accent1"/>
-          </a:fillRef>
-          <a:effectRef idx="2">
-            <a:schemeClr val="accent1"/>
-          </a:effectRef>
-          <a:fontRef idx="minor">
-            <a:schemeClr val="lt1"/>
-          </a:fontRef>
-        </p:style>
-      </p:sp>
-      <p:sp>
-        <p:nvSpPr>
-          <p:cNvPr id="12" name="Isosceles Triangle 11">
-            <a:extLst>
-              <a:ext uri="{FF2B5EF4-FFF2-40B4-BE49-F238E27FC236}">
-                <a16:creationId xmlns:a16="http://schemas.microsoft.com/office/drawing/2014/main" id="{266F638A-E405-4AC0-B984-72E5813B0DD1}"/>
-              </a:ext>
-              <a:ext uri="{C183D7F6-B498-43B3-948B-1728B52AA6E4}">
-                <adec:decorative xmlns:adec="http://schemas.microsoft.com/office/drawing/2017/decorative" val="1"/>
-              </a:ext>
-            </a:extLst>
-          </p:cNvPr>
-          <p:cNvSpPr>
-            <a:spLocks noGrp="1" noRot="1" noChangeAspect="1" noMove="1" noResize="1" noEditPoints="1" noAdjustHandles="1" noChangeArrowheads="1" noChangeShapeType="1" noTextEdit="1"/>
-          </p:cNvSpPr>
-          <p:nvPr>
-            <p:extLst>
-              <p:ext uri="{386F3935-93C4-4BCD-93E2-E3B085C9AB24}">
-                <p16:designElem xmlns:p16="http://schemas.microsoft.com/office/powerpoint/2015/main" val="1"/>
-              </p:ext>
-            </p:extLst>
-          </p:nvPr>
-        </p:nvSpPr>
-        <p:spPr>
-          <a:xfrm>
-            <a:off x="7738534" y="3818467"/>
-            <a:ext cx="4450292" cy="3039533"/>
-          </a:xfrm>
-          <a:prstGeom prst="triangle">
-            <a:avLst>
-              <a:gd name="adj" fmla="val 100000"/>
-            </a:avLst>
-          </a:prstGeom>
-          <a:solidFill>
-            <a:schemeClr val="accent1"/>
-          </a:solidFill>
-          <a:ln>
-            <a:noFill/>
-          </a:ln>
-          <a:effectLst/>
-        </p:spPr>
-        <p:style>
-          <a:lnRef idx="1">
-            <a:schemeClr val="accent1"/>
-          </a:lnRef>
-          <a:fillRef idx="3">
-            <a:schemeClr val="accent1"/>
-          </a:fillRef>
-          <a:effectRef idx="2">
-            <a:schemeClr val="accent1"/>
-          </a:effectRef>
-          <a:fontRef idx="minor">
-            <a:schemeClr val="lt1"/>
-          </a:fontRef>
-        </p:style>
-      </p:sp>
-      <p:cxnSp>
-        <p:nvCxnSpPr>
-          <p:cNvPr id="14" name="Straight Connector 13">
-            <a:extLst>
-              <a:ext uri="{FF2B5EF4-FFF2-40B4-BE49-F238E27FC236}">
-                <a16:creationId xmlns:a16="http://schemas.microsoft.com/office/drawing/2014/main" id="{7D1CBE93-B17D-4509-843C-82287C38032A}"/>
-              </a:ext>
-              <a:ext uri="{C183D7F6-B498-43B3-948B-1728B52AA6E4}">
-                <adec:decorative xmlns:adec="http://schemas.microsoft.com/office/drawing/2017/decorative" val="1"/>
-              </a:ext>
-            </a:extLst>
-          </p:cNvPr>
-          <p:cNvCxnSpPr>
-            <a:cxnSpLocks noGrp="1" noRot="1" noChangeAspect="1" noMove="1" noResize="1" noEditPoints="1" noAdjustHandles="1" noChangeArrowheads="1" noChangeShapeType="1"/>
-          </p:cNvCxnSpPr>
-          <p:nvPr>
-            <p:extLst>
-              <p:ext uri="{386F3935-93C4-4BCD-93E2-E3B085C9AB24}">
-                <p16:designElem xmlns:p16="http://schemas.microsoft.com/office/powerpoint/2015/main" val="1"/>
-              </p:ext>
-            </p:extLst>
-          </p:nvPr>
-        </p:nvCxnSpPr>
-        <p:spPr>
-          <a:xfrm>
-            <a:off x="10134600" y="0"/>
-            <a:ext cx="1727200" cy="6858000"/>
-          </a:xfrm>
-          <a:prstGeom prst="line">
-            <a:avLst/>
-          </a:prstGeom>
-          <a:ln w="15875" cap="sq">
-            <a:solidFill>
-              <a:schemeClr val="accent2"/>
-            </a:solidFill>
-            <a:bevel/>
-          </a:ln>
-        </p:spPr>
-        <p:style>
-          <a:lnRef idx="2">
-            <a:schemeClr val="accent1"/>
-          </a:lnRef>
-          <a:fillRef idx="0">
-            <a:schemeClr val="accent1"/>
-          </a:fillRef>
-          <a:effectRef idx="1">
-            <a:schemeClr val="accent1"/>
-          </a:effectRef>
-          <a:fontRef idx="minor">
-            <a:schemeClr val="tx1"/>
-          </a:fontRef>
-        </p:style>
-      </p:cxnSp>
-      <p:cxnSp>
-        <p:nvCxnSpPr>
-          <p:cNvPr id="16" name="Straight Connector 15">
-            <a:extLst>
-              <a:ext uri="{FF2B5EF4-FFF2-40B4-BE49-F238E27FC236}">
-                <a16:creationId xmlns:a16="http://schemas.microsoft.com/office/drawing/2014/main" id="{AE6277B4-6A43-48AB-89B2-3442221619CC}"/>
-              </a:ext>
-              <a:ext uri="{C183D7F6-B498-43B3-948B-1728B52AA6E4}">
-                <adec:decorative xmlns:adec="http://schemas.microsoft.com/office/drawing/2017/decorative" val="1"/>
-              </a:ext>
-            </a:extLst>
-          </p:cNvPr>
-          <p:cNvCxnSpPr>
-            <a:cxnSpLocks noGrp="1" noRot="1" noChangeAspect="1" noMove="1" noResize="1" noEditPoints="1" noAdjustHandles="1" noChangeArrowheads="1" noChangeShapeType="1"/>
-          </p:cNvCxnSpPr>
-          <p:nvPr>
-            <p:extLst>
-              <p:ext uri="{386F3935-93C4-4BCD-93E2-E3B085C9AB24}">
-                <p16:designElem xmlns:p16="http://schemas.microsoft.com/office/powerpoint/2015/main" val="1"/>
-              </p:ext>
-            </p:extLst>
-          </p:nvPr>
-        </p:nvCxnSpPr>
-        <p:spPr>
-          <a:xfrm flipH="1">
-            <a:off x="7425267" y="3681413"/>
-            <a:ext cx="4763558" cy="3176587"/>
-          </a:xfrm>
-          <a:prstGeom prst="line">
-            <a:avLst/>
-          </a:prstGeom>
-          <a:ln w="15875">
-            <a:solidFill>
-              <a:schemeClr val="accent1"/>
-            </a:solidFill>
-          </a:ln>
-        </p:spPr>
-        <p:style>
-          <a:lnRef idx="2">
-            <a:schemeClr val="accent1"/>
-          </a:lnRef>
-          <a:fillRef idx="0">
-            <a:schemeClr val="accent1"/>
-          </a:fillRef>
-          <a:effectRef idx="1">
-            <a:schemeClr val="accent1"/>
-          </a:effectRef>
-          <a:fontRef idx="minor">
-            <a:schemeClr val="tx1"/>
-          </a:fontRef>
-        </p:style>
-      </p:cxnSp>
-      <p:sp>
-        <p:nvSpPr>
           <p:cNvPr id="3" name="Espace réservé du contenu 2">
             <a:extLst>
               <a:ext uri="{FF2B5EF4-FFF2-40B4-BE49-F238E27FC236}">
@@ -9640,84 +9021,6 @@
             </a:r>
           </a:p>
         </p:txBody>
-      </p:sp>
-      <p:sp>
-        <p:nvSpPr>
-          <p:cNvPr id="18" name="Rectangle 27">
-            <a:extLst>
-              <a:ext uri="{FF2B5EF4-FFF2-40B4-BE49-F238E27FC236}">
-                <a16:creationId xmlns:a16="http://schemas.microsoft.com/office/drawing/2014/main" id="{27B538D5-95DB-47ED-9CB4-34AE5BF78E6B}"/>
-              </a:ext>
-              <a:ext uri="{C183D7F6-B498-43B3-948B-1728B52AA6E4}">
-                <adec:decorative xmlns:adec="http://schemas.microsoft.com/office/drawing/2017/decorative" val="1"/>
-              </a:ext>
-            </a:extLst>
-          </p:cNvPr>
-          <p:cNvSpPr>
-            <a:spLocks noGrp="1" noRot="1" noChangeAspect="1" noMove="1" noResize="1" noEditPoints="1" noAdjustHandles="1" noChangeArrowheads="1" noChangeShapeType="1" noTextEdit="1"/>
-          </p:cNvSpPr>
-          <p:nvPr>
-            <p:extLst>
-              <p:ext uri="{386F3935-93C4-4BCD-93E2-E3B085C9AB24}">
-                <p16:designElem xmlns:p16="http://schemas.microsoft.com/office/powerpoint/2015/main" val="1"/>
-              </p:ext>
-            </p:extLst>
-          </p:nvPr>
-        </p:nvSpPr>
-        <p:spPr>
-          <a:xfrm>
-            <a:off x="10425641" y="0"/>
-            <a:ext cx="1766359" cy="6858000"/>
-          </a:xfrm>
-          <a:custGeom>
-            <a:avLst/>
-            <a:gdLst/>
-            <a:ahLst/>
-            <a:cxnLst/>
-            <a:rect l="l" t="t" r="r" b="b"/>
-            <a:pathLst>
-              <a:path w="2858013" h="6866467">
-                <a:moveTo>
-                  <a:pt x="0" y="0"/>
-                </a:moveTo>
-                <a:lnTo>
-                  <a:pt x="2858013" y="0"/>
-                </a:lnTo>
-                <a:lnTo>
-                  <a:pt x="2858013" y="6866467"/>
-                </a:lnTo>
-                <a:lnTo>
-                  <a:pt x="2473942" y="6866467"/>
-                </a:lnTo>
-                <a:lnTo>
-                  <a:pt x="0" y="0"/>
-                </a:lnTo>
-                <a:close/>
-              </a:path>
-            </a:pathLst>
-          </a:custGeom>
-          <a:solidFill>
-            <a:schemeClr val="accent2"/>
-          </a:solidFill>
-          <a:ln>
-            <a:noFill/>
-          </a:ln>
-          <a:effectLst/>
-        </p:spPr>
-        <p:style>
-          <a:lnRef idx="1">
-            <a:schemeClr val="accent1"/>
-          </a:lnRef>
-          <a:fillRef idx="3">
-            <a:schemeClr val="accent1"/>
-          </a:fillRef>
-          <a:effectRef idx="2">
-            <a:schemeClr val="accent1"/>
-          </a:effectRef>
-          <a:fontRef idx="minor">
-            <a:schemeClr val="lt1"/>
-          </a:fontRef>
-        </p:style>
       </p:sp>
     </p:spTree>
     <p:extLst>
@@ -9950,12 +9253,7 @@
             <p:ph type="title"/>
           </p:nvPr>
         </p:nvSpPr>
-        <p:spPr>
-          <a:xfrm>
-            <a:off x="677334" y="609600"/>
-            <a:ext cx="8596668" cy="1320800"/>
-          </a:xfrm>
-        </p:spPr>
+        <p:spPr/>
         <p:txBody>
           <a:bodyPr anchor="t">
             <a:normAutofit/>
@@ -10395,66 +9693,6 @@
           <a:chExt cx="0" cy="0"/>
         </a:xfrm>
       </p:grpSpPr>
-      <p:sp useBgFill="1">
-        <p:nvSpPr>
-          <p:cNvPr id="27" name="Rectangle 7">
-            <a:extLst>
-              <a:ext uri="{FF2B5EF4-FFF2-40B4-BE49-F238E27FC236}">
-                <a16:creationId xmlns:a16="http://schemas.microsoft.com/office/drawing/2014/main" id="{E80B86A7-A1EC-475B-9166-88902B033A38}"/>
-              </a:ext>
-              <a:ext uri="{C183D7F6-B498-43B3-948B-1728B52AA6E4}">
-                <adec:decorative xmlns:adec="http://schemas.microsoft.com/office/drawing/2017/decorative" val="1"/>
-              </a:ext>
-            </a:extLst>
-          </p:cNvPr>
-          <p:cNvSpPr>
-            <a:spLocks noGrp="1" noRot="1" noChangeAspect="1" noMove="1" noResize="1" noEditPoints="1" noAdjustHandles="1" noChangeArrowheads="1" noChangeShapeType="1" noTextEdit="1"/>
-          </p:cNvSpPr>
-          <p:nvPr>
-            <p:extLst>
-              <p:ext uri="{386F3935-93C4-4BCD-93E2-E3B085C9AB24}">
-                <p16:designElem xmlns:p16="http://schemas.microsoft.com/office/powerpoint/2015/main" val="1"/>
-              </p:ext>
-            </p:extLst>
-          </p:nvPr>
-        </p:nvSpPr>
-        <p:spPr>
-          <a:xfrm>
-            <a:off x="0" y="0"/>
-            <a:ext cx="12192000" cy="6858000"/>
-          </a:xfrm>
-          <a:prstGeom prst="rect">
-            <a:avLst/>
-          </a:prstGeom>
-          <a:ln>
-            <a:noFill/>
-          </a:ln>
-        </p:spPr>
-        <p:style>
-          <a:lnRef idx="2">
-            <a:schemeClr val="accent1">
-              <a:shade val="50000"/>
-            </a:schemeClr>
-          </a:lnRef>
-          <a:fillRef idx="1">
-            <a:schemeClr val="accent1"/>
-          </a:fillRef>
-          <a:effectRef idx="0">
-            <a:schemeClr val="accent1"/>
-          </a:effectRef>
-          <a:fontRef idx="minor">
-            <a:schemeClr val="lt1"/>
-          </a:fontRef>
-        </p:style>
-        <p:txBody>
-          <a:bodyPr rtlCol="0" anchor="ctr"/>
-          <a:lstStyle/>
-          <a:p>
-            <a:pPr algn="ctr"/>
-            <a:endParaRPr lang="en-US"/>
-          </a:p>
-        </p:txBody>
-      </p:sp>
       <p:sp>
         <p:nvSpPr>
           <p:cNvPr id="2" name="Titre 1">
@@ -10493,64 +9731,6 @@
       </p:sp>
       <p:sp>
         <p:nvSpPr>
-          <p:cNvPr id="10" name="Isosceles Triangle 9">
-            <a:extLst>
-              <a:ext uri="{FF2B5EF4-FFF2-40B4-BE49-F238E27FC236}">
-                <a16:creationId xmlns:a16="http://schemas.microsoft.com/office/drawing/2014/main" id="{C2C29CB1-9F74-4879-A6AF-AEA67B6F1F4D}"/>
-              </a:ext>
-              <a:ext uri="{C183D7F6-B498-43B3-948B-1728B52AA6E4}">
-                <adec:decorative xmlns:adec="http://schemas.microsoft.com/office/drawing/2017/decorative" val="1"/>
-              </a:ext>
-            </a:extLst>
-          </p:cNvPr>
-          <p:cNvSpPr>
-            <a:spLocks noGrp="1" noRot="1" noChangeAspect="1" noMove="1" noResize="1" noEditPoints="1" noAdjustHandles="1" noChangeArrowheads="1" noChangeShapeType="1" noTextEdit="1"/>
-          </p:cNvSpPr>
-          <p:nvPr>
-            <p:extLst>
-              <p:ext uri="{386F3935-93C4-4BCD-93E2-E3B085C9AB24}">
-                <p16:designElem xmlns:p16="http://schemas.microsoft.com/office/powerpoint/2015/main" val="1"/>
-              </p:ext>
-            </p:extLst>
-          </p:nvPr>
-        </p:nvSpPr>
-        <p:spPr>
-          <a:xfrm rot="10800000">
-            <a:off x="0" y="0"/>
-            <a:ext cx="842596" cy="5666154"/>
-          </a:xfrm>
-          <a:prstGeom prst="triangle">
-            <a:avLst>
-              <a:gd name="adj" fmla="val 100000"/>
-            </a:avLst>
-          </a:prstGeom>
-          <a:solidFill>
-            <a:schemeClr val="accent1">
-              <a:alpha val="85000"/>
-            </a:schemeClr>
-          </a:solidFill>
-          <a:ln>
-            <a:noFill/>
-          </a:ln>
-          <a:effectLst/>
-        </p:spPr>
-        <p:style>
-          <a:lnRef idx="1">
-            <a:schemeClr val="accent1"/>
-          </a:lnRef>
-          <a:fillRef idx="3">
-            <a:schemeClr val="accent1"/>
-          </a:fillRef>
-          <a:effectRef idx="2">
-            <a:schemeClr val="accent1"/>
-          </a:effectRef>
-          <a:fontRef idx="minor">
-            <a:schemeClr val="lt1"/>
-          </a:fontRef>
-        </p:style>
-      </p:sp>
-      <p:sp>
-        <p:nvSpPr>
           <p:cNvPr id="28" name="Espace réservé du contenu 2">
             <a:extLst>
               <a:ext uri="{FF2B5EF4-FFF2-40B4-BE49-F238E27FC236}">
@@ -10612,64 +9792,6 @@
             <a:endParaRPr lang="en-GB" dirty="0"/>
           </a:p>
         </p:txBody>
-      </p:sp>
-      <p:sp>
-        <p:nvSpPr>
-          <p:cNvPr id="12" name="Isosceles Triangle 11">
-            <a:extLst>
-              <a:ext uri="{FF2B5EF4-FFF2-40B4-BE49-F238E27FC236}">
-                <a16:creationId xmlns:a16="http://schemas.microsoft.com/office/drawing/2014/main" id="{7E2C7115-5336-410C-AD71-0F0952A2E5A7}"/>
-              </a:ext>
-              <a:ext uri="{C183D7F6-B498-43B3-948B-1728B52AA6E4}">
-                <adec:decorative xmlns:adec="http://schemas.microsoft.com/office/drawing/2017/decorative" val="1"/>
-              </a:ext>
-            </a:extLst>
-          </p:cNvPr>
-          <p:cNvSpPr>
-            <a:spLocks noGrp="1" noRot="1" noChangeAspect="1" noMove="1" noResize="1" noEditPoints="1" noAdjustHandles="1" noChangeArrowheads="1" noChangeShapeType="1" noTextEdit="1"/>
-          </p:cNvSpPr>
-          <p:nvPr>
-            <p:extLst>
-              <p:ext uri="{386F3935-93C4-4BCD-93E2-E3B085C9AB24}">
-                <p16:designElem xmlns:p16="http://schemas.microsoft.com/office/powerpoint/2015/main" val="1"/>
-              </p:ext>
-            </p:extLst>
-          </p:nvPr>
-        </p:nvSpPr>
-        <p:spPr>
-          <a:xfrm flipH="1">
-            <a:off x="11743267" y="4013200"/>
-            <a:ext cx="448733" cy="2844800"/>
-          </a:xfrm>
-          <a:prstGeom prst="triangle">
-            <a:avLst>
-              <a:gd name="adj" fmla="val 0"/>
-            </a:avLst>
-          </a:prstGeom>
-          <a:solidFill>
-            <a:schemeClr val="accent1">
-              <a:alpha val="85000"/>
-            </a:schemeClr>
-          </a:solidFill>
-          <a:ln>
-            <a:noFill/>
-          </a:ln>
-          <a:effectLst/>
-        </p:spPr>
-        <p:style>
-          <a:lnRef idx="1">
-            <a:schemeClr val="accent1"/>
-          </a:lnRef>
-          <a:fillRef idx="3">
-            <a:schemeClr val="accent1"/>
-          </a:fillRef>
-          <a:effectRef idx="2">
-            <a:schemeClr val="accent1"/>
-          </a:effectRef>
-          <a:fontRef idx="minor">
-            <a:schemeClr val="lt1"/>
-          </a:fontRef>
-        </p:style>
       </p:sp>
     </p:spTree>
     <p:extLst>
@@ -10851,66 +9973,6 @@
           <a:chExt cx="0" cy="0"/>
         </a:xfrm>
       </p:grpSpPr>
-      <p:sp useBgFill="1">
-        <p:nvSpPr>
-          <p:cNvPr id="8" name="Rectangle 7">
-            <a:extLst>
-              <a:ext uri="{FF2B5EF4-FFF2-40B4-BE49-F238E27FC236}">
-                <a16:creationId xmlns:a16="http://schemas.microsoft.com/office/drawing/2014/main" id="{8DF4D7F6-81B5-452A-9CE6-76D81F91D41B}"/>
-              </a:ext>
-              <a:ext uri="{C183D7F6-B498-43B3-948B-1728B52AA6E4}">
-                <adec:decorative xmlns:adec="http://schemas.microsoft.com/office/drawing/2017/decorative" val="1"/>
-              </a:ext>
-            </a:extLst>
-          </p:cNvPr>
-          <p:cNvSpPr>
-            <a:spLocks noGrp="1" noRot="1" noChangeAspect="1" noMove="1" noResize="1" noEditPoints="1" noAdjustHandles="1" noChangeArrowheads="1" noChangeShapeType="1" noTextEdit="1"/>
-          </p:cNvSpPr>
-          <p:nvPr>
-            <p:extLst>
-              <p:ext uri="{386F3935-93C4-4BCD-93E2-E3B085C9AB24}">
-                <p16:designElem xmlns:p16="http://schemas.microsoft.com/office/powerpoint/2015/main" val="1"/>
-              </p:ext>
-            </p:extLst>
-          </p:nvPr>
-        </p:nvSpPr>
-        <p:spPr>
-          <a:xfrm>
-            <a:off x="0" y="0"/>
-            <a:ext cx="12192000" cy="6858000"/>
-          </a:xfrm>
-          <a:prstGeom prst="rect">
-            <a:avLst/>
-          </a:prstGeom>
-          <a:ln>
-            <a:noFill/>
-          </a:ln>
-        </p:spPr>
-        <p:style>
-          <a:lnRef idx="2">
-            <a:schemeClr val="accent1">
-              <a:shade val="50000"/>
-            </a:schemeClr>
-          </a:lnRef>
-          <a:fillRef idx="1">
-            <a:schemeClr val="accent1"/>
-          </a:fillRef>
-          <a:effectRef idx="0">
-            <a:schemeClr val="accent1"/>
-          </a:effectRef>
-          <a:fontRef idx="minor">
-            <a:schemeClr val="lt1"/>
-          </a:fontRef>
-        </p:style>
-        <p:txBody>
-          <a:bodyPr rtlCol="0" anchor="ctr"/>
-          <a:lstStyle/>
-          <a:p>
-            <a:pPr algn="ctr"/>
-            <a:endParaRPr lang="en-US"/>
-          </a:p>
-        </p:txBody>
-      </p:sp>
       <p:sp>
         <p:nvSpPr>
           <p:cNvPr id="2" name="Titre 1">
@@ -10952,225 +10014,6 @@
       </p:sp>
       <p:sp>
         <p:nvSpPr>
-          <p:cNvPr id="10" name="Isosceles Triangle 9">
-            <a:extLst>
-              <a:ext uri="{FF2B5EF4-FFF2-40B4-BE49-F238E27FC236}">
-                <a16:creationId xmlns:a16="http://schemas.microsoft.com/office/drawing/2014/main" id="{4600514D-20FB-4559-97DC-D1DC39E6C3DE}"/>
-              </a:ext>
-              <a:ext uri="{C183D7F6-B498-43B3-948B-1728B52AA6E4}">
-                <adec:decorative xmlns:adec="http://schemas.microsoft.com/office/drawing/2017/decorative" val="1"/>
-              </a:ext>
-            </a:extLst>
-          </p:cNvPr>
-          <p:cNvSpPr>
-            <a:spLocks noGrp="1" noRot="1" noChangeAspect="1" noMove="1" noResize="1" noEditPoints="1" noAdjustHandles="1" noChangeArrowheads="1" noChangeShapeType="1" noTextEdit="1"/>
-          </p:cNvSpPr>
-          <p:nvPr>
-            <p:extLst>
-              <p:ext uri="{386F3935-93C4-4BCD-93E2-E3B085C9AB24}">
-                <p16:designElem xmlns:p16="http://schemas.microsoft.com/office/powerpoint/2015/main" val="1"/>
-              </p:ext>
-            </p:extLst>
-          </p:nvPr>
-        </p:nvSpPr>
-        <p:spPr>
-          <a:xfrm flipV="1">
-            <a:off x="0" y="0"/>
-            <a:ext cx="448733" cy="2844800"/>
-          </a:xfrm>
-          <a:prstGeom prst="triangle">
-            <a:avLst>
-              <a:gd name="adj" fmla="val 0"/>
-            </a:avLst>
-          </a:prstGeom>
-          <a:solidFill>
-            <a:schemeClr val="accent1">
-              <a:alpha val="85000"/>
-            </a:schemeClr>
-          </a:solidFill>
-          <a:ln>
-            <a:noFill/>
-          </a:ln>
-          <a:effectLst/>
-        </p:spPr>
-        <p:style>
-          <a:lnRef idx="1">
-            <a:schemeClr val="accent1"/>
-          </a:lnRef>
-          <a:fillRef idx="3">
-            <a:schemeClr val="accent1"/>
-          </a:fillRef>
-          <a:effectRef idx="2">
-            <a:schemeClr val="accent1"/>
-          </a:effectRef>
-          <a:fontRef idx="minor">
-            <a:schemeClr val="lt1"/>
-          </a:fontRef>
-        </p:style>
-      </p:sp>
-      <p:sp>
-        <p:nvSpPr>
-          <p:cNvPr id="12" name="Isosceles Triangle 11">
-            <a:extLst>
-              <a:ext uri="{FF2B5EF4-FFF2-40B4-BE49-F238E27FC236}">
-                <a16:creationId xmlns:a16="http://schemas.microsoft.com/office/drawing/2014/main" id="{266F638A-E405-4AC0-B984-72E5813B0DD1}"/>
-              </a:ext>
-              <a:ext uri="{C183D7F6-B498-43B3-948B-1728B52AA6E4}">
-                <adec:decorative xmlns:adec="http://schemas.microsoft.com/office/drawing/2017/decorative" val="1"/>
-              </a:ext>
-            </a:extLst>
-          </p:cNvPr>
-          <p:cNvSpPr>
-            <a:spLocks noGrp="1" noRot="1" noChangeAspect="1" noMove="1" noResize="1" noEditPoints="1" noAdjustHandles="1" noChangeArrowheads="1" noChangeShapeType="1" noTextEdit="1"/>
-          </p:cNvSpPr>
-          <p:nvPr>
-            <p:extLst>
-              <p:ext uri="{386F3935-93C4-4BCD-93E2-E3B085C9AB24}">
-                <p16:designElem xmlns:p16="http://schemas.microsoft.com/office/powerpoint/2015/main" val="1"/>
-              </p:ext>
-            </p:extLst>
-          </p:nvPr>
-        </p:nvSpPr>
-        <p:spPr>
-          <a:xfrm>
-            <a:off x="7738534" y="3818467"/>
-            <a:ext cx="4450292" cy="3039533"/>
-          </a:xfrm>
-          <a:prstGeom prst="triangle">
-            <a:avLst>
-              <a:gd name="adj" fmla="val 100000"/>
-            </a:avLst>
-          </a:prstGeom>
-          <a:solidFill>
-            <a:schemeClr val="accent1"/>
-          </a:solidFill>
-          <a:ln>
-            <a:noFill/>
-          </a:ln>
-          <a:effectLst/>
-        </p:spPr>
-        <p:style>
-          <a:lnRef idx="1">
-            <a:schemeClr val="accent1"/>
-          </a:lnRef>
-          <a:fillRef idx="3">
-            <a:schemeClr val="accent1"/>
-          </a:fillRef>
-          <a:effectRef idx="2">
-            <a:schemeClr val="accent1"/>
-          </a:effectRef>
-          <a:fontRef idx="minor">
-            <a:schemeClr val="lt1"/>
-          </a:fontRef>
-        </p:style>
-      </p:sp>
-      <p:cxnSp>
-        <p:nvCxnSpPr>
-          <p:cNvPr id="14" name="Straight Connector 13">
-            <a:extLst>
-              <a:ext uri="{FF2B5EF4-FFF2-40B4-BE49-F238E27FC236}">
-                <a16:creationId xmlns:a16="http://schemas.microsoft.com/office/drawing/2014/main" id="{7D1CBE93-B17D-4509-843C-82287C38032A}"/>
-              </a:ext>
-              <a:ext uri="{C183D7F6-B498-43B3-948B-1728B52AA6E4}">
-                <adec:decorative xmlns:adec="http://schemas.microsoft.com/office/drawing/2017/decorative" val="1"/>
-              </a:ext>
-            </a:extLst>
-          </p:cNvPr>
-          <p:cNvCxnSpPr>
-            <a:cxnSpLocks noGrp="1" noRot="1" noChangeAspect="1" noMove="1" noResize="1" noEditPoints="1" noAdjustHandles="1" noChangeArrowheads="1" noChangeShapeType="1"/>
-          </p:cNvCxnSpPr>
-          <p:nvPr>
-            <p:extLst>
-              <p:ext uri="{386F3935-93C4-4BCD-93E2-E3B085C9AB24}">
-                <p16:designElem xmlns:p16="http://schemas.microsoft.com/office/powerpoint/2015/main" val="1"/>
-              </p:ext>
-            </p:extLst>
-          </p:nvPr>
-        </p:nvCxnSpPr>
-        <p:spPr>
-          <a:xfrm>
-            <a:off x="10134600" y="0"/>
-            <a:ext cx="1727200" cy="6858000"/>
-          </a:xfrm>
-          <a:prstGeom prst="line">
-            <a:avLst/>
-          </a:prstGeom>
-          <a:ln w="15875" cap="sq">
-            <a:solidFill>
-              <a:schemeClr val="accent2"/>
-            </a:solidFill>
-            <a:bevel/>
-          </a:ln>
-        </p:spPr>
-        <p:style>
-          <a:lnRef idx="2">
-            <a:schemeClr val="accent1"/>
-          </a:lnRef>
-          <a:fillRef idx="0">
-            <a:schemeClr val="accent1"/>
-          </a:fillRef>
-          <a:effectRef idx="1">
-            <a:schemeClr val="accent1"/>
-          </a:effectRef>
-          <a:fontRef idx="minor">
-            <a:schemeClr val="tx1"/>
-          </a:fontRef>
-        </p:style>
-      </p:cxnSp>
-      <p:cxnSp>
-        <p:nvCxnSpPr>
-          <p:cNvPr id="16" name="Straight Connector 15">
-            <a:extLst>
-              <a:ext uri="{FF2B5EF4-FFF2-40B4-BE49-F238E27FC236}">
-                <a16:creationId xmlns:a16="http://schemas.microsoft.com/office/drawing/2014/main" id="{AE6277B4-6A43-48AB-89B2-3442221619CC}"/>
-              </a:ext>
-              <a:ext uri="{C183D7F6-B498-43B3-948B-1728B52AA6E4}">
-                <adec:decorative xmlns:adec="http://schemas.microsoft.com/office/drawing/2017/decorative" val="1"/>
-              </a:ext>
-            </a:extLst>
-          </p:cNvPr>
-          <p:cNvCxnSpPr>
-            <a:cxnSpLocks noGrp="1" noRot="1" noChangeAspect="1" noMove="1" noResize="1" noEditPoints="1" noAdjustHandles="1" noChangeArrowheads="1" noChangeShapeType="1"/>
-          </p:cNvCxnSpPr>
-          <p:nvPr>
-            <p:extLst>
-              <p:ext uri="{386F3935-93C4-4BCD-93E2-E3B085C9AB24}">
-                <p16:designElem xmlns:p16="http://schemas.microsoft.com/office/powerpoint/2015/main" val="1"/>
-              </p:ext>
-            </p:extLst>
-          </p:nvPr>
-        </p:nvCxnSpPr>
-        <p:spPr>
-          <a:xfrm flipH="1">
-            <a:off x="7425267" y="3681413"/>
-            <a:ext cx="4763558" cy="3176587"/>
-          </a:xfrm>
-          <a:prstGeom prst="line">
-            <a:avLst/>
-          </a:prstGeom>
-          <a:ln w="15875">
-            <a:solidFill>
-              <a:schemeClr val="accent1"/>
-            </a:solidFill>
-          </a:ln>
-        </p:spPr>
-        <p:style>
-          <a:lnRef idx="2">
-            <a:schemeClr val="accent1"/>
-          </a:lnRef>
-          <a:fillRef idx="0">
-            <a:schemeClr val="accent1"/>
-          </a:fillRef>
-          <a:effectRef idx="1">
-            <a:schemeClr val="accent1"/>
-          </a:effectRef>
-          <a:fontRef idx="minor">
-            <a:schemeClr val="tx1"/>
-          </a:fontRef>
-        </p:style>
-      </p:cxnSp>
-      <p:sp>
-        <p:nvSpPr>
           <p:cNvPr id="3" name="Espace réservé du contenu 2">
             <a:extLst>
               <a:ext uri="{FF2B5EF4-FFF2-40B4-BE49-F238E27FC236}">
@@ -11284,84 +10127,6 @@
             <a:endParaRPr lang="fr-FR" dirty="0"/>
           </a:p>
         </p:txBody>
-      </p:sp>
-      <p:sp>
-        <p:nvSpPr>
-          <p:cNvPr id="18" name="Rectangle 27">
-            <a:extLst>
-              <a:ext uri="{FF2B5EF4-FFF2-40B4-BE49-F238E27FC236}">
-                <a16:creationId xmlns:a16="http://schemas.microsoft.com/office/drawing/2014/main" id="{27B538D5-95DB-47ED-9CB4-34AE5BF78E6B}"/>
-              </a:ext>
-              <a:ext uri="{C183D7F6-B498-43B3-948B-1728B52AA6E4}">
-                <adec:decorative xmlns:adec="http://schemas.microsoft.com/office/drawing/2017/decorative" val="1"/>
-              </a:ext>
-            </a:extLst>
-          </p:cNvPr>
-          <p:cNvSpPr>
-            <a:spLocks noGrp="1" noRot="1" noChangeAspect="1" noMove="1" noResize="1" noEditPoints="1" noAdjustHandles="1" noChangeArrowheads="1" noChangeShapeType="1" noTextEdit="1"/>
-          </p:cNvSpPr>
-          <p:nvPr>
-            <p:extLst>
-              <p:ext uri="{386F3935-93C4-4BCD-93E2-E3B085C9AB24}">
-                <p16:designElem xmlns:p16="http://schemas.microsoft.com/office/powerpoint/2015/main" val="1"/>
-              </p:ext>
-            </p:extLst>
-          </p:nvPr>
-        </p:nvSpPr>
-        <p:spPr>
-          <a:xfrm>
-            <a:off x="10425641" y="0"/>
-            <a:ext cx="1766359" cy="6858000"/>
-          </a:xfrm>
-          <a:custGeom>
-            <a:avLst/>
-            <a:gdLst/>
-            <a:ahLst/>
-            <a:cxnLst/>
-            <a:rect l="l" t="t" r="r" b="b"/>
-            <a:pathLst>
-              <a:path w="2858013" h="6866467">
-                <a:moveTo>
-                  <a:pt x="0" y="0"/>
-                </a:moveTo>
-                <a:lnTo>
-                  <a:pt x="2858013" y="0"/>
-                </a:lnTo>
-                <a:lnTo>
-                  <a:pt x="2858013" y="6866467"/>
-                </a:lnTo>
-                <a:lnTo>
-                  <a:pt x="2473942" y="6866467"/>
-                </a:lnTo>
-                <a:lnTo>
-                  <a:pt x="0" y="0"/>
-                </a:lnTo>
-                <a:close/>
-              </a:path>
-            </a:pathLst>
-          </a:custGeom>
-          <a:solidFill>
-            <a:schemeClr val="accent2"/>
-          </a:solidFill>
-          <a:ln>
-            <a:noFill/>
-          </a:ln>
-          <a:effectLst/>
-        </p:spPr>
-        <p:style>
-          <a:lnRef idx="1">
-            <a:schemeClr val="accent1"/>
-          </a:lnRef>
-          <a:fillRef idx="3">
-            <a:schemeClr val="accent1"/>
-          </a:fillRef>
-          <a:effectRef idx="2">
-            <a:schemeClr val="accent1"/>
-          </a:effectRef>
-          <a:fontRef idx="minor">
-            <a:schemeClr val="lt1"/>
-          </a:fontRef>
-        </p:style>
       </p:sp>
     </p:spTree>
     <p:extLst>
@@ -11401,53 +10166,6 @@
           <a:chExt cx="0" cy="0"/>
         </a:xfrm>
       </p:grpSpPr>
-      <p:cxnSp>
-        <p:nvCxnSpPr>
-          <p:cNvPr id="8" name="Straight Connector 7">
-            <a:extLst>
-              <a:ext uri="{FF2B5EF4-FFF2-40B4-BE49-F238E27FC236}">
-                <a16:creationId xmlns:a16="http://schemas.microsoft.com/office/drawing/2014/main" id="{0B5F7E3B-C5F1-40E0-A491-558BAFBC1127}"/>
-              </a:ext>
-              <a:ext uri="{C183D7F6-B498-43B3-948B-1728B52AA6E4}">
-                <adec:decorative xmlns:adec="http://schemas.microsoft.com/office/drawing/2017/decorative" val="1"/>
-              </a:ext>
-            </a:extLst>
-          </p:cNvPr>
-          <p:cNvCxnSpPr>
-            <a:cxnSpLocks noGrp="1" noRot="1" noChangeAspect="1" noMove="1" noResize="1" noEditPoints="1" noAdjustHandles="1" noChangeArrowheads="1" noChangeShapeType="1"/>
-          </p:cNvCxnSpPr>
-          <p:nvPr>
-            <p:extLst>
-              <p:ext uri="{386F3935-93C4-4BCD-93E2-E3B085C9AB24}">
-                <p16:designElem xmlns:p16="http://schemas.microsoft.com/office/powerpoint/2015/main" val="1"/>
-              </p:ext>
-            </p:extLst>
-          </p:nvPr>
-        </p:nvCxnSpPr>
-        <p:spPr>
-          <a:xfrm>
-            <a:off x="4241804" y="1460500"/>
-            <a:ext cx="0" cy="3937000"/>
-          </a:xfrm>
-          <a:prstGeom prst="line">
-            <a:avLst/>
-          </a:prstGeom>
-        </p:spPr>
-        <p:style>
-          <a:lnRef idx="1">
-            <a:schemeClr val="accent1"/>
-          </a:lnRef>
-          <a:fillRef idx="0">
-            <a:schemeClr val="accent1"/>
-          </a:fillRef>
-          <a:effectRef idx="0">
-            <a:schemeClr val="accent1"/>
-          </a:effectRef>
-          <a:fontRef idx="minor">
-            <a:schemeClr val="tx1"/>
-          </a:fontRef>
-        </p:style>
-      </p:cxnSp>
       <p:sp>
         <p:nvSpPr>
           <p:cNvPr id="2" name="Titre 1">
@@ -11625,12 +10343,7 @@
             <p:ph type="title"/>
           </p:nvPr>
         </p:nvSpPr>
-        <p:spPr>
-          <a:xfrm>
-            <a:off x="677334" y="609600"/>
-            <a:ext cx="8596668" cy="1320800"/>
-          </a:xfrm>
-        </p:spPr>
+        <p:spPr/>
         <p:txBody>
           <a:bodyPr/>
           <a:lstStyle/>
@@ -11658,12 +10371,7 @@
             <p:ph idx="1"/>
           </p:nvPr>
         </p:nvSpPr>
-        <p:spPr>
-          <a:xfrm>
-            <a:off x="677334" y="2160589"/>
-            <a:ext cx="8596668" cy="3880773"/>
-          </a:xfrm>
-        </p:spPr>
+        <p:spPr/>
         <p:txBody>
           <a:bodyPr>
             <a:normAutofit lnSpcReduction="10000"/>
@@ -12090,6 +10798,63 @@
               <a:rPr lang="fr-BE" dirty="0"/>
               <a:t>Cette présentation</a:t>
             </a:r>
+            <a:endParaRPr lang="fr-FR" dirty="0"/>
+          </a:p>
+        </p:txBody>
+      </p:sp>
+      <p:sp>
+        <p:nvSpPr>
+          <p:cNvPr id="3" name="Espace réservé du contenu 2">
+            <a:extLst>
+              <a:ext uri="{FF2B5EF4-FFF2-40B4-BE49-F238E27FC236}">
+                <a16:creationId xmlns:a16="http://schemas.microsoft.com/office/drawing/2014/main" id="{73A26057-EE8B-434E-BEAA-6BD0BF597AEC}"/>
+              </a:ext>
+            </a:extLst>
+          </p:cNvPr>
+          <p:cNvSpPr>
+            <a:spLocks noGrp="1"/>
+          </p:cNvSpPr>
+          <p:nvPr>
+            <p:ph idx="1"/>
+          </p:nvPr>
+        </p:nvSpPr>
+        <p:spPr>
+          <a:xfrm>
+            <a:off x="4159225" y="2160589"/>
+            <a:ext cx="5114776" cy="3880773"/>
+          </a:xfrm>
+        </p:spPr>
+        <p:txBody>
+          <a:bodyPr>
+            <a:normAutofit/>
+          </a:bodyPr>
+          <a:lstStyle/>
+          <a:p>
+            <a:r>
+              <a:rPr lang="fr-BE" dirty="0"/>
+              <a:t>Est orienté code. </a:t>
+            </a:r>
+          </a:p>
+          <a:p>
+            <a:r>
+              <a:rPr lang="fr-BE" dirty="0"/>
+              <a:t>Utilise plusieurs langages.</a:t>
+            </a:r>
+          </a:p>
+          <a:p>
+            <a:r>
+              <a:rPr lang="fr-BE" dirty="0"/>
+              <a:t>Est conviviale. Les réactions sont les bienvenues</a:t>
+            </a:r>
+            <a:endParaRPr lang="fr-FR" dirty="0"/>
+          </a:p>
+          <a:p>
+            <a:endParaRPr lang="fr-BE" dirty="0"/>
+          </a:p>
+          <a:p>
+            <a:endParaRPr lang="fr-BE" dirty="0"/>
+          </a:p>
+          <a:p>
             <a:endParaRPr lang="fr-FR" dirty="0"/>
           </a:p>
         </p:txBody>
@@ -12414,333 +11179,6 @@
           </a:custGeom>
         </p:spPr>
       </p:pic>
-      <p:sp>
-        <p:nvSpPr>
-          <p:cNvPr id="16" name="Isosceles Triangle 30">
-            <a:extLst>
-              <a:ext uri="{FF2B5EF4-FFF2-40B4-BE49-F238E27FC236}">
-                <a16:creationId xmlns:a16="http://schemas.microsoft.com/office/drawing/2014/main" id="{E09C6EA1-A72F-431C-A81E-14B793A2884E}"/>
-              </a:ext>
-              <a:ext uri="{C183D7F6-B498-43B3-948B-1728B52AA6E4}">
-                <adec:decorative xmlns:adec="http://schemas.microsoft.com/office/drawing/2017/decorative" val="1"/>
-              </a:ext>
-            </a:extLst>
-          </p:cNvPr>
-          <p:cNvSpPr>
-            <a:spLocks noGrp="1" noRot="1" noChangeAspect="1" noMove="1" noResize="1" noEditPoints="1" noAdjustHandles="1" noChangeArrowheads="1" noChangeShapeType="1" noTextEdit="1"/>
-          </p:cNvSpPr>
-          <p:nvPr>
-            <p:extLst>
-              <p:ext uri="{386F3935-93C4-4BCD-93E2-E3B085C9AB24}">
-                <p16:designElem xmlns:p16="http://schemas.microsoft.com/office/powerpoint/2015/main" val="1"/>
-              </p:ext>
-            </p:extLst>
-          </p:nvPr>
-        </p:nvSpPr>
-        <p:spPr>
-          <a:xfrm rot="10800000">
-            <a:off x="-10634" y="0"/>
-            <a:ext cx="842596" cy="5666154"/>
-          </a:xfrm>
-          <a:prstGeom prst="triangle">
-            <a:avLst>
-              <a:gd name="adj" fmla="val 100000"/>
-            </a:avLst>
-          </a:prstGeom>
-          <a:solidFill>
-            <a:schemeClr val="accent1">
-              <a:alpha val="85000"/>
-            </a:schemeClr>
-          </a:solidFill>
-          <a:ln>
-            <a:noFill/>
-          </a:ln>
-          <a:effectLst/>
-        </p:spPr>
-        <p:style>
-          <a:lnRef idx="1">
-            <a:schemeClr val="accent1"/>
-          </a:lnRef>
-          <a:fillRef idx="3">
-            <a:schemeClr val="accent1"/>
-          </a:fillRef>
-          <a:effectRef idx="2">
-            <a:schemeClr val="accent1"/>
-          </a:effectRef>
-          <a:fontRef idx="minor">
-            <a:schemeClr val="lt1"/>
-          </a:fontRef>
-        </p:style>
-      </p:sp>
-      <p:cxnSp>
-        <p:nvCxnSpPr>
-          <p:cNvPr id="18" name="Straight Connector 17">
-            <a:extLst>
-              <a:ext uri="{FF2B5EF4-FFF2-40B4-BE49-F238E27FC236}">
-                <a16:creationId xmlns:a16="http://schemas.microsoft.com/office/drawing/2014/main" id="{F335CC31-F319-461D-9045-F34BF78A2FA3}"/>
-              </a:ext>
-              <a:ext uri="{C183D7F6-B498-43B3-948B-1728B52AA6E4}">
-                <adec:decorative xmlns:adec="http://schemas.microsoft.com/office/drawing/2017/decorative" val="1"/>
-              </a:ext>
-            </a:extLst>
-          </p:cNvPr>
-          <p:cNvCxnSpPr>
-            <a:cxnSpLocks noGrp="1" noRot="1" noChangeAspect="1" noMove="1" noResize="1" noEditPoints="1" noAdjustHandles="1" noChangeArrowheads="1" noChangeShapeType="1"/>
-          </p:cNvCxnSpPr>
-          <p:nvPr>
-            <p:extLst>
-              <p:ext uri="{386F3935-93C4-4BCD-93E2-E3B085C9AB24}">
-                <p16:designElem xmlns:p16="http://schemas.microsoft.com/office/powerpoint/2015/main" val="1"/>
-              </p:ext>
-            </p:extLst>
-          </p:nvPr>
-        </p:nvCxnSpPr>
-        <p:spPr>
-          <a:xfrm>
-            <a:off x="578712" y="1714500"/>
-            <a:ext cx="3206088" cy="0"/>
-          </a:xfrm>
-          <a:prstGeom prst="line">
-            <a:avLst/>
-          </a:prstGeom>
-          <a:ln>
-            <a:solidFill>
-              <a:schemeClr val="bg1"/>
-            </a:solidFill>
-          </a:ln>
-        </p:spPr>
-        <p:style>
-          <a:lnRef idx="1">
-            <a:schemeClr val="accent1"/>
-          </a:lnRef>
-          <a:fillRef idx="0">
-            <a:schemeClr val="accent1"/>
-          </a:fillRef>
-          <a:effectRef idx="0">
-            <a:schemeClr val="accent1"/>
-          </a:effectRef>
-          <a:fontRef idx="minor">
-            <a:schemeClr val="tx1"/>
-          </a:fontRef>
-        </p:style>
-      </p:cxnSp>
-      <p:cxnSp>
-        <p:nvCxnSpPr>
-          <p:cNvPr id="20" name="Straight Connector 19">
-            <a:extLst>
-              <a:ext uri="{FF2B5EF4-FFF2-40B4-BE49-F238E27FC236}">
-                <a16:creationId xmlns:a16="http://schemas.microsoft.com/office/drawing/2014/main" id="{B7BCA152-E42A-42E3-8DE8-3C8B59DCB845}"/>
-              </a:ext>
-              <a:ext uri="{C183D7F6-B498-43B3-948B-1728B52AA6E4}">
-                <adec:decorative xmlns:adec="http://schemas.microsoft.com/office/drawing/2017/decorative" val="1"/>
-              </a:ext>
-            </a:extLst>
-          </p:cNvPr>
-          <p:cNvCxnSpPr>
-            <a:cxnSpLocks noGrp="1" noRot="1" noChangeAspect="1" noMove="1" noResize="1" noEditPoints="1" noAdjustHandles="1" noChangeArrowheads="1" noChangeShapeType="1"/>
-          </p:cNvCxnSpPr>
-          <p:nvPr>
-            <p:extLst>
-              <p:ext uri="{386F3935-93C4-4BCD-93E2-E3B085C9AB24}">
-                <p16:designElem xmlns:p16="http://schemas.microsoft.com/office/powerpoint/2015/main" val="1"/>
-              </p:ext>
-            </p:extLst>
-          </p:nvPr>
-        </p:nvCxnSpPr>
-        <p:spPr>
-          <a:xfrm>
-            <a:off x="317088" y="3421959"/>
-            <a:ext cx="3206088" cy="0"/>
-          </a:xfrm>
-          <a:prstGeom prst="line">
-            <a:avLst/>
-          </a:prstGeom>
-          <a:ln>
-            <a:solidFill>
-              <a:schemeClr val="bg1"/>
-            </a:solidFill>
-          </a:ln>
-        </p:spPr>
-        <p:style>
-          <a:lnRef idx="1">
-            <a:schemeClr val="accent1"/>
-          </a:lnRef>
-          <a:fillRef idx="0">
-            <a:schemeClr val="accent1"/>
-          </a:fillRef>
-          <a:effectRef idx="0">
-            <a:schemeClr val="accent1"/>
-          </a:effectRef>
-          <a:fontRef idx="minor">
-            <a:schemeClr val="tx1"/>
-          </a:fontRef>
-        </p:style>
-      </p:cxnSp>
-      <p:cxnSp>
-        <p:nvCxnSpPr>
-          <p:cNvPr id="22" name="Straight Connector 21">
-            <a:extLst>
-              <a:ext uri="{FF2B5EF4-FFF2-40B4-BE49-F238E27FC236}">
-                <a16:creationId xmlns:a16="http://schemas.microsoft.com/office/drawing/2014/main" id="{041DA940-D863-420D-A3F8-9F997C09FA42}"/>
-              </a:ext>
-              <a:ext uri="{C183D7F6-B498-43B3-948B-1728B52AA6E4}">
-                <adec:decorative xmlns:adec="http://schemas.microsoft.com/office/drawing/2017/decorative" val="1"/>
-              </a:ext>
-            </a:extLst>
-          </p:cNvPr>
-          <p:cNvCxnSpPr>
-            <a:cxnSpLocks noGrp="1" noRot="1" noChangeAspect="1" noMove="1" noResize="1" noEditPoints="1" noAdjustHandles="1" noChangeArrowheads="1" noChangeShapeType="1"/>
-          </p:cNvCxnSpPr>
-          <p:nvPr>
-            <p:extLst>
-              <p:ext uri="{386F3935-93C4-4BCD-93E2-E3B085C9AB24}">
-                <p16:designElem xmlns:p16="http://schemas.microsoft.com/office/powerpoint/2015/main" val="1"/>
-              </p:ext>
-            </p:extLst>
-          </p:nvPr>
-        </p:nvCxnSpPr>
-        <p:spPr>
-          <a:xfrm>
-            <a:off x="68950" y="5127992"/>
-            <a:ext cx="3206088" cy="0"/>
-          </a:xfrm>
-          <a:prstGeom prst="line">
-            <a:avLst/>
-          </a:prstGeom>
-          <a:ln>
-            <a:solidFill>
-              <a:schemeClr val="bg1"/>
-            </a:solidFill>
-          </a:ln>
-        </p:spPr>
-        <p:style>
-          <a:lnRef idx="1">
-            <a:schemeClr val="accent1"/>
-          </a:lnRef>
-          <a:fillRef idx="0">
-            <a:schemeClr val="accent1"/>
-          </a:fillRef>
-          <a:effectRef idx="0">
-            <a:schemeClr val="accent1"/>
-          </a:effectRef>
-          <a:fontRef idx="minor">
-            <a:schemeClr val="tx1"/>
-          </a:fontRef>
-        </p:style>
-      </p:cxnSp>
-      <p:sp>
-        <p:nvSpPr>
-          <p:cNvPr id="24" name="Isosceles Triangle 30">
-            <a:extLst>
-              <a:ext uri="{FF2B5EF4-FFF2-40B4-BE49-F238E27FC236}">
-                <a16:creationId xmlns:a16="http://schemas.microsoft.com/office/drawing/2014/main" id="{56E4DBE8-15E2-4BA3-B171-C959C9CDF6BD}"/>
-              </a:ext>
-              <a:ext uri="{C183D7F6-B498-43B3-948B-1728B52AA6E4}">
-                <adec:decorative xmlns:adec="http://schemas.microsoft.com/office/drawing/2017/decorative" val="1"/>
-              </a:ext>
-            </a:extLst>
-          </p:cNvPr>
-          <p:cNvSpPr>
-            <a:spLocks noGrp="1" noRot="1" noChangeAspect="1" noMove="1" noResize="1" noEditPoints="1" noAdjustHandles="1" noChangeArrowheads="1" noChangeShapeType="1" noTextEdit="1"/>
-          </p:cNvSpPr>
-          <p:nvPr>
-            <p:extLst>
-              <p:ext uri="{386F3935-93C4-4BCD-93E2-E3B085C9AB24}">
-                <p16:designElem xmlns:p16="http://schemas.microsoft.com/office/powerpoint/2015/main" val="1"/>
-              </p:ext>
-            </p:extLst>
-          </p:nvPr>
-        </p:nvSpPr>
-        <p:spPr>
-          <a:xfrm rot="10800000">
-            <a:off x="9940" y="0"/>
-            <a:ext cx="842596" cy="5666154"/>
-          </a:xfrm>
-          <a:prstGeom prst="triangle">
-            <a:avLst>
-              <a:gd name="adj" fmla="val 100000"/>
-            </a:avLst>
-          </a:prstGeom>
-          <a:solidFill>
-            <a:schemeClr val="accent1"/>
-          </a:solidFill>
-          <a:ln>
-            <a:noFill/>
-          </a:ln>
-          <a:effectLst/>
-        </p:spPr>
-        <p:style>
-          <a:lnRef idx="1">
-            <a:schemeClr val="accent1"/>
-          </a:lnRef>
-          <a:fillRef idx="3">
-            <a:schemeClr val="accent1"/>
-          </a:fillRef>
-          <a:effectRef idx="2">
-            <a:schemeClr val="accent1"/>
-          </a:effectRef>
-          <a:fontRef idx="minor">
-            <a:schemeClr val="lt1"/>
-          </a:fontRef>
-        </p:style>
-      </p:sp>
-      <p:sp>
-        <p:nvSpPr>
-          <p:cNvPr id="3" name="Espace réservé du contenu 2">
-            <a:extLst>
-              <a:ext uri="{FF2B5EF4-FFF2-40B4-BE49-F238E27FC236}">
-                <a16:creationId xmlns:a16="http://schemas.microsoft.com/office/drawing/2014/main" id="{73A26057-EE8B-434E-BEAA-6BD0BF597AEC}"/>
-              </a:ext>
-            </a:extLst>
-          </p:cNvPr>
-          <p:cNvSpPr>
-            <a:spLocks noGrp="1"/>
-          </p:cNvSpPr>
-          <p:nvPr>
-            <p:ph idx="1"/>
-          </p:nvPr>
-        </p:nvSpPr>
-        <p:spPr>
-          <a:xfrm>
-            <a:off x="4159225" y="2160589"/>
-            <a:ext cx="5114776" cy="3880773"/>
-          </a:xfrm>
-        </p:spPr>
-        <p:txBody>
-          <a:bodyPr>
-            <a:normAutofit/>
-          </a:bodyPr>
-          <a:lstStyle/>
-          <a:p>
-            <a:r>
-              <a:rPr lang="fr-BE" dirty="0"/>
-              <a:t>Est orienté code. </a:t>
-            </a:r>
-          </a:p>
-          <a:p>
-            <a:r>
-              <a:rPr lang="fr-BE" dirty="0"/>
-              <a:t>Utilise plusieurs langages.</a:t>
-            </a:r>
-          </a:p>
-          <a:p>
-            <a:r>
-              <a:rPr lang="fr-BE" dirty="0"/>
-              <a:t>Est conviviale. Les réactions sont les bienvenues</a:t>
-            </a:r>
-            <a:endParaRPr lang="fr-FR" dirty="0"/>
-          </a:p>
-          <a:p>
-            <a:endParaRPr lang="fr-BE" dirty="0"/>
-          </a:p>
-          <a:p>
-            <a:endParaRPr lang="fr-BE" dirty="0"/>
-          </a:p>
-          <a:p>
-            <a:endParaRPr lang="fr-FR" dirty="0"/>
-          </a:p>
-        </p:txBody>
-      </p:sp>
     </p:spTree>
     <p:extLst>
       <p:ext uri="{BB962C8B-B14F-4D97-AF65-F5344CB8AC3E}">
@@ -13749,53 +12187,6 @@
           <a:chExt cx="0" cy="0"/>
         </a:xfrm>
       </p:grpSpPr>
-      <p:cxnSp>
-        <p:nvCxnSpPr>
-          <p:cNvPr id="8" name="Straight Connector 7">
-            <a:extLst>
-              <a:ext uri="{FF2B5EF4-FFF2-40B4-BE49-F238E27FC236}">
-                <a16:creationId xmlns:a16="http://schemas.microsoft.com/office/drawing/2014/main" id="{0B5F7E3B-C5F1-40E0-A491-558BAFBC1127}"/>
-              </a:ext>
-              <a:ext uri="{C183D7F6-B498-43B3-948B-1728B52AA6E4}">
-                <adec:decorative xmlns:adec="http://schemas.microsoft.com/office/drawing/2017/decorative" val="1"/>
-              </a:ext>
-            </a:extLst>
-          </p:cNvPr>
-          <p:cNvCxnSpPr>
-            <a:cxnSpLocks noGrp="1" noRot="1" noChangeAspect="1" noMove="1" noResize="1" noEditPoints="1" noAdjustHandles="1" noChangeArrowheads="1" noChangeShapeType="1"/>
-          </p:cNvCxnSpPr>
-          <p:nvPr>
-            <p:extLst>
-              <p:ext uri="{386F3935-93C4-4BCD-93E2-E3B085C9AB24}">
-                <p16:designElem xmlns:p16="http://schemas.microsoft.com/office/powerpoint/2015/main" val="1"/>
-              </p:ext>
-            </p:extLst>
-          </p:nvPr>
-        </p:nvCxnSpPr>
-        <p:spPr>
-          <a:xfrm>
-            <a:off x="4241804" y="1460500"/>
-            <a:ext cx="0" cy="3937000"/>
-          </a:xfrm>
-          <a:prstGeom prst="line">
-            <a:avLst/>
-          </a:prstGeom>
-        </p:spPr>
-        <p:style>
-          <a:lnRef idx="1">
-            <a:schemeClr val="accent1"/>
-          </a:lnRef>
-          <a:fillRef idx="0">
-            <a:schemeClr val="accent1"/>
-          </a:fillRef>
-          <a:effectRef idx="0">
-            <a:schemeClr val="accent1"/>
-          </a:effectRef>
-          <a:fontRef idx="minor">
-            <a:schemeClr val="tx1"/>
-          </a:fontRef>
-        </p:style>
-      </p:cxnSp>
       <p:sp>
         <p:nvSpPr>
           <p:cNvPr id="2" name="Titre 1">
@@ -14130,62 +12521,6 @@
           </a:custGeom>
         </p:spPr>
       </p:pic>
-      <p:sp>
-        <p:nvSpPr>
-          <p:cNvPr id="10" name="Isosceles Triangle 9">
-            <a:extLst>
-              <a:ext uri="{FF2B5EF4-FFF2-40B4-BE49-F238E27FC236}">
-                <a16:creationId xmlns:a16="http://schemas.microsoft.com/office/drawing/2014/main" id="{3BCB5F6A-9EB0-40B0-9D13-3023E9A20508}"/>
-              </a:ext>
-              <a:ext uri="{C183D7F6-B498-43B3-948B-1728B52AA6E4}">
-                <adec:decorative xmlns:adec="http://schemas.microsoft.com/office/drawing/2017/decorative" val="1"/>
-              </a:ext>
-            </a:extLst>
-          </p:cNvPr>
-          <p:cNvSpPr>
-            <a:spLocks noGrp="1" noRot="1" noChangeAspect="1" noMove="1" noResize="1" noEditPoints="1" noAdjustHandles="1" noChangeArrowheads="1" noChangeShapeType="1" noTextEdit="1"/>
-          </p:cNvSpPr>
-          <p:nvPr>
-            <p:extLst>
-              <p:ext uri="{386F3935-93C4-4BCD-93E2-E3B085C9AB24}">
-                <p16:designElem xmlns:p16="http://schemas.microsoft.com/office/powerpoint/2015/main" val="1"/>
-              </p:ext>
-            </p:extLst>
-          </p:nvPr>
-        </p:nvSpPr>
-        <p:spPr>
-          <a:xfrm rot="10800000">
-            <a:off x="0" y="0"/>
-            <a:ext cx="842596" cy="5666154"/>
-          </a:xfrm>
-          <a:prstGeom prst="triangle">
-            <a:avLst>
-              <a:gd name="adj" fmla="val 100000"/>
-            </a:avLst>
-          </a:prstGeom>
-          <a:solidFill>
-            <a:schemeClr val="accent1"/>
-          </a:solidFill>
-          <a:ln>
-            <a:noFill/>
-          </a:ln>
-          <a:effectLst/>
-        </p:spPr>
-        <p:style>
-          <a:lnRef idx="1">
-            <a:schemeClr val="accent1"/>
-          </a:lnRef>
-          <a:fillRef idx="3">
-            <a:schemeClr val="accent1"/>
-          </a:fillRef>
-          <a:effectRef idx="2">
-            <a:schemeClr val="accent1"/>
-          </a:effectRef>
-          <a:fontRef idx="minor">
-            <a:schemeClr val="lt1"/>
-          </a:fontRef>
-        </p:style>
-      </p:sp>
     </p:spTree>
     <p:extLst>
       <p:ext uri="{BB962C8B-B14F-4D97-AF65-F5344CB8AC3E}">
@@ -14753,7 +13088,7 @@
 <file path=ppt/theme/theme1.xml><?xml version="1.0" encoding="utf-8"?>
 <a:theme xmlns:a="http://schemas.openxmlformats.org/drawingml/2006/main" name="Facette">
   <a:themeElements>
-    <a:clrScheme name="Facet">
+    <a:clrScheme name="Facette">
       <a:dk1>
         <a:sysClr val="windowText" lastClr="000000"/>
       </a:dk1>
@@ -14791,7 +13126,7 @@
         <a:srgbClr val="B9D181"/>
       </a:folHlink>
     </a:clrScheme>
-    <a:fontScheme name="Facet">
+    <a:fontScheme name="Facette">
       <a:majorFont>
         <a:latin typeface="Trebuchet MS" panose="020B0603020202020204"/>
         <a:ea typeface=""/>
@@ -14863,7 +13198,7 @@
         <a:font script="Geor" typeface="Sylfaen"/>
       </a:minorFont>
     </a:fontScheme>
-    <a:fmtScheme name="Facet">
+    <a:fmtScheme name="Facette">
       <a:fillStyleLst>
         <a:solidFill>
           <a:schemeClr val="phClr"/>
@@ -15001,7 +13336,7 @@
   <a:extraClrSchemeLst/>
   <a:extLst>
     <a:ext uri="{05A4C25C-085E-4340-85A3-A5531E510DB2}">
-      <thm15:themeFamily xmlns:thm15="http://schemas.microsoft.com/office/thememl/2012/main" name="Facet" id="{C0C680CD-088A-49FC-A102-D699147F32B2}" vid="{CFBC31BA-B70F-4F30-BCAA-4F3011E16C4D}"/>
+      <thm15:themeFamily xmlns:thm15="http://schemas.microsoft.com/office/thememl/2012/main" name="Facet" id="{C0C680CD-088A-49FC-A102-D699147F32B2}" vid="{8C59B386-999D-4CB6-B907-9F3997C027CC}"/>
     </a:ext>
   </a:extLst>
 </a:theme>

</xml_diff>